<commit_message>
[PRES] Initial steps on presentation
</commit_message>
<xml_diff>
--- a/presentation/presentation_1.0.0.pptx
+++ b/presentation/presentation_1.0.0.pptx
@@ -5,10 +5,10 @@
     <p:sldMasterId id="2147483663" r:id="rId1"/>
   </p:sldMasterIdLst>
   <p:notesMasterIdLst>
-    <p:notesMasterId r:id="rId16"/>
+    <p:notesMasterId r:id="rId19"/>
   </p:notesMasterIdLst>
   <p:handoutMasterIdLst>
-    <p:handoutMasterId r:id="rId17"/>
+    <p:handoutMasterId r:id="rId20"/>
   </p:handoutMasterIdLst>
   <p:sldIdLst>
     <p:sldId id="256" r:id="rId2"/>
@@ -16,15 +16,18 @@
     <p:sldId id="258" r:id="rId4"/>
     <p:sldId id="268" r:id="rId5"/>
     <p:sldId id="259" r:id="rId6"/>
-    <p:sldId id="269" r:id="rId7"/>
-    <p:sldId id="260" r:id="rId8"/>
-    <p:sldId id="261" r:id="rId9"/>
-    <p:sldId id="262" r:id="rId10"/>
-    <p:sldId id="263" r:id="rId11"/>
-    <p:sldId id="264" r:id="rId12"/>
-    <p:sldId id="265" r:id="rId13"/>
-    <p:sldId id="266" r:id="rId14"/>
-    <p:sldId id="267" r:id="rId15"/>
+    <p:sldId id="270" r:id="rId7"/>
+    <p:sldId id="271" r:id="rId8"/>
+    <p:sldId id="272" r:id="rId9"/>
+    <p:sldId id="269" r:id="rId10"/>
+    <p:sldId id="260" r:id="rId11"/>
+    <p:sldId id="261" r:id="rId12"/>
+    <p:sldId id="262" r:id="rId13"/>
+    <p:sldId id="263" r:id="rId14"/>
+    <p:sldId id="264" r:id="rId15"/>
+    <p:sldId id="265" r:id="rId16"/>
+    <p:sldId id="266" r:id="rId17"/>
+    <p:sldId id="267" r:id="rId18"/>
   </p:sldIdLst>
   <p:sldSz cx="9144000" cy="6858000" type="screen4x3"/>
   <p:notesSz cx="6997700" cy="9283700"/>
@@ -206,14 +209,14 @@
           <a:effectLst/>
           <a:extLst>
             <a:ext uri="{909E8E84-426E-40DD-AFC4-6F175D3DCCD1}">
-              <a14:hiddenFill xmlns:a14="http://schemas.microsoft.com/office/drawing/2010/main" xmlns="">
+              <a14:hiddenFill xmlns:a14="http://schemas.microsoft.com/office/drawing/2010/main">
                 <a:solidFill>
                   <a:schemeClr val="accent1"/>
                 </a:solidFill>
               </a14:hiddenFill>
             </a:ext>
             <a:ext uri="{91240B29-F687-4F45-9708-019B960494DF}">
-              <a14:hiddenLine xmlns:a14="http://schemas.microsoft.com/office/drawing/2010/main" xmlns="" w="9525">
+              <a14:hiddenLine xmlns:a14="http://schemas.microsoft.com/office/drawing/2010/main" w="9525">
                 <a:solidFill>
                   <a:schemeClr val="tx1"/>
                 </a:solidFill>
@@ -223,7 +226,7 @@
               </a14:hiddenLine>
             </a:ext>
             <a:ext uri="{AF507438-7753-43E0-B8FC-AC1667EBCBE1}">
-              <a14:hiddenEffects xmlns:a14="http://schemas.microsoft.com/office/drawing/2010/main" xmlns="">
+              <a14:hiddenEffects xmlns:a14="http://schemas.microsoft.com/office/drawing/2010/main">
                 <a:effectLst>
                   <a:outerShdw dist="35921" dir="2700000" algn="ctr" rotWithShape="0">
                     <a:schemeClr val="bg2"/>
@@ -276,14 +279,14 @@
           <a:effectLst/>
           <a:extLst>
             <a:ext uri="{909E8E84-426E-40DD-AFC4-6F175D3DCCD1}">
-              <a14:hiddenFill xmlns:a14="http://schemas.microsoft.com/office/drawing/2010/main" xmlns="">
+              <a14:hiddenFill xmlns:a14="http://schemas.microsoft.com/office/drawing/2010/main">
                 <a:solidFill>
                   <a:schemeClr val="accent1"/>
                 </a:solidFill>
               </a14:hiddenFill>
             </a:ext>
             <a:ext uri="{91240B29-F687-4F45-9708-019B960494DF}">
-              <a14:hiddenLine xmlns:a14="http://schemas.microsoft.com/office/drawing/2010/main" xmlns="" w="9525">
+              <a14:hiddenLine xmlns:a14="http://schemas.microsoft.com/office/drawing/2010/main" w="9525">
                 <a:solidFill>
                   <a:schemeClr val="tx1"/>
                 </a:solidFill>
@@ -293,7 +296,7 @@
               </a14:hiddenLine>
             </a:ext>
             <a:ext uri="{AF507438-7753-43E0-B8FC-AC1667EBCBE1}">
-              <a14:hiddenEffects xmlns:a14="http://schemas.microsoft.com/office/drawing/2010/main" xmlns="">
+              <a14:hiddenEffects xmlns:a14="http://schemas.microsoft.com/office/drawing/2010/main">
                 <a:effectLst>
                   <a:outerShdw dist="35921" dir="2700000" algn="ctr" rotWithShape="0">
                     <a:schemeClr val="bg2"/>
@@ -346,14 +349,14 @@
           <a:effectLst/>
           <a:extLst>
             <a:ext uri="{909E8E84-426E-40DD-AFC4-6F175D3DCCD1}">
-              <a14:hiddenFill xmlns:a14="http://schemas.microsoft.com/office/drawing/2010/main" xmlns="">
+              <a14:hiddenFill xmlns:a14="http://schemas.microsoft.com/office/drawing/2010/main">
                 <a:solidFill>
                   <a:schemeClr val="accent1"/>
                 </a:solidFill>
               </a14:hiddenFill>
             </a:ext>
             <a:ext uri="{91240B29-F687-4F45-9708-019B960494DF}">
-              <a14:hiddenLine xmlns:a14="http://schemas.microsoft.com/office/drawing/2010/main" xmlns="" w="9525">
+              <a14:hiddenLine xmlns:a14="http://schemas.microsoft.com/office/drawing/2010/main" w="9525">
                 <a:solidFill>
                   <a:schemeClr val="tx1"/>
                 </a:solidFill>
@@ -363,7 +366,7 @@
               </a14:hiddenLine>
             </a:ext>
             <a:ext uri="{AF507438-7753-43E0-B8FC-AC1667EBCBE1}">
-              <a14:hiddenEffects xmlns:a14="http://schemas.microsoft.com/office/drawing/2010/main" xmlns="">
+              <a14:hiddenEffects xmlns:a14="http://schemas.microsoft.com/office/drawing/2010/main">
                 <a:effectLst>
                   <a:outerShdw dist="35921" dir="2700000" algn="ctr" rotWithShape="0">
                     <a:schemeClr val="bg2"/>
@@ -416,14 +419,14 @@
           <a:effectLst/>
           <a:extLst>
             <a:ext uri="{909E8E84-426E-40DD-AFC4-6F175D3DCCD1}">
-              <a14:hiddenFill xmlns:a14="http://schemas.microsoft.com/office/drawing/2010/main" xmlns="">
+              <a14:hiddenFill xmlns:a14="http://schemas.microsoft.com/office/drawing/2010/main">
                 <a:solidFill>
                   <a:schemeClr val="accent1"/>
                 </a:solidFill>
               </a14:hiddenFill>
             </a:ext>
             <a:ext uri="{91240B29-F687-4F45-9708-019B960494DF}">
-              <a14:hiddenLine xmlns:a14="http://schemas.microsoft.com/office/drawing/2010/main" xmlns="" w="9525">
+              <a14:hiddenLine xmlns:a14="http://schemas.microsoft.com/office/drawing/2010/main" w="9525">
                 <a:solidFill>
                   <a:schemeClr val="tx1"/>
                 </a:solidFill>
@@ -433,7 +436,7 @@
               </a14:hiddenLine>
             </a:ext>
             <a:ext uri="{AF507438-7753-43E0-B8FC-AC1667EBCBE1}">
-              <a14:hiddenEffects xmlns:a14="http://schemas.microsoft.com/office/drawing/2010/main" xmlns="">
+              <a14:hiddenEffects xmlns:a14="http://schemas.microsoft.com/office/drawing/2010/main">
                 <a:effectLst>
                   <a:outerShdw dist="35921" dir="2700000" algn="ctr" rotWithShape="0">
                     <a:schemeClr val="bg2"/>
@@ -460,7 +463,7 @@
             <a:fld id="{6C027EFB-4644-416D-B81A-F19E8B246ECA}" type="slidenum">
               <a:rPr lang="en-GB" altLang="en-US"/>
               <a:pPr/>
-              <a:t>‹nº›</a:t>
+              <a:t>‹#›</a:t>
             </a:fld>
             <a:endParaRPr lang="en-GB" altLang="en-US"/>
           </a:p>
@@ -469,7 +472,7 @@
     </p:spTree>
     <p:extLst>
       <p:ext uri="{BB962C8B-B14F-4D97-AF65-F5344CB8AC3E}">
-        <p14:creationId xmlns:p14="http://schemas.microsoft.com/office/powerpoint/2010/main" xmlns="" val="1117100711"/>
+        <p14:creationId xmlns:p14="http://schemas.microsoft.com/office/powerpoint/2010/main" val="1117100711"/>
       </p:ext>
     </p:extLst>
   </p:cSld>
@@ -527,14 +530,14 @@
           <a:effectLst/>
           <a:extLst>
             <a:ext uri="{909E8E84-426E-40DD-AFC4-6F175D3DCCD1}">
-              <a14:hiddenFill xmlns:a14="http://schemas.microsoft.com/office/drawing/2010/main" xmlns="">
+              <a14:hiddenFill xmlns:a14="http://schemas.microsoft.com/office/drawing/2010/main">
                 <a:solidFill>
                   <a:schemeClr val="accent1"/>
                 </a:solidFill>
               </a14:hiddenFill>
             </a:ext>
             <a:ext uri="{91240B29-F687-4F45-9708-019B960494DF}">
-              <a14:hiddenLine xmlns:a14="http://schemas.microsoft.com/office/drawing/2010/main" xmlns="" w="9525">
+              <a14:hiddenLine xmlns:a14="http://schemas.microsoft.com/office/drawing/2010/main" w="9525">
                 <a:solidFill>
                   <a:schemeClr val="tx1"/>
                 </a:solidFill>
@@ -544,7 +547,7 @@
               </a14:hiddenLine>
             </a:ext>
             <a:ext uri="{AF507438-7753-43E0-B8FC-AC1667EBCBE1}">
-              <a14:hiddenEffects xmlns:a14="http://schemas.microsoft.com/office/drawing/2010/main" xmlns="">
+              <a14:hiddenEffects xmlns:a14="http://schemas.microsoft.com/office/drawing/2010/main">
                 <a:effectLst>
                   <a:outerShdw dist="35921" dir="2700000" algn="ctr" rotWithShape="0">
                     <a:schemeClr val="bg2"/>
@@ -597,14 +600,14 @@
           <a:effectLst/>
           <a:extLst>
             <a:ext uri="{909E8E84-426E-40DD-AFC4-6F175D3DCCD1}">
-              <a14:hiddenFill xmlns:a14="http://schemas.microsoft.com/office/drawing/2010/main" xmlns="">
+              <a14:hiddenFill xmlns:a14="http://schemas.microsoft.com/office/drawing/2010/main">
                 <a:solidFill>
                   <a:schemeClr val="accent1"/>
                 </a:solidFill>
               </a14:hiddenFill>
             </a:ext>
             <a:ext uri="{91240B29-F687-4F45-9708-019B960494DF}">
-              <a14:hiddenLine xmlns:a14="http://schemas.microsoft.com/office/drawing/2010/main" xmlns="" w="9525">
+              <a14:hiddenLine xmlns:a14="http://schemas.microsoft.com/office/drawing/2010/main" w="9525">
                 <a:solidFill>
                   <a:schemeClr val="tx1"/>
                 </a:solidFill>
@@ -614,7 +617,7 @@
               </a14:hiddenLine>
             </a:ext>
             <a:ext uri="{AF507438-7753-43E0-B8FC-AC1667EBCBE1}">
-              <a14:hiddenEffects xmlns:a14="http://schemas.microsoft.com/office/drawing/2010/main" xmlns="">
+              <a14:hiddenEffects xmlns:a14="http://schemas.microsoft.com/office/drawing/2010/main">
                 <a:effectLst>
                   <a:outerShdw dist="35921" dir="2700000" algn="ctr" rotWithShape="0">
                     <a:schemeClr val="bg2"/>
@@ -672,7 +675,7 @@
           <a:effectLst/>
           <a:extLst>
             <a:ext uri="{AF507438-7753-43E0-B8FC-AC1667EBCBE1}">
-              <a14:hiddenEffects xmlns:a14="http://schemas.microsoft.com/office/drawing/2010/main" xmlns="">
+              <a14:hiddenEffects xmlns:a14="http://schemas.microsoft.com/office/drawing/2010/main">
                 <a:effectLst>
                   <a:outerShdw dist="35921" dir="2700000" algn="ctr" rotWithShape="0">
                     <a:srgbClr val="808080"/>
@@ -681,7 +684,7 @@
               </a14:hiddenEffects>
             </a:ext>
             <a:ext uri="{53640926-AAD7-44D8-BBD7-CCE9431645EC}">
-              <a14:shadowObscured xmlns:a14="http://schemas.microsoft.com/office/drawing/2010/main" xmlns="" val="1"/>
+              <a14:shadowObscured xmlns:a14="http://schemas.microsoft.com/office/drawing/2010/main" val="1"/>
             </a:ext>
           </a:extLst>
         </p:spPr>
@@ -711,14 +714,14 @@
           <a:effectLst/>
           <a:extLst>
             <a:ext uri="{909E8E84-426E-40DD-AFC4-6F175D3DCCD1}">
-              <a14:hiddenFill xmlns:a14="http://schemas.microsoft.com/office/drawing/2010/main" xmlns="">
+              <a14:hiddenFill xmlns:a14="http://schemas.microsoft.com/office/drawing/2010/main">
                 <a:solidFill>
                   <a:schemeClr val="accent1"/>
                 </a:solidFill>
               </a14:hiddenFill>
             </a:ext>
             <a:ext uri="{91240B29-F687-4F45-9708-019B960494DF}">
-              <a14:hiddenLine xmlns:a14="http://schemas.microsoft.com/office/drawing/2010/main" xmlns="" w="9525">
+              <a14:hiddenLine xmlns:a14="http://schemas.microsoft.com/office/drawing/2010/main" w="9525">
                 <a:solidFill>
                   <a:schemeClr val="tx1"/>
                 </a:solidFill>
@@ -728,7 +731,7 @@
               </a14:hiddenLine>
             </a:ext>
             <a:ext uri="{AF507438-7753-43E0-B8FC-AC1667EBCBE1}">
-              <a14:hiddenEffects xmlns:a14="http://schemas.microsoft.com/office/drawing/2010/main" xmlns="">
+              <a14:hiddenEffects xmlns:a14="http://schemas.microsoft.com/office/drawing/2010/main">
                 <a:effectLst>
                   <a:outerShdw dist="35921" dir="2700000" algn="ctr" rotWithShape="0">
                     <a:schemeClr val="bg2"/>
@@ -807,14 +810,14 @@
           <a:effectLst/>
           <a:extLst>
             <a:ext uri="{909E8E84-426E-40DD-AFC4-6F175D3DCCD1}">
-              <a14:hiddenFill xmlns:a14="http://schemas.microsoft.com/office/drawing/2010/main" xmlns="">
+              <a14:hiddenFill xmlns:a14="http://schemas.microsoft.com/office/drawing/2010/main">
                 <a:solidFill>
                   <a:schemeClr val="accent1"/>
                 </a:solidFill>
               </a14:hiddenFill>
             </a:ext>
             <a:ext uri="{91240B29-F687-4F45-9708-019B960494DF}">
-              <a14:hiddenLine xmlns:a14="http://schemas.microsoft.com/office/drawing/2010/main" xmlns="" w="9525">
+              <a14:hiddenLine xmlns:a14="http://schemas.microsoft.com/office/drawing/2010/main" w="9525">
                 <a:solidFill>
                   <a:schemeClr val="tx1"/>
                 </a:solidFill>
@@ -824,7 +827,7 @@
               </a14:hiddenLine>
             </a:ext>
             <a:ext uri="{AF507438-7753-43E0-B8FC-AC1667EBCBE1}">
-              <a14:hiddenEffects xmlns:a14="http://schemas.microsoft.com/office/drawing/2010/main" xmlns="">
+              <a14:hiddenEffects xmlns:a14="http://schemas.microsoft.com/office/drawing/2010/main">
                 <a:effectLst>
                   <a:outerShdw dist="35921" dir="2700000" algn="ctr" rotWithShape="0">
                     <a:schemeClr val="bg2"/>
@@ -877,14 +880,14 @@
           <a:effectLst/>
           <a:extLst>
             <a:ext uri="{909E8E84-426E-40DD-AFC4-6F175D3DCCD1}">
-              <a14:hiddenFill xmlns:a14="http://schemas.microsoft.com/office/drawing/2010/main" xmlns="">
+              <a14:hiddenFill xmlns:a14="http://schemas.microsoft.com/office/drawing/2010/main">
                 <a:solidFill>
                   <a:schemeClr val="accent1"/>
                 </a:solidFill>
               </a14:hiddenFill>
             </a:ext>
             <a:ext uri="{91240B29-F687-4F45-9708-019B960494DF}">
-              <a14:hiddenLine xmlns:a14="http://schemas.microsoft.com/office/drawing/2010/main" xmlns="" w="9525">
+              <a14:hiddenLine xmlns:a14="http://schemas.microsoft.com/office/drawing/2010/main" w="9525">
                 <a:solidFill>
                   <a:schemeClr val="tx1"/>
                 </a:solidFill>
@@ -894,7 +897,7 @@
               </a14:hiddenLine>
             </a:ext>
             <a:ext uri="{AF507438-7753-43E0-B8FC-AC1667EBCBE1}">
-              <a14:hiddenEffects xmlns:a14="http://schemas.microsoft.com/office/drawing/2010/main" xmlns="">
+              <a14:hiddenEffects xmlns:a14="http://schemas.microsoft.com/office/drawing/2010/main">
                 <a:effectLst>
                   <a:outerShdw dist="35921" dir="2700000" algn="ctr" rotWithShape="0">
                     <a:schemeClr val="bg2"/>
@@ -921,7 +924,7 @@
             <a:fld id="{2668A6B0-39CE-4449-B429-CEA1155F1F9F}" type="slidenum">
               <a:rPr lang="en-GB" altLang="en-US"/>
               <a:pPr/>
-              <a:t>‹nº›</a:t>
+              <a:t>‹#›</a:t>
             </a:fld>
             <a:endParaRPr lang="en-GB" altLang="en-US"/>
           </a:p>
@@ -930,7 +933,7 @@
     </p:spTree>
     <p:extLst>
       <p:ext uri="{BB962C8B-B14F-4D97-AF65-F5344CB8AC3E}">
-        <p14:creationId xmlns:p14="http://schemas.microsoft.com/office/powerpoint/2010/main" xmlns="" val="2478137502"/>
+        <p14:creationId xmlns:p14="http://schemas.microsoft.com/office/powerpoint/2010/main" val="2478137502"/>
       </p:ext>
     </p:extLst>
   </p:cSld>
@@ -1097,7 +1100,7 @@
             <a:fld id="{819040E0-4D5D-4F31-A92A-3B12F7FE3C43}" type="slidenum">
               <a:rPr lang="en-GB" altLang="en-US"/>
               <a:pPr/>
-              <a:t>14</a:t>
+              <a:t>17</a:t>
             </a:fld>
             <a:endParaRPr lang="en-GB" altLang="en-US"/>
           </a:p>
@@ -1332,7 +1335,7 @@
             <a:fld id="{C8AB3E90-A031-40ED-864C-0FE577295A4E}" type="slidenum">
               <a:rPr lang="en-GB" altLang="en-US"/>
               <a:pPr/>
-              <a:t>‹nº›</a:t>
+              <a:t>‹#›</a:t>
             </a:fld>
             <a:endParaRPr lang="en-GB" altLang="en-US"/>
           </a:p>
@@ -1506,7 +1509,7 @@
             <a:fld id="{DE2B9F86-01BD-4AB2-A917-3EBBF00190D1}" type="slidenum">
               <a:rPr lang="en-GB" altLang="en-US"/>
               <a:pPr/>
-              <a:t>‹nº›</a:t>
+              <a:t>‹#›</a:t>
             </a:fld>
             <a:endParaRPr lang="en-GB" altLang="en-US"/>
           </a:p>
@@ -1515,7 +1518,7 @@
     </p:spTree>
     <p:extLst>
       <p:ext uri="{BB962C8B-B14F-4D97-AF65-F5344CB8AC3E}">
-        <p14:creationId xmlns:p14="http://schemas.microsoft.com/office/powerpoint/2010/main" xmlns="" val="1685033987"/>
+        <p14:creationId xmlns:p14="http://schemas.microsoft.com/office/powerpoint/2010/main" val="1685033987"/>
       </p:ext>
     </p:extLst>
   </p:cSld>
@@ -1695,7 +1698,7 @@
             <a:fld id="{D1147624-9B02-4BF5-B493-9E73928D4D99}" type="slidenum">
               <a:rPr lang="en-GB" altLang="en-US"/>
               <a:pPr/>
-              <a:t>‹nº›</a:t>
+              <a:t>‹#›</a:t>
             </a:fld>
             <a:endParaRPr lang="en-GB" altLang="en-US"/>
           </a:p>
@@ -1704,7 +1707,7 @@
     </p:spTree>
     <p:extLst>
       <p:ext uri="{BB962C8B-B14F-4D97-AF65-F5344CB8AC3E}">
-        <p14:creationId xmlns:p14="http://schemas.microsoft.com/office/powerpoint/2010/main" xmlns="" val="2831046476"/>
+        <p14:creationId xmlns:p14="http://schemas.microsoft.com/office/powerpoint/2010/main" val="2831046476"/>
       </p:ext>
     </p:extLst>
   </p:cSld>
@@ -1874,7 +1877,7 @@
             <a:fld id="{2F90CFF5-16EB-46D8-931E-269E2410E6A6}" type="slidenum">
               <a:rPr lang="en-GB" altLang="en-US"/>
               <a:pPr/>
-              <a:t>‹nº›</a:t>
+              <a:t>‹#›</a:t>
             </a:fld>
             <a:endParaRPr lang="en-GB" altLang="en-US"/>
           </a:p>
@@ -1883,7 +1886,7 @@
     </p:spTree>
     <p:extLst>
       <p:ext uri="{BB962C8B-B14F-4D97-AF65-F5344CB8AC3E}">
-        <p14:creationId xmlns:p14="http://schemas.microsoft.com/office/powerpoint/2010/main" xmlns="" val="3951937901"/>
+        <p14:creationId xmlns:p14="http://schemas.microsoft.com/office/powerpoint/2010/main" val="3951937901"/>
       </p:ext>
     </p:extLst>
   </p:cSld>
@@ -2075,7 +2078,7 @@
             <a:fld id="{5E28F0CB-2D3D-41AD-BCAB-2DD5D90E301A}" type="slidenum">
               <a:rPr lang="en-GB" altLang="en-US"/>
               <a:pPr/>
-              <a:t>‹nº›</a:t>
+              <a:t>‹#›</a:t>
             </a:fld>
             <a:endParaRPr lang="en-GB" altLang="en-US"/>
           </a:p>
@@ -2084,7 +2087,7 @@
     </p:spTree>
     <p:extLst>
       <p:ext uri="{BB962C8B-B14F-4D97-AF65-F5344CB8AC3E}">
-        <p14:creationId xmlns:p14="http://schemas.microsoft.com/office/powerpoint/2010/main" xmlns="" val="277518866"/>
+        <p14:creationId xmlns:p14="http://schemas.microsoft.com/office/powerpoint/2010/main" val="277518866"/>
       </p:ext>
     </p:extLst>
   </p:cSld>
@@ -2372,7 +2375,7 @@
             <a:fld id="{97402484-938B-4517-BB33-B3B29C04DB26}" type="slidenum">
               <a:rPr lang="en-GB" altLang="en-US"/>
               <a:pPr/>
-              <a:t>‹nº›</a:t>
+              <a:t>‹#›</a:t>
             </a:fld>
             <a:endParaRPr lang="en-GB" altLang="en-US"/>
           </a:p>
@@ -2381,7 +2384,7 @@
     </p:spTree>
     <p:extLst>
       <p:ext uri="{BB962C8B-B14F-4D97-AF65-F5344CB8AC3E}">
-        <p14:creationId xmlns:p14="http://schemas.microsoft.com/office/powerpoint/2010/main" xmlns="" val="1549182660"/>
+        <p14:creationId xmlns:p14="http://schemas.microsoft.com/office/powerpoint/2010/main" val="1549182660"/>
       </p:ext>
     </p:extLst>
   </p:cSld>
@@ -2808,7 +2811,7 @@
             <a:fld id="{B6FA9CB4-CBE3-457C-ABF5-8CF2F9FA81F1}" type="slidenum">
               <a:rPr lang="en-GB" altLang="en-US"/>
               <a:pPr/>
-              <a:t>‹nº›</a:t>
+              <a:t>‹#›</a:t>
             </a:fld>
             <a:endParaRPr lang="en-GB" altLang="en-US"/>
           </a:p>
@@ -2817,7 +2820,7 @@
     </p:spTree>
     <p:extLst>
       <p:ext uri="{BB962C8B-B14F-4D97-AF65-F5344CB8AC3E}">
-        <p14:creationId xmlns:p14="http://schemas.microsoft.com/office/powerpoint/2010/main" xmlns="" val="97857459"/>
+        <p14:creationId xmlns:p14="http://schemas.microsoft.com/office/powerpoint/2010/main" val="97857459"/>
       </p:ext>
     </p:extLst>
   </p:cSld>
@@ -2935,7 +2938,7 @@
             <a:fld id="{B0238676-A5C6-441D-871D-BA22E0B2CF97}" type="slidenum">
               <a:rPr lang="en-GB" altLang="en-US"/>
               <a:pPr/>
-              <a:t>‹nº›</a:t>
+              <a:t>‹#›</a:t>
             </a:fld>
             <a:endParaRPr lang="en-GB" altLang="en-US"/>
           </a:p>
@@ -2944,7 +2947,7 @@
     </p:spTree>
     <p:extLst>
       <p:ext uri="{BB962C8B-B14F-4D97-AF65-F5344CB8AC3E}">
-        <p14:creationId xmlns:p14="http://schemas.microsoft.com/office/powerpoint/2010/main" xmlns="" val="1927087680"/>
+        <p14:creationId xmlns:p14="http://schemas.microsoft.com/office/powerpoint/2010/main" val="1927087680"/>
       </p:ext>
     </p:extLst>
   </p:cSld>
@@ -3039,7 +3042,7 @@
             <a:fld id="{4EFED0D0-D77C-4087-B9DB-216A832FF7B7}" type="slidenum">
               <a:rPr lang="en-GB" altLang="en-US"/>
               <a:pPr/>
-              <a:t>‹nº›</a:t>
+              <a:t>‹#›</a:t>
             </a:fld>
             <a:endParaRPr lang="en-GB" altLang="en-US"/>
           </a:p>
@@ -3048,7 +3051,7 @@
     </p:spTree>
     <p:extLst>
       <p:ext uri="{BB962C8B-B14F-4D97-AF65-F5344CB8AC3E}">
-        <p14:creationId xmlns:p14="http://schemas.microsoft.com/office/powerpoint/2010/main" xmlns="" val="2063913859"/>
+        <p14:creationId xmlns:p14="http://schemas.microsoft.com/office/powerpoint/2010/main" val="2063913859"/>
       </p:ext>
     </p:extLst>
   </p:cSld>
@@ -3325,7 +3328,7 @@
             <a:fld id="{080243EE-BA26-4E12-89DB-9BA7250AD0AF}" type="slidenum">
               <a:rPr lang="en-GB" altLang="en-US"/>
               <a:pPr/>
-              <a:t>‹nº›</a:t>
+              <a:t>‹#›</a:t>
             </a:fld>
             <a:endParaRPr lang="en-GB" altLang="en-US"/>
           </a:p>
@@ -3334,7 +3337,7 @@
     </p:spTree>
     <p:extLst>
       <p:ext uri="{BB962C8B-B14F-4D97-AF65-F5344CB8AC3E}">
-        <p14:creationId xmlns:p14="http://schemas.microsoft.com/office/powerpoint/2010/main" xmlns="" val="1481749320"/>
+        <p14:creationId xmlns:p14="http://schemas.microsoft.com/office/powerpoint/2010/main" val="1481749320"/>
       </p:ext>
     </p:extLst>
   </p:cSld>
@@ -3591,7 +3594,7 @@
             <a:fld id="{C2A4BA49-06BA-4A16-A84C-C141ADB185A3}" type="slidenum">
               <a:rPr lang="en-GB" altLang="en-US"/>
               <a:pPr/>
-              <a:t>‹nº›</a:t>
+              <a:t>‹#›</a:t>
             </a:fld>
             <a:endParaRPr lang="en-GB" altLang="en-US"/>
           </a:p>
@@ -3600,7 +3603,7 @@
     </p:spTree>
     <p:extLst>
       <p:ext uri="{BB962C8B-B14F-4D97-AF65-F5344CB8AC3E}">
-        <p14:creationId xmlns:p14="http://schemas.microsoft.com/office/powerpoint/2010/main" xmlns="" val="2983627013"/>
+        <p14:creationId xmlns:p14="http://schemas.microsoft.com/office/powerpoint/2010/main" val="2983627013"/>
       </p:ext>
     </p:extLst>
   </p:cSld>
@@ -3664,14 +3667,14 @@
           <a:effectLst/>
           <a:extLst>
             <a:ext uri="{909E8E84-426E-40DD-AFC4-6F175D3DCCD1}">
-              <a14:hiddenFill xmlns:a14="http://schemas.microsoft.com/office/drawing/2010/main" xmlns="">
+              <a14:hiddenFill xmlns:a14="http://schemas.microsoft.com/office/drawing/2010/main">
                 <a:solidFill>
                   <a:schemeClr val="accent1"/>
                 </a:solidFill>
               </a14:hiddenFill>
             </a:ext>
             <a:ext uri="{91240B29-F687-4F45-9708-019B960494DF}">
-              <a14:hiddenLine xmlns:a14="http://schemas.microsoft.com/office/drawing/2010/main" xmlns="" w="9525">
+              <a14:hiddenLine xmlns:a14="http://schemas.microsoft.com/office/drawing/2010/main" w="9525">
                 <a:solidFill>
                   <a:schemeClr val="tx1"/>
                 </a:solidFill>
@@ -3681,7 +3684,7 @@
               </a14:hiddenLine>
             </a:ext>
             <a:ext uri="{AF507438-7753-43E0-B8FC-AC1667EBCBE1}">
-              <a14:hiddenEffects xmlns:a14="http://schemas.microsoft.com/office/drawing/2010/main" xmlns="">
+              <a14:hiddenEffects xmlns:a14="http://schemas.microsoft.com/office/drawing/2010/main">
                 <a:effectLst>
                   <a:outerShdw dist="35921" dir="2700000" algn="ctr" rotWithShape="0">
                     <a:schemeClr val="bg2"/>
@@ -3733,14 +3736,14 @@
           <a:effectLst/>
           <a:extLst>
             <a:ext uri="{909E8E84-426E-40DD-AFC4-6F175D3DCCD1}">
-              <a14:hiddenFill xmlns:a14="http://schemas.microsoft.com/office/drawing/2010/main" xmlns="">
+              <a14:hiddenFill xmlns:a14="http://schemas.microsoft.com/office/drawing/2010/main">
                 <a:solidFill>
                   <a:schemeClr val="accent1"/>
                 </a:solidFill>
               </a14:hiddenFill>
             </a:ext>
             <a:ext uri="{91240B29-F687-4F45-9708-019B960494DF}">
-              <a14:hiddenLine xmlns:a14="http://schemas.microsoft.com/office/drawing/2010/main" xmlns="" w="9525">
+              <a14:hiddenLine xmlns:a14="http://schemas.microsoft.com/office/drawing/2010/main" w="9525">
                 <a:solidFill>
                   <a:schemeClr val="tx1"/>
                 </a:solidFill>
@@ -3750,7 +3753,7 @@
               </a14:hiddenLine>
             </a:ext>
             <a:ext uri="{AF507438-7753-43E0-B8FC-AC1667EBCBE1}">
-              <a14:hiddenEffects xmlns:a14="http://schemas.microsoft.com/office/drawing/2010/main" xmlns="">
+              <a14:hiddenEffects xmlns:a14="http://schemas.microsoft.com/office/drawing/2010/main">
                 <a:effectLst>
                   <a:outerShdw dist="35921" dir="2700000" algn="ctr" rotWithShape="0">
                     <a:schemeClr val="bg2"/>
@@ -3830,14 +3833,14 @@
           <a:effectLst/>
           <a:extLst>
             <a:ext uri="{909E8E84-426E-40DD-AFC4-6F175D3DCCD1}">
-              <a14:hiddenFill xmlns:a14="http://schemas.microsoft.com/office/drawing/2010/main" xmlns="">
+              <a14:hiddenFill xmlns:a14="http://schemas.microsoft.com/office/drawing/2010/main">
                 <a:solidFill>
                   <a:schemeClr val="accent1"/>
                 </a:solidFill>
               </a14:hiddenFill>
             </a:ext>
             <a:ext uri="{91240B29-F687-4F45-9708-019B960494DF}">
-              <a14:hiddenLine xmlns:a14="http://schemas.microsoft.com/office/drawing/2010/main" xmlns="" w="9525">
+              <a14:hiddenLine xmlns:a14="http://schemas.microsoft.com/office/drawing/2010/main" w="9525">
                 <a:solidFill>
                   <a:schemeClr val="tx1"/>
                 </a:solidFill>
@@ -3847,7 +3850,7 @@
               </a14:hiddenLine>
             </a:ext>
             <a:ext uri="{AF507438-7753-43E0-B8FC-AC1667EBCBE1}">
-              <a14:hiddenEffects xmlns:a14="http://schemas.microsoft.com/office/drawing/2010/main" xmlns="">
+              <a14:hiddenEffects xmlns:a14="http://schemas.microsoft.com/office/drawing/2010/main">
                 <a:effectLst>
                   <a:outerShdw dist="35921" dir="2700000" algn="ctr" rotWithShape="0">
                     <a:schemeClr val="bg2"/>
@@ -3900,14 +3903,14 @@
           <a:effectLst/>
           <a:extLst>
             <a:ext uri="{909E8E84-426E-40DD-AFC4-6F175D3DCCD1}">
-              <a14:hiddenFill xmlns:a14="http://schemas.microsoft.com/office/drawing/2010/main" xmlns="">
+              <a14:hiddenFill xmlns:a14="http://schemas.microsoft.com/office/drawing/2010/main">
                 <a:solidFill>
                   <a:schemeClr val="accent1"/>
                 </a:solidFill>
               </a14:hiddenFill>
             </a:ext>
             <a:ext uri="{91240B29-F687-4F45-9708-019B960494DF}">
-              <a14:hiddenLine xmlns:a14="http://schemas.microsoft.com/office/drawing/2010/main" xmlns="" w="9525">
+              <a14:hiddenLine xmlns:a14="http://schemas.microsoft.com/office/drawing/2010/main" w="9525">
                 <a:solidFill>
                   <a:schemeClr val="tx1"/>
                 </a:solidFill>
@@ -3917,7 +3920,7 @@
               </a14:hiddenLine>
             </a:ext>
             <a:ext uri="{AF507438-7753-43E0-B8FC-AC1667EBCBE1}">
-              <a14:hiddenEffects xmlns:a14="http://schemas.microsoft.com/office/drawing/2010/main" xmlns="">
+              <a14:hiddenEffects xmlns:a14="http://schemas.microsoft.com/office/drawing/2010/main">
                 <a:effectLst>
                   <a:outerShdw dist="35921" dir="2700000" algn="ctr" rotWithShape="0">
                     <a:schemeClr val="bg2"/>
@@ -3970,14 +3973,14 @@
           <a:effectLst/>
           <a:extLst>
             <a:ext uri="{909E8E84-426E-40DD-AFC4-6F175D3DCCD1}">
-              <a14:hiddenFill xmlns:a14="http://schemas.microsoft.com/office/drawing/2010/main" xmlns="">
+              <a14:hiddenFill xmlns:a14="http://schemas.microsoft.com/office/drawing/2010/main">
                 <a:solidFill>
                   <a:schemeClr val="accent1"/>
                 </a:solidFill>
               </a14:hiddenFill>
             </a:ext>
             <a:ext uri="{91240B29-F687-4F45-9708-019B960494DF}">
-              <a14:hiddenLine xmlns:a14="http://schemas.microsoft.com/office/drawing/2010/main" xmlns="" w="9525">
+              <a14:hiddenLine xmlns:a14="http://schemas.microsoft.com/office/drawing/2010/main" w="9525">
                 <a:solidFill>
                   <a:schemeClr val="tx1"/>
                 </a:solidFill>
@@ -3987,7 +3990,7 @@
               </a14:hiddenLine>
             </a:ext>
             <a:ext uri="{AF507438-7753-43E0-B8FC-AC1667EBCBE1}">
-              <a14:hiddenEffects xmlns:a14="http://schemas.microsoft.com/office/drawing/2010/main" xmlns="">
+              <a14:hiddenEffects xmlns:a14="http://schemas.microsoft.com/office/drawing/2010/main">
                 <a:effectLst>
                   <a:outerShdw dist="35921" dir="2700000" algn="ctr" rotWithShape="0">
                     <a:schemeClr val="bg2"/>
@@ -4014,7 +4017,7 @@
             <a:fld id="{E477BC0E-3AE9-42A1-BC3F-DA76B085E71D}" type="slidenum">
               <a:rPr lang="en-GB" altLang="en-US"/>
               <a:pPr/>
-              <a:t>‹nº›</a:t>
+              <a:t>‹#›</a:t>
             </a:fld>
             <a:endParaRPr lang="en-GB" altLang="en-US"/>
           </a:p>
@@ -4690,7 +4693,7 @@
           <a:blip r:embed="rId2" cstate="print">
             <a:extLst>
               <a:ext uri="{28A0092B-C50C-407E-A947-70E740481C1C}">
-                <a14:useLocalDpi xmlns:a14="http://schemas.microsoft.com/office/drawing/2010/main" xmlns="" val="0"/>
+                <a14:useLocalDpi xmlns:a14="http://schemas.microsoft.com/office/drawing/2010/main" val="0"/>
               </a:ext>
             </a:extLst>
           </a:blip>
@@ -4713,14 +4716,14 @@
           </a:ln>
           <a:extLst>
             <a:ext uri="{909E8E84-426E-40DD-AFC4-6F175D3DCCD1}">
-              <a14:hiddenFill xmlns:a14="http://schemas.microsoft.com/office/drawing/2010/main" xmlns="">
+              <a14:hiddenFill xmlns:a14="http://schemas.microsoft.com/office/drawing/2010/main">
                 <a:solidFill>
                   <a:srgbClr val="FFFFFF"/>
                 </a:solidFill>
               </a14:hiddenFill>
             </a:ext>
             <a:ext uri="{91240B29-F687-4F45-9708-019B960494DF}">
-              <a14:hiddenLine xmlns:a14="http://schemas.microsoft.com/office/drawing/2010/main" xmlns="" w="9525">
+              <a14:hiddenLine xmlns:a14="http://schemas.microsoft.com/office/drawing/2010/main" w="9525">
                 <a:solidFill>
                   <a:srgbClr val="000000"/>
                 </a:solidFill>
@@ -4766,7 +4769,7 @@
       </p:grpSpPr>
       <p:sp>
         <p:nvSpPr>
-          <p:cNvPr id="23554" name="Rectangle 2"/>
+          <p:cNvPr id="20482" name="Rectangle 2"/>
           <p:cNvSpPr>
             <a:spLocks noGrp="1" noChangeArrowheads="1"/>
           </p:cNvSpPr>
@@ -4781,14 +4784,14 @@
           <a:p>
             <a:r>
               <a:rPr lang="en-GB" altLang="en-US"/>
-              <a:t>Goals and Objectives</a:t>
+              <a:t>Opportunities</a:t>
             </a:r>
           </a:p>
         </p:txBody>
       </p:sp>
       <p:sp>
         <p:nvSpPr>
-          <p:cNvPr id="23555" name="Rectangle 3"/>
+          <p:cNvPr id="20483" name="Rectangle 3"/>
           <p:cNvSpPr>
             <a:spLocks noGrp="1" noChangeArrowheads="1"/>
           </p:cNvSpPr>
@@ -4803,27 +4806,14 @@
           <a:p>
             <a:r>
               <a:rPr lang="en-GB" altLang="en-US"/>
-              <a:t>List five-year goals.</a:t>
-            </a:r>
-          </a:p>
-          <a:p>
+              <a:t>Identify problems and opportunities.</a:t>
+            </a:r>
+          </a:p>
+          <a:p>
+            <a:pPr lvl="1"/>
             <a:r>
               <a:rPr lang="en-GB" altLang="en-US"/>
-              <a:t>State specific, measurable objectives for achieving your five-year goals.</a:t>
-            </a:r>
-          </a:p>
-          <a:p>
-            <a:pPr lvl="1"/>
-            <a:r>
-              <a:rPr lang="en-GB" altLang="en-US"/>
-              <a:t>List market-share objectives.</a:t>
-            </a:r>
-          </a:p>
-          <a:p>
-            <a:pPr lvl="1"/>
-            <a:r>
-              <a:rPr lang="en-GB" altLang="en-US"/>
-              <a:t>List revenue/profitability objectives.</a:t>
+              <a:t>State consumer problems, and define the nature of product/service opportunities that are created by those problems.</a:t>
             </a:r>
           </a:p>
         </p:txBody>
@@ -4862,7 +4852,7 @@
       </p:grpSpPr>
       <p:sp>
         <p:nvSpPr>
-          <p:cNvPr id="24578" name="Rectangle 2"/>
+          <p:cNvPr id="21506" name="Rectangle 2"/>
           <p:cNvSpPr>
             <a:spLocks noGrp="1" noChangeArrowheads="1"/>
           </p:cNvSpPr>
@@ -4877,14 +4867,14 @@
           <a:p>
             <a:r>
               <a:rPr lang="en-GB" altLang="en-US"/>
-              <a:t>Financial Plan</a:t>
+              <a:t>Business Concept</a:t>
             </a:r>
           </a:p>
         </p:txBody>
       </p:sp>
       <p:sp>
         <p:nvSpPr>
-          <p:cNvPr id="24579" name="Rectangle 3"/>
+          <p:cNvPr id="21507" name="Rectangle 3"/>
           <p:cNvSpPr>
             <a:spLocks noGrp="1" noChangeArrowheads="1"/>
           </p:cNvSpPr>
@@ -4899,21 +4889,7 @@
           <a:p>
             <a:r>
               <a:rPr lang="en-GB" altLang="en-US"/>
-              <a:t>Outline a high-level financial plan that defines your financial model and pricing assumptions. </a:t>
-            </a:r>
-          </a:p>
-          <a:p>
-            <a:pPr lvl="1"/>
-            <a:r>
-              <a:rPr lang="en-GB" altLang="en-US"/>
-              <a:t>This plan should include expected annual sales and profits for the next three years.</a:t>
-            </a:r>
-          </a:p>
-          <a:p>
-            <a:pPr lvl="1"/>
-            <a:r>
-              <a:rPr lang="en-GB" altLang="en-US"/>
-              <a:t>Use several slides to cover this material appropriately.</a:t>
+              <a:t>Summarize the key technology, concept, or strategy on which your business is based.</a:t>
             </a:r>
           </a:p>
         </p:txBody>
@@ -4952,7 +4928,7 @@
       </p:grpSpPr>
       <p:sp>
         <p:nvSpPr>
-          <p:cNvPr id="25602" name="Rectangle 2"/>
+          <p:cNvPr id="22530" name="Rectangle 2"/>
           <p:cNvSpPr>
             <a:spLocks noGrp="1" noChangeArrowheads="1"/>
           </p:cNvSpPr>
@@ -4967,14 +4943,14 @@
           <a:p>
             <a:r>
               <a:rPr lang="en-GB" altLang="en-US"/>
-              <a:t>Resource Requirements</a:t>
+              <a:t>Competition</a:t>
             </a:r>
           </a:p>
         </p:txBody>
       </p:sp>
       <p:sp>
         <p:nvSpPr>
-          <p:cNvPr id="25603" name="Rectangle 3"/>
+          <p:cNvPr id="22531" name="Rectangle 3"/>
           <p:cNvSpPr>
             <a:spLocks noGrp="1" noChangeArrowheads="1"/>
           </p:cNvSpPr>
@@ -4989,56 +4965,13 @@
           <a:p>
             <a:r>
               <a:rPr lang="en-GB" altLang="en-US"/>
-              <a:t>List requirements for the following resources:</a:t>
-            </a:r>
-          </a:p>
-          <a:p>
-            <a:pPr lvl="1"/>
+              <a:t>Summarize the competition.</a:t>
+            </a:r>
+          </a:p>
+          <a:p>
             <a:r>
               <a:rPr lang="en-GB" altLang="en-US"/>
-              <a:t>Personnel</a:t>
-            </a:r>
-          </a:p>
-          <a:p>
-            <a:pPr lvl="1"/>
-            <a:r>
-              <a:rPr lang="en-GB" altLang="en-US"/>
-              <a:t>Technology</a:t>
-            </a:r>
-          </a:p>
-          <a:p>
-            <a:pPr lvl="1"/>
-            <a:r>
-              <a:rPr lang="en-GB" altLang="en-US"/>
-              <a:t>Finances</a:t>
-            </a:r>
-          </a:p>
-          <a:p>
-            <a:pPr lvl="1"/>
-            <a:r>
-              <a:rPr lang="en-GB" altLang="en-US"/>
-              <a:t>Distribution</a:t>
-            </a:r>
-          </a:p>
-          <a:p>
-            <a:pPr lvl="1"/>
-            <a:r>
-              <a:rPr lang="en-GB" altLang="en-US"/>
-              <a:t>Promotion</a:t>
-            </a:r>
-          </a:p>
-          <a:p>
-            <a:pPr lvl="1"/>
-            <a:r>
-              <a:rPr lang="en-GB" altLang="en-US"/>
-              <a:t>Products</a:t>
-            </a:r>
-          </a:p>
-          <a:p>
-            <a:pPr lvl="1"/>
-            <a:r>
-              <a:rPr lang="en-GB" altLang="en-US"/>
-              <a:t>Services</a:t>
+              <a:t>Outline your company’s competitive advantage.</a:t>
             </a:r>
           </a:p>
         </p:txBody>
@@ -5077,7 +5010,7 @@
       </p:grpSpPr>
       <p:sp>
         <p:nvSpPr>
-          <p:cNvPr id="26626" name="Rectangle 2"/>
+          <p:cNvPr id="23554" name="Rectangle 2"/>
           <p:cNvSpPr>
             <a:spLocks noGrp="1" noChangeArrowheads="1"/>
           </p:cNvSpPr>
@@ -5092,14 +5025,14 @@
           <a:p>
             <a:r>
               <a:rPr lang="en-GB" altLang="en-US"/>
-              <a:t>Risks and Rewards</a:t>
+              <a:t>Goals and Objectives</a:t>
             </a:r>
           </a:p>
         </p:txBody>
       </p:sp>
       <p:sp>
         <p:nvSpPr>
-          <p:cNvPr id="26627" name="Rectangle 3"/>
+          <p:cNvPr id="23555" name="Rectangle 3"/>
           <p:cNvSpPr>
             <a:spLocks noGrp="1" noChangeArrowheads="1"/>
           </p:cNvSpPr>
@@ -5114,13 +5047,27 @@
           <a:p>
             <a:r>
               <a:rPr lang="en-GB" altLang="en-US"/>
-              <a:t>Summarize the risks of the proposed project and how they will be addressed.</a:t>
+              <a:t>List five-year goals.</a:t>
             </a:r>
           </a:p>
           <a:p>
             <a:r>
               <a:rPr lang="en-GB" altLang="en-US"/>
-              <a:t>Estimate expected rewards, particularly if you are seeking funding.</a:t>
+              <a:t>State specific, measurable objectives for achieving your five-year goals.</a:t>
+            </a:r>
+          </a:p>
+          <a:p>
+            <a:pPr lvl="1"/>
+            <a:r>
+              <a:rPr lang="en-GB" altLang="en-US"/>
+              <a:t>List market-share objectives.</a:t>
+            </a:r>
+          </a:p>
+          <a:p>
+            <a:pPr lvl="1"/>
+            <a:r>
+              <a:rPr lang="en-GB" altLang="en-US"/>
+              <a:t>List revenue/profitability objectives.</a:t>
             </a:r>
           </a:p>
         </p:txBody>
@@ -5141,6 +5088,303 @@
 </file>
 
 <file path=ppt/slides/slide14.xml><?xml version="1.0" encoding="utf-8"?>
+<p:sld xmlns:a="http://schemas.openxmlformats.org/drawingml/2006/main" xmlns:r="http://schemas.openxmlformats.org/officeDocument/2006/relationships" xmlns:p="http://schemas.openxmlformats.org/presentationml/2006/main">
+  <p:cSld>
+    <p:spTree>
+      <p:nvGrpSpPr>
+        <p:cNvPr id="1" name=""/>
+        <p:cNvGrpSpPr/>
+        <p:nvPr/>
+      </p:nvGrpSpPr>
+      <p:grpSpPr>
+        <a:xfrm>
+          <a:off x="0" y="0"/>
+          <a:ext cx="0" cy="0"/>
+          <a:chOff x="0" y="0"/>
+          <a:chExt cx="0" cy="0"/>
+        </a:xfrm>
+      </p:grpSpPr>
+      <p:sp>
+        <p:nvSpPr>
+          <p:cNvPr id="24578" name="Rectangle 2"/>
+          <p:cNvSpPr>
+            <a:spLocks noGrp="1" noChangeArrowheads="1"/>
+          </p:cNvSpPr>
+          <p:nvPr>
+            <p:ph type="title"/>
+          </p:nvPr>
+        </p:nvSpPr>
+        <p:spPr/>
+        <p:txBody>
+          <a:bodyPr/>
+          <a:lstStyle/>
+          <a:p>
+            <a:r>
+              <a:rPr lang="en-GB" altLang="en-US"/>
+              <a:t>Financial Plan</a:t>
+            </a:r>
+          </a:p>
+        </p:txBody>
+      </p:sp>
+      <p:sp>
+        <p:nvSpPr>
+          <p:cNvPr id="24579" name="Rectangle 3"/>
+          <p:cNvSpPr>
+            <a:spLocks noGrp="1" noChangeArrowheads="1"/>
+          </p:cNvSpPr>
+          <p:nvPr>
+            <p:ph type="body" idx="1"/>
+          </p:nvPr>
+        </p:nvSpPr>
+        <p:spPr/>
+        <p:txBody>
+          <a:bodyPr/>
+          <a:lstStyle/>
+          <a:p>
+            <a:r>
+              <a:rPr lang="en-GB" altLang="en-US"/>
+              <a:t>Outline a high-level financial plan that defines your financial model and pricing assumptions. </a:t>
+            </a:r>
+          </a:p>
+          <a:p>
+            <a:pPr lvl="1"/>
+            <a:r>
+              <a:rPr lang="en-GB" altLang="en-US"/>
+              <a:t>This plan should include expected annual sales and profits for the next three years.</a:t>
+            </a:r>
+          </a:p>
+          <a:p>
+            <a:pPr lvl="1"/>
+            <a:r>
+              <a:rPr lang="en-GB" altLang="en-US"/>
+              <a:t>Use several slides to cover this material appropriately.</a:t>
+            </a:r>
+          </a:p>
+        </p:txBody>
+      </p:sp>
+    </p:spTree>
+  </p:cSld>
+  <p:clrMapOvr>
+    <a:masterClrMapping/>
+  </p:clrMapOvr>
+  <p:timing>
+    <p:tnLst>
+      <p:par>
+        <p:cTn id="1" dur="indefinite" restart="never" nodeType="tmRoot"/>
+      </p:par>
+    </p:tnLst>
+  </p:timing>
+</p:sld>
+</file>
+
+<file path=ppt/slides/slide15.xml><?xml version="1.0" encoding="utf-8"?>
+<p:sld xmlns:a="http://schemas.openxmlformats.org/drawingml/2006/main" xmlns:r="http://schemas.openxmlformats.org/officeDocument/2006/relationships" xmlns:p="http://schemas.openxmlformats.org/presentationml/2006/main">
+  <p:cSld>
+    <p:spTree>
+      <p:nvGrpSpPr>
+        <p:cNvPr id="1" name=""/>
+        <p:cNvGrpSpPr/>
+        <p:nvPr/>
+      </p:nvGrpSpPr>
+      <p:grpSpPr>
+        <a:xfrm>
+          <a:off x="0" y="0"/>
+          <a:ext cx="0" cy="0"/>
+          <a:chOff x="0" y="0"/>
+          <a:chExt cx="0" cy="0"/>
+        </a:xfrm>
+      </p:grpSpPr>
+      <p:sp>
+        <p:nvSpPr>
+          <p:cNvPr id="25602" name="Rectangle 2"/>
+          <p:cNvSpPr>
+            <a:spLocks noGrp="1" noChangeArrowheads="1"/>
+          </p:cNvSpPr>
+          <p:nvPr>
+            <p:ph type="title"/>
+          </p:nvPr>
+        </p:nvSpPr>
+        <p:spPr/>
+        <p:txBody>
+          <a:bodyPr/>
+          <a:lstStyle/>
+          <a:p>
+            <a:r>
+              <a:rPr lang="en-GB" altLang="en-US"/>
+              <a:t>Resource Requirements</a:t>
+            </a:r>
+          </a:p>
+        </p:txBody>
+      </p:sp>
+      <p:sp>
+        <p:nvSpPr>
+          <p:cNvPr id="25603" name="Rectangle 3"/>
+          <p:cNvSpPr>
+            <a:spLocks noGrp="1" noChangeArrowheads="1"/>
+          </p:cNvSpPr>
+          <p:nvPr>
+            <p:ph type="body" idx="1"/>
+          </p:nvPr>
+        </p:nvSpPr>
+        <p:spPr/>
+        <p:txBody>
+          <a:bodyPr/>
+          <a:lstStyle/>
+          <a:p>
+            <a:r>
+              <a:rPr lang="en-GB" altLang="en-US"/>
+              <a:t>List requirements for the following resources:</a:t>
+            </a:r>
+          </a:p>
+          <a:p>
+            <a:pPr lvl="1"/>
+            <a:r>
+              <a:rPr lang="en-GB" altLang="en-US"/>
+              <a:t>Personnel</a:t>
+            </a:r>
+          </a:p>
+          <a:p>
+            <a:pPr lvl="1"/>
+            <a:r>
+              <a:rPr lang="en-GB" altLang="en-US"/>
+              <a:t>Technology</a:t>
+            </a:r>
+          </a:p>
+          <a:p>
+            <a:pPr lvl="1"/>
+            <a:r>
+              <a:rPr lang="en-GB" altLang="en-US"/>
+              <a:t>Finances</a:t>
+            </a:r>
+          </a:p>
+          <a:p>
+            <a:pPr lvl="1"/>
+            <a:r>
+              <a:rPr lang="en-GB" altLang="en-US"/>
+              <a:t>Distribution</a:t>
+            </a:r>
+          </a:p>
+          <a:p>
+            <a:pPr lvl="1"/>
+            <a:r>
+              <a:rPr lang="en-GB" altLang="en-US"/>
+              <a:t>Promotion</a:t>
+            </a:r>
+          </a:p>
+          <a:p>
+            <a:pPr lvl="1"/>
+            <a:r>
+              <a:rPr lang="en-GB" altLang="en-US"/>
+              <a:t>Products</a:t>
+            </a:r>
+          </a:p>
+          <a:p>
+            <a:pPr lvl="1"/>
+            <a:r>
+              <a:rPr lang="en-GB" altLang="en-US"/>
+              <a:t>Services</a:t>
+            </a:r>
+          </a:p>
+        </p:txBody>
+      </p:sp>
+    </p:spTree>
+  </p:cSld>
+  <p:clrMapOvr>
+    <a:masterClrMapping/>
+  </p:clrMapOvr>
+  <p:timing>
+    <p:tnLst>
+      <p:par>
+        <p:cTn id="1" dur="indefinite" restart="never" nodeType="tmRoot"/>
+      </p:par>
+    </p:tnLst>
+  </p:timing>
+</p:sld>
+</file>
+
+<file path=ppt/slides/slide16.xml><?xml version="1.0" encoding="utf-8"?>
+<p:sld xmlns:a="http://schemas.openxmlformats.org/drawingml/2006/main" xmlns:r="http://schemas.openxmlformats.org/officeDocument/2006/relationships" xmlns:p="http://schemas.openxmlformats.org/presentationml/2006/main">
+  <p:cSld>
+    <p:spTree>
+      <p:nvGrpSpPr>
+        <p:cNvPr id="1" name=""/>
+        <p:cNvGrpSpPr/>
+        <p:nvPr/>
+      </p:nvGrpSpPr>
+      <p:grpSpPr>
+        <a:xfrm>
+          <a:off x="0" y="0"/>
+          <a:ext cx="0" cy="0"/>
+          <a:chOff x="0" y="0"/>
+          <a:chExt cx="0" cy="0"/>
+        </a:xfrm>
+      </p:grpSpPr>
+      <p:sp>
+        <p:nvSpPr>
+          <p:cNvPr id="26626" name="Rectangle 2"/>
+          <p:cNvSpPr>
+            <a:spLocks noGrp="1" noChangeArrowheads="1"/>
+          </p:cNvSpPr>
+          <p:nvPr>
+            <p:ph type="title"/>
+          </p:nvPr>
+        </p:nvSpPr>
+        <p:spPr/>
+        <p:txBody>
+          <a:bodyPr/>
+          <a:lstStyle/>
+          <a:p>
+            <a:r>
+              <a:rPr lang="en-GB" altLang="en-US"/>
+              <a:t>Risks and Rewards</a:t>
+            </a:r>
+          </a:p>
+        </p:txBody>
+      </p:sp>
+      <p:sp>
+        <p:nvSpPr>
+          <p:cNvPr id="26627" name="Rectangle 3"/>
+          <p:cNvSpPr>
+            <a:spLocks noGrp="1" noChangeArrowheads="1"/>
+          </p:cNvSpPr>
+          <p:nvPr>
+            <p:ph type="body" idx="1"/>
+          </p:nvPr>
+        </p:nvSpPr>
+        <p:spPr/>
+        <p:txBody>
+          <a:bodyPr/>
+          <a:lstStyle/>
+          <a:p>
+            <a:r>
+              <a:rPr lang="en-GB" altLang="en-US"/>
+              <a:t>Summarize the risks of the proposed project and how they will be addressed.</a:t>
+            </a:r>
+          </a:p>
+          <a:p>
+            <a:r>
+              <a:rPr lang="en-GB" altLang="en-US"/>
+              <a:t>Estimate expected rewards, particularly if you are seeking funding.</a:t>
+            </a:r>
+          </a:p>
+        </p:txBody>
+      </p:sp>
+    </p:spTree>
+  </p:cSld>
+  <p:clrMapOvr>
+    <a:masterClrMapping/>
+  </p:clrMapOvr>
+  <p:timing>
+    <p:tnLst>
+      <p:par>
+        <p:cTn id="1" dur="indefinite" restart="never" nodeType="tmRoot"/>
+      </p:par>
+    </p:tnLst>
+  </p:timing>
+</p:sld>
+</file>
+
+<file path=ppt/slides/slide17.xml><?xml version="1.0" encoding="utf-8"?>
 <p:sld xmlns:a="http://schemas.openxmlformats.org/drawingml/2006/main" xmlns:r="http://schemas.openxmlformats.org/officeDocument/2006/relationships" xmlns:p="http://schemas.openxmlformats.org/presentationml/2006/main">
   <p:cSld>
     <p:spTree>
@@ -5389,11 +5633,7 @@
             </a:r>
             <a:r>
               <a:rPr lang="en-GB" altLang="en-US" dirty="0" smtClean="0"/>
-              <a:t> </a:t>
-            </a:r>
-            <a:r>
-              <a:rPr lang="en-GB" altLang="en-US" dirty="0" smtClean="0"/>
-              <a:t>e, </a:t>
+              <a:t> e, </a:t>
             </a:r>
             <a:r>
               <a:rPr lang="en-GB" altLang="en-US" dirty="0" err="1" smtClean="0"/>
@@ -5557,11 +5797,7 @@
           <a:p>
             <a:r>
               <a:rPr lang="en-GB" altLang="en-US" dirty="0" err="1" smtClean="0"/>
-              <a:t>Objetivo</a:t>
-            </a:r>
-            <a:r>
-              <a:rPr lang="en-GB" altLang="en-US" dirty="0" err="1" smtClean="0"/>
-              <a:t>s</a:t>
+              <a:t>Objetivos</a:t>
             </a:r>
             <a:r>
               <a:rPr lang="en-GB" altLang="en-US" dirty="0" smtClean="0"/>
@@ -5592,26 +5828,14 @@
           <a:p>
             <a:r>
               <a:rPr lang="pt-BR" altLang="en-US" dirty="0" smtClean="0"/>
-              <a:t>Uma proposta de garantia da </a:t>
-            </a:r>
+              <a:t>Uma proposta de garantia da qualidade</a:t>
+            </a:r>
+          </a:p>
+          <a:p>
+            <a:pPr lvl="1"/>
             <a:r>
               <a:rPr lang="pt-BR" altLang="en-US" dirty="0" smtClean="0"/>
-              <a:t>qualidade</a:t>
-            </a:r>
-          </a:p>
-          <a:p>
-            <a:pPr lvl="1"/>
-            <a:r>
-              <a:rPr lang="pt-BR" altLang="en-US" dirty="0" smtClean="0"/>
-              <a:t>como </a:t>
-            </a:r>
-            <a:r>
-              <a:rPr lang="pt-BR" altLang="en-US" dirty="0" smtClean="0"/>
-              <a:t>um conjunto de atividades, de modo a propor um guia geral para as organizações que buscam conformidade com o </a:t>
-            </a:r>
-            <a:r>
-              <a:rPr lang="pt-BR" altLang="en-US" dirty="0" smtClean="0"/>
-              <a:t>CMMI-DEV</a:t>
+              <a:t>como um conjunto de atividades, de modo a propor um guia geral para as organizações que buscam conformidade com o CMMI-DEV</a:t>
             </a:r>
             <a:r>
               <a:rPr lang="en-GB" altLang="en-US" dirty="0" smtClean="0"/>
@@ -5739,21 +5963,7 @@
                 <a:latin typeface="Times New Roman" pitchFamily="18" charset="0"/>
                 <a:cs typeface="Times New Roman" pitchFamily="18" charset="0"/>
               </a:rPr>
-              <a:t>Qualidade </a:t>
-            </a:r>
-            <a:r>
-              <a:rPr lang="pt-BR" i="1" dirty="0" smtClean="0">
-                <a:latin typeface="Times New Roman" pitchFamily="18" charset="0"/>
-                <a:cs typeface="Times New Roman" pitchFamily="18" charset="0"/>
-              </a:rPr>
-              <a:t>é a habilidade de um conjunto de características inerentes a um produto, componente de produto ou processo atenderem aos requisitos dos </a:t>
-            </a:r>
-            <a:r>
-              <a:rPr lang="pt-BR" i="1" dirty="0" smtClean="0">
-                <a:latin typeface="Times New Roman" pitchFamily="18" charset="0"/>
-                <a:cs typeface="Times New Roman" pitchFamily="18" charset="0"/>
-              </a:rPr>
-              <a:t>clientes</a:t>
+              <a:t>Qualidade é a habilidade de um conjunto de características inerentes a um produto, componente de produto ou processo atenderem aos requisitos dos clientes</a:t>
             </a:r>
             <a:r>
               <a:rPr lang="en-GB" altLang="en-US" i="1" dirty="0" smtClean="0">
@@ -5795,21 +6005,7 @@
                 <a:latin typeface="Times New Roman" pitchFamily="18" charset="0"/>
                 <a:cs typeface="Times New Roman" pitchFamily="18" charset="0"/>
               </a:rPr>
-              <a:t>Qualidade </a:t>
-            </a:r>
-            <a:r>
-              <a:rPr lang="pt-BR" i="1" dirty="0" smtClean="0">
-                <a:latin typeface="Times New Roman" pitchFamily="18" charset="0"/>
-                <a:cs typeface="Times New Roman" pitchFamily="18" charset="0"/>
-              </a:rPr>
-              <a:t>é o grau no qual um conjunto de características inerentes satisfaz a requisitos </a:t>
-            </a:r>
-            <a:r>
-              <a:rPr lang="pt-BR" i="1" dirty="0" smtClean="0">
-                <a:latin typeface="Times New Roman" pitchFamily="18" charset="0"/>
-                <a:cs typeface="Times New Roman" pitchFamily="18" charset="0"/>
-              </a:rPr>
-              <a:t>– ISO 9000, 2005.</a:t>
+              <a:t>Qualidade é o grau no qual um conjunto de características inerentes satisfaz a requisitos – ISO 9000, 2005.</a:t>
             </a:r>
             <a:endParaRPr lang="en-GB" altLang="en-US" i="1" dirty="0">
               <a:latin typeface="Times New Roman" pitchFamily="18" charset="0"/>
@@ -5818,30 +6014,6 @@
           </a:p>
         </p:txBody>
       </p:sp>
-      <p:pic>
-        <p:nvPicPr>
-          <p:cNvPr id="4" name="Imagem 3" descr="glad.png"/>
-          <p:cNvPicPr>
-            <a:picLocks noChangeAspect="1"/>
-          </p:cNvPicPr>
-          <p:nvPr/>
-        </p:nvPicPr>
-        <p:blipFill>
-          <a:blip r:embed="rId2" cstate="print"/>
-          <a:stretch>
-            <a:fillRect/>
-          </a:stretch>
-        </p:blipFill>
-        <p:spPr>
-          <a:xfrm>
-            <a:off x="7092280" y="908720"/>
-            <a:ext cx="1656184" cy="1656184"/>
-          </a:xfrm>
-          <a:prstGeom prst="rect">
-            <a:avLst/>
-          </a:prstGeom>
-        </p:spPr>
-      </p:pic>
     </p:spTree>
   </p:cSld>
   <p:clrMapOvr>
@@ -5899,7 +6071,11 @@
             </a:r>
             <a:r>
               <a:rPr lang="en-GB" altLang="en-US" dirty="0" smtClean="0"/>
-              <a:t>de Software</a:t>
+              <a:t>= </a:t>
+            </a:r>
+            <a:r>
+              <a:rPr lang="en-GB" altLang="en-US" dirty="0" err="1" smtClean="0"/>
+              <a:t>Satisfação</a:t>
             </a:r>
             <a:endParaRPr lang="en-GB" altLang="en-US" dirty="0"/>
           </a:p>
@@ -5921,12 +6097,16 @@
           <a:lstStyle/>
           <a:p>
             <a:r>
+              <a:rPr lang="en-GB" altLang="en-US" dirty="0" err="1" smtClean="0"/>
+              <a:t>Atender</a:t>
+            </a:r>
+            <a:r>
               <a:rPr lang="en-GB" altLang="en-US" dirty="0" smtClean="0"/>
-              <a:t>Como </a:t>
+              <a:t> as </a:t>
             </a:r>
             <a:r>
               <a:rPr lang="en-GB" altLang="en-US" dirty="0" err="1" smtClean="0"/>
-              <a:t>definir</a:t>
+              <a:t>necessidades</a:t>
             </a:r>
             <a:r>
               <a:rPr lang="en-GB" altLang="en-US" dirty="0" smtClean="0"/>
@@ -5934,28 +6114,68 @@
             </a:r>
             <a:r>
               <a:rPr lang="en-GB" altLang="en-US" dirty="0" err="1" smtClean="0"/>
-              <a:t>qualidade</a:t>
+              <a:t>ou</a:t>
             </a:r>
             <a:r>
               <a:rPr lang="en-GB" altLang="en-US" dirty="0" smtClean="0"/>
-              <a:t> de Software</a:t>
-            </a:r>
-            <a:endParaRPr lang="en-GB" altLang="en-US" dirty="0"/>
-          </a:p>
-          <a:p>
-            <a:pPr lvl="1"/>
+              <a:t> </a:t>
+            </a:r>
             <a:r>
               <a:rPr lang="en-GB" altLang="en-US" dirty="0" err="1" smtClean="0"/>
-              <a:t>Modelo</a:t>
+              <a:t>expectativas</a:t>
             </a:r>
             <a:r>
               <a:rPr lang="en-GB" altLang="en-US" dirty="0" smtClean="0"/>
-              <a:t> McCall, 1977</a:t>
+              <a:t> do </a:t>
+            </a:r>
+            <a:r>
+              <a:rPr lang="en-GB" altLang="en-US" dirty="0" err="1" smtClean="0"/>
+              <a:t>cliente</a:t>
+            </a:r>
+            <a:r>
+              <a:rPr lang="en-GB" altLang="en-US" dirty="0" smtClean="0"/>
+              <a:t> </a:t>
+            </a:r>
+            <a:r>
+              <a:rPr lang="en-GB" altLang="en-US" dirty="0" err="1" smtClean="0"/>
+              <a:t>ou</a:t>
+            </a:r>
+            <a:r>
+              <a:rPr lang="en-GB" altLang="en-US" dirty="0" smtClean="0"/>
+              <a:t> </a:t>
+            </a:r>
+            <a:r>
+              <a:rPr lang="en-GB" altLang="en-US" dirty="0" err="1" smtClean="0"/>
+              <a:t>usuário</a:t>
             </a:r>
             <a:endParaRPr lang="en-GB" altLang="en-US" dirty="0"/>
           </a:p>
         </p:txBody>
       </p:sp>
+      <p:pic>
+        <p:nvPicPr>
+          <p:cNvPr id="4" name="Imagem 3" descr="glad.png"/>
+          <p:cNvPicPr>
+            <a:picLocks noChangeAspect="1"/>
+          </p:cNvPicPr>
+          <p:nvPr/>
+        </p:nvPicPr>
+        <p:blipFill>
+          <a:blip r:embed="rId2" cstate="print"/>
+          <a:stretch>
+            <a:fillRect/>
+          </a:stretch>
+        </p:blipFill>
+        <p:spPr>
+          <a:xfrm>
+            <a:off x="3995936" y="2348880"/>
+            <a:ext cx="2880320" cy="2880320"/>
+          </a:xfrm>
+          <a:prstGeom prst="rect">
+            <a:avLst/>
+          </a:prstGeom>
+        </p:spPr>
+      </p:pic>
     </p:spTree>
   </p:cSld>
   <p:clrMapOvr>
@@ -6005,27 +6225,11 @@
           <a:p>
             <a:r>
               <a:rPr lang="en-GB" altLang="en-US" dirty="0" err="1" smtClean="0"/>
-              <a:t>Garantia</a:t>
+              <a:t>Qualidade</a:t>
             </a:r>
             <a:r>
               <a:rPr lang="en-GB" altLang="en-US" dirty="0" smtClean="0"/>
-              <a:t> </a:t>
-            </a:r>
-            <a:r>
-              <a:rPr lang="en-GB" altLang="en-US" dirty="0" err="1" smtClean="0"/>
-              <a:t>da</a:t>
-            </a:r>
-            <a:r>
-              <a:rPr lang="en-GB" altLang="en-US" dirty="0" smtClean="0"/>
-              <a:t> </a:t>
-            </a:r>
-            <a:r>
-              <a:rPr lang="en-GB" altLang="en-US" dirty="0" err="1" smtClean="0"/>
-              <a:t>qualidade</a:t>
-            </a:r>
-            <a:r>
-              <a:rPr lang="en-GB" altLang="en-US" dirty="0" smtClean="0"/>
-              <a:t>?</a:t>
+              <a:t> de Software</a:t>
             </a:r>
             <a:endParaRPr lang="en-GB" altLang="en-US" dirty="0"/>
           </a:p>
@@ -6048,27 +6252,11 @@
           <a:p>
             <a:r>
               <a:rPr lang="en-GB" altLang="en-US" dirty="0" smtClean="0"/>
-              <a:t>O </a:t>
+              <a:t>Como </a:t>
             </a:r>
             <a:r>
               <a:rPr lang="en-GB" altLang="en-US" dirty="0" err="1" smtClean="0"/>
-              <a:t>quê</a:t>
-            </a:r>
-            <a:r>
-              <a:rPr lang="en-GB" altLang="en-US" dirty="0" smtClean="0"/>
-              <a:t> se </a:t>
-            </a:r>
-            <a:r>
-              <a:rPr lang="en-GB" altLang="en-US" dirty="0" err="1" smtClean="0"/>
-              <a:t>busca</a:t>
-            </a:r>
-            <a:r>
-              <a:rPr lang="en-GB" altLang="en-US" dirty="0" smtClean="0"/>
-              <a:t> com </a:t>
-            </a:r>
-            <a:r>
-              <a:rPr lang="en-GB" altLang="en-US" dirty="0" err="1" smtClean="0"/>
-              <a:t>garantia</a:t>
+              <a:t>definir</a:t>
             </a:r>
             <a:r>
               <a:rPr lang="en-GB" altLang="en-US" dirty="0" smtClean="0"/>
@@ -6076,93 +6264,1031 @@
             </a:r>
             <a:r>
               <a:rPr lang="en-GB" altLang="en-US" dirty="0" err="1" smtClean="0"/>
-              <a:t>da</a:t>
+              <a:t>qualidade</a:t>
             </a:r>
             <a:r>
               <a:rPr lang="en-GB" altLang="en-US" dirty="0" smtClean="0"/>
-              <a:t> </a:t>
-            </a:r>
+              <a:t> de Software</a:t>
+            </a:r>
+            <a:endParaRPr lang="en-GB" altLang="en-US" dirty="0"/>
+          </a:p>
+          <a:p>
+            <a:pPr lvl="1"/>
             <a:r>
               <a:rPr lang="en-GB" altLang="en-US" dirty="0" err="1" smtClean="0"/>
-              <a:t>qualidade</a:t>
+              <a:t>Modelo</a:t>
             </a:r>
             <a:r>
               <a:rPr lang="en-GB" altLang="en-US" dirty="0" smtClean="0"/>
-              <a:t>?</a:t>
-            </a:r>
-            <a:endParaRPr lang="en-GB" altLang="en-US" dirty="0"/>
-          </a:p>
-          <a:p>
-            <a:pPr lvl="1"/>
-            <a:r>
-              <a:rPr lang="en-GB" altLang="en-US" dirty="0" err="1" smtClean="0"/>
-              <a:t>Processos</a:t>
-            </a:r>
-            <a:r>
-              <a:rPr lang="en-GB" altLang="en-US" dirty="0" smtClean="0"/>
-              <a:t> </a:t>
-            </a:r>
-            <a:r>
-              <a:rPr lang="en-GB" altLang="en-US" dirty="0" smtClean="0"/>
-              <a:t>de </a:t>
-            </a:r>
-            <a:r>
-              <a:rPr lang="en-GB" altLang="en-US" dirty="0" err="1" smtClean="0"/>
-              <a:t>qualidade</a:t>
-            </a:r>
-            <a:r>
-              <a:rPr lang="en-GB" altLang="en-US" dirty="0" smtClean="0"/>
-              <a:t> </a:t>
-            </a:r>
-            <a:r>
-              <a:rPr lang="en-GB" altLang="en-US" dirty="0" smtClean="0"/>
-              <a:t>com o </a:t>
-            </a:r>
-            <a:r>
-              <a:rPr lang="en-GB" altLang="en-US" dirty="0" err="1" smtClean="0"/>
-              <a:t>intuito</a:t>
-            </a:r>
-            <a:r>
-              <a:rPr lang="en-GB" altLang="en-US" dirty="0" smtClean="0"/>
-              <a:t> de </a:t>
-            </a:r>
-            <a:r>
-              <a:rPr lang="en-GB" altLang="en-US" dirty="0" err="1" smtClean="0"/>
-              <a:t>obter</a:t>
-            </a:r>
-            <a:r>
-              <a:rPr lang="en-GB" altLang="en-US" dirty="0" smtClean="0"/>
-              <a:t> um </a:t>
-            </a:r>
-            <a:r>
-              <a:rPr lang="en-GB" altLang="en-US" dirty="0" err="1" smtClean="0"/>
-              <a:t>produto</a:t>
-            </a:r>
-            <a:r>
-              <a:rPr lang="en-GB" altLang="en-US" dirty="0" smtClean="0"/>
-              <a:t> de </a:t>
-            </a:r>
-            <a:r>
-              <a:rPr lang="en-GB" altLang="en-US" dirty="0" err="1" smtClean="0"/>
-              <a:t>trabalho</a:t>
-            </a:r>
-            <a:r>
-              <a:rPr lang="en-GB" altLang="en-US" dirty="0" smtClean="0"/>
-              <a:t> com </a:t>
-            </a:r>
-            <a:r>
-              <a:rPr lang="en-GB" altLang="en-US" dirty="0" err="1" smtClean="0"/>
-              <a:t>qualidade</a:t>
-            </a:r>
-            <a:r>
-              <a:rPr lang="en-GB" altLang="en-US" dirty="0" smtClean="0"/>
-              <a:t>.</a:t>
+              <a:t> McCall, 1977</a:t>
             </a:r>
             <a:endParaRPr lang="en-GB" altLang="en-US" dirty="0"/>
           </a:p>
         </p:txBody>
       </p:sp>
+      <p:grpSp>
+        <p:nvGrpSpPr>
+          <p:cNvPr id="4" name="Grupo 15"/>
+          <p:cNvGrpSpPr/>
+          <p:nvPr/>
+        </p:nvGrpSpPr>
+        <p:grpSpPr>
+          <a:xfrm>
+            <a:off x="2195737" y="2708920"/>
+            <a:ext cx="6480720" cy="3672408"/>
+            <a:chOff x="0" y="0"/>
+            <a:chExt cx="6627999" cy="4610100"/>
+          </a:xfrm>
+        </p:grpSpPr>
+        <p:sp>
+          <p:nvSpPr>
+            <p:cNvPr id="5" name="Triângulo isósceles 1"/>
+            <p:cNvSpPr/>
+            <p:nvPr/>
+          </p:nvSpPr>
+          <p:spPr>
+            <a:xfrm>
+              <a:off x="0" y="0"/>
+              <a:ext cx="6571268" cy="3648075"/>
+            </a:xfrm>
+            <a:prstGeom prst="triangle">
+              <a:avLst/>
+            </a:prstGeom>
+            <a:noFill/>
+            <a:ln>
+              <a:solidFill>
+                <a:schemeClr val="tx1">
+                  <a:lumMod val="50000"/>
+                  <a:lumOff val="50000"/>
+                </a:schemeClr>
+              </a:solidFill>
+              <a:prstDash val="dash"/>
+            </a:ln>
+          </p:spPr>
+          <p:style>
+            <a:lnRef idx="2">
+              <a:schemeClr val="accent1">
+                <a:shade val="50000"/>
+              </a:schemeClr>
+            </a:lnRef>
+            <a:fillRef idx="1">
+              <a:schemeClr val="accent1"/>
+            </a:fillRef>
+            <a:effectRef idx="0">
+              <a:schemeClr val="accent1"/>
+            </a:effectRef>
+            <a:fontRef idx="minor">
+              <a:schemeClr val="lt1"/>
+            </a:fontRef>
+          </p:style>
+          <p:txBody>
+            <a:bodyPr rtlCol="0" anchor="ctr"/>
+            <a:lstStyle>
+              <a:lvl1pPr marL="0" indent="0">
+                <a:defRPr sz="1100">
+                  <a:solidFill>
+                    <a:schemeClr val="lt1"/>
+                  </a:solidFill>
+                  <a:latin typeface="+mn-lt"/>
+                  <a:ea typeface="+mn-ea"/>
+                  <a:cs typeface="+mn-cs"/>
+                </a:defRPr>
+              </a:lvl1pPr>
+              <a:lvl2pPr marL="457200" indent="0">
+                <a:defRPr sz="1100">
+                  <a:solidFill>
+                    <a:schemeClr val="lt1"/>
+                  </a:solidFill>
+                  <a:latin typeface="+mn-lt"/>
+                  <a:ea typeface="+mn-ea"/>
+                  <a:cs typeface="+mn-cs"/>
+                </a:defRPr>
+              </a:lvl2pPr>
+              <a:lvl3pPr marL="914400" indent="0">
+                <a:defRPr sz="1100">
+                  <a:solidFill>
+                    <a:schemeClr val="lt1"/>
+                  </a:solidFill>
+                  <a:latin typeface="+mn-lt"/>
+                  <a:ea typeface="+mn-ea"/>
+                  <a:cs typeface="+mn-cs"/>
+                </a:defRPr>
+              </a:lvl3pPr>
+              <a:lvl4pPr marL="1371600" indent="0">
+                <a:defRPr sz="1100">
+                  <a:solidFill>
+                    <a:schemeClr val="lt1"/>
+                  </a:solidFill>
+                  <a:latin typeface="+mn-lt"/>
+                  <a:ea typeface="+mn-ea"/>
+                  <a:cs typeface="+mn-cs"/>
+                </a:defRPr>
+              </a:lvl4pPr>
+              <a:lvl5pPr marL="1828800" indent="0">
+                <a:defRPr sz="1100">
+                  <a:solidFill>
+                    <a:schemeClr val="lt1"/>
+                  </a:solidFill>
+                  <a:latin typeface="+mn-lt"/>
+                  <a:ea typeface="+mn-ea"/>
+                  <a:cs typeface="+mn-cs"/>
+                </a:defRPr>
+              </a:lvl5pPr>
+              <a:lvl6pPr marL="2286000" indent="0">
+                <a:defRPr sz="1100">
+                  <a:solidFill>
+                    <a:schemeClr val="lt1"/>
+                  </a:solidFill>
+                  <a:latin typeface="+mn-lt"/>
+                  <a:ea typeface="+mn-ea"/>
+                  <a:cs typeface="+mn-cs"/>
+                </a:defRPr>
+              </a:lvl6pPr>
+              <a:lvl7pPr marL="2743200" indent="0">
+                <a:defRPr sz="1100">
+                  <a:solidFill>
+                    <a:schemeClr val="lt1"/>
+                  </a:solidFill>
+                  <a:latin typeface="+mn-lt"/>
+                  <a:ea typeface="+mn-ea"/>
+                  <a:cs typeface="+mn-cs"/>
+                </a:defRPr>
+              </a:lvl7pPr>
+              <a:lvl8pPr marL="3200400" indent="0">
+                <a:defRPr sz="1100">
+                  <a:solidFill>
+                    <a:schemeClr val="lt1"/>
+                  </a:solidFill>
+                  <a:latin typeface="+mn-lt"/>
+                  <a:ea typeface="+mn-ea"/>
+                  <a:cs typeface="+mn-cs"/>
+                </a:defRPr>
+              </a:lvl8pPr>
+              <a:lvl9pPr marL="3657600" indent="0">
+                <a:defRPr sz="1100">
+                  <a:solidFill>
+                    <a:schemeClr val="lt1"/>
+                  </a:solidFill>
+                  <a:latin typeface="+mn-lt"/>
+                  <a:ea typeface="+mn-ea"/>
+                  <a:cs typeface="+mn-cs"/>
+                </a:defRPr>
+              </a:lvl9pPr>
+            </a:lstStyle>
+            <a:p>
+              <a:pPr algn="ctr"/>
+              <a:endParaRPr lang="pt-BR" sz="1100">
+                <a:solidFill>
+                  <a:schemeClr val="tx1">
+                    <a:lumMod val="85000"/>
+                    <a:lumOff val="15000"/>
+                  </a:schemeClr>
+                </a:solidFill>
+              </a:endParaRPr>
+            </a:p>
+          </p:txBody>
+        </p:sp>
+        <p:grpSp>
+          <p:nvGrpSpPr>
+            <p:cNvPr id="6" name="Grupo 13"/>
+            <p:cNvGrpSpPr/>
+            <p:nvPr/>
+          </p:nvGrpSpPr>
+          <p:grpSpPr>
+            <a:xfrm>
+              <a:off x="18910" y="0"/>
+              <a:ext cx="6609089" cy="4610100"/>
+              <a:chOff x="18910" y="0"/>
+              <a:chExt cx="6609089" cy="4610100"/>
+            </a:xfrm>
+          </p:grpSpPr>
+          <p:cxnSp>
+            <p:nvCxnSpPr>
+              <p:cNvPr id="7" name="Conector reto 7"/>
+              <p:cNvCxnSpPr>
+                <a:stCxn id="8" idx="0"/>
+                <a:endCxn id="5" idx="0"/>
+              </p:cNvCxnSpPr>
+              <p:nvPr/>
+            </p:nvCxnSpPr>
+            <p:spPr>
+              <a:xfrm flipV="1">
+                <a:off x="3276881" y="0"/>
+                <a:ext cx="8753" cy="2238375"/>
+              </a:xfrm>
+              <a:prstGeom prst="line">
+                <a:avLst/>
+              </a:prstGeom>
+              <a:ln w="44450">
+                <a:solidFill>
+                  <a:schemeClr val="accent4">
+                    <a:lumMod val="90000"/>
+                  </a:schemeClr>
+                </a:solidFill>
+              </a:ln>
+            </p:spPr>
+            <p:style>
+              <a:lnRef idx="1">
+                <a:schemeClr val="accent1"/>
+              </a:lnRef>
+              <a:fillRef idx="0">
+                <a:schemeClr val="accent1"/>
+              </a:fillRef>
+              <a:effectRef idx="0">
+                <a:schemeClr val="accent1"/>
+              </a:effectRef>
+              <a:fontRef idx="minor">
+                <a:schemeClr val="tx1"/>
+              </a:fontRef>
+            </p:style>
+          </p:cxnSp>
+          <p:sp>
+            <p:nvSpPr>
+              <p:cNvPr id="8" name="Triângulo isósceles 2"/>
+              <p:cNvSpPr/>
+              <p:nvPr/>
+            </p:nvSpPr>
+            <p:spPr>
+              <a:xfrm>
+                <a:off x="60792" y="2238375"/>
+                <a:ext cx="6432177" cy="1381125"/>
+              </a:xfrm>
+              <a:prstGeom prst="triangle">
+                <a:avLst/>
+              </a:prstGeom>
+              <a:noFill/>
+              <a:ln w="44450">
+                <a:solidFill>
+                  <a:schemeClr val="accent4">
+                    <a:lumMod val="75000"/>
+                  </a:schemeClr>
+                </a:solidFill>
+              </a:ln>
+            </p:spPr>
+            <p:style>
+              <a:lnRef idx="2">
+                <a:schemeClr val="accent1">
+                  <a:shade val="50000"/>
+                </a:schemeClr>
+              </a:lnRef>
+              <a:fillRef idx="1">
+                <a:schemeClr val="accent1"/>
+              </a:fillRef>
+              <a:effectRef idx="0">
+                <a:schemeClr val="accent1"/>
+              </a:effectRef>
+              <a:fontRef idx="minor">
+                <a:schemeClr val="lt1"/>
+              </a:fontRef>
+            </p:style>
+            <p:txBody>
+              <a:bodyPr rtlCol="0" anchor="ctr"/>
+              <a:lstStyle>
+                <a:lvl1pPr marL="0" indent="0">
+                  <a:defRPr sz="1100">
+                    <a:solidFill>
+                      <a:schemeClr val="lt1"/>
+                    </a:solidFill>
+                    <a:latin typeface="+mn-lt"/>
+                    <a:ea typeface="+mn-ea"/>
+                    <a:cs typeface="+mn-cs"/>
+                  </a:defRPr>
+                </a:lvl1pPr>
+                <a:lvl2pPr marL="457200" indent="0">
+                  <a:defRPr sz="1100">
+                    <a:solidFill>
+                      <a:schemeClr val="lt1"/>
+                    </a:solidFill>
+                    <a:latin typeface="+mn-lt"/>
+                    <a:ea typeface="+mn-ea"/>
+                    <a:cs typeface="+mn-cs"/>
+                  </a:defRPr>
+                </a:lvl2pPr>
+                <a:lvl3pPr marL="914400" indent="0">
+                  <a:defRPr sz="1100">
+                    <a:solidFill>
+                      <a:schemeClr val="lt1"/>
+                    </a:solidFill>
+                    <a:latin typeface="+mn-lt"/>
+                    <a:ea typeface="+mn-ea"/>
+                    <a:cs typeface="+mn-cs"/>
+                  </a:defRPr>
+                </a:lvl3pPr>
+                <a:lvl4pPr marL="1371600" indent="0">
+                  <a:defRPr sz="1100">
+                    <a:solidFill>
+                      <a:schemeClr val="lt1"/>
+                    </a:solidFill>
+                    <a:latin typeface="+mn-lt"/>
+                    <a:ea typeface="+mn-ea"/>
+                    <a:cs typeface="+mn-cs"/>
+                  </a:defRPr>
+                </a:lvl4pPr>
+                <a:lvl5pPr marL="1828800" indent="0">
+                  <a:defRPr sz="1100">
+                    <a:solidFill>
+                      <a:schemeClr val="lt1"/>
+                    </a:solidFill>
+                    <a:latin typeface="+mn-lt"/>
+                    <a:ea typeface="+mn-ea"/>
+                    <a:cs typeface="+mn-cs"/>
+                  </a:defRPr>
+                </a:lvl5pPr>
+                <a:lvl6pPr marL="2286000" indent="0">
+                  <a:defRPr sz="1100">
+                    <a:solidFill>
+                      <a:schemeClr val="lt1"/>
+                    </a:solidFill>
+                    <a:latin typeface="+mn-lt"/>
+                    <a:ea typeface="+mn-ea"/>
+                    <a:cs typeface="+mn-cs"/>
+                  </a:defRPr>
+                </a:lvl6pPr>
+                <a:lvl7pPr marL="2743200" indent="0">
+                  <a:defRPr sz="1100">
+                    <a:solidFill>
+                      <a:schemeClr val="lt1"/>
+                    </a:solidFill>
+                    <a:latin typeface="+mn-lt"/>
+                    <a:ea typeface="+mn-ea"/>
+                    <a:cs typeface="+mn-cs"/>
+                  </a:defRPr>
+                </a:lvl7pPr>
+                <a:lvl8pPr marL="3200400" indent="0">
+                  <a:defRPr sz="1100">
+                    <a:solidFill>
+                      <a:schemeClr val="lt1"/>
+                    </a:solidFill>
+                    <a:latin typeface="+mn-lt"/>
+                    <a:ea typeface="+mn-ea"/>
+                    <a:cs typeface="+mn-cs"/>
+                  </a:defRPr>
+                </a:lvl8pPr>
+                <a:lvl9pPr marL="3657600" indent="0">
+                  <a:defRPr sz="1100">
+                    <a:solidFill>
+                      <a:schemeClr val="lt1"/>
+                    </a:solidFill>
+                    <a:latin typeface="+mn-lt"/>
+                    <a:ea typeface="+mn-ea"/>
+                    <a:cs typeface="+mn-cs"/>
+                  </a:defRPr>
+                </a:lvl9pPr>
+              </a:lstStyle>
+              <a:p>
+                <a:pPr algn="ctr"/>
+                <a:endParaRPr lang="pt-BR" sz="1100">
+                  <a:solidFill>
+                    <a:schemeClr val="tx1">
+                      <a:lumMod val="85000"/>
+                      <a:lumOff val="15000"/>
+                    </a:schemeClr>
+                  </a:solidFill>
+                </a:endParaRPr>
+              </a:p>
+            </p:txBody>
+          </p:sp>
+          <p:sp>
+            <p:nvSpPr>
+              <p:cNvPr id="9" name="CaixaDeTexto 10"/>
+              <p:cNvSpPr txBox="1"/>
+              <p:nvPr/>
+            </p:nvSpPr>
+            <p:spPr>
+              <a:xfrm>
+                <a:off x="104006" y="514349"/>
+                <a:ext cx="3082351" cy="1228726"/>
+              </a:xfrm>
+              <a:prstGeom prst="rect">
+                <a:avLst/>
+              </a:prstGeom>
+              <a:solidFill>
+                <a:schemeClr val="lt1">
+                  <a:alpha val="0"/>
+                </a:schemeClr>
+              </a:solidFill>
+              <a:ln w="9525" cmpd="sng">
+                <a:noFill/>
+              </a:ln>
+            </p:spPr>
+            <p:style>
+              <a:lnRef idx="0">
+                <a:scrgbClr r="0" g="0" b="0"/>
+              </a:lnRef>
+              <a:fillRef idx="0">
+                <a:scrgbClr r="0" g="0" b="0"/>
+              </a:fillRef>
+              <a:effectRef idx="0">
+                <a:scrgbClr r="0" g="0" b="0"/>
+              </a:effectRef>
+              <a:fontRef idx="minor">
+                <a:schemeClr val="dk1"/>
+              </a:fontRef>
+            </p:style>
+            <p:txBody>
+              <a:bodyPr wrap="square" rtlCol="0" anchor="t"/>
+              <a:lstStyle>
+                <a:lvl1pPr marL="0" indent="0">
+                  <a:defRPr sz="1100">
+                    <a:solidFill>
+                      <a:schemeClr val="dk1"/>
+                    </a:solidFill>
+                    <a:latin typeface="+mn-lt"/>
+                    <a:ea typeface="+mn-ea"/>
+                    <a:cs typeface="+mn-cs"/>
+                  </a:defRPr>
+                </a:lvl1pPr>
+                <a:lvl2pPr marL="457200" indent="0">
+                  <a:defRPr sz="1100">
+                    <a:solidFill>
+                      <a:schemeClr val="dk1"/>
+                    </a:solidFill>
+                    <a:latin typeface="+mn-lt"/>
+                    <a:ea typeface="+mn-ea"/>
+                    <a:cs typeface="+mn-cs"/>
+                  </a:defRPr>
+                </a:lvl2pPr>
+                <a:lvl3pPr marL="914400" indent="0">
+                  <a:defRPr sz="1100">
+                    <a:solidFill>
+                      <a:schemeClr val="dk1"/>
+                    </a:solidFill>
+                    <a:latin typeface="+mn-lt"/>
+                    <a:ea typeface="+mn-ea"/>
+                    <a:cs typeface="+mn-cs"/>
+                  </a:defRPr>
+                </a:lvl3pPr>
+                <a:lvl4pPr marL="1371600" indent="0">
+                  <a:defRPr sz="1100">
+                    <a:solidFill>
+                      <a:schemeClr val="dk1"/>
+                    </a:solidFill>
+                    <a:latin typeface="+mn-lt"/>
+                    <a:ea typeface="+mn-ea"/>
+                    <a:cs typeface="+mn-cs"/>
+                  </a:defRPr>
+                </a:lvl4pPr>
+                <a:lvl5pPr marL="1828800" indent="0">
+                  <a:defRPr sz="1100">
+                    <a:solidFill>
+                      <a:schemeClr val="dk1"/>
+                    </a:solidFill>
+                    <a:latin typeface="+mn-lt"/>
+                    <a:ea typeface="+mn-ea"/>
+                    <a:cs typeface="+mn-cs"/>
+                  </a:defRPr>
+                </a:lvl5pPr>
+                <a:lvl6pPr marL="2286000" indent="0">
+                  <a:defRPr sz="1100">
+                    <a:solidFill>
+                      <a:schemeClr val="dk1"/>
+                    </a:solidFill>
+                    <a:latin typeface="+mn-lt"/>
+                    <a:ea typeface="+mn-ea"/>
+                    <a:cs typeface="+mn-cs"/>
+                  </a:defRPr>
+                </a:lvl6pPr>
+                <a:lvl7pPr marL="2743200" indent="0">
+                  <a:defRPr sz="1100">
+                    <a:solidFill>
+                      <a:schemeClr val="dk1"/>
+                    </a:solidFill>
+                    <a:latin typeface="+mn-lt"/>
+                    <a:ea typeface="+mn-ea"/>
+                    <a:cs typeface="+mn-cs"/>
+                  </a:defRPr>
+                </a:lvl7pPr>
+                <a:lvl8pPr marL="3200400" indent="0">
+                  <a:defRPr sz="1100">
+                    <a:solidFill>
+                      <a:schemeClr val="dk1"/>
+                    </a:solidFill>
+                    <a:latin typeface="+mn-lt"/>
+                    <a:ea typeface="+mn-ea"/>
+                    <a:cs typeface="+mn-cs"/>
+                  </a:defRPr>
+                </a:lvl8pPr>
+                <a:lvl9pPr marL="3657600" indent="0">
+                  <a:defRPr sz="1100">
+                    <a:solidFill>
+                      <a:schemeClr val="dk1"/>
+                    </a:solidFill>
+                    <a:latin typeface="+mn-lt"/>
+                    <a:ea typeface="+mn-ea"/>
+                    <a:cs typeface="+mn-cs"/>
+                  </a:defRPr>
+                </a:lvl9pPr>
+              </a:lstStyle>
+              <a:p>
+                <a:r>
+                  <a:rPr lang="pt-BR" sz="1400" b="1">
+                    <a:solidFill>
+                      <a:schemeClr val="tx1">
+                        <a:lumMod val="75000"/>
+                        <a:lumOff val="25000"/>
+                      </a:schemeClr>
+                    </a:solidFill>
+                    <a:latin typeface="Arial" pitchFamily="34" charset="0"/>
+                    <a:cs typeface="Arial" pitchFamily="34" charset="0"/>
+                  </a:rPr>
+                  <a:t>Capacidade:</a:t>
+                </a:r>
+                <a:endParaRPr lang="pt-BR" sz="1400" b="1" baseline="0">
+                  <a:solidFill>
+                    <a:schemeClr val="tx1">
+                      <a:lumMod val="75000"/>
+                      <a:lumOff val="25000"/>
+                    </a:schemeClr>
+                  </a:solidFill>
+                  <a:latin typeface="Arial" pitchFamily="34" charset="0"/>
+                  <a:cs typeface="Arial" pitchFamily="34" charset="0"/>
+                </a:endParaRPr>
+              </a:p>
+              <a:p>
+                <a:r>
+                  <a:rPr lang="pt-BR" sz="2000" b="1" baseline="0">
+                    <a:solidFill>
+                      <a:schemeClr val="tx1">
+                        <a:lumMod val="75000"/>
+                        <a:lumOff val="25000"/>
+                      </a:schemeClr>
+                    </a:solidFill>
+                    <a:latin typeface="Arial" pitchFamily="34" charset="0"/>
+                    <a:cs typeface="Arial" pitchFamily="34" charset="0"/>
+                  </a:rPr>
+                  <a:t>Manutenção </a:t>
+                </a:r>
+                <a:r>
+                  <a:rPr lang="pt-BR" sz="1400" b="1" baseline="0">
+                    <a:solidFill>
+                      <a:schemeClr val="tx1">
+                        <a:lumMod val="75000"/>
+                        <a:lumOff val="25000"/>
+                      </a:schemeClr>
+                    </a:solidFill>
+                    <a:latin typeface="Arial" pitchFamily="34" charset="0"/>
+                    <a:cs typeface="Arial" pitchFamily="34" charset="0"/>
+                  </a:rPr>
+                  <a:t>e Teste</a:t>
+                </a:r>
+              </a:p>
+              <a:p>
+                <a:r>
+                  <a:rPr lang="pt-BR" sz="1400" b="1" baseline="0">
+                    <a:solidFill>
+                      <a:schemeClr val="tx1">
+                        <a:lumMod val="75000"/>
+                        <a:lumOff val="25000"/>
+                      </a:schemeClr>
+                    </a:solidFill>
+                    <a:latin typeface="Arial" pitchFamily="34" charset="0"/>
+                    <a:cs typeface="Arial" pitchFamily="34" charset="0"/>
+                  </a:rPr>
+                  <a:t>Flexibilidade</a:t>
+                </a:r>
+                <a:endParaRPr lang="pt-BR" sz="1400" b="1">
+                  <a:solidFill>
+                    <a:schemeClr val="tx1">
+                      <a:lumMod val="75000"/>
+                      <a:lumOff val="25000"/>
+                    </a:schemeClr>
+                  </a:solidFill>
+                  <a:latin typeface="Arial" pitchFamily="34" charset="0"/>
+                  <a:cs typeface="Arial" pitchFamily="34" charset="0"/>
+                </a:endParaRPr>
+              </a:p>
+            </p:txBody>
+          </p:sp>
+          <p:sp>
+            <p:nvSpPr>
+              <p:cNvPr id="10" name="CaixaDeTexto 11"/>
+              <p:cNvSpPr txBox="1"/>
+              <p:nvPr/>
+            </p:nvSpPr>
+            <p:spPr>
+              <a:xfrm>
+                <a:off x="4094042" y="533400"/>
+                <a:ext cx="2203030" cy="1038226"/>
+              </a:xfrm>
+              <a:prstGeom prst="rect">
+                <a:avLst/>
+              </a:prstGeom>
+              <a:solidFill>
+                <a:schemeClr val="lt1">
+                  <a:alpha val="0"/>
+                </a:schemeClr>
+              </a:solidFill>
+              <a:ln w="9525" cmpd="sng">
+                <a:noFill/>
+              </a:ln>
+            </p:spPr>
+            <p:style>
+              <a:lnRef idx="0">
+                <a:scrgbClr r="0" g="0" b="0"/>
+              </a:lnRef>
+              <a:fillRef idx="0">
+                <a:scrgbClr r="0" g="0" b="0"/>
+              </a:fillRef>
+              <a:effectRef idx="0">
+                <a:scrgbClr r="0" g="0" b="0"/>
+              </a:effectRef>
+              <a:fontRef idx="minor">
+                <a:schemeClr val="dk1"/>
+              </a:fontRef>
+            </p:style>
+            <p:txBody>
+              <a:bodyPr wrap="square" rtlCol="0" anchor="t"/>
+              <a:lstStyle>
+                <a:lvl1pPr marL="0" indent="0">
+                  <a:defRPr sz="1100">
+                    <a:solidFill>
+                      <a:schemeClr val="dk1"/>
+                    </a:solidFill>
+                    <a:latin typeface="+mn-lt"/>
+                    <a:ea typeface="+mn-ea"/>
+                    <a:cs typeface="+mn-cs"/>
+                  </a:defRPr>
+                </a:lvl1pPr>
+                <a:lvl2pPr marL="457200" indent="0">
+                  <a:defRPr sz="1100">
+                    <a:solidFill>
+                      <a:schemeClr val="dk1"/>
+                    </a:solidFill>
+                    <a:latin typeface="+mn-lt"/>
+                    <a:ea typeface="+mn-ea"/>
+                    <a:cs typeface="+mn-cs"/>
+                  </a:defRPr>
+                </a:lvl2pPr>
+                <a:lvl3pPr marL="914400" indent="0">
+                  <a:defRPr sz="1100">
+                    <a:solidFill>
+                      <a:schemeClr val="dk1"/>
+                    </a:solidFill>
+                    <a:latin typeface="+mn-lt"/>
+                    <a:ea typeface="+mn-ea"/>
+                    <a:cs typeface="+mn-cs"/>
+                  </a:defRPr>
+                </a:lvl3pPr>
+                <a:lvl4pPr marL="1371600" indent="0">
+                  <a:defRPr sz="1100">
+                    <a:solidFill>
+                      <a:schemeClr val="dk1"/>
+                    </a:solidFill>
+                    <a:latin typeface="+mn-lt"/>
+                    <a:ea typeface="+mn-ea"/>
+                    <a:cs typeface="+mn-cs"/>
+                  </a:defRPr>
+                </a:lvl4pPr>
+                <a:lvl5pPr marL="1828800" indent="0">
+                  <a:defRPr sz="1100">
+                    <a:solidFill>
+                      <a:schemeClr val="dk1"/>
+                    </a:solidFill>
+                    <a:latin typeface="+mn-lt"/>
+                    <a:ea typeface="+mn-ea"/>
+                    <a:cs typeface="+mn-cs"/>
+                  </a:defRPr>
+                </a:lvl5pPr>
+                <a:lvl6pPr marL="2286000" indent="0">
+                  <a:defRPr sz="1100">
+                    <a:solidFill>
+                      <a:schemeClr val="dk1"/>
+                    </a:solidFill>
+                    <a:latin typeface="+mn-lt"/>
+                    <a:ea typeface="+mn-ea"/>
+                    <a:cs typeface="+mn-cs"/>
+                  </a:defRPr>
+                </a:lvl6pPr>
+                <a:lvl7pPr marL="2743200" indent="0">
+                  <a:defRPr sz="1100">
+                    <a:solidFill>
+                      <a:schemeClr val="dk1"/>
+                    </a:solidFill>
+                    <a:latin typeface="+mn-lt"/>
+                    <a:ea typeface="+mn-ea"/>
+                    <a:cs typeface="+mn-cs"/>
+                  </a:defRPr>
+                </a:lvl7pPr>
+                <a:lvl8pPr marL="3200400" indent="0">
+                  <a:defRPr sz="1100">
+                    <a:solidFill>
+                      <a:schemeClr val="dk1"/>
+                    </a:solidFill>
+                    <a:latin typeface="+mn-lt"/>
+                    <a:ea typeface="+mn-ea"/>
+                    <a:cs typeface="+mn-cs"/>
+                  </a:defRPr>
+                </a:lvl8pPr>
+                <a:lvl9pPr marL="3657600" indent="0">
+                  <a:defRPr sz="1100">
+                    <a:solidFill>
+                      <a:schemeClr val="dk1"/>
+                    </a:solidFill>
+                    <a:latin typeface="+mn-lt"/>
+                    <a:ea typeface="+mn-ea"/>
+                    <a:cs typeface="+mn-cs"/>
+                  </a:defRPr>
+                </a:lvl9pPr>
+              </a:lstStyle>
+              <a:p>
+                <a:pPr algn="r"/>
+                <a:r>
+                  <a:rPr lang="pt-BR" sz="1200" b="1">
+                    <a:solidFill>
+                      <a:schemeClr val="tx1">
+                        <a:lumMod val="85000"/>
+                        <a:lumOff val="15000"/>
+                      </a:schemeClr>
+                    </a:solidFill>
+                    <a:latin typeface="Arial" pitchFamily="34" charset="0"/>
+                    <a:cs typeface="Arial" pitchFamily="34" charset="0"/>
+                  </a:rPr>
+                  <a:t>Portabilidade</a:t>
+                </a:r>
+              </a:p>
+              <a:p>
+                <a:pPr algn="r"/>
+                <a:r>
+                  <a:rPr lang="pt-BR" sz="2200" b="1">
+                    <a:solidFill>
+                      <a:schemeClr val="tx1">
+                        <a:lumMod val="75000"/>
+                        <a:lumOff val="25000"/>
+                      </a:schemeClr>
+                    </a:solidFill>
+                    <a:latin typeface="Arial" pitchFamily="34" charset="0"/>
+                    <a:cs typeface="Arial" pitchFamily="34" charset="0"/>
+                  </a:rPr>
+                  <a:t>Reusabilidade</a:t>
+                </a:r>
+              </a:p>
+              <a:p>
+                <a:pPr algn="r"/>
+                <a:r>
+                  <a:rPr lang="pt-BR" sz="1200" b="1" baseline="0">
+                    <a:solidFill>
+                      <a:schemeClr val="tx1">
+                        <a:lumMod val="85000"/>
+                        <a:lumOff val="15000"/>
+                      </a:schemeClr>
+                    </a:solidFill>
+                    <a:latin typeface="Arial" pitchFamily="34" charset="0"/>
+                    <a:cs typeface="Arial" pitchFamily="34" charset="0"/>
+                  </a:rPr>
+                  <a:t>Interoperabilidade</a:t>
+                </a:r>
+              </a:p>
+            </p:txBody>
+          </p:sp>
+          <p:sp>
+            <p:nvSpPr>
+              <p:cNvPr id="11" name="CaixaDeTexto 14"/>
+              <p:cNvSpPr txBox="1"/>
+              <p:nvPr/>
+            </p:nvSpPr>
+            <p:spPr>
+              <a:xfrm>
+                <a:off x="18910" y="3648074"/>
+                <a:ext cx="6609089" cy="962026"/>
+              </a:xfrm>
+              <a:prstGeom prst="rect">
+                <a:avLst/>
+              </a:prstGeom>
+              <a:solidFill>
+                <a:schemeClr val="lt1">
+                  <a:alpha val="0"/>
+                </a:schemeClr>
+              </a:solidFill>
+              <a:ln w="9525" cmpd="sng">
+                <a:noFill/>
+              </a:ln>
+            </p:spPr>
+            <p:style>
+              <a:lnRef idx="0">
+                <a:scrgbClr r="0" g="0" b="0"/>
+              </a:lnRef>
+              <a:fillRef idx="0">
+                <a:scrgbClr r="0" g="0" b="0"/>
+              </a:fillRef>
+              <a:effectRef idx="0">
+                <a:scrgbClr r="0" g="0" b="0"/>
+              </a:effectRef>
+              <a:fontRef idx="minor">
+                <a:schemeClr val="dk1"/>
+              </a:fontRef>
+            </p:style>
+            <p:txBody>
+              <a:bodyPr wrap="square" rtlCol="0" anchor="t"/>
+              <a:lstStyle>
+                <a:lvl1pPr marL="0" indent="0">
+                  <a:defRPr sz="1100">
+                    <a:solidFill>
+                      <a:schemeClr val="dk1"/>
+                    </a:solidFill>
+                    <a:latin typeface="+mn-lt"/>
+                    <a:ea typeface="+mn-ea"/>
+                    <a:cs typeface="+mn-cs"/>
+                  </a:defRPr>
+                </a:lvl1pPr>
+                <a:lvl2pPr marL="457200" indent="0">
+                  <a:defRPr sz="1100">
+                    <a:solidFill>
+                      <a:schemeClr val="dk1"/>
+                    </a:solidFill>
+                    <a:latin typeface="+mn-lt"/>
+                    <a:ea typeface="+mn-ea"/>
+                    <a:cs typeface="+mn-cs"/>
+                  </a:defRPr>
+                </a:lvl2pPr>
+                <a:lvl3pPr marL="914400" indent="0">
+                  <a:defRPr sz="1100">
+                    <a:solidFill>
+                      <a:schemeClr val="dk1"/>
+                    </a:solidFill>
+                    <a:latin typeface="+mn-lt"/>
+                    <a:ea typeface="+mn-ea"/>
+                    <a:cs typeface="+mn-cs"/>
+                  </a:defRPr>
+                </a:lvl3pPr>
+                <a:lvl4pPr marL="1371600" indent="0">
+                  <a:defRPr sz="1100">
+                    <a:solidFill>
+                      <a:schemeClr val="dk1"/>
+                    </a:solidFill>
+                    <a:latin typeface="+mn-lt"/>
+                    <a:ea typeface="+mn-ea"/>
+                    <a:cs typeface="+mn-cs"/>
+                  </a:defRPr>
+                </a:lvl4pPr>
+                <a:lvl5pPr marL="1828800" indent="0">
+                  <a:defRPr sz="1100">
+                    <a:solidFill>
+                      <a:schemeClr val="dk1"/>
+                    </a:solidFill>
+                    <a:latin typeface="+mn-lt"/>
+                    <a:ea typeface="+mn-ea"/>
+                    <a:cs typeface="+mn-cs"/>
+                  </a:defRPr>
+                </a:lvl5pPr>
+                <a:lvl6pPr marL="2286000" indent="0">
+                  <a:defRPr sz="1100">
+                    <a:solidFill>
+                      <a:schemeClr val="dk1"/>
+                    </a:solidFill>
+                    <a:latin typeface="+mn-lt"/>
+                    <a:ea typeface="+mn-ea"/>
+                    <a:cs typeface="+mn-cs"/>
+                  </a:defRPr>
+                </a:lvl6pPr>
+                <a:lvl7pPr marL="2743200" indent="0">
+                  <a:defRPr sz="1100">
+                    <a:solidFill>
+                      <a:schemeClr val="dk1"/>
+                    </a:solidFill>
+                    <a:latin typeface="+mn-lt"/>
+                    <a:ea typeface="+mn-ea"/>
+                    <a:cs typeface="+mn-cs"/>
+                  </a:defRPr>
+                </a:lvl7pPr>
+                <a:lvl8pPr marL="3200400" indent="0">
+                  <a:defRPr sz="1100">
+                    <a:solidFill>
+                      <a:schemeClr val="dk1"/>
+                    </a:solidFill>
+                    <a:latin typeface="+mn-lt"/>
+                    <a:ea typeface="+mn-ea"/>
+                    <a:cs typeface="+mn-cs"/>
+                  </a:defRPr>
+                </a:lvl8pPr>
+                <a:lvl9pPr marL="3657600" indent="0">
+                  <a:defRPr sz="1100">
+                    <a:solidFill>
+                      <a:schemeClr val="dk1"/>
+                    </a:solidFill>
+                    <a:latin typeface="+mn-lt"/>
+                    <a:ea typeface="+mn-ea"/>
+                    <a:cs typeface="+mn-cs"/>
+                  </a:defRPr>
+                </a:lvl9pPr>
+              </a:lstStyle>
+              <a:p>
+                <a:r>
+                  <a:rPr lang="pt-BR" sz="1200" b="1" dirty="0">
+                    <a:solidFill>
+                      <a:schemeClr val="tx1">
+                        <a:lumMod val="85000"/>
+                        <a:lumOff val="15000"/>
+                      </a:schemeClr>
+                    </a:solidFill>
+                    <a:latin typeface="Arial" pitchFamily="34" charset="0"/>
+                    <a:cs typeface="Arial" pitchFamily="34" charset="0"/>
+                  </a:rPr>
+                  <a:t>Acurácia 			</a:t>
+                </a:r>
+                <a:r>
+                  <a:rPr lang="pt-BR" sz="1200" b="1" dirty="0" smtClean="0">
+                    <a:solidFill>
+                      <a:schemeClr val="tx1">
+                        <a:lumMod val="85000"/>
+                        <a:lumOff val="15000"/>
+                      </a:schemeClr>
+                    </a:solidFill>
+                    <a:latin typeface="Arial" pitchFamily="34" charset="0"/>
+                    <a:cs typeface="Arial" pitchFamily="34" charset="0"/>
+                  </a:rPr>
+                  <a:t>Confiabilidade</a:t>
+                </a:r>
+                <a:r>
+                  <a:rPr lang="pt-BR" sz="1200" b="1" dirty="0">
+                    <a:solidFill>
+                      <a:schemeClr val="tx1">
+                        <a:lumMod val="85000"/>
+                        <a:lumOff val="15000"/>
+                      </a:schemeClr>
+                    </a:solidFill>
+                    <a:latin typeface="Arial" pitchFamily="34" charset="0"/>
+                    <a:cs typeface="Arial" pitchFamily="34" charset="0"/>
+                  </a:rPr>
+                  <a:t>	E</a:t>
+                </a:r>
+                <a:r>
+                  <a:rPr lang="pt-BR" sz="1600" b="1" dirty="0">
+                    <a:solidFill>
+                      <a:schemeClr val="tx1">
+                        <a:lumMod val="85000"/>
+                        <a:lumOff val="15000"/>
+                      </a:schemeClr>
+                    </a:solidFill>
+                    <a:latin typeface="Arial" pitchFamily="34" charset="0"/>
+                    <a:cs typeface="Arial" pitchFamily="34" charset="0"/>
+                  </a:rPr>
+                  <a:t>ficiência</a:t>
+                </a:r>
+              </a:p>
+              <a:p>
+                <a:r>
+                  <a:rPr lang="pt-BR" sz="1200" b="1" baseline="0" dirty="0">
+                    <a:solidFill>
+                      <a:schemeClr val="tx1">
+                        <a:lumMod val="85000"/>
+                        <a:lumOff val="15000"/>
+                      </a:schemeClr>
+                    </a:solidFill>
+                    <a:latin typeface="Arial" pitchFamily="34" charset="0"/>
+                    <a:cs typeface="Arial" pitchFamily="34" charset="0"/>
+                  </a:rPr>
+                  <a:t>	</a:t>
+                </a:r>
+                <a:r>
+                  <a:rPr lang="pt-BR" sz="2800" b="1" baseline="0" dirty="0" smtClean="0">
+                    <a:solidFill>
+                      <a:schemeClr val="tx1">
+                        <a:lumMod val="85000"/>
+                        <a:lumOff val="15000"/>
+                      </a:schemeClr>
+                    </a:solidFill>
+                    <a:latin typeface="Arial" pitchFamily="34" charset="0"/>
+                    <a:cs typeface="Arial" pitchFamily="34" charset="0"/>
+                  </a:rPr>
+                  <a:t>Usabilidade</a:t>
+                </a:r>
+                <a:r>
+                  <a:rPr lang="pt-BR" sz="2200" b="1" baseline="0" dirty="0">
+                    <a:solidFill>
+                      <a:schemeClr val="tx1">
+                        <a:lumMod val="85000"/>
+                        <a:lumOff val="15000"/>
+                      </a:schemeClr>
+                    </a:solidFill>
+                    <a:latin typeface="Arial" pitchFamily="34" charset="0"/>
+                    <a:cs typeface="Arial" pitchFamily="34" charset="0"/>
+                  </a:rPr>
+                  <a:t>		</a:t>
+                </a:r>
+                <a:r>
+                  <a:rPr lang="pt-BR" sz="1200" b="1" baseline="0" dirty="0">
+                    <a:solidFill>
+                      <a:schemeClr val="tx1">
+                        <a:lumMod val="85000"/>
+                        <a:lumOff val="15000"/>
+                      </a:schemeClr>
+                    </a:solidFill>
+                    <a:latin typeface="Arial" pitchFamily="34" charset="0"/>
+                    <a:cs typeface="Arial" pitchFamily="34" charset="0"/>
+                  </a:rPr>
+                  <a:t>Integridade</a:t>
+                </a:r>
+              </a:p>
+            </p:txBody>
+          </p:sp>
+        </p:grpSp>
+      </p:grpSp>
     </p:spTree>
+    <p:extLst>
+      <p:ext uri="{BB962C8B-B14F-4D97-AF65-F5344CB8AC3E}">
+        <p14:creationId xmlns:p14="http://schemas.microsoft.com/office/powerpoint/2010/main" val="3781259700"/>
+      </p:ext>
+    </p:extLst>
   </p:cSld>
   <p:clrMapOvr>
     <a:masterClrMapping/>
@@ -6196,7 +7322,7 @@
       </p:grpSpPr>
       <p:sp>
         <p:nvSpPr>
-          <p:cNvPr id="20482" name="Rectangle 2"/>
+          <p:cNvPr id="19458" name="Rectangle 2"/>
           <p:cNvSpPr>
             <a:spLocks noGrp="1" noChangeArrowheads="1"/>
           </p:cNvSpPr>
@@ -6210,15 +7336,20 @@
           <a:lstStyle/>
           <a:p>
             <a:r>
-              <a:rPr lang="en-GB" altLang="en-US"/>
-              <a:t>Opportunities</a:t>
-            </a:r>
+              <a:rPr lang="en-GB" altLang="en-US" dirty="0" err="1" smtClean="0"/>
+              <a:t>Qualidade</a:t>
+            </a:r>
+            <a:r>
+              <a:rPr lang="en-GB" altLang="en-US" dirty="0" smtClean="0"/>
+              <a:t> de Software</a:t>
+            </a:r>
+            <a:endParaRPr lang="en-GB" altLang="en-US" dirty="0"/>
           </a:p>
         </p:txBody>
       </p:sp>
       <p:sp>
         <p:nvSpPr>
-          <p:cNvPr id="20483" name="Rectangle 3"/>
+          <p:cNvPr id="19459" name="Rectangle 3"/>
           <p:cNvSpPr>
             <a:spLocks noGrp="1" noChangeArrowheads="1"/>
           </p:cNvSpPr>
@@ -6232,20 +7363,68 @@
           <a:lstStyle/>
           <a:p>
             <a:r>
-              <a:rPr lang="en-GB" altLang="en-US"/>
-              <a:t>Identify problems and opportunities.</a:t>
-            </a:r>
+              <a:rPr lang="en-GB" altLang="en-US" dirty="0" smtClean="0"/>
+              <a:t>Outros </a:t>
+            </a:r>
+            <a:r>
+              <a:rPr lang="en-GB" altLang="en-US" dirty="0" err="1" smtClean="0"/>
+              <a:t>modelos</a:t>
+            </a:r>
+            <a:endParaRPr lang="en-GB" altLang="en-US" dirty="0"/>
           </a:p>
           <a:p>
             <a:pPr lvl="1"/>
             <a:r>
-              <a:rPr lang="en-GB" altLang="en-US"/>
-              <a:t>State consumer problems, and define the nature of product/service opportunities that are created by those problems.</a:t>
-            </a:r>
+              <a:rPr lang="en-GB" altLang="en-US" dirty="0" smtClean="0"/>
+              <a:t>Boehm</a:t>
+            </a:r>
+          </a:p>
+          <a:p>
+            <a:pPr lvl="1"/>
+            <a:r>
+              <a:rPr lang="pt-BR" altLang="en-US" dirty="0" smtClean="0"/>
+              <a:t>FURPS</a:t>
+            </a:r>
+          </a:p>
+          <a:p>
+            <a:r>
+              <a:rPr lang="pt-BR" altLang="en-US" dirty="0" smtClean="0"/>
+              <a:t>ISO/IEC JTC1, 1985</a:t>
+            </a:r>
+          </a:p>
+          <a:p>
+            <a:pPr lvl="1"/>
+            <a:r>
+              <a:rPr lang="pt-BR" altLang="en-US" dirty="0" smtClean="0"/>
+              <a:t>Objetivo: Desenvolver consensos, padronização Internacional</a:t>
+            </a:r>
+          </a:p>
+          <a:p>
+            <a:pPr lvl="1"/>
+            <a:r>
+              <a:rPr lang="pt-BR" altLang="en-US" dirty="0" smtClean="0"/>
+              <a:t>ISO/IEC 9126 – Membro da família ISO 9000</a:t>
+            </a:r>
+          </a:p>
+          <a:p>
+            <a:pPr lvl="2"/>
+            <a:r>
+              <a:rPr lang="pt-BR" altLang="en-US" dirty="0" smtClean="0"/>
+              <a:t>Revisada em 2011, ISO/IEC 25010</a:t>
+            </a:r>
+          </a:p>
+          <a:p>
+            <a:pPr lvl="1"/>
+            <a:endParaRPr lang="en-GB" altLang="en-US" dirty="0"/>
           </a:p>
         </p:txBody>
       </p:sp>
     </p:spTree>
+    <p:extLst>
+      <p:ext uri="{BB962C8B-B14F-4D97-AF65-F5344CB8AC3E}">
+        <p14:creationId xmlns:p14="http://schemas.microsoft.com/office/powerpoint/2010/main" val="173649872"/>
+      </p:ext>
+    </p:extLst>
   </p:cSld>
   <p:clrMapOvr>
     <a:masterClrMapping/>
@@ -6279,7 +7458,7 @@
       </p:grpSpPr>
       <p:sp>
         <p:nvSpPr>
-          <p:cNvPr id="21506" name="Rectangle 2"/>
+          <p:cNvPr id="19458" name="Rectangle 2"/>
           <p:cNvSpPr>
             <a:spLocks noGrp="1" noChangeArrowheads="1"/>
           </p:cNvSpPr>
@@ -6293,15 +7472,20 @@
           <a:lstStyle/>
           <a:p>
             <a:r>
-              <a:rPr lang="en-GB" altLang="en-US"/>
-              <a:t>Business Concept</a:t>
-            </a:r>
+              <a:rPr lang="en-GB" altLang="en-US" dirty="0" err="1"/>
+              <a:t>Qualidade</a:t>
+            </a:r>
+            <a:r>
+              <a:rPr lang="en-GB" altLang="en-US" dirty="0"/>
+              <a:t> de Software</a:t>
+            </a:r>
+            <a:endParaRPr lang="en-GB" altLang="en-US" dirty="0"/>
           </a:p>
         </p:txBody>
       </p:sp>
       <p:sp>
         <p:nvSpPr>
-          <p:cNvPr id="21507" name="Rectangle 3"/>
+          <p:cNvPr id="19459" name="Rectangle 3"/>
           <p:cNvSpPr>
             <a:spLocks noGrp="1" noChangeArrowheads="1"/>
           </p:cNvSpPr>
@@ -6315,13 +7499,1910 @@
           <a:lstStyle/>
           <a:p>
             <a:r>
-              <a:rPr lang="en-GB" altLang="en-US"/>
-              <a:t>Summarize the key technology, concept, or strategy on which your business is based.</a:t>
-            </a:r>
+              <a:rPr lang="pt-BR" altLang="en-US" dirty="0" smtClean="0"/>
+              <a:t>ISO/IEC 25010 - SQuaRE </a:t>
+            </a:r>
+            <a:r>
+              <a:rPr lang="pt-BR" altLang="en-US" i="1" dirty="0" smtClean="0">
+                <a:latin typeface="Times New Roman" panose="02020603050405020304" pitchFamily="18" charset="0"/>
+                <a:cs typeface="Times New Roman" panose="02020603050405020304" pitchFamily="18" charset="0"/>
+              </a:rPr>
+              <a:t>(Software </a:t>
+            </a:r>
+            <a:r>
+              <a:rPr lang="pt-BR" altLang="en-US" i="1" dirty="0" err="1" smtClean="0">
+                <a:latin typeface="Times New Roman" panose="02020603050405020304" pitchFamily="18" charset="0"/>
+                <a:cs typeface="Times New Roman" panose="02020603050405020304" pitchFamily="18" charset="0"/>
+              </a:rPr>
+              <a:t>product</a:t>
+            </a:r>
+            <a:r>
+              <a:rPr lang="pt-BR" altLang="en-US" i="1" dirty="0" smtClean="0">
+                <a:latin typeface="Times New Roman" panose="02020603050405020304" pitchFamily="18" charset="0"/>
+                <a:cs typeface="Times New Roman" panose="02020603050405020304" pitchFamily="18" charset="0"/>
+              </a:rPr>
+              <a:t> </a:t>
+            </a:r>
+            <a:r>
+              <a:rPr lang="pt-BR" altLang="en-US" i="1" dirty="0" err="1" smtClean="0">
+                <a:latin typeface="Times New Roman" panose="02020603050405020304" pitchFamily="18" charset="0"/>
+                <a:cs typeface="Times New Roman" panose="02020603050405020304" pitchFamily="18" charset="0"/>
+              </a:rPr>
+              <a:t>Quality</a:t>
+            </a:r>
+            <a:r>
+              <a:rPr lang="pt-BR" altLang="en-US" i="1" dirty="0" smtClean="0">
+                <a:latin typeface="Times New Roman" panose="02020603050405020304" pitchFamily="18" charset="0"/>
+                <a:cs typeface="Times New Roman" panose="02020603050405020304" pitchFamily="18" charset="0"/>
+              </a:rPr>
+              <a:t> </a:t>
+            </a:r>
+            <a:r>
+              <a:rPr lang="pt-BR" altLang="en-US" i="1" dirty="0" err="1" smtClean="0">
+                <a:latin typeface="Times New Roman" panose="02020603050405020304" pitchFamily="18" charset="0"/>
+                <a:cs typeface="Times New Roman" panose="02020603050405020304" pitchFamily="18" charset="0"/>
+              </a:rPr>
+              <a:t>Requirement</a:t>
+            </a:r>
+            <a:r>
+              <a:rPr lang="pt-BR" altLang="en-US" i="1" dirty="0" smtClean="0">
+                <a:latin typeface="Times New Roman" panose="02020603050405020304" pitchFamily="18" charset="0"/>
+                <a:cs typeface="Times New Roman" panose="02020603050405020304" pitchFamily="18" charset="0"/>
+              </a:rPr>
+              <a:t> </a:t>
+            </a:r>
+            <a:r>
+              <a:rPr lang="pt-BR" altLang="en-US" i="1" dirty="0" err="1" smtClean="0">
+                <a:latin typeface="Times New Roman" panose="02020603050405020304" pitchFamily="18" charset="0"/>
+                <a:cs typeface="Times New Roman" panose="02020603050405020304" pitchFamily="18" charset="0"/>
+              </a:rPr>
+              <a:t>Evaluation</a:t>
+            </a:r>
+            <a:r>
+              <a:rPr lang="pt-BR" altLang="en-US" i="1" dirty="0" smtClean="0">
+                <a:latin typeface="Times New Roman" panose="02020603050405020304" pitchFamily="18" charset="0"/>
+                <a:cs typeface="Times New Roman" panose="02020603050405020304" pitchFamily="18" charset="0"/>
+              </a:rPr>
+              <a:t>)</a:t>
+            </a:r>
+            <a:endParaRPr lang="en-GB" altLang="en-US" i="1" dirty="0">
+              <a:latin typeface="Times New Roman" panose="02020603050405020304" pitchFamily="18" charset="0"/>
+              <a:cs typeface="Times New Roman" panose="02020603050405020304" pitchFamily="18" charset="0"/>
+            </a:endParaRPr>
           </a:p>
         </p:txBody>
       </p:sp>
+      <p:grpSp>
+        <p:nvGrpSpPr>
+          <p:cNvPr id="4" name="Grupo 19"/>
+          <p:cNvGrpSpPr/>
+          <p:nvPr/>
+        </p:nvGrpSpPr>
+        <p:grpSpPr>
+          <a:xfrm>
+            <a:off x="1835016" y="2492896"/>
+            <a:ext cx="7201480" cy="3672408"/>
+            <a:chOff x="0" y="0"/>
+            <a:chExt cx="8048625" cy="4333875"/>
+          </a:xfrm>
+        </p:grpSpPr>
+        <p:sp>
+          <p:nvSpPr>
+            <p:cNvPr id="5" name="Retângulo de cantos arredondados 6"/>
+            <p:cNvSpPr/>
+            <p:nvPr/>
+          </p:nvSpPr>
+          <p:spPr>
+            <a:xfrm>
+              <a:off x="1228725" y="0"/>
+              <a:ext cx="2181225" cy="628650"/>
+            </a:xfrm>
+            <a:prstGeom prst="roundRect">
+              <a:avLst/>
+            </a:prstGeom>
+            <a:solidFill>
+              <a:schemeClr val="bg1">
+                <a:lumMod val="75000"/>
+                <a:alpha val="50000"/>
+              </a:schemeClr>
+            </a:solidFill>
+            <a:ln>
+              <a:solidFill>
+                <a:schemeClr val="tx1">
+                  <a:lumMod val="50000"/>
+                  <a:lumOff val="50000"/>
+                  <a:alpha val="55000"/>
+                </a:schemeClr>
+              </a:solidFill>
+              <a:prstDash val="dash"/>
+            </a:ln>
+          </p:spPr>
+          <p:style>
+            <a:lnRef idx="2">
+              <a:schemeClr val="accent1">
+                <a:shade val="50000"/>
+              </a:schemeClr>
+            </a:lnRef>
+            <a:fillRef idx="1">
+              <a:schemeClr val="accent1"/>
+            </a:fillRef>
+            <a:effectRef idx="0">
+              <a:schemeClr val="accent1"/>
+            </a:effectRef>
+            <a:fontRef idx="minor">
+              <a:schemeClr val="lt1"/>
+            </a:fontRef>
+          </p:style>
+          <p:txBody>
+            <a:bodyPr rtlCol="0" anchor="ctr"/>
+            <a:lstStyle>
+              <a:lvl1pPr marL="0" indent="0">
+                <a:defRPr sz="1100">
+                  <a:solidFill>
+                    <a:schemeClr val="lt1"/>
+                  </a:solidFill>
+                  <a:latin typeface="+mn-lt"/>
+                  <a:ea typeface="+mn-ea"/>
+                  <a:cs typeface="+mn-cs"/>
+                </a:defRPr>
+              </a:lvl1pPr>
+              <a:lvl2pPr marL="457200" indent="0">
+                <a:defRPr sz="1100">
+                  <a:solidFill>
+                    <a:schemeClr val="lt1"/>
+                  </a:solidFill>
+                  <a:latin typeface="+mn-lt"/>
+                  <a:ea typeface="+mn-ea"/>
+                  <a:cs typeface="+mn-cs"/>
+                </a:defRPr>
+              </a:lvl2pPr>
+              <a:lvl3pPr marL="914400" indent="0">
+                <a:defRPr sz="1100">
+                  <a:solidFill>
+                    <a:schemeClr val="lt1"/>
+                  </a:solidFill>
+                  <a:latin typeface="+mn-lt"/>
+                  <a:ea typeface="+mn-ea"/>
+                  <a:cs typeface="+mn-cs"/>
+                </a:defRPr>
+              </a:lvl3pPr>
+              <a:lvl4pPr marL="1371600" indent="0">
+                <a:defRPr sz="1100">
+                  <a:solidFill>
+                    <a:schemeClr val="lt1"/>
+                  </a:solidFill>
+                  <a:latin typeface="+mn-lt"/>
+                  <a:ea typeface="+mn-ea"/>
+                  <a:cs typeface="+mn-cs"/>
+                </a:defRPr>
+              </a:lvl4pPr>
+              <a:lvl5pPr marL="1828800" indent="0">
+                <a:defRPr sz="1100">
+                  <a:solidFill>
+                    <a:schemeClr val="lt1"/>
+                  </a:solidFill>
+                  <a:latin typeface="+mn-lt"/>
+                  <a:ea typeface="+mn-ea"/>
+                  <a:cs typeface="+mn-cs"/>
+                </a:defRPr>
+              </a:lvl5pPr>
+              <a:lvl6pPr marL="2286000" indent="0">
+                <a:defRPr sz="1100">
+                  <a:solidFill>
+                    <a:schemeClr val="lt1"/>
+                  </a:solidFill>
+                  <a:latin typeface="+mn-lt"/>
+                  <a:ea typeface="+mn-ea"/>
+                  <a:cs typeface="+mn-cs"/>
+                </a:defRPr>
+              </a:lvl6pPr>
+              <a:lvl7pPr marL="2743200" indent="0">
+                <a:defRPr sz="1100">
+                  <a:solidFill>
+                    <a:schemeClr val="lt1"/>
+                  </a:solidFill>
+                  <a:latin typeface="+mn-lt"/>
+                  <a:ea typeface="+mn-ea"/>
+                  <a:cs typeface="+mn-cs"/>
+                </a:defRPr>
+              </a:lvl7pPr>
+              <a:lvl8pPr marL="3200400" indent="0">
+                <a:defRPr sz="1100">
+                  <a:solidFill>
+                    <a:schemeClr val="lt1"/>
+                  </a:solidFill>
+                  <a:latin typeface="+mn-lt"/>
+                  <a:ea typeface="+mn-ea"/>
+                  <a:cs typeface="+mn-cs"/>
+                </a:defRPr>
+              </a:lvl8pPr>
+              <a:lvl9pPr marL="3657600" indent="0">
+                <a:defRPr sz="1100">
+                  <a:solidFill>
+                    <a:schemeClr val="lt1"/>
+                  </a:solidFill>
+                  <a:latin typeface="+mn-lt"/>
+                  <a:ea typeface="+mn-ea"/>
+                  <a:cs typeface="+mn-cs"/>
+                </a:defRPr>
+              </a:lvl9pPr>
+            </a:lstStyle>
+            <a:p>
+              <a:pPr marL="0" indent="0" algn="ctr"/>
+              <a:r>
+                <a:rPr lang="pt-BR" sz="1400">
+                  <a:solidFill>
+                    <a:schemeClr val="tx1">
+                      <a:lumMod val="75000"/>
+                      <a:lumOff val="25000"/>
+                    </a:schemeClr>
+                  </a:solidFill>
+                  <a:latin typeface="Arial" pitchFamily="34" charset="0"/>
+                  <a:ea typeface="+mn-ea"/>
+                  <a:cs typeface="Arial" pitchFamily="34" charset="0"/>
+                </a:rPr>
+                <a:t>PORTABILIDADE</a:t>
+              </a:r>
+            </a:p>
+          </p:txBody>
+        </p:sp>
+        <p:grpSp>
+          <p:nvGrpSpPr>
+            <p:cNvPr id="6" name="Grupo 21"/>
+            <p:cNvGrpSpPr/>
+            <p:nvPr/>
+          </p:nvGrpSpPr>
+          <p:grpSpPr>
+            <a:xfrm>
+              <a:off x="0" y="28575"/>
+              <a:ext cx="8048625" cy="4305300"/>
+              <a:chOff x="0" y="28575"/>
+              <a:chExt cx="8048625" cy="4305300"/>
+            </a:xfrm>
+          </p:grpSpPr>
+          <p:sp>
+            <p:nvSpPr>
+              <p:cNvPr id="7" name="Retângulo de cantos arredondados 1"/>
+              <p:cNvSpPr/>
+              <p:nvPr/>
+            </p:nvSpPr>
+            <p:spPr>
+              <a:xfrm>
+                <a:off x="2943227" y="1685924"/>
+                <a:ext cx="2190750" cy="990601"/>
+              </a:xfrm>
+              <a:prstGeom prst="roundRect">
+                <a:avLst/>
+              </a:prstGeom>
+              <a:solidFill>
+                <a:schemeClr val="tx1">
+                  <a:lumMod val="85000"/>
+                  <a:lumOff val="15000"/>
+                  <a:alpha val="17000"/>
+                </a:schemeClr>
+              </a:solidFill>
+              <a:ln>
+                <a:solidFill>
+                  <a:schemeClr val="tx1">
+                    <a:lumMod val="75000"/>
+                    <a:lumOff val="25000"/>
+                  </a:schemeClr>
+                </a:solidFill>
+              </a:ln>
+            </p:spPr>
+            <p:style>
+              <a:lnRef idx="2">
+                <a:schemeClr val="accent1">
+                  <a:shade val="50000"/>
+                </a:schemeClr>
+              </a:lnRef>
+              <a:fillRef idx="1">
+                <a:schemeClr val="accent1"/>
+              </a:fillRef>
+              <a:effectRef idx="0">
+                <a:schemeClr val="accent1"/>
+              </a:effectRef>
+              <a:fontRef idx="minor">
+                <a:schemeClr val="lt1"/>
+              </a:fontRef>
+            </p:style>
+            <p:txBody>
+              <a:bodyPr rtlCol="0" anchor="ctr"/>
+              <a:lstStyle>
+                <a:lvl1pPr marL="0" indent="0">
+                  <a:defRPr sz="1100">
+                    <a:solidFill>
+                      <a:schemeClr val="lt1"/>
+                    </a:solidFill>
+                    <a:latin typeface="+mn-lt"/>
+                    <a:ea typeface="+mn-ea"/>
+                    <a:cs typeface="+mn-cs"/>
+                  </a:defRPr>
+                </a:lvl1pPr>
+                <a:lvl2pPr marL="457200" indent="0">
+                  <a:defRPr sz="1100">
+                    <a:solidFill>
+                      <a:schemeClr val="lt1"/>
+                    </a:solidFill>
+                    <a:latin typeface="+mn-lt"/>
+                    <a:ea typeface="+mn-ea"/>
+                    <a:cs typeface="+mn-cs"/>
+                  </a:defRPr>
+                </a:lvl2pPr>
+                <a:lvl3pPr marL="914400" indent="0">
+                  <a:defRPr sz="1100">
+                    <a:solidFill>
+                      <a:schemeClr val="lt1"/>
+                    </a:solidFill>
+                    <a:latin typeface="+mn-lt"/>
+                    <a:ea typeface="+mn-ea"/>
+                    <a:cs typeface="+mn-cs"/>
+                  </a:defRPr>
+                </a:lvl3pPr>
+                <a:lvl4pPr marL="1371600" indent="0">
+                  <a:defRPr sz="1100">
+                    <a:solidFill>
+                      <a:schemeClr val="lt1"/>
+                    </a:solidFill>
+                    <a:latin typeface="+mn-lt"/>
+                    <a:ea typeface="+mn-ea"/>
+                    <a:cs typeface="+mn-cs"/>
+                  </a:defRPr>
+                </a:lvl4pPr>
+                <a:lvl5pPr marL="1828800" indent="0">
+                  <a:defRPr sz="1100">
+                    <a:solidFill>
+                      <a:schemeClr val="lt1"/>
+                    </a:solidFill>
+                    <a:latin typeface="+mn-lt"/>
+                    <a:ea typeface="+mn-ea"/>
+                    <a:cs typeface="+mn-cs"/>
+                  </a:defRPr>
+                </a:lvl5pPr>
+                <a:lvl6pPr marL="2286000" indent="0">
+                  <a:defRPr sz="1100">
+                    <a:solidFill>
+                      <a:schemeClr val="lt1"/>
+                    </a:solidFill>
+                    <a:latin typeface="+mn-lt"/>
+                    <a:ea typeface="+mn-ea"/>
+                    <a:cs typeface="+mn-cs"/>
+                  </a:defRPr>
+                </a:lvl6pPr>
+                <a:lvl7pPr marL="2743200" indent="0">
+                  <a:defRPr sz="1100">
+                    <a:solidFill>
+                      <a:schemeClr val="lt1"/>
+                    </a:solidFill>
+                    <a:latin typeface="+mn-lt"/>
+                    <a:ea typeface="+mn-ea"/>
+                    <a:cs typeface="+mn-cs"/>
+                  </a:defRPr>
+                </a:lvl7pPr>
+                <a:lvl8pPr marL="3200400" indent="0">
+                  <a:defRPr sz="1100">
+                    <a:solidFill>
+                      <a:schemeClr val="lt1"/>
+                    </a:solidFill>
+                    <a:latin typeface="+mn-lt"/>
+                    <a:ea typeface="+mn-ea"/>
+                    <a:cs typeface="+mn-cs"/>
+                  </a:defRPr>
+                </a:lvl8pPr>
+                <a:lvl9pPr marL="3657600" indent="0">
+                  <a:defRPr sz="1100">
+                    <a:solidFill>
+                      <a:schemeClr val="lt1"/>
+                    </a:solidFill>
+                    <a:latin typeface="+mn-lt"/>
+                    <a:ea typeface="+mn-ea"/>
+                    <a:cs typeface="+mn-cs"/>
+                  </a:defRPr>
+                </a:lvl9pPr>
+              </a:lstStyle>
+              <a:p>
+                <a:pPr algn="ctr"/>
+                <a:r>
+                  <a:rPr lang="pt-BR" sz="1400" b="1" dirty="0">
+                    <a:latin typeface="Arial" pitchFamily="34" charset="0"/>
+                    <a:cs typeface="Arial" pitchFamily="34" charset="0"/>
+                  </a:rPr>
+                  <a:t>ISO/IEC 25010:2011</a:t>
+                </a:r>
+              </a:p>
+              <a:p>
+                <a:pPr algn="ctr"/>
+                <a:endParaRPr lang="pt-BR" sz="1400" b="1" dirty="0">
+                  <a:latin typeface="Arial" pitchFamily="34" charset="0"/>
+                  <a:cs typeface="Arial" pitchFamily="34" charset="0"/>
+                </a:endParaRPr>
+              </a:p>
+              <a:p>
+                <a:pPr algn="ctr"/>
+                <a:r>
+                  <a:rPr lang="pt-BR" sz="1400" b="1" dirty="0">
+                    <a:latin typeface="Arial" pitchFamily="34" charset="0"/>
+                    <a:cs typeface="Arial" pitchFamily="34" charset="0"/>
+                  </a:rPr>
+                  <a:t>Qualidade</a:t>
+                </a:r>
+                <a:r>
+                  <a:rPr lang="pt-BR" sz="1400" b="1" baseline="0" dirty="0">
+                    <a:latin typeface="Arial" pitchFamily="34" charset="0"/>
+                    <a:cs typeface="Arial" pitchFamily="34" charset="0"/>
+                  </a:rPr>
+                  <a:t> do Produto</a:t>
+                </a:r>
+                <a:endParaRPr lang="pt-BR" sz="1400" b="1" dirty="0">
+                  <a:latin typeface="Arial" pitchFamily="34" charset="0"/>
+                  <a:cs typeface="Arial" pitchFamily="34" charset="0"/>
+                </a:endParaRPr>
+              </a:p>
+            </p:txBody>
+          </p:sp>
+          <p:sp>
+            <p:nvSpPr>
+              <p:cNvPr id="8" name="Retângulo de cantos arredondados 2"/>
+              <p:cNvSpPr/>
+              <p:nvPr/>
+            </p:nvSpPr>
+            <p:spPr>
+              <a:xfrm>
+                <a:off x="4648200" y="28575"/>
+                <a:ext cx="2181225" cy="628650"/>
+              </a:xfrm>
+              <a:prstGeom prst="roundRect">
+                <a:avLst/>
+              </a:prstGeom>
+              <a:solidFill>
+                <a:schemeClr val="bg1">
+                  <a:lumMod val="75000"/>
+                  <a:alpha val="50000"/>
+                </a:schemeClr>
+              </a:solidFill>
+              <a:ln>
+                <a:solidFill>
+                  <a:schemeClr val="tx1">
+                    <a:lumMod val="50000"/>
+                    <a:lumOff val="50000"/>
+                    <a:alpha val="55000"/>
+                  </a:schemeClr>
+                </a:solidFill>
+                <a:prstDash val="dash"/>
+              </a:ln>
+            </p:spPr>
+            <p:style>
+              <a:lnRef idx="2">
+                <a:schemeClr val="accent1">
+                  <a:shade val="50000"/>
+                </a:schemeClr>
+              </a:lnRef>
+              <a:fillRef idx="1">
+                <a:schemeClr val="accent1"/>
+              </a:fillRef>
+              <a:effectRef idx="0">
+                <a:schemeClr val="accent1"/>
+              </a:effectRef>
+              <a:fontRef idx="minor">
+                <a:schemeClr val="lt1"/>
+              </a:fontRef>
+            </p:style>
+            <p:txBody>
+              <a:bodyPr rtlCol="0" anchor="ctr"/>
+              <a:lstStyle>
+                <a:lvl1pPr marL="0" indent="0">
+                  <a:defRPr sz="1100">
+                    <a:solidFill>
+                      <a:schemeClr val="lt1"/>
+                    </a:solidFill>
+                    <a:latin typeface="+mn-lt"/>
+                    <a:ea typeface="+mn-ea"/>
+                    <a:cs typeface="+mn-cs"/>
+                  </a:defRPr>
+                </a:lvl1pPr>
+                <a:lvl2pPr marL="457200" indent="0">
+                  <a:defRPr sz="1100">
+                    <a:solidFill>
+                      <a:schemeClr val="lt1"/>
+                    </a:solidFill>
+                    <a:latin typeface="+mn-lt"/>
+                    <a:ea typeface="+mn-ea"/>
+                    <a:cs typeface="+mn-cs"/>
+                  </a:defRPr>
+                </a:lvl2pPr>
+                <a:lvl3pPr marL="914400" indent="0">
+                  <a:defRPr sz="1100">
+                    <a:solidFill>
+                      <a:schemeClr val="lt1"/>
+                    </a:solidFill>
+                    <a:latin typeface="+mn-lt"/>
+                    <a:ea typeface="+mn-ea"/>
+                    <a:cs typeface="+mn-cs"/>
+                  </a:defRPr>
+                </a:lvl3pPr>
+                <a:lvl4pPr marL="1371600" indent="0">
+                  <a:defRPr sz="1100">
+                    <a:solidFill>
+                      <a:schemeClr val="lt1"/>
+                    </a:solidFill>
+                    <a:latin typeface="+mn-lt"/>
+                    <a:ea typeface="+mn-ea"/>
+                    <a:cs typeface="+mn-cs"/>
+                  </a:defRPr>
+                </a:lvl4pPr>
+                <a:lvl5pPr marL="1828800" indent="0">
+                  <a:defRPr sz="1100">
+                    <a:solidFill>
+                      <a:schemeClr val="lt1"/>
+                    </a:solidFill>
+                    <a:latin typeface="+mn-lt"/>
+                    <a:ea typeface="+mn-ea"/>
+                    <a:cs typeface="+mn-cs"/>
+                  </a:defRPr>
+                </a:lvl5pPr>
+                <a:lvl6pPr marL="2286000" indent="0">
+                  <a:defRPr sz="1100">
+                    <a:solidFill>
+                      <a:schemeClr val="lt1"/>
+                    </a:solidFill>
+                    <a:latin typeface="+mn-lt"/>
+                    <a:ea typeface="+mn-ea"/>
+                    <a:cs typeface="+mn-cs"/>
+                  </a:defRPr>
+                </a:lvl6pPr>
+                <a:lvl7pPr marL="2743200" indent="0">
+                  <a:defRPr sz="1100">
+                    <a:solidFill>
+                      <a:schemeClr val="lt1"/>
+                    </a:solidFill>
+                    <a:latin typeface="+mn-lt"/>
+                    <a:ea typeface="+mn-ea"/>
+                    <a:cs typeface="+mn-cs"/>
+                  </a:defRPr>
+                </a:lvl7pPr>
+                <a:lvl8pPr marL="3200400" indent="0">
+                  <a:defRPr sz="1100">
+                    <a:solidFill>
+                      <a:schemeClr val="lt1"/>
+                    </a:solidFill>
+                    <a:latin typeface="+mn-lt"/>
+                    <a:ea typeface="+mn-ea"/>
+                    <a:cs typeface="+mn-cs"/>
+                  </a:defRPr>
+                </a:lvl8pPr>
+                <a:lvl9pPr marL="3657600" indent="0">
+                  <a:defRPr sz="1100">
+                    <a:solidFill>
+                      <a:schemeClr val="lt1"/>
+                    </a:solidFill>
+                    <a:latin typeface="+mn-lt"/>
+                    <a:ea typeface="+mn-ea"/>
+                    <a:cs typeface="+mn-cs"/>
+                  </a:defRPr>
+                </a:lvl9pPr>
+              </a:lstStyle>
+              <a:p>
+                <a:pPr algn="ctr"/>
+                <a:r>
+                  <a:rPr lang="pt-BR" sz="1400">
+                    <a:solidFill>
+                      <a:schemeClr val="tx1">
+                        <a:lumMod val="75000"/>
+                        <a:lumOff val="25000"/>
+                      </a:schemeClr>
+                    </a:solidFill>
+                    <a:latin typeface="Arial" pitchFamily="34" charset="0"/>
+                    <a:cs typeface="Arial" pitchFamily="34" charset="0"/>
+                  </a:rPr>
+                  <a:t>FUNCIONALIDADE</a:t>
+                </a:r>
+              </a:p>
+            </p:txBody>
+          </p:sp>
+          <p:sp>
+            <p:nvSpPr>
+              <p:cNvPr id="9" name="Retângulo de cantos arredondados 3"/>
+              <p:cNvSpPr/>
+              <p:nvPr/>
+            </p:nvSpPr>
+            <p:spPr>
+              <a:xfrm>
+                <a:off x="5867400" y="1047750"/>
+                <a:ext cx="2181225" cy="628650"/>
+              </a:xfrm>
+              <a:prstGeom prst="roundRect">
+                <a:avLst/>
+              </a:prstGeom>
+              <a:solidFill>
+                <a:schemeClr val="bg1">
+                  <a:lumMod val="75000"/>
+                  <a:alpha val="50000"/>
+                </a:schemeClr>
+              </a:solidFill>
+              <a:ln>
+                <a:solidFill>
+                  <a:schemeClr val="tx1">
+                    <a:lumMod val="50000"/>
+                    <a:lumOff val="50000"/>
+                    <a:alpha val="55000"/>
+                  </a:schemeClr>
+                </a:solidFill>
+                <a:prstDash val="dash"/>
+              </a:ln>
+            </p:spPr>
+            <p:style>
+              <a:lnRef idx="2">
+                <a:schemeClr val="accent1">
+                  <a:shade val="50000"/>
+                </a:schemeClr>
+              </a:lnRef>
+              <a:fillRef idx="1">
+                <a:schemeClr val="accent1"/>
+              </a:fillRef>
+              <a:effectRef idx="0">
+                <a:schemeClr val="accent1"/>
+              </a:effectRef>
+              <a:fontRef idx="minor">
+                <a:schemeClr val="lt1"/>
+              </a:fontRef>
+            </p:style>
+            <p:txBody>
+              <a:bodyPr rtlCol="0" anchor="ctr"/>
+              <a:lstStyle>
+                <a:lvl1pPr marL="0" indent="0">
+                  <a:defRPr sz="1100">
+                    <a:solidFill>
+                      <a:schemeClr val="lt1"/>
+                    </a:solidFill>
+                    <a:latin typeface="+mn-lt"/>
+                    <a:ea typeface="+mn-ea"/>
+                    <a:cs typeface="+mn-cs"/>
+                  </a:defRPr>
+                </a:lvl1pPr>
+                <a:lvl2pPr marL="457200" indent="0">
+                  <a:defRPr sz="1100">
+                    <a:solidFill>
+                      <a:schemeClr val="lt1"/>
+                    </a:solidFill>
+                    <a:latin typeface="+mn-lt"/>
+                    <a:ea typeface="+mn-ea"/>
+                    <a:cs typeface="+mn-cs"/>
+                  </a:defRPr>
+                </a:lvl2pPr>
+                <a:lvl3pPr marL="914400" indent="0">
+                  <a:defRPr sz="1100">
+                    <a:solidFill>
+                      <a:schemeClr val="lt1"/>
+                    </a:solidFill>
+                    <a:latin typeface="+mn-lt"/>
+                    <a:ea typeface="+mn-ea"/>
+                    <a:cs typeface="+mn-cs"/>
+                  </a:defRPr>
+                </a:lvl3pPr>
+                <a:lvl4pPr marL="1371600" indent="0">
+                  <a:defRPr sz="1100">
+                    <a:solidFill>
+                      <a:schemeClr val="lt1"/>
+                    </a:solidFill>
+                    <a:latin typeface="+mn-lt"/>
+                    <a:ea typeface="+mn-ea"/>
+                    <a:cs typeface="+mn-cs"/>
+                  </a:defRPr>
+                </a:lvl4pPr>
+                <a:lvl5pPr marL="1828800" indent="0">
+                  <a:defRPr sz="1100">
+                    <a:solidFill>
+                      <a:schemeClr val="lt1"/>
+                    </a:solidFill>
+                    <a:latin typeface="+mn-lt"/>
+                    <a:ea typeface="+mn-ea"/>
+                    <a:cs typeface="+mn-cs"/>
+                  </a:defRPr>
+                </a:lvl5pPr>
+                <a:lvl6pPr marL="2286000" indent="0">
+                  <a:defRPr sz="1100">
+                    <a:solidFill>
+                      <a:schemeClr val="lt1"/>
+                    </a:solidFill>
+                    <a:latin typeface="+mn-lt"/>
+                    <a:ea typeface="+mn-ea"/>
+                    <a:cs typeface="+mn-cs"/>
+                  </a:defRPr>
+                </a:lvl6pPr>
+                <a:lvl7pPr marL="2743200" indent="0">
+                  <a:defRPr sz="1100">
+                    <a:solidFill>
+                      <a:schemeClr val="lt1"/>
+                    </a:solidFill>
+                    <a:latin typeface="+mn-lt"/>
+                    <a:ea typeface="+mn-ea"/>
+                    <a:cs typeface="+mn-cs"/>
+                  </a:defRPr>
+                </a:lvl7pPr>
+                <a:lvl8pPr marL="3200400" indent="0">
+                  <a:defRPr sz="1100">
+                    <a:solidFill>
+                      <a:schemeClr val="lt1"/>
+                    </a:solidFill>
+                    <a:latin typeface="+mn-lt"/>
+                    <a:ea typeface="+mn-ea"/>
+                    <a:cs typeface="+mn-cs"/>
+                  </a:defRPr>
+                </a:lvl8pPr>
+                <a:lvl9pPr marL="3657600" indent="0">
+                  <a:defRPr sz="1100">
+                    <a:solidFill>
+                      <a:schemeClr val="lt1"/>
+                    </a:solidFill>
+                    <a:latin typeface="+mn-lt"/>
+                    <a:ea typeface="+mn-ea"/>
+                    <a:cs typeface="+mn-cs"/>
+                  </a:defRPr>
+                </a:lvl9pPr>
+              </a:lstStyle>
+              <a:p>
+                <a:pPr marL="0" indent="0" algn="ctr"/>
+                <a:r>
+                  <a:rPr lang="pt-BR" sz="1400">
+                    <a:solidFill>
+                      <a:schemeClr val="tx1">
+                        <a:lumMod val="75000"/>
+                        <a:lumOff val="25000"/>
+                      </a:schemeClr>
+                    </a:solidFill>
+                    <a:latin typeface="Arial" pitchFamily="34" charset="0"/>
+                    <a:ea typeface="+mn-ea"/>
+                    <a:cs typeface="Arial" pitchFamily="34" charset="0"/>
+                  </a:rPr>
+                  <a:t>CONFIABILIDADE</a:t>
+                </a:r>
+              </a:p>
+            </p:txBody>
+          </p:sp>
+          <p:sp>
+            <p:nvSpPr>
+              <p:cNvPr id="10" name="Retângulo de cantos arredondados 4"/>
+              <p:cNvSpPr/>
+              <p:nvPr/>
+            </p:nvSpPr>
+            <p:spPr>
+              <a:xfrm>
+                <a:off x="5867400" y="2676525"/>
+                <a:ext cx="2181225" cy="628650"/>
+              </a:xfrm>
+              <a:prstGeom prst="roundRect">
+                <a:avLst/>
+              </a:prstGeom>
+              <a:solidFill>
+                <a:schemeClr val="bg1">
+                  <a:lumMod val="75000"/>
+                  <a:alpha val="50000"/>
+                </a:schemeClr>
+              </a:solidFill>
+              <a:ln>
+                <a:solidFill>
+                  <a:schemeClr val="tx1">
+                    <a:lumMod val="50000"/>
+                    <a:lumOff val="50000"/>
+                    <a:alpha val="55000"/>
+                  </a:schemeClr>
+                </a:solidFill>
+                <a:prstDash val="dash"/>
+              </a:ln>
+            </p:spPr>
+            <p:style>
+              <a:lnRef idx="2">
+                <a:schemeClr val="accent1">
+                  <a:shade val="50000"/>
+                </a:schemeClr>
+              </a:lnRef>
+              <a:fillRef idx="1">
+                <a:schemeClr val="accent1"/>
+              </a:fillRef>
+              <a:effectRef idx="0">
+                <a:schemeClr val="accent1"/>
+              </a:effectRef>
+              <a:fontRef idx="minor">
+                <a:schemeClr val="lt1"/>
+              </a:fontRef>
+            </p:style>
+            <p:txBody>
+              <a:bodyPr rtlCol="0" anchor="ctr"/>
+              <a:lstStyle>
+                <a:lvl1pPr marL="0" indent="0">
+                  <a:defRPr sz="1100">
+                    <a:solidFill>
+                      <a:schemeClr val="lt1"/>
+                    </a:solidFill>
+                    <a:latin typeface="+mn-lt"/>
+                    <a:ea typeface="+mn-ea"/>
+                    <a:cs typeface="+mn-cs"/>
+                  </a:defRPr>
+                </a:lvl1pPr>
+                <a:lvl2pPr marL="457200" indent="0">
+                  <a:defRPr sz="1100">
+                    <a:solidFill>
+                      <a:schemeClr val="lt1"/>
+                    </a:solidFill>
+                    <a:latin typeface="+mn-lt"/>
+                    <a:ea typeface="+mn-ea"/>
+                    <a:cs typeface="+mn-cs"/>
+                  </a:defRPr>
+                </a:lvl2pPr>
+                <a:lvl3pPr marL="914400" indent="0">
+                  <a:defRPr sz="1100">
+                    <a:solidFill>
+                      <a:schemeClr val="lt1"/>
+                    </a:solidFill>
+                    <a:latin typeface="+mn-lt"/>
+                    <a:ea typeface="+mn-ea"/>
+                    <a:cs typeface="+mn-cs"/>
+                  </a:defRPr>
+                </a:lvl3pPr>
+                <a:lvl4pPr marL="1371600" indent="0">
+                  <a:defRPr sz="1100">
+                    <a:solidFill>
+                      <a:schemeClr val="lt1"/>
+                    </a:solidFill>
+                    <a:latin typeface="+mn-lt"/>
+                    <a:ea typeface="+mn-ea"/>
+                    <a:cs typeface="+mn-cs"/>
+                  </a:defRPr>
+                </a:lvl4pPr>
+                <a:lvl5pPr marL="1828800" indent="0">
+                  <a:defRPr sz="1100">
+                    <a:solidFill>
+                      <a:schemeClr val="lt1"/>
+                    </a:solidFill>
+                    <a:latin typeface="+mn-lt"/>
+                    <a:ea typeface="+mn-ea"/>
+                    <a:cs typeface="+mn-cs"/>
+                  </a:defRPr>
+                </a:lvl5pPr>
+                <a:lvl6pPr marL="2286000" indent="0">
+                  <a:defRPr sz="1100">
+                    <a:solidFill>
+                      <a:schemeClr val="lt1"/>
+                    </a:solidFill>
+                    <a:latin typeface="+mn-lt"/>
+                    <a:ea typeface="+mn-ea"/>
+                    <a:cs typeface="+mn-cs"/>
+                  </a:defRPr>
+                </a:lvl6pPr>
+                <a:lvl7pPr marL="2743200" indent="0">
+                  <a:defRPr sz="1100">
+                    <a:solidFill>
+                      <a:schemeClr val="lt1"/>
+                    </a:solidFill>
+                    <a:latin typeface="+mn-lt"/>
+                    <a:ea typeface="+mn-ea"/>
+                    <a:cs typeface="+mn-cs"/>
+                  </a:defRPr>
+                </a:lvl7pPr>
+                <a:lvl8pPr marL="3200400" indent="0">
+                  <a:defRPr sz="1100">
+                    <a:solidFill>
+                      <a:schemeClr val="lt1"/>
+                    </a:solidFill>
+                    <a:latin typeface="+mn-lt"/>
+                    <a:ea typeface="+mn-ea"/>
+                    <a:cs typeface="+mn-cs"/>
+                  </a:defRPr>
+                </a:lvl8pPr>
+                <a:lvl9pPr marL="3657600" indent="0">
+                  <a:defRPr sz="1100">
+                    <a:solidFill>
+                      <a:schemeClr val="lt1"/>
+                    </a:solidFill>
+                    <a:latin typeface="+mn-lt"/>
+                    <a:ea typeface="+mn-ea"/>
+                    <a:cs typeface="+mn-cs"/>
+                  </a:defRPr>
+                </a:lvl9pPr>
+              </a:lstStyle>
+              <a:p>
+                <a:pPr marL="0" indent="0" algn="ctr"/>
+                <a:r>
+                  <a:rPr lang="pt-BR" sz="1400">
+                    <a:solidFill>
+                      <a:schemeClr val="tx1">
+                        <a:lumMod val="75000"/>
+                        <a:lumOff val="25000"/>
+                      </a:schemeClr>
+                    </a:solidFill>
+                    <a:latin typeface="Arial" pitchFamily="34" charset="0"/>
+                    <a:ea typeface="+mn-ea"/>
+                    <a:cs typeface="Arial" pitchFamily="34" charset="0"/>
+                  </a:rPr>
+                  <a:t>OPERABILIDADE</a:t>
+                </a:r>
+              </a:p>
+            </p:txBody>
+          </p:sp>
+          <p:sp>
+            <p:nvSpPr>
+              <p:cNvPr id="11" name="Retângulo de cantos arredondados 5"/>
+              <p:cNvSpPr/>
+              <p:nvPr/>
+            </p:nvSpPr>
+            <p:spPr>
+              <a:xfrm>
+                <a:off x="4648200" y="3705225"/>
+                <a:ext cx="2181225" cy="628650"/>
+              </a:xfrm>
+              <a:prstGeom prst="roundRect">
+                <a:avLst/>
+              </a:prstGeom>
+              <a:solidFill>
+                <a:schemeClr val="bg1">
+                  <a:lumMod val="75000"/>
+                  <a:alpha val="50000"/>
+                </a:schemeClr>
+              </a:solidFill>
+              <a:ln>
+                <a:solidFill>
+                  <a:schemeClr val="tx1">
+                    <a:lumMod val="50000"/>
+                    <a:lumOff val="50000"/>
+                    <a:alpha val="55000"/>
+                  </a:schemeClr>
+                </a:solidFill>
+                <a:prstDash val="dash"/>
+              </a:ln>
+            </p:spPr>
+            <p:style>
+              <a:lnRef idx="2">
+                <a:schemeClr val="accent1">
+                  <a:shade val="50000"/>
+                </a:schemeClr>
+              </a:lnRef>
+              <a:fillRef idx="1">
+                <a:schemeClr val="accent1"/>
+              </a:fillRef>
+              <a:effectRef idx="0">
+                <a:schemeClr val="accent1"/>
+              </a:effectRef>
+              <a:fontRef idx="minor">
+                <a:schemeClr val="lt1"/>
+              </a:fontRef>
+            </p:style>
+            <p:txBody>
+              <a:bodyPr rtlCol="0" anchor="ctr"/>
+              <a:lstStyle>
+                <a:lvl1pPr marL="0" indent="0">
+                  <a:defRPr sz="1100">
+                    <a:solidFill>
+                      <a:schemeClr val="lt1"/>
+                    </a:solidFill>
+                    <a:latin typeface="+mn-lt"/>
+                    <a:ea typeface="+mn-ea"/>
+                    <a:cs typeface="+mn-cs"/>
+                  </a:defRPr>
+                </a:lvl1pPr>
+                <a:lvl2pPr marL="457200" indent="0">
+                  <a:defRPr sz="1100">
+                    <a:solidFill>
+                      <a:schemeClr val="lt1"/>
+                    </a:solidFill>
+                    <a:latin typeface="+mn-lt"/>
+                    <a:ea typeface="+mn-ea"/>
+                    <a:cs typeface="+mn-cs"/>
+                  </a:defRPr>
+                </a:lvl2pPr>
+                <a:lvl3pPr marL="914400" indent="0">
+                  <a:defRPr sz="1100">
+                    <a:solidFill>
+                      <a:schemeClr val="lt1"/>
+                    </a:solidFill>
+                    <a:latin typeface="+mn-lt"/>
+                    <a:ea typeface="+mn-ea"/>
+                    <a:cs typeface="+mn-cs"/>
+                  </a:defRPr>
+                </a:lvl3pPr>
+                <a:lvl4pPr marL="1371600" indent="0">
+                  <a:defRPr sz="1100">
+                    <a:solidFill>
+                      <a:schemeClr val="lt1"/>
+                    </a:solidFill>
+                    <a:latin typeface="+mn-lt"/>
+                    <a:ea typeface="+mn-ea"/>
+                    <a:cs typeface="+mn-cs"/>
+                  </a:defRPr>
+                </a:lvl4pPr>
+                <a:lvl5pPr marL="1828800" indent="0">
+                  <a:defRPr sz="1100">
+                    <a:solidFill>
+                      <a:schemeClr val="lt1"/>
+                    </a:solidFill>
+                    <a:latin typeface="+mn-lt"/>
+                    <a:ea typeface="+mn-ea"/>
+                    <a:cs typeface="+mn-cs"/>
+                  </a:defRPr>
+                </a:lvl5pPr>
+                <a:lvl6pPr marL="2286000" indent="0">
+                  <a:defRPr sz="1100">
+                    <a:solidFill>
+                      <a:schemeClr val="lt1"/>
+                    </a:solidFill>
+                    <a:latin typeface="+mn-lt"/>
+                    <a:ea typeface="+mn-ea"/>
+                    <a:cs typeface="+mn-cs"/>
+                  </a:defRPr>
+                </a:lvl6pPr>
+                <a:lvl7pPr marL="2743200" indent="0">
+                  <a:defRPr sz="1100">
+                    <a:solidFill>
+                      <a:schemeClr val="lt1"/>
+                    </a:solidFill>
+                    <a:latin typeface="+mn-lt"/>
+                    <a:ea typeface="+mn-ea"/>
+                    <a:cs typeface="+mn-cs"/>
+                  </a:defRPr>
+                </a:lvl7pPr>
+                <a:lvl8pPr marL="3200400" indent="0">
+                  <a:defRPr sz="1100">
+                    <a:solidFill>
+                      <a:schemeClr val="lt1"/>
+                    </a:solidFill>
+                    <a:latin typeface="+mn-lt"/>
+                    <a:ea typeface="+mn-ea"/>
+                    <a:cs typeface="+mn-cs"/>
+                  </a:defRPr>
+                </a:lvl8pPr>
+                <a:lvl9pPr marL="3657600" indent="0">
+                  <a:defRPr sz="1100">
+                    <a:solidFill>
+                      <a:schemeClr val="lt1"/>
+                    </a:solidFill>
+                    <a:latin typeface="+mn-lt"/>
+                    <a:ea typeface="+mn-ea"/>
+                    <a:cs typeface="+mn-cs"/>
+                  </a:defRPr>
+                </a:lvl9pPr>
+              </a:lstStyle>
+              <a:p>
+                <a:pPr marL="0" indent="0" algn="ctr"/>
+                <a:r>
+                  <a:rPr lang="pt-BR" sz="1400">
+                    <a:solidFill>
+                      <a:schemeClr val="tx1">
+                        <a:lumMod val="75000"/>
+                        <a:lumOff val="25000"/>
+                      </a:schemeClr>
+                    </a:solidFill>
+                    <a:latin typeface="Arial" pitchFamily="34" charset="0"/>
+                    <a:ea typeface="+mn-ea"/>
+                    <a:cs typeface="Arial" pitchFamily="34" charset="0"/>
+                  </a:rPr>
+                  <a:t>SEGURANÇA</a:t>
+                </a:r>
+              </a:p>
+            </p:txBody>
+          </p:sp>
+          <p:sp>
+            <p:nvSpPr>
+              <p:cNvPr id="12" name="Retângulo de cantos arredondados 7"/>
+              <p:cNvSpPr/>
+              <p:nvPr/>
+            </p:nvSpPr>
+            <p:spPr>
+              <a:xfrm>
+                <a:off x="1228725" y="3676650"/>
+                <a:ext cx="2181225" cy="628650"/>
+              </a:xfrm>
+              <a:prstGeom prst="roundRect">
+                <a:avLst/>
+              </a:prstGeom>
+              <a:solidFill>
+                <a:schemeClr val="bg1">
+                  <a:lumMod val="75000"/>
+                  <a:alpha val="50000"/>
+                </a:schemeClr>
+              </a:solidFill>
+              <a:ln>
+                <a:solidFill>
+                  <a:schemeClr val="tx1">
+                    <a:lumMod val="50000"/>
+                    <a:lumOff val="50000"/>
+                    <a:alpha val="55000"/>
+                  </a:schemeClr>
+                </a:solidFill>
+                <a:prstDash val="dash"/>
+              </a:ln>
+            </p:spPr>
+            <p:style>
+              <a:lnRef idx="2">
+                <a:schemeClr val="accent1">
+                  <a:shade val="50000"/>
+                </a:schemeClr>
+              </a:lnRef>
+              <a:fillRef idx="1">
+                <a:schemeClr val="accent1"/>
+              </a:fillRef>
+              <a:effectRef idx="0">
+                <a:schemeClr val="accent1"/>
+              </a:effectRef>
+              <a:fontRef idx="minor">
+                <a:schemeClr val="lt1"/>
+              </a:fontRef>
+            </p:style>
+            <p:txBody>
+              <a:bodyPr rtlCol="0" anchor="ctr"/>
+              <a:lstStyle>
+                <a:lvl1pPr marL="0" indent="0">
+                  <a:defRPr sz="1100">
+                    <a:solidFill>
+                      <a:schemeClr val="lt1"/>
+                    </a:solidFill>
+                    <a:latin typeface="+mn-lt"/>
+                    <a:ea typeface="+mn-ea"/>
+                    <a:cs typeface="+mn-cs"/>
+                  </a:defRPr>
+                </a:lvl1pPr>
+                <a:lvl2pPr marL="457200" indent="0">
+                  <a:defRPr sz="1100">
+                    <a:solidFill>
+                      <a:schemeClr val="lt1"/>
+                    </a:solidFill>
+                    <a:latin typeface="+mn-lt"/>
+                    <a:ea typeface="+mn-ea"/>
+                    <a:cs typeface="+mn-cs"/>
+                  </a:defRPr>
+                </a:lvl2pPr>
+                <a:lvl3pPr marL="914400" indent="0">
+                  <a:defRPr sz="1100">
+                    <a:solidFill>
+                      <a:schemeClr val="lt1"/>
+                    </a:solidFill>
+                    <a:latin typeface="+mn-lt"/>
+                    <a:ea typeface="+mn-ea"/>
+                    <a:cs typeface="+mn-cs"/>
+                  </a:defRPr>
+                </a:lvl3pPr>
+                <a:lvl4pPr marL="1371600" indent="0">
+                  <a:defRPr sz="1100">
+                    <a:solidFill>
+                      <a:schemeClr val="lt1"/>
+                    </a:solidFill>
+                    <a:latin typeface="+mn-lt"/>
+                    <a:ea typeface="+mn-ea"/>
+                    <a:cs typeface="+mn-cs"/>
+                  </a:defRPr>
+                </a:lvl4pPr>
+                <a:lvl5pPr marL="1828800" indent="0">
+                  <a:defRPr sz="1100">
+                    <a:solidFill>
+                      <a:schemeClr val="lt1"/>
+                    </a:solidFill>
+                    <a:latin typeface="+mn-lt"/>
+                    <a:ea typeface="+mn-ea"/>
+                    <a:cs typeface="+mn-cs"/>
+                  </a:defRPr>
+                </a:lvl5pPr>
+                <a:lvl6pPr marL="2286000" indent="0">
+                  <a:defRPr sz="1100">
+                    <a:solidFill>
+                      <a:schemeClr val="lt1"/>
+                    </a:solidFill>
+                    <a:latin typeface="+mn-lt"/>
+                    <a:ea typeface="+mn-ea"/>
+                    <a:cs typeface="+mn-cs"/>
+                  </a:defRPr>
+                </a:lvl6pPr>
+                <a:lvl7pPr marL="2743200" indent="0">
+                  <a:defRPr sz="1100">
+                    <a:solidFill>
+                      <a:schemeClr val="lt1"/>
+                    </a:solidFill>
+                    <a:latin typeface="+mn-lt"/>
+                    <a:ea typeface="+mn-ea"/>
+                    <a:cs typeface="+mn-cs"/>
+                  </a:defRPr>
+                </a:lvl7pPr>
+                <a:lvl8pPr marL="3200400" indent="0">
+                  <a:defRPr sz="1100">
+                    <a:solidFill>
+                      <a:schemeClr val="lt1"/>
+                    </a:solidFill>
+                    <a:latin typeface="+mn-lt"/>
+                    <a:ea typeface="+mn-ea"/>
+                    <a:cs typeface="+mn-cs"/>
+                  </a:defRPr>
+                </a:lvl8pPr>
+                <a:lvl9pPr marL="3657600" indent="0">
+                  <a:defRPr sz="1100">
+                    <a:solidFill>
+                      <a:schemeClr val="lt1"/>
+                    </a:solidFill>
+                    <a:latin typeface="+mn-lt"/>
+                    <a:ea typeface="+mn-ea"/>
+                    <a:cs typeface="+mn-cs"/>
+                  </a:defRPr>
+                </a:lvl9pPr>
+              </a:lstStyle>
+              <a:p>
+                <a:pPr marL="0" indent="0" algn="ctr"/>
+                <a:r>
+                  <a:rPr lang="pt-BR" sz="1400">
+                    <a:solidFill>
+                      <a:schemeClr val="tx1">
+                        <a:lumMod val="75000"/>
+                        <a:lumOff val="25000"/>
+                      </a:schemeClr>
+                    </a:solidFill>
+                    <a:latin typeface="Arial" pitchFamily="34" charset="0"/>
+                    <a:ea typeface="+mn-ea"/>
+                    <a:cs typeface="Arial" pitchFamily="34" charset="0"/>
+                  </a:rPr>
+                  <a:t>COMPATIBILIDADE</a:t>
+                </a:r>
+              </a:p>
+            </p:txBody>
+          </p:sp>
+          <p:sp>
+            <p:nvSpPr>
+              <p:cNvPr id="13" name="Retângulo de cantos arredondados 8"/>
+              <p:cNvSpPr/>
+              <p:nvPr/>
+            </p:nvSpPr>
+            <p:spPr>
+              <a:xfrm>
+                <a:off x="0" y="1047750"/>
+                <a:ext cx="2181225" cy="628650"/>
+              </a:xfrm>
+              <a:prstGeom prst="roundRect">
+                <a:avLst/>
+              </a:prstGeom>
+              <a:solidFill>
+                <a:schemeClr val="bg1">
+                  <a:lumMod val="75000"/>
+                  <a:alpha val="50000"/>
+                </a:schemeClr>
+              </a:solidFill>
+              <a:ln>
+                <a:solidFill>
+                  <a:schemeClr val="tx1">
+                    <a:lumMod val="50000"/>
+                    <a:lumOff val="50000"/>
+                    <a:alpha val="55000"/>
+                  </a:schemeClr>
+                </a:solidFill>
+                <a:prstDash val="dash"/>
+              </a:ln>
+            </p:spPr>
+            <p:style>
+              <a:lnRef idx="2">
+                <a:schemeClr val="accent1">
+                  <a:shade val="50000"/>
+                </a:schemeClr>
+              </a:lnRef>
+              <a:fillRef idx="1">
+                <a:schemeClr val="accent1"/>
+              </a:fillRef>
+              <a:effectRef idx="0">
+                <a:schemeClr val="accent1"/>
+              </a:effectRef>
+              <a:fontRef idx="minor">
+                <a:schemeClr val="lt1"/>
+              </a:fontRef>
+            </p:style>
+            <p:txBody>
+              <a:bodyPr rtlCol="0" anchor="ctr"/>
+              <a:lstStyle>
+                <a:lvl1pPr marL="0" indent="0">
+                  <a:defRPr sz="1100">
+                    <a:solidFill>
+                      <a:schemeClr val="lt1"/>
+                    </a:solidFill>
+                    <a:latin typeface="+mn-lt"/>
+                    <a:ea typeface="+mn-ea"/>
+                    <a:cs typeface="+mn-cs"/>
+                  </a:defRPr>
+                </a:lvl1pPr>
+                <a:lvl2pPr marL="457200" indent="0">
+                  <a:defRPr sz="1100">
+                    <a:solidFill>
+                      <a:schemeClr val="lt1"/>
+                    </a:solidFill>
+                    <a:latin typeface="+mn-lt"/>
+                    <a:ea typeface="+mn-ea"/>
+                    <a:cs typeface="+mn-cs"/>
+                  </a:defRPr>
+                </a:lvl2pPr>
+                <a:lvl3pPr marL="914400" indent="0">
+                  <a:defRPr sz="1100">
+                    <a:solidFill>
+                      <a:schemeClr val="lt1"/>
+                    </a:solidFill>
+                    <a:latin typeface="+mn-lt"/>
+                    <a:ea typeface="+mn-ea"/>
+                    <a:cs typeface="+mn-cs"/>
+                  </a:defRPr>
+                </a:lvl3pPr>
+                <a:lvl4pPr marL="1371600" indent="0">
+                  <a:defRPr sz="1100">
+                    <a:solidFill>
+                      <a:schemeClr val="lt1"/>
+                    </a:solidFill>
+                    <a:latin typeface="+mn-lt"/>
+                    <a:ea typeface="+mn-ea"/>
+                    <a:cs typeface="+mn-cs"/>
+                  </a:defRPr>
+                </a:lvl4pPr>
+                <a:lvl5pPr marL="1828800" indent="0">
+                  <a:defRPr sz="1100">
+                    <a:solidFill>
+                      <a:schemeClr val="lt1"/>
+                    </a:solidFill>
+                    <a:latin typeface="+mn-lt"/>
+                    <a:ea typeface="+mn-ea"/>
+                    <a:cs typeface="+mn-cs"/>
+                  </a:defRPr>
+                </a:lvl5pPr>
+                <a:lvl6pPr marL="2286000" indent="0">
+                  <a:defRPr sz="1100">
+                    <a:solidFill>
+                      <a:schemeClr val="lt1"/>
+                    </a:solidFill>
+                    <a:latin typeface="+mn-lt"/>
+                    <a:ea typeface="+mn-ea"/>
+                    <a:cs typeface="+mn-cs"/>
+                  </a:defRPr>
+                </a:lvl6pPr>
+                <a:lvl7pPr marL="2743200" indent="0">
+                  <a:defRPr sz="1100">
+                    <a:solidFill>
+                      <a:schemeClr val="lt1"/>
+                    </a:solidFill>
+                    <a:latin typeface="+mn-lt"/>
+                    <a:ea typeface="+mn-ea"/>
+                    <a:cs typeface="+mn-cs"/>
+                  </a:defRPr>
+                </a:lvl7pPr>
+                <a:lvl8pPr marL="3200400" indent="0">
+                  <a:defRPr sz="1100">
+                    <a:solidFill>
+                      <a:schemeClr val="lt1"/>
+                    </a:solidFill>
+                    <a:latin typeface="+mn-lt"/>
+                    <a:ea typeface="+mn-ea"/>
+                    <a:cs typeface="+mn-cs"/>
+                  </a:defRPr>
+                </a:lvl8pPr>
+                <a:lvl9pPr marL="3657600" indent="0">
+                  <a:defRPr sz="1100">
+                    <a:solidFill>
+                      <a:schemeClr val="lt1"/>
+                    </a:solidFill>
+                    <a:latin typeface="+mn-lt"/>
+                    <a:ea typeface="+mn-ea"/>
+                    <a:cs typeface="+mn-cs"/>
+                  </a:defRPr>
+                </a:lvl9pPr>
+              </a:lstStyle>
+              <a:p>
+                <a:pPr marL="0" indent="0" algn="ctr"/>
+                <a:r>
+                  <a:rPr lang="pt-BR" sz="1400">
+                    <a:solidFill>
+                      <a:schemeClr val="tx1">
+                        <a:lumMod val="75000"/>
+                        <a:lumOff val="25000"/>
+                      </a:schemeClr>
+                    </a:solidFill>
+                    <a:latin typeface="Arial" pitchFamily="34" charset="0"/>
+                    <a:ea typeface="+mn-ea"/>
+                    <a:cs typeface="Arial" pitchFamily="34" charset="0"/>
+                  </a:rPr>
+                  <a:t>CAPACIDADE DE MANUTENÇÃO</a:t>
+                </a:r>
+              </a:p>
+            </p:txBody>
+          </p:sp>
+          <p:sp>
+            <p:nvSpPr>
+              <p:cNvPr id="14" name="Retângulo de cantos arredondados 9"/>
+              <p:cNvSpPr/>
+              <p:nvPr/>
+            </p:nvSpPr>
+            <p:spPr>
+              <a:xfrm>
+                <a:off x="0" y="2676525"/>
+                <a:ext cx="2181225" cy="628650"/>
+              </a:xfrm>
+              <a:prstGeom prst="roundRect">
+                <a:avLst/>
+              </a:prstGeom>
+              <a:solidFill>
+                <a:schemeClr val="bg1">
+                  <a:lumMod val="75000"/>
+                  <a:alpha val="50000"/>
+                </a:schemeClr>
+              </a:solidFill>
+              <a:ln>
+                <a:solidFill>
+                  <a:schemeClr val="tx1">
+                    <a:lumMod val="50000"/>
+                    <a:lumOff val="50000"/>
+                    <a:alpha val="55000"/>
+                  </a:schemeClr>
+                </a:solidFill>
+                <a:prstDash val="dash"/>
+              </a:ln>
+            </p:spPr>
+            <p:style>
+              <a:lnRef idx="2">
+                <a:schemeClr val="accent1">
+                  <a:shade val="50000"/>
+                </a:schemeClr>
+              </a:lnRef>
+              <a:fillRef idx="1">
+                <a:schemeClr val="accent1"/>
+              </a:fillRef>
+              <a:effectRef idx="0">
+                <a:schemeClr val="accent1"/>
+              </a:effectRef>
+              <a:fontRef idx="minor">
+                <a:schemeClr val="lt1"/>
+              </a:fontRef>
+            </p:style>
+            <p:txBody>
+              <a:bodyPr rtlCol="0" anchor="ctr"/>
+              <a:lstStyle>
+                <a:lvl1pPr marL="0" indent="0">
+                  <a:defRPr sz="1100">
+                    <a:solidFill>
+                      <a:schemeClr val="lt1"/>
+                    </a:solidFill>
+                    <a:latin typeface="+mn-lt"/>
+                    <a:ea typeface="+mn-ea"/>
+                    <a:cs typeface="+mn-cs"/>
+                  </a:defRPr>
+                </a:lvl1pPr>
+                <a:lvl2pPr marL="457200" indent="0">
+                  <a:defRPr sz="1100">
+                    <a:solidFill>
+                      <a:schemeClr val="lt1"/>
+                    </a:solidFill>
+                    <a:latin typeface="+mn-lt"/>
+                    <a:ea typeface="+mn-ea"/>
+                    <a:cs typeface="+mn-cs"/>
+                  </a:defRPr>
+                </a:lvl2pPr>
+                <a:lvl3pPr marL="914400" indent="0">
+                  <a:defRPr sz="1100">
+                    <a:solidFill>
+                      <a:schemeClr val="lt1"/>
+                    </a:solidFill>
+                    <a:latin typeface="+mn-lt"/>
+                    <a:ea typeface="+mn-ea"/>
+                    <a:cs typeface="+mn-cs"/>
+                  </a:defRPr>
+                </a:lvl3pPr>
+                <a:lvl4pPr marL="1371600" indent="0">
+                  <a:defRPr sz="1100">
+                    <a:solidFill>
+                      <a:schemeClr val="lt1"/>
+                    </a:solidFill>
+                    <a:latin typeface="+mn-lt"/>
+                    <a:ea typeface="+mn-ea"/>
+                    <a:cs typeface="+mn-cs"/>
+                  </a:defRPr>
+                </a:lvl4pPr>
+                <a:lvl5pPr marL="1828800" indent="0">
+                  <a:defRPr sz="1100">
+                    <a:solidFill>
+                      <a:schemeClr val="lt1"/>
+                    </a:solidFill>
+                    <a:latin typeface="+mn-lt"/>
+                    <a:ea typeface="+mn-ea"/>
+                    <a:cs typeface="+mn-cs"/>
+                  </a:defRPr>
+                </a:lvl5pPr>
+                <a:lvl6pPr marL="2286000" indent="0">
+                  <a:defRPr sz="1100">
+                    <a:solidFill>
+                      <a:schemeClr val="lt1"/>
+                    </a:solidFill>
+                    <a:latin typeface="+mn-lt"/>
+                    <a:ea typeface="+mn-ea"/>
+                    <a:cs typeface="+mn-cs"/>
+                  </a:defRPr>
+                </a:lvl6pPr>
+                <a:lvl7pPr marL="2743200" indent="0">
+                  <a:defRPr sz="1100">
+                    <a:solidFill>
+                      <a:schemeClr val="lt1"/>
+                    </a:solidFill>
+                    <a:latin typeface="+mn-lt"/>
+                    <a:ea typeface="+mn-ea"/>
+                    <a:cs typeface="+mn-cs"/>
+                  </a:defRPr>
+                </a:lvl7pPr>
+                <a:lvl8pPr marL="3200400" indent="0">
+                  <a:defRPr sz="1100">
+                    <a:solidFill>
+                      <a:schemeClr val="lt1"/>
+                    </a:solidFill>
+                    <a:latin typeface="+mn-lt"/>
+                    <a:ea typeface="+mn-ea"/>
+                    <a:cs typeface="+mn-cs"/>
+                  </a:defRPr>
+                </a:lvl8pPr>
+                <a:lvl9pPr marL="3657600" indent="0">
+                  <a:defRPr sz="1100">
+                    <a:solidFill>
+                      <a:schemeClr val="lt1"/>
+                    </a:solidFill>
+                    <a:latin typeface="+mn-lt"/>
+                    <a:ea typeface="+mn-ea"/>
+                    <a:cs typeface="+mn-cs"/>
+                  </a:defRPr>
+                </a:lvl9pPr>
+              </a:lstStyle>
+              <a:p>
+                <a:pPr marL="0" indent="0" algn="ctr"/>
+                <a:r>
+                  <a:rPr lang="pt-BR" sz="1400">
+                    <a:solidFill>
+                      <a:schemeClr val="tx1">
+                        <a:lumMod val="75000"/>
+                        <a:lumOff val="25000"/>
+                      </a:schemeClr>
+                    </a:solidFill>
+                    <a:latin typeface="Arial" pitchFamily="34" charset="0"/>
+                    <a:ea typeface="+mn-ea"/>
+                    <a:cs typeface="Arial" pitchFamily="34" charset="0"/>
+                  </a:rPr>
+                  <a:t>EFICIÊNCIA</a:t>
+                </a:r>
+              </a:p>
+            </p:txBody>
+          </p:sp>
+          <p:cxnSp>
+            <p:nvCxnSpPr>
+              <p:cNvPr id="15" name="Conector reto 11"/>
+              <p:cNvCxnSpPr>
+                <a:stCxn id="7" idx="3"/>
+                <a:endCxn id="8" idx="2"/>
+              </p:cNvCxnSpPr>
+              <p:nvPr/>
+            </p:nvCxnSpPr>
+            <p:spPr>
+              <a:xfrm flipV="1">
+                <a:off x="5133976" y="657225"/>
+                <a:ext cx="604837" cy="1524000"/>
+              </a:xfrm>
+              <a:prstGeom prst="line">
+                <a:avLst/>
+              </a:prstGeom>
+              <a:ln w="31750">
+                <a:solidFill>
+                  <a:schemeClr val="tx1">
+                    <a:lumMod val="85000"/>
+                    <a:lumOff val="15000"/>
+                  </a:schemeClr>
+                </a:solidFill>
+                <a:prstDash val="sysDot"/>
+              </a:ln>
+            </p:spPr>
+            <p:style>
+              <a:lnRef idx="1">
+                <a:schemeClr val="accent1"/>
+              </a:lnRef>
+              <a:fillRef idx="0">
+                <a:schemeClr val="accent1"/>
+              </a:fillRef>
+              <a:effectRef idx="0">
+                <a:schemeClr val="accent1"/>
+              </a:effectRef>
+              <a:fontRef idx="minor">
+                <a:schemeClr val="tx1"/>
+              </a:fontRef>
+            </p:style>
+          </p:cxnSp>
+          <p:cxnSp>
+            <p:nvCxnSpPr>
+              <p:cNvPr id="16" name="Conector reto 13"/>
+              <p:cNvCxnSpPr>
+                <a:stCxn id="7" idx="3"/>
+                <a:endCxn id="9" idx="1"/>
+              </p:cNvCxnSpPr>
+              <p:nvPr/>
+            </p:nvCxnSpPr>
+            <p:spPr>
+              <a:xfrm flipV="1">
+                <a:off x="5133976" y="1362075"/>
+                <a:ext cx="733424" cy="819150"/>
+              </a:xfrm>
+              <a:prstGeom prst="line">
+                <a:avLst/>
+              </a:prstGeom>
+              <a:ln w="31750">
+                <a:solidFill>
+                  <a:schemeClr val="tx1">
+                    <a:lumMod val="85000"/>
+                    <a:lumOff val="15000"/>
+                  </a:schemeClr>
+                </a:solidFill>
+                <a:prstDash val="sysDot"/>
+              </a:ln>
+            </p:spPr>
+            <p:style>
+              <a:lnRef idx="1">
+                <a:schemeClr val="accent1"/>
+              </a:lnRef>
+              <a:fillRef idx="0">
+                <a:schemeClr val="accent1"/>
+              </a:fillRef>
+              <a:effectRef idx="0">
+                <a:schemeClr val="accent1"/>
+              </a:effectRef>
+              <a:fontRef idx="minor">
+                <a:schemeClr val="tx1"/>
+              </a:fontRef>
+            </p:style>
+          </p:cxnSp>
+          <p:cxnSp>
+            <p:nvCxnSpPr>
+              <p:cNvPr id="17" name="Conector reto 16"/>
+              <p:cNvCxnSpPr>
+                <a:stCxn id="7" idx="3"/>
+                <a:endCxn id="10" idx="1"/>
+              </p:cNvCxnSpPr>
+              <p:nvPr/>
+            </p:nvCxnSpPr>
+            <p:spPr>
+              <a:xfrm>
+                <a:off x="5133976" y="2181225"/>
+                <a:ext cx="733424" cy="809625"/>
+              </a:xfrm>
+              <a:prstGeom prst="line">
+                <a:avLst/>
+              </a:prstGeom>
+              <a:ln w="31750">
+                <a:solidFill>
+                  <a:schemeClr val="tx1">
+                    <a:lumMod val="85000"/>
+                    <a:lumOff val="15000"/>
+                  </a:schemeClr>
+                </a:solidFill>
+                <a:prstDash val="sysDot"/>
+              </a:ln>
+            </p:spPr>
+            <p:style>
+              <a:lnRef idx="1">
+                <a:schemeClr val="accent1"/>
+              </a:lnRef>
+              <a:fillRef idx="0">
+                <a:schemeClr val="accent1"/>
+              </a:fillRef>
+              <a:effectRef idx="0">
+                <a:schemeClr val="accent1"/>
+              </a:effectRef>
+              <a:fontRef idx="minor">
+                <a:schemeClr val="tx1"/>
+              </a:fontRef>
+            </p:style>
+          </p:cxnSp>
+          <p:cxnSp>
+            <p:nvCxnSpPr>
+              <p:cNvPr id="18" name="Conector reto 17"/>
+              <p:cNvCxnSpPr>
+                <a:stCxn id="7" idx="3"/>
+                <a:endCxn id="11" idx="0"/>
+              </p:cNvCxnSpPr>
+              <p:nvPr/>
+            </p:nvCxnSpPr>
+            <p:spPr>
+              <a:xfrm>
+                <a:off x="5133976" y="2181225"/>
+                <a:ext cx="604837" cy="1524000"/>
+              </a:xfrm>
+              <a:prstGeom prst="line">
+                <a:avLst/>
+              </a:prstGeom>
+              <a:ln w="31750">
+                <a:solidFill>
+                  <a:schemeClr val="tx1">
+                    <a:lumMod val="85000"/>
+                    <a:lumOff val="15000"/>
+                  </a:schemeClr>
+                </a:solidFill>
+                <a:prstDash val="sysDot"/>
+              </a:ln>
+            </p:spPr>
+            <p:style>
+              <a:lnRef idx="1">
+                <a:schemeClr val="accent1"/>
+              </a:lnRef>
+              <a:fillRef idx="0">
+                <a:schemeClr val="accent1"/>
+              </a:fillRef>
+              <a:effectRef idx="0">
+                <a:schemeClr val="accent1"/>
+              </a:effectRef>
+              <a:fontRef idx="minor">
+                <a:schemeClr val="tx1"/>
+              </a:fontRef>
+            </p:style>
+          </p:cxnSp>
+          <p:cxnSp>
+            <p:nvCxnSpPr>
+              <p:cNvPr id="19" name="Conector reto 20"/>
+              <p:cNvCxnSpPr>
+                <a:stCxn id="7" idx="1"/>
+                <a:endCxn id="12" idx="0"/>
+              </p:cNvCxnSpPr>
+              <p:nvPr/>
+            </p:nvCxnSpPr>
+            <p:spPr>
+              <a:xfrm flipH="1">
+                <a:off x="2319338" y="2181225"/>
+                <a:ext cx="623888" cy="1495425"/>
+              </a:xfrm>
+              <a:prstGeom prst="line">
+                <a:avLst/>
+              </a:prstGeom>
+              <a:ln w="31750">
+                <a:solidFill>
+                  <a:schemeClr val="tx1">
+                    <a:lumMod val="85000"/>
+                    <a:lumOff val="15000"/>
+                  </a:schemeClr>
+                </a:solidFill>
+                <a:prstDash val="sysDot"/>
+              </a:ln>
+            </p:spPr>
+            <p:style>
+              <a:lnRef idx="1">
+                <a:schemeClr val="accent1"/>
+              </a:lnRef>
+              <a:fillRef idx="0">
+                <a:schemeClr val="accent1"/>
+              </a:fillRef>
+              <a:effectRef idx="0">
+                <a:schemeClr val="accent1"/>
+              </a:effectRef>
+              <a:fontRef idx="minor">
+                <a:schemeClr val="tx1"/>
+              </a:fontRef>
+            </p:style>
+          </p:cxnSp>
+          <p:cxnSp>
+            <p:nvCxnSpPr>
+              <p:cNvPr id="20" name="Conector reto 23"/>
+              <p:cNvCxnSpPr>
+                <a:stCxn id="7" idx="1"/>
+                <a:endCxn id="14" idx="3"/>
+              </p:cNvCxnSpPr>
+              <p:nvPr/>
+            </p:nvCxnSpPr>
+            <p:spPr>
+              <a:xfrm flipH="1">
+                <a:off x="2181225" y="2181225"/>
+                <a:ext cx="762001" cy="809625"/>
+              </a:xfrm>
+              <a:prstGeom prst="line">
+                <a:avLst/>
+              </a:prstGeom>
+              <a:ln w="31750">
+                <a:solidFill>
+                  <a:schemeClr val="tx1">
+                    <a:lumMod val="85000"/>
+                    <a:lumOff val="15000"/>
+                  </a:schemeClr>
+                </a:solidFill>
+                <a:prstDash val="sysDot"/>
+              </a:ln>
+            </p:spPr>
+            <p:style>
+              <a:lnRef idx="1">
+                <a:schemeClr val="accent1"/>
+              </a:lnRef>
+              <a:fillRef idx="0">
+                <a:schemeClr val="accent1"/>
+              </a:fillRef>
+              <a:effectRef idx="0">
+                <a:schemeClr val="accent1"/>
+              </a:effectRef>
+              <a:fontRef idx="minor">
+                <a:schemeClr val="tx1"/>
+              </a:fontRef>
+            </p:style>
+          </p:cxnSp>
+          <p:cxnSp>
+            <p:nvCxnSpPr>
+              <p:cNvPr id="21" name="Conector reto 26"/>
+              <p:cNvCxnSpPr>
+                <a:stCxn id="7" idx="1"/>
+                <a:endCxn id="13" idx="3"/>
+              </p:cNvCxnSpPr>
+              <p:nvPr/>
+            </p:nvCxnSpPr>
+            <p:spPr>
+              <a:xfrm flipH="1" flipV="1">
+                <a:off x="2181225" y="1362075"/>
+                <a:ext cx="762001" cy="819150"/>
+              </a:xfrm>
+              <a:prstGeom prst="line">
+                <a:avLst/>
+              </a:prstGeom>
+              <a:ln w="31750">
+                <a:solidFill>
+                  <a:schemeClr val="tx1">
+                    <a:lumMod val="85000"/>
+                    <a:lumOff val="15000"/>
+                  </a:schemeClr>
+                </a:solidFill>
+                <a:prstDash val="sysDot"/>
+              </a:ln>
+            </p:spPr>
+            <p:style>
+              <a:lnRef idx="1">
+                <a:schemeClr val="accent1"/>
+              </a:lnRef>
+              <a:fillRef idx="0">
+                <a:schemeClr val="accent1"/>
+              </a:fillRef>
+              <a:effectRef idx="0">
+                <a:schemeClr val="accent1"/>
+              </a:effectRef>
+              <a:fontRef idx="minor">
+                <a:schemeClr val="tx1"/>
+              </a:fontRef>
+            </p:style>
+          </p:cxnSp>
+          <p:cxnSp>
+            <p:nvCxnSpPr>
+              <p:cNvPr id="22" name="Conector reto 29"/>
+              <p:cNvCxnSpPr>
+                <a:stCxn id="7" idx="1"/>
+                <a:endCxn id="5" idx="2"/>
+              </p:cNvCxnSpPr>
+              <p:nvPr/>
+            </p:nvCxnSpPr>
+            <p:spPr>
+              <a:xfrm flipH="1" flipV="1">
+                <a:off x="2319338" y="628650"/>
+                <a:ext cx="623888" cy="1552575"/>
+              </a:xfrm>
+              <a:prstGeom prst="line">
+                <a:avLst/>
+              </a:prstGeom>
+              <a:ln w="31750">
+                <a:solidFill>
+                  <a:schemeClr val="tx1">
+                    <a:lumMod val="85000"/>
+                    <a:lumOff val="15000"/>
+                  </a:schemeClr>
+                </a:solidFill>
+                <a:prstDash val="sysDot"/>
+              </a:ln>
+            </p:spPr>
+            <p:style>
+              <a:lnRef idx="1">
+                <a:schemeClr val="accent1"/>
+              </a:lnRef>
+              <a:fillRef idx="0">
+                <a:schemeClr val="accent1"/>
+              </a:fillRef>
+              <a:effectRef idx="0">
+                <a:schemeClr val="accent1"/>
+              </a:effectRef>
+              <a:fontRef idx="minor">
+                <a:schemeClr val="tx1"/>
+              </a:fontRef>
+            </p:style>
+          </p:cxnSp>
+        </p:grpSp>
+      </p:grpSp>
     </p:spTree>
+    <p:extLst>
+      <p:ext uri="{BB962C8B-B14F-4D97-AF65-F5344CB8AC3E}">
+        <p14:creationId xmlns:p14="http://schemas.microsoft.com/office/powerpoint/2010/main" val="4150305661"/>
+      </p:ext>
+    </p:extLst>
   </p:cSld>
   <p:clrMapOvr>
     <a:masterClrMapping/>
@@ -6355,7 +9436,7 @@
       </p:grpSpPr>
       <p:sp>
         <p:nvSpPr>
-          <p:cNvPr id="22530" name="Rectangle 2"/>
+          <p:cNvPr id="19458" name="Rectangle 2"/>
           <p:cNvSpPr>
             <a:spLocks noGrp="1" noChangeArrowheads="1"/>
           </p:cNvSpPr>
@@ -6369,15 +9450,36 @@
           <a:lstStyle/>
           <a:p>
             <a:r>
-              <a:rPr lang="en-GB" altLang="en-US"/>
-              <a:t>Competition</a:t>
-            </a:r>
+              <a:rPr lang="en-GB" altLang="en-US" dirty="0" err="1" smtClean="0"/>
+              <a:t>Garantia</a:t>
+            </a:r>
+            <a:r>
+              <a:rPr lang="en-GB" altLang="en-US" dirty="0" smtClean="0"/>
+              <a:t> </a:t>
+            </a:r>
+            <a:r>
+              <a:rPr lang="en-GB" altLang="en-US" dirty="0" err="1" smtClean="0"/>
+              <a:t>da</a:t>
+            </a:r>
+            <a:r>
+              <a:rPr lang="en-GB" altLang="en-US" dirty="0" smtClean="0"/>
+              <a:t> </a:t>
+            </a:r>
+            <a:r>
+              <a:rPr lang="en-GB" altLang="en-US" dirty="0" err="1" smtClean="0"/>
+              <a:t>qualidade</a:t>
+            </a:r>
+            <a:r>
+              <a:rPr lang="en-GB" altLang="en-US" dirty="0" smtClean="0"/>
+              <a:t>?</a:t>
+            </a:r>
+            <a:endParaRPr lang="en-GB" altLang="en-US" dirty="0"/>
           </a:p>
         </p:txBody>
       </p:sp>
       <p:sp>
         <p:nvSpPr>
-          <p:cNvPr id="22531" name="Rectangle 3"/>
+          <p:cNvPr id="19459" name="Rectangle 3"/>
           <p:cNvSpPr>
             <a:spLocks noGrp="1" noChangeArrowheads="1"/>
           </p:cNvSpPr>
@@ -6391,15 +9493,110 @@
           <a:lstStyle/>
           <a:p>
             <a:r>
-              <a:rPr lang="en-GB" altLang="en-US"/>
-              <a:t>Summarize the competition.</a:t>
-            </a:r>
-          </a:p>
-          <a:p>
-            <a:r>
-              <a:rPr lang="en-GB" altLang="en-US"/>
-              <a:t>Outline your company’s competitive advantage.</a:t>
-            </a:r>
+              <a:rPr lang="en-GB" altLang="en-US" dirty="0" smtClean="0"/>
+              <a:t>O </a:t>
+            </a:r>
+            <a:r>
+              <a:rPr lang="en-GB" altLang="en-US" dirty="0" err="1" smtClean="0"/>
+              <a:t>quê</a:t>
+            </a:r>
+            <a:r>
+              <a:rPr lang="en-GB" altLang="en-US" dirty="0" smtClean="0"/>
+              <a:t> se </a:t>
+            </a:r>
+            <a:r>
+              <a:rPr lang="en-GB" altLang="en-US" dirty="0" err="1" smtClean="0"/>
+              <a:t>busca</a:t>
+            </a:r>
+            <a:r>
+              <a:rPr lang="en-GB" altLang="en-US" dirty="0" smtClean="0"/>
+              <a:t> com </a:t>
+            </a:r>
+            <a:r>
+              <a:rPr lang="en-GB" altLang="en-US" dirty="0" err="1" smtClean="0"/>
+              <a:t>garantia</a:t>
+            </a:r>
+            <a:r>
+              <a:rPr lang="en-GB" altLang="en-US" dirty="0" smtClean="0"/>
+              <a:t> </a:t>
+            </a:r>
+            <a:r>
+              <a:rPr lang="en-GB" altLang="en-US" dirty="0" err="1" smtClean="0"/>
+              <a:t>da</a:t>
+            </a:r>
+            <a:r>
+              <a:rPr lang="en-GB" altLang="en-US" dirty="0" smtClean="0"/>
+              <a:t> </a:t>
+            </a:r>
+            <a:r>
+              <a:rPr lang="en-GB" altLang="en-US" dirty="0" err="1" smtClean="0"/>
+              <a:t>qualidade</a:t>
+            </a:r>
+            <a:r>
+              <a:rPr lang="en-GB" altLang="en-US" dirty="0" smtClean="0"/>
+              <a:t>?</a:t>
+            </a:r>
+            <a:endParaRPr lang="en-GB" altLang="en-US" dirty="0"/>
+          </a:p>
+          <a:p>
+            <a:pPr lvl="1"/>
+            <a:r>
+              <a:rPr lang="en-GB" altLang="en-US" dirty="0" err="1" smtClean="0"/>
+              <a:t>Processos</a:t>
+            </a:r>
+            <a:r>
+              <a:rPr lang="en-GB" altLang="en-US" dirty="0" smtClean="0"/>
+              <a:t> de </a:t>
+            </a:r>
+            <a:r>
+              <a:rPr lang="en-GB" altLang="en-US" dirty="0" err="1" smtClean="0"/>
+              <a:t>qualidade</a:t>
+            </a:r>
+            <a:r>
+              <a:rPr lang="en-GB" altLang="en-US" dirty="0" smtClean="0"/>
+              <a:t> com o </a:t>
+            </a:r>
+            <a:r>
+              <a:rPr lang="en-GB" altLang="en-US" dirty="0" err="1" smtClean="0"/>
+              <a:t>intuito</a:t>
+            </a:r>
+            <a:r>
+              <a:rPr lang="en-GB" altLang="en-US" dirty="0" smtClean="0"/>
+              <a:t> de </a:t>
+            </a:r>
+            <a:r>
+              <a:rPr lang="en-GB" altLang="en-US" dirty="0" err="1" smtClean="0"/>
+              <a:t>obter</a:t>
+            </a:r>
+            <a:r>
+              <a:rPr lang="en-GB" altLang="en-US" dirty="0" smtClean="0"/>
+              <a:t> um </a:t>
+            </a:r>
+            <a:r>
+              <a:rPr lang="en-GB" altLang="en-US" dirty="0" err="1" smtClean="0"/>
+              <a:t>produto</a:t>
+            </a:r>
+            <a:r>
+              <a:rPr lang="en-GB" altLang="en-US" dirty="0" smtClean="0"/>
+              <a:t> de </a:t>
+            </a:r>
+            <a:r>
+              <a:rPr lang="en-GB" altLang="en-US" dirty="0" err="1" smtClean="0"/>
+              <a:t>trabalho</a:t>
+            </a:r>
+            <a:r>
+              <a:rPr lang="en-GB" altLang="en-US" dirty="0" smtClean="0"/>
+              <a:t> com </a:t>
+            </a:r>
+            <a:r>
+              <a:rPr lang="en-GB" altLang="en-US" dirty="0" err="1" smtClean="0"/>
+              <a:t>qualidade</a:t>
+            </a:r>
+            <a:r>
+              <a:rPr lang="en-GB" altLang="en-US" dirty="0" smtClean="0"/>
+              <a:t>.</a:t>
+            </a:r>
+            <a:endParaRPr lang="en-GB" altLang="en-US" dirty="0"/>
           </a:p>
         </p:txBody>
       </p:sp>
@@ -6668,7 +9865,7 @@
         <a:effectLst/>
         <a:extLst>
           <a:ext uri="{AF507438-7753-43E0-B8FC-AC1667EBCBE1}">
-            <a14:hiddenEffects xmlns:a14="http://schemas.microsoft.com/office/drawing/2010/main" xmlns="">
+            <a14:hiddenEffects xmlns:a14="http://schemas.microsoft.com/office/drawing/2010/main">
               <a:effectLst>
                 <a:outerShdw dist="35921" dir="2700000" algn="ctr" rotWithShape="0">
                   <a:schemeClr val="bg2"/>
@@ -6741,7 +9938,7 @@
         <a:effectLst/>
         <a:extLst>
           <a:ext uri="{AF507438-7753-43E0-B8FC-AC1667EBCBE1}">
-            <a14:hiddenEffects xmlns:a14="http://schemas.microsoft.com/office/drawing/2010/main" xmlns="">
+            <a14:hiddenEffects xmlns:a14="http://schemas.microsoft.com/office/drawing/2010/main">
               <a:effectLst>
                 <a:outerShdw dist="35921" dir="2700000" algn="ctr" rotWithShape="0">
                   <a:schemeClr val="bg2"/>

</xml_diff>

<commit_message>
[CONC] Working on presentation
</commit_message>
<xml_diff>
--- a/presentation/presentation_1.0.0.pptx
+++ b/presentation/presentation_1.0.0.pptx
@@ -5,10 +5,10 @@
     <p:sldMasterId id="2147483663" r:id="rId1"/>
   </p:sldMasterIdLst>
   <p:notesMasterIdLst>
-    <p:notesMasterId r:id="rId19"/>
+    <p:notesMasterId r:id="rId21"/>
   </p:notesMasterIdLst>
   <p:handoutMasterIdLst>
-    <p:handoutMasterId r:id="rId20"/>
+    <p:handoutMasterId r:id="rId22"/>
   </p:handoutMasterIdLst>
   <p:sldIdLst>
     <p:sldId id="256" r:id="rId2"/>
@@ -19,15 +19,17 @@
     <p:sldId id="270" r:id="rId7"/>
     <p:sldId id="271" r:id="rId8"/>
     <p:sldId id="272" r:id="rId9"/>
-    <p:sldId id="269" r:id="rId10"/>
-    <p:sldId id="260" r:id="rId11"/>
-    <p:sldId id="261" r:id="rId12"/>
-    <p:sldId id="262" r:id="rId13"/>
-    <p:sldId id="263" r:id="rId14"/>
-    <p:sldId id="264" r:id="rId15"/>
-    <p:sldId id="265" r:id="rId16"/>
-    <p:sldId id="266" r:id="rId17"/>
-    <p:sldId id="267" r:id="rId18"/>
+    <p:sldId id="273" r:id="rId10"/>
+    <p:sldId id="275" r:id="rId11"/>
+    <p:sldId id="274" r:id="rId12"/>
+    <p:sldId id="276" r:id="rId13"/>
+    <p:sldId id="269" r:id="rId14"/>
+    <p:sldId id="277" r:id="rId15"/>
+    <p:sldId id="278" r:id="rId16"/>
+    <p:sldId id="279" r:id="rId17"/>
+    <p:sldId id="281" r:id="rId18"/>
+    <p:sldId id="282" r:id="rId19"/>
+    <p:sldId id="280" r:id="rId20"/>
   </p:sldIdLst>
   <p:sldSz cx="9144000" cy="6858000" type="screen4x3"/>
   <p:notesSz cx="6997700" cy="9283700"/>
@@ -209,14 +211,14 @@
           <a:effectLst/>
           <a:extLst>
             <a:ext uri="{909E8E84-426E-40DD-AFC4-6F175D3DCCD1}">
-              <a14:hiddenFill xmlns:a14="http://schemas.microsoft.com/office/drawing/2010/main">
+              <a14:hiddenFill xmlns:a14="http://schemas.microsoft.com/office/drawing/2010/main" xmlns="">
                 <a:solidFill>
                   <a:schemeClr val="accent1"/>
                 </a:solidFill>
               </a14:hiddenFill>
             </a:ext>
             <a:ext uri="{91240B29-F687-4F45-9708-019B960494DF}">
-              <a14:hiddenLine xmlns:a14="http://schemas.microsoft.com/office/drawing/2010/main" w="9525">
+              <a14:hiddenLine xmlns:a14="http://schemas.microsoft.com/office/drawing/2010/main" xmlns="" w="9525">
                 <a:solidFill>
                   <a:schemeClr val="tx1"/>
                 </a:solidFill>
@@ -226,7 +228,7 @@
               </a14:hiddenLine>
             </a:ext>
             <a:ext uri="{AF507438-7753-43E0-B8FC-AC1667EBCBE1}">
-              <a14:hiddenEffects xmlns:a14="http://schemas.microsoft.com/office/drawing/2010/main">
+              <a14:hiddenEffects xmlns:a14="http://schemas.microsoft.com/office/drawing/2010/main" xmlns="">
                 <a:effectLst>
                   <a:outerShdw dist="35921" dir="2700000" algn="ctr" rotWithShape="0">
                     <a:schemeClr val="bg2"/>
@@ -279,14 +281,14 @@
           <a:effectLst/>
           <a:extLst>
             <a:ext uri="{909E8E84-426E-40DD-AFC4-6F175D3DCCD1}">
-              <a14:hiddenFill xmlns:a14="http://schemas.microsoft.com/office/drawing/2010/main">
+              <a14:hiddenFill xmlns:a14="http://schemas.microsoft.com/office/drawing/2010/main" xmlns="">
                 <a:solidFill>
                   <a:schemeClr val="accent1"/>
                 </a:solidFill>
               </a14:hiddenFill>
             </a:ext>
             <a:ext uri="{91240B29-F687-4F45-9708-019B960494DF}">
-              <a14:hiddenLine xmlns:a14="http://schemas.microsoft.com/office/drawing/2010/main" w="9525">
+              <a14:hiddenLine xmlns:a14="http://schemas.microsoft.com/office/drawing/2010/main" xmlns="" w="9525">
                 <a:solidFill>
                   <a:schemeClr val="tx1"/>
                 </a:solidFill>
@@ -296,7 +298,7 @@
               </a14:hiddenLine>
             </a:ext>
             <a:ext uri="{AF507438-7753-43E0-B8FC-AC1667EBCBE1}">
-              <a14:hiddenEffects xmlns:a14="http://schemas.microsoft.com/office/drawing/2010/main">
+              <a14:hiddenEffects xmlns:a14="http://schemas.microsoft.com/office/drawing/2010/main" xmlns="">
                 <a:effectLst>
                   <a:outerShdw dist="35921" dir="2700000" algn="ctr" rotWithShape="0">
                     <a:schemeClr val="bg2"/>
@@ -349,14 +351,14 @@
           <a:effectLst/>
           <a:extLst>
             <a:ext uri="{909E8E84-426E-40DD-AFC4-6F175D3DCCD1}">
-              <a14:hiddenFill xmlns:a14="http://schemas.microsoft.com/office/drawing/2010/main">
+              <a14:hiddenFill xmlns:a14="http://schemas.microsoft.com/office/drawing/2010/main" xmlns="">
                 <a:solidFill>
                   <a:schemeClr val="accent1"/>
                 </a:solidFill>
               </a14:hiddenFill>
             </a:ext>
             <a:ext uri="{91240B29-F687-4F45-9708-019B960494DF}">
-              <a14:hiddenLine xmlns:a14="http://schemas.microsoft.com/office/drawing/2010/main" w="9525">
+              <a14:hiddenLine xmlns:a14="http://schemas.microsoft.com/office/drawing/2010/main" xmlns="" w="9525">
                 <a:solidFill>
                   <a:schemeClr val="tx1"/>
                 </a:solidFill>
@@ -366,7 +368,7 @@
               </a14:hiddenLine>
             </a:ext>
             <a:ext uri="{AF507438-7753-43E0-B8FC-AC1667EBCBE1}">
-              <a14:hiddenEffects xmlns:a14="http://schemas.microsoft.com/office/drawing/2010/main">
+              <a14:hiddenEffects xmlns:a14="http://schemas.microsoft.com/office/drawing/2010/main" xmlns="">
                 <a:effectLst>
                   <a:outerShdw dist="35921" dir="2700000" algn="ctr" rotWithShape="0">
                     <a:schemeClr val="bg2"/>
@@ -419,14 +421,14 @@
           <a:effectLst/>
           <a:extLst>
             <a:ext uri="{909E8E84-426E-40DD-AFC4-6F175D3DCCD1}">
-              <a14:hiddenFill xmlns:a14="http://schemas.microsoft.com/office/drawing/2010/main">
+              <a14:hiddenFill xmlns:a14="http://schemas.microsoft.com/office/drawing/2010/main" xmlns="">
                 <a:solidFill>
                   <a:schemeClr val="accent1"/>
                 </a:solidFill>
               </a14:hiddenFill>
             </a:ext>
             <a:ext uri="{91240B29-F687-4F45-9708-019B960494DF}">
-              <a14:hiddenLine xmlns:a14="http://schemas.microsoft.com/office/drawing/2010/main" w="9525">
+              <a14:hiddenLine xmlns:a14="http://schemas.microsoft.com/office/drawing/2010/main" xmlns="" w="9525">
                 <a:solidFill>
                   <a:schemeClr val="tx1"/>
                 </a:solidFill>
@@ -436,7 +438,7 @@
               </a14:hiddenLine>
             </a:ext>
             <a:ext uri="{AF507438-7753-43E0-B8FC-AC1667EBCBE1}">
-              <a14:hiddenEffects xmlns:a14="http://schemas.microsoft.com/office/drawing/2010/main">
+              <a14:hiddenEffects xmlns:a14="http://schemas.microsoft.com/office/drawing/2010/main" xmlns="">
                 <a:effectLst>
                   <a:outerShdw dist="35921" dir="2700000" algn="ctr" rotWithShape="0">
                     <a:schemeClr val="bg2"/>
@@ -463,7 +465,7 @@
             <a:fld id="{6C027EFB-4644-416D-B81A-F19E8B246ECA}" type="slidenum">
               <a:rPr lang="en-GB" altLang="en-US"/>
               <a:pPr/>
-              <a:t>‹#›</a:t>
+              <a:t>‹nº›</a:t>
             </a:fld>
             <a:endParaRPr lang="en-GB" altLang="en-US"/>
           </a:p>
@@ -472,7 +474,7 @@
     </p:spTree>
     <p:extLst>
       <p:ext uri="{BB962C8B-B14F-4D97-AF65-F5344CB8AC3E}">
-        <p14:creationId xmlns:p14="http://schemas.microsoft.com/office/powerpoint/2010/main" val="1117100711"/>
+        <p14:creationId xmlns:p14="http://schemas.microsoft.com/office/powerpoint/2010/main" xmlns="" val="1117100711"/>
       </p:ext>
     </p:extLst>
   </p:cSld>
@@ -530,14 +532,14 @@
           <a:effectLst/>
           <a:extLst>
             <a:ext uri="{909E8E84-426E-40DD-AFC4-6F175D3DCCD1}">
-              <a14:hiddenFill xmlns:a14="http://schemas.microsoft.com/office/drawing/2010/main">
+              <a14:hiddenFill xmlns:a14="http://schemas.microsoft.com/office/drawing/2010/main" xmlns="">
                 <a:solidFill>
                   <a:schemeClr val="accent1"/>
                 </a:solidFill>
               </a14:hiddenFill>
             </a:ext>
             <a:ext uri="{91240B29-F687-4F45-9708-019B960494DF}">
-              <a14:hiddenLine xmlns:a14="http://schemas.microsoft.com/office/drawing/2010/main" w="9525">
+              <a14:hiddenLine xmlns:a14="http://schemas.microsoft.com/office/drawing/2010/main" xmlns="" w="9525">
                 <a:solidFill>
                   <a:schemeClr val="tx1"/>
                 </a:solidFill>
@@ -547,7 +549,7 @@
               </a14:hiddenLine>
             </a:ext>
             <a:ext uri="{AF507438-7753-43E0-B8FC-AC1667EBCBE1}">
-              <a14:hiddenEffects xmlns:a14="http://schemas.microsoft.com/office/drawing/2010/main">
+              <a14:hiddenEffects xmlns:a14="http://schemas.microsoft.com/office/drawing/2010/main" xmlns="">
                 <a:effectLst>
                   <a:outerShdw dist="35921" dir="2700000" algn="ctr" rotWithShape="0">
                     <a:schemeClr val="bg2"/>
@@ -600,14 +602,14 @@
           <a:effectLst/>
           <a:extLst>
             <a:ext uri="{909E8E84-426E-40DD-AFC4-6F175D3DCCD1}">
-              <a14:hiddenFill xmlns:a14="http://schemas.microsoft.com/office/drawing/2010/main">
+              <a14:hiddenFill xmlns:a14="http://schemas.microsoft.com/office/drawing/2010/main" xmlns="">
                 <a:solidFill>
                   <a:schemeClr val="accent1"/>
                 </a:solidFill>
               </a14:hiddenFill>
             </a:ext>
             <a:ext uri="{91240B29-F687-4F45-9708-019B960494DF}">
-              <a14:hiddenLine xmlns:a14="http://schemas.microsoft.com/office/drawing/2010/main" w="9525">
+              <a14:hiddenLine xmlns:a14="http://schemas.microsoft.com/office/drawing/2010/main" xmlns="" w="9525">
                 <a:solidFill>
                   <a:schemeClr val="tx1"/>
                 </a:solidFill>
@@ -617,7 +619,7 @@
               </a14:hiddenLine>
             </a:ext>
             <a:ext uri="{AF507438-7753-43E0-B8FC-AC1667EBCBE1}">
-              <a14:hiddenEffects xmlns:a14="http://schemas.microsoft.com/office/drawing/2010/main">
+              <a14:hiddenEffects xmlns:a14="http://schemas.microsoft.com/office/drawing/2010/main" xmlns="">
                 <a:effectLst>
                   <a:outerShdw dist="35921" dir="2700000" algn="ctr" rotWithShape="0">
                     <a:schemeClr val="bg2"/>
@@ -675,7 +677,7 @@
           <a:effectLst/>
           <a:extLst>
             <a:ext uri="{AF507438-7753-43E0-B8FC-AC1667EBCBE1}">
-              <a14:hiddenEffects xmlns:a14="http://schemas.microsoft.com/office/drawing/2010/main">
+              <a14:hiddenEffects xmlns:a14="http://schemas.microsoft.com/office/drawing/2010/main" xmlns="">
                 <a:effectLst>
                   <a:outerShdw dist="35921" dir="2700000" algn="ctr" rotWithShape="0">
                     <a:srgbClr val="808080"/>
@@ -684,7 +686,7 @@
               </a14:hiddenEffects>
             </a:ext>
             <a:ext uri="{53640926-AAD7-44D8-BBD7-CCE9431645EC}">
-              <a14:shadowObscured xmlns:a14="http://schemas.microsoft.com/office/drawing/2010/main" val="1"/>
+              <a14:shadowObscured xmlns:a14="http://schemas.microsoft.com/office/drawing/2010/main" xmlns="" val="1"/>
             </a:ext>
           </a:extLst>
         </p:spPr>
@@ -714,14 +716,14 @@
           <a:effectLst/>
           <a:extLst>
             <a:ext uri="{909E8E84-426E-40DD-AFC4-6F175D3DCCD1}">
-              <a14:hiddenFill xmlns:a14="http://schemas.microsoft.com/office/drawing/2010/main">
+              <a14:hiddenFill xmlns:a14="http://schemas.microsoft.com/office/drawing/2010/main" xmlns="">
                 <a:solidFill>
                   <a:schemeClr val="accent1"/>
                 </a:solidFill>
               </a14:hiddenFill>
             </a:ext>
             <a:ext uri="{91240B29-F687-4F45-9708-019B960494DF}">
-              <a14:hiddenLine xmlns:a14="http://schemas.microsoft.com/office/drawing/2010/main" w="9525">
+              <a14:hiddenLine xmlns:a14="http://schemas.microsoft.com/office/drawing/2010/main" xmlns="" w="9525">
                 <a:solidFill>
                   <a:schemeClr val="tx1"/>
                 </a:solidFill>
@@ -731,7 +733,7 @@
               </a14:hiddenLine>
             </a:ext>
             <a:ext uri="{AF507438-7753-43E0-B8FC-AC1667EBCBE1}">
-              <a14:hiddenEffects xmlns:a14="http://schemas.microsoft.com/office/drawing/2010/main">
+              <a14:hiddenEffects xmlns:a14="http://schemas.microsoft.com/office/drawing/2010/main" xmlns="">
                 <a:effectLst>
                   <a:outerShdw dist="35921" dir="2700000" algn="ctr" rotWithShape="0">
                     <a:schemeClr val="bg2"/>
@@ -810,14 +812,14 @@
           <a:effectLst/>
           <a:extLst>
             <a:ext uri="{909E8E84-426E-40DD-AFC4-6F175D3DCCD1}">
-              <a14:hiddenFill xmlns:a14="http://schemas.microsoft.com/office/drawing/2010/main">
+              <a14:hiddenFill xmlns:a14="http://schemas.microsoft.com/office/drawing/2010/main" xmlns="">
                 <a:solidFill>
                   <a:schemeClr val="accent1"/>
                 </a:solidFill>
               </a14:hiddenFill>
             </a:ext>
             <a:ext uri="{91240B29-F687-4F45-9708-019B960494DF}">
-              <a14:hiddenLine xmlns:a14="http://schemas.microsoft.com/office/drawing/2010/main" w="9525">
+              <a14:hiddenLine xmlns:a14="http://schemas.microsoft.com/office/drawing/2010/main" xmlns="" w="9525">
                 <a:solidFill>
                   <a:schemeClr val="tx1"/>
                 </a:solidFill>
@@ -827,7 +829,7 @@
               </a14:hiddenLine>
             </a:ext>
             <a:ext uri="{AF507438-7753-43E0-B8FC-AC1667EBCBE1}">
-              <a14:hiddenEffects xmlns:a14="http://schemas.microsoft.com/office/drawing/2010/main">
+              <a14:hiddenEffects xmlns:a14="http://schemas.microsoft.com/office/drawing/2010/main" xmlns="">
                 <a:effectLst>
                   <a:outerShdw dist="35921" dir="2700000" algn="ctr" rotWithShape="0">
                     <a:schemeClr val="bg2"/>
@@ -880,14 +882,14 @@
           <a:effectLst/>
           <a:extLst>
             <a:ext uri="{909E8E84-426E-40DD-AFC4-6F175D3DCCD1}">
-              <a14:hiddenFill xmlns:a14="http://schemas.microsoft.com/office/drawing/2010/main">
+              <a14:hiddenFill xmlns:a14="http://schemas.microsoft.com/office/drawing/2010/main" xmlns="">
                 <a:solidFill>
                   <a:schemeClr val="accent1"/>
                 </a:solidFill>
               </a14:hiddenFill>
             </a:ext>
             <a:ext uri="{91240B29-F687-4F45-9708-019B960494DF}">
-              <a14:hiddenLine xmlns:a14="http://schemas.microsoft.com/office/drawing/2010/main" w="9525">
+              <a14:hiddenLine xmlns:a14="http://schemas.microsoft.com/office/drawing/2010/main" xmlns="" w="9525">
                 <a:solidFill>
                   <a:schemeClr val="tx1"/>
                 </a:solidFill>
@@ -897,7 +899,7 @@
               </a14:hiddenLine>
             </a:ext>
             <a:ext uri="{AF507438-7753-43E0-B8FC-AC1667EBCBE1}">
-              <a14:hiddenEffects xmlns:a14="http://schemas.microsoft.com/office/drawing/2010/main">
+              <a14:hiddenEffects xmlns:a14="http://schemas.microsoft.com/office/drawing/2010/main" xmlns="">
                 <a:effectLst>
                   <a:outerShdw dist="35921" dir="2700000" algn="ctr" rotWithShape="0">
                     <a:schemeClr val="bg2"/>
@@ -924,7 +926,7 @@
             <a:fld id="{2668A6B0-39CE-4449-B429-CEA1155F1F9F}" type="slidenum">
               <a:rPr lang="en-GB" altLang="en-US"/>
               <a:pPr/>
-              <a:t>‹#›</a:t>
+              <a:t>‹nº›</a:t>
             </a:fld>
             <a:endParaRPr lang="en-GB" altLang="en-US"/>
           </a:p>
@@ -933,7 +935,7 @@
     </p:spTree>
     <p:extLst>
       <p:ext uri="{BB962C8B-B14F-4D97-AF65-F5344CB8AC3E}">
-        <p14:creationId xmlns:p14="http://schemas.microsoft.com/office/powerpoint/2010/main" val="2478137502"/>
+        <p14:creationId xmlns:p14="http://schemas.microsoft.com/office/powerpoint/2010/main" xmlns="" val="2478137502"/>
       </p:ext>
     </p:extLst>
   </p:cSld>
@@ -1063,90 +1065,6 @@
 </p:notesMaster>
 </file>
 
-<file path=ppt/notesSlides/notesSlide1.xml><?xml version="1.0" encoding="utf-8"?>
-<p:notes xmlns:a="http://schemas.openxmlformats.org/drawingml/2006/main" xmlns:r="http://schemas.openxmlformats.org/officeDocument/2006/relationships" xmlns:p="http://schemas.openxmlformats.org/presentationml/2006/main">
-  <p:cSld>
-    <p:spTree>
-      <p:nvGrpSpPr>
-        <p:cNvPr id="1" name=""/>
-        <p:cNvGrpSpPr/>
-        <p:nvPr/>
-      </p:nvGrpSpPr>
-      <p:grpSpPr>
-        <a:xfrm>
-          <a:off x="0" y="0"/>
-          <a:ext cx="0" cy="0"/>
-          <a:chOff x="0" y="0"/>
-          <a:chExt cx="0" cy="0"/>
-        </a:xfrm>
-      </p:grpSpPr>
-      <p:sp>
-        <p:nvSpPr>
-          <p:cNvPr id="7" name="Rectangle 7"/>
-          <p:cNvSpPr>
-            <a:spLocks noGrp="1" noChangeArrowheads="1"/>
-          </p:cNvSpPr>
-          <p:nvPr>
-            <p:ph type="sldNum" sz="quarter" idx="5"/>
-          </p:nvPr>
-        </p:nvSpPr>
-        <p:spPr>
-          <a:ln/>
-        </p:spPr>
-        <p:txBody>
-          <a:bodyPr/>
-          <a:lstStyle/>
-          <a:p>
-            <a:fld id="{819040E0-4D5D-4F31-A92A-3B12F7FE3C43}" type="slidenum">
-              <a:rPr lang="en-GB" altLang="en-US"/>
-              <a:pPr/>
-              <a:t>17</a:t>
-            </a:fld>
-            <a:endParaRPr lang="en-GB" altLang="en-US"/>
-          </a:p>
-        </p:txBody>
-      </p:sp>
-      <p:sp>
-        <p:nvSpPr>
-          <p:cNvPr id="34818" name="Rectangle 2"/>
-          <p:cNvSpPr>
-            <a:spLocks noGrp="1" noRot="1" noChangeAspect="1" noChangeArrowheads="1" noTextEdit="1"/>
-          </p:cNvSpPr>
-          <p:nvPr>
-            <p:ph type="sldImg"/>
-          </p:nvPr>
-        </p:nvSpPr>
-        <p:spPr>
-          <a:ln/>
-        </p:spPr>
-      </p:sp>
-      <p:sp>
-        <p:nvSpPr>
-          <p:cNvPr id="34819" name="Rectangle 3"/>
-          <p:cNvSpPr>
-            <a:spLocks noGrp="1" noChangeArrowheads="1"/>
-          </p:cNvSpPr>
-          <p:nvPr>
-            <p:ph type="body" idx="1"/>
-          </p:nvPr>
-        </p:nvSpPr>
-        <p:spPr/>
-        <p:txBody>
-          <a:bodyPr/>
-          <a:lstStyle/>
-          <a:p>
-            <a:endParaRPr lang="en-US" altLang="en-US"/>
-          </a:p>
-        </p:txBody>
-      </p:sp>
-    </p:spTree>
-  </p:cSld>
-  <p:clrMapOvr>
-    <a:masterClrMapping/>
-  </p:clrMapOvr>
-</p:notes>
-</file>
-
 <file path=ppt/slideLayouts/slideLayout1.xml><?xml version="1.0" encoding="utf-8"?>
 <p:sldLayout xmlns:a="http://schemas.openxmlformats.org/drawingml/2006/main" xmlns:r="http://schemas.openxmlformats.org/officeDocument/2006/relationships" xmlns:p="http://schemas.openxmlformats.org/presentationml/2006/main" type="title" preserve="1">
   <p:cSld name="Title Slide">
@@ -1335,7 +1253,7 @@
             <a:fld id="{C8AB3E90-A031-40ED-864C-0FE577295A4E}" type="slidenum">
               <a:rPr lang="en-GB" altLang="en-US"/>
               <a:pPr/>
-              <a:t>‹#›</a:t>
+              <a:t>‹nº›</a:t>
             </a:fld>
             <a:endParaRPr lang="en-GB" altLang="en-US"/>
           </a:p>
@@ -1509,7 +1427,7 @@
             <a:fld id="{DE2B9F86-01BD-4AB2-A917-3EBBF00190D1}" type="slidenum">
               <a:rPr lang="en-GB" altLang="en-US"/>
               <a:pPr/>
-              <a:t>‹#›</a:t>
+              <a:t>‹nº›</a:t>
             </a:fld>
             <a:endParaRPr lang="en-GB" altLang="en-US"/>
           </a:p>
@@ -1518,7 +1436,7 @@
     </p:spTree>
     <p:extLst>
       <p:ext uri="{BB962C8B-B14F-4D97-AF65-F5344CB8AC3E}">
-        <p14:creationId xmlns:p14="http://schemas.microsoft.com/office/powerpoint/2010/main" val="1685033987"/>
+        <p14:creationId xmlns:p14="http://schemas.microsoft.com/office/powerpoint/2010/main" xmlns="" val="1685033987"/>
       </p:ext>
     </p:extLst>
   </p:cSld>
@@ -1698,7 +1616,7 @@
             <a:fld id="{D1147624-9B02-4BF5-B493-9E73928D4D99}" type="slidenum">
               <a:rPr lang="en-GB" altLang="en-US"/>
               <a:pPr/>
-              <a:t>‹#›</a:t>
+              <a:t>‹nº›</a:t>
             </a:fld>
             <a:endParaRPr lang="en-GB" altLang="en-US"/>
           </a:p>
@@ -1707,7 +1625,7 @@
     </p:spTree>
     <p:extLst>
       <p:ext uri="{BB962C8B-B14F-4D97-AF65-F5344CB8AC3E}">
-        <p14:creationId xmlns:p14="http://schemas.microsoft.com/office/powerpoint/2010/main" val="2831046476"/>
+        <p14:creationId xmlns:p14="http://schemas.microsoft.com/office/powerpoint/2010/main" xmlns="" val="2831046476"/>
       </p:ext>
     </p:extLst>
   </p:cSld>
@@ -1877,7 +1795,7 @@
             <a:fld id="{2F90CFF5-16EB-46D8-931E-269E2410E6A6}" type="slidenum">
               <a:rPr lang="en-GB" altLang="en-US"/>
               <a:pPr/>
-              <a:t>‹#›</a:t>
+              <a:t>‹nº›</a:t>
             </a:fld>
             <a:endParaRPr lang="en-GB" altLang="en-US"/>
           </a:p>
@@ -1886,7 +1804,7 @@
     </p:spTree>
     <p:extLst>
       <p:ext uri="{BB962C8B-B14F-4D97-AF65-F5344CB8AC3E}">
-        <p14:creationId xmlns:p14="http://schemas.microsoft.com/office/powerpoint/2010/main" val="3951937901"/>
+        <p14:creationId xmlns:p14="http://schemas.microsoft.com/office/powerpoint/2010/main" xmlns="" val="3951937901"/>
       </p:ext>
     </p:extLst>
   </p:cSld>
@@ -2078,7 +1996,7 @@
             <a:fld id="{5E28F0CB-2D3D-41AD-BCAB-2DD5D90E301A}" type="slidenum">
               <a:rPr lang="en-GB" altLang="en-US"/>
               <a:pPr/>
-              <a:t>‹#›</a:t>
+              <a:t>‹nº›</a:t>
             </a:fld>
             <a:endParaRPr lang="en-GB" altLang="en-US"/>
           </a:p>
@@ -2087,7 +2005,7 @@
     </p:spTree>
     <p:extLst>
       <p:ext uri="{BB962C8B-B14F-4D97-AF65-F5344CB8AC3E}">
-        <p14:creationId xmlns:p14="http://schemas.microsoft.com/office/powerpoint/2010/main" val="277518866"/>
+        <p14:creationId xmlns:p14="http://schemas.microsoft.com/office/powerpoint/2010/main" xmlns="" val="277518866"/>
       </p:ext>
     </p:extLst>
   </p:cSld>
@@ -2375,7 +2293,7 @@
             <a:fld id="{97402484-938B-4517-BB33-B3B29C04DB26}" type="slidenum">
               <a:rPr lang="en-GB" altLang="en-US"/>
               <a:pPr/>
-              <a:t>‹#›</a:t>
+              <a:t>‹nº›</a:t>
             </a:fld>
             <a:endParaRPr lang="en-GB" altLang="en-US"/>
           </a:p>
@@ -2384,7 +2302,7 @@
     </p:spTree>
     <p:extLst>
       <p:ext uri="{BB962C8B-B14F-4D97-AF65-F5344CB8AC3E}">
-        <p14:creationId xmlns:p14="http://schemas.microsoft.com/office/powerpoint/2010/main" val="1549182660"/>
+        <p14:creationId xmlns:p14="http://schemas.microsoft.com/office/powerpoint/2010/main" xmlns="" val="1549182660"/>
       </p:ext>
     </p:extLst>
   </p:cSld>
@@ -2811,7 +2729,7 @@
             <a:fld id="{B6FA9CB4-CBE3-457C-ABF5-8CF2F9FA81F1}" type="slidenum">
               <a:rPr lang="en-GB" altLang="en-US"/>
               <a:pPr/>
-              <a:t>‹#›</a:t>
+              <a:t>‹nº›</a:t>
             </a:fld>
             <a:endParaRPr lang="en-GB" altLang="en-US"/>
           </a:p>
@@ -2820,7 +2738,7 @@
     </p:spTree>
     <p:extLst>
       <p:ext uri="{BB962C8B-B14F-4D97-AF65-F5344CB8AC3E}">
-        <p14:creationId xmlns:p14="http://schemas.microsoft.com/office/powerpoint/2010/main" val="97857459"/>
+        <p14:creationId xmlns:p14="http://schemas.microsoft.com/office/powerpoint/2010/main" xmlns="" val="97857459"/>
       </p:ext>
     </p:extLst>
   </p:cSld>
@@ -2938,7 +2856,7 @@
             <a:fld id="{B0238676-A5C6-441D-871D-BA22E0B2CF97}" type="slidenum">
               <a:rPr lang="en-GB" altLang="en-US"/>
               <a:pPr/>
-              <a:t>‹#›</a:t>
+              <a:t>‹nº›</a:t>
             </a:fld>
             <a:endParaRPr lang="en-GB" altLang="en-US"/>
           </a:p>
@@ -2947,7 +2865,7 @@
     </p:spTree>
     <p:extLst>
       <p:ext uri="{BB962C8B-B14F-4D97-AF65-F5344CB8AC3E}">
-        <p14:creationId xmlns:p14="http://schemas.microsoft.com/office/powerpoint/2010/main" val="1927087680"/>
+        <p14:creationId xmlns:p14="http://schemas.microsoft.com/office/powerpoint/2010/main" xmlns="" val="1927087680"/>
       </p:ext>
     </p:extLst>
   </p:cSld>
@@ -3042,7 +2960,7 @@
             <a:fld id="{4EFED0D0-D77C-4087-B9DB-216A832FF7B7}" type="slidenum">
               <a:rPr lang="en-GB" altLang="en-US"/>
               <a:pPr/>
-              <a:t>‹#›</a:t>
+              <a:t>‹nº›</a:t>
             </a:fld>
             <a:endParaRPr lang="en-GB" altLang="en-US"/>
           </a:p>
@@ -3051,7 +2969,7 @@
     </p:spTree>
     <p:extLst>
       <p:ext uri="{BB962C8B-B14F-4D97-AF65-F5344CB8AC3E}">
-        <p14:creationId xmlns:p14="http://schemas.microsoft.com/office/powerpoint/2010/main" val="2063913859"/>
+        <p14:creationId xmlns:p14="http://schemas.microsoft.com/office/powerpoint/2010/main" xmlns="" val="2063913859"/>
       </p:ext>
     </p:extLst>
   </p:cSld>
@@ -3328,7 +3246,7 @@
             <a:fld id="{080243EE-BA26-4E12-89DB-9BA7250AD0AF}" type="slidenum">
               <a:rPr lang="en-GB" altLang="en-US"/>
               <a:pPr/>
-              <a:t>‹#›</a:t>
+              <a:t>‹nº›</a:t>
             </a:fld>
             <a:endParaRPr lang="en-GB" altLang="en-US"/>
           </a:p>
@@ -3337,7 +3255,7 @@
     </p:spTree>
     <p:extLst>
       <p:ext uri="{BB962C8B-B14F-4D97-AF65-F5344CB8AC3E}">
-        <p14:creationId xmlns:p14="http://schemas.microsoft.com/office/powerpoint/2010/main" val="1481749320"/>
+        <p14:creationId xmlns:p14="http://schemas.microsoft.com/office/powerpoint/2010/main" xmlns="" val="1481749320"/>
       </p:ext>
     </p:extLst>
   </p:cSld>
@@ -3594,7 +3512,7 @@
             <a:fld id="{C2A4BA49-06BA-4A16-A84C-C141ADB185A3}" type="slidenum">
               <a:rPr lang="en-GB" altLang="en-US"/>
               <a:pPr/>
-              <a:t>‹#›</a:t>
+              <a:t>‹nº›</a:t>
             </a:fld>
             <a:endParaRPr lang="en-GB" altLang="en-US"/>
           </a:p>
@@ -3603,7 +3521,7 @@
     </p:spTree>
     <p:extLst>
       <p:ext uri="{BB962C8B-B14F-4D97-AF65-F5344CB8AC3E}">
-        <p14:creationId xmlns:p14="http://schemas.microsoft.com/office/powerpoint/2010/main" val="2983627013"/>
+        <p14:creationId xmlns:p14="http://schemas.microsoft.com/office/powerpoint/2010/main" xmlns="" val="2983627013"/>
       </p:ext>
     </p:extLst>
   </p:cSld>
@@ -3667,14 +3585,14 @@
           <a:effectLst/>
           <a:extLst>
             <a:ext uri="{909E8E84-426E-40DD-AFC4-6F175D3DCCD1}">
-              <a14:hiddenFill xmlns:a14="http://schemas.microsoft.com/office/drawing/2010/main">
+              <a14:hiddenFill xmlns:a14="http://schemas.microsoft.com/office/drawing/2010/main" xmlns="">
                 <a:solidFill>
                   <a:schemeClr val="accent1"/>
                 </a:solidFill>
               </a14:hiddenFill>
             </a:ext>
             <a:ext uri="{91240B29-F687-4F45-9708-019B960494DF}">
-              <a14:hiddenLine xmlns:a14="http://schemas.microsoft.com/office/drawing/2010/main" w="9525">
+              <a14:hiddenLine xmlns:a14="http://schemas.microsoft.com/office/drawing/2010/main" xmlns="" w="9525">
                 <a:solidFill>
                   <a:schemeClr val="tx1"/>
                 </a:solidFill>
@@ -3684,7 +3602,7 @@
               </a14:hiddenLine>
             </a:ext>
             <a:ext uri="{AF507438-7753-43E0-B8FC-AC1667EBCBE1}">
-              <a14:hiddenEffects xmlns:a14="http://schemas.microsoft.com/office/drawing/2010/main">
+              <a14:hiddenEffects xmlns:a14="http://schemas.microsoft.com/office/drawing/2010/main" xmlns="">
                 <a:effectLst>
                   <a:outerShdw dist="35921" dir="2700000" algn="ctr" rotWithShape="0">
                     <a:schemeClr val="bg2"/>
@@ -3736,14 +3654,14 @@
           <a:effectLst/>
           <a:extLst>
             <a:ext uri="{909E8E84-426E-40DD-AFC4-6F175D3DCCD1}">
-              <a14:hiddenFill xmlns:a14="http://schemas.microsoft.com/office/drawing/2010/main">
+              <a14:hiddenFill xmlns:a14="http://schemas.microsoft.com/office/drawing/2010/main" xmlns="">
                 <a:solidFill>
                   <a:schemeClr val="accent1"/>
                 </a:solidFill>
               </a14:hiddenFill>
             </a:ext>
             <a:ext uri="{91240B29-F687-4F45-9708-019B960494DF}">
-              <a14:hiddenLine xmlns:a14="http://schemas.microsoft.com/office/drawing/2010/main" w="9525">
+              <a14:hiddenLine xmlns:a14="http://schemas.microsoft.com/office/drawing/2010/main" xmlns="" w="9525">
                 <a:solidFill>
                   <a:schemeClr val="tx1"/>
                 </a:solidFill>
@@ -3753,7 +3671,7 @@
               </a14:hiddenLine>
             </a:ext>
             <a:ext uri="{AF507438-7753-43E0-B8FC-AC1667EBCBE1}">
-              <a14:hiddenEffects xmlns:a14="http://schemas.microsoft.com/office/drawing/2010/main">
+              <a14:hiddenEffects xmlns:a14="http://schemas.microsoft.com/office/drawing/2010/main" xmlns="">
                 <a:effectLst>
                   <a:outerShdw dist="35921" dir="2700000" algn="ctr" rotWithShape="0">
                     <a:schemeClr val="bg2"/>
@@ -3833,14 +3751,14 @@
           <a:effectLst/>
           <a:extLst>
             <a:ext uri="{909E8E84-426E-40DD-AFC4-6F175D3DCCD1}">
-              <a14:hiddenFill xmlns:a14="http://schemas.microsoft.com/office/drawing/2010/main">
+              <a14:hiddenFill xmlns:a14="http://schemas.microsoft.com/office/drawing/2010/main" xmlns="">
                 <a:solidFill>
                   <a:schemeClr val="accent1"/>
                 </a:solidFill>
               </a14:hiddenFill>
             </a:ext>
             <a:ext uri="{91240B29-F687-4F45-9708-019B960494DF}">
-              <a14:hiddenLine xmlns:a14="http://schemas.microsoft.com/office/drawing/2010/main" w="9525">
+              <a14:hiddenLine xmlns:a14="http://schemas.microsoft.com/office/drawing/2010/main" xmlns="" w="9525">
                 <a:solidFill>
                   <a:schemeClr val="tx1"/>
                 </a:solidFill>
@@ -3850,7 +3768,7 @@
               </a14:hiddenLine>
             </a:ext>
             <a:ext uri="{AF507438-7753-43E0-B8FC-AC1667EBCBE1}">
-              <a14:hiddenEffects xmlns:a14="http://schemas.microsoft.com/office/drawing/2010/main">
+              <a14:hiddenEffects xmlns:a14="http://schemas.microsoft.com/office/drawing/2010/main" xmlns="">
                 <a:effectLst>
                   <a:outerShdw dist="35921" dir="2700000" algn="ctr" rotWithShape="0">
                     <a:schemeClr val="bg2"/>
@@ -3903,14 +3821,14 @@
           <a:effectLst/>
           <a:extLst>
             <a:ext uri="{909E8E84-426E-40DD-AFC4-6F175D3DCCD1}">
-              <a14:hiddenFill xmlns:a14="http://schemas.microsoft.com/office/drawing/2010/main">
+              <a14:hiddenFill xmlns:a14="http://schemas.microsoft.com/office/drawing/2010/main" xmlns="">
                 <a:solidFill>
                   <a:schemeClr val="accent1"/>
                 </a:solidFill>
               </a14:hiddenFill>
             </a:ext>
             <a:ext uri="{91240B29-F687-4F45-9708-019B960494DF}">
-              <a14:hiddenLine xmlns:a14="http://schemas.microsoft.com/office/drawing/2010/main" w="9525">
+              <a14:hiddenLine xmlns:a14="http://schemas.microsoft.com/office/drawing/2010/main" xmlns="" w="9525">
                 <a:solidFill>
                   <a:schemeClr val="tx1"/>
                 </a:solidFill>
@@ -3920,7 +3838,7 @@
               </a14:hiddenLine>
             </a:ext>
             <a:ext uri="{AF507438-7753-43E0-B8FC-AC1667EBCBE1}">
-              <a14:hiddenEffects xmlns:a14="http://schemas.microsoft.com/office/drawing/2010/main">
+              <a14:hiddenEffects xmlns:a14="http://schemas.microsoft.com/office/drawing/2010/main" xmlns="">
                 <a:effectLst>
                   <a:outerShdw dist="35921" dir="2700000" algn="ctr" rotWithShape="0">
                     <a:schemeClr val="bg2"/>
@@ -3973,14 +3891,14 @@
           <a:effectLst/>
           <a:extLst>
             <a:ext uri="{909E8E84-426E-40DD-AFC4-6F175D3DCCD1}">
-              <a14:hiddenFill xmlns:a14="http://schemas.microsoft.com/office/drawing/2010/main">
+              <a14:hiddenFill xmlns:a14="http://schemas.microsoft.com/office/drawing/2010/main" xmlns="">
                 <a:solidFill>
                   <a:schemeClr val="accent1"/>
                 </a:solidFill>
               </a14:hiddenFill>
             </a:ext>
             <a:ext uri="{91240B29-F687-4F45-9708-019B960494DF}">
-              <a14:hiddenLine xmlns:a14="http://schemas.microsoft.com/office/drawing/2010/main" w="9525">
+              <a14:hiddenLine xmlns:a14="http://schemas.microsoft.com/office/drawing/2010/main" xmlns="" w="9525">
                 <a:solidFill>
                   <a:schemeClr val="tx1"/>
                 </a:solidFill>
@@ -3990,7 +3908,7 @@
               </a14:hiddenLine>
             </a:ext>
             <a:ext uri="{AF507438-7753-43E0-B8FC-AC1667EBCBE1}">
-              <a14:hiddenEffects xmlns:a14="http://schemas.microsoft.com/office/drawing/2010/main">
+              <a14:hiddenEffects xmlns:a14="http://schemas.microsoft.com/office/drawing/2010/main" xmlns="">
                 <a:effectLst>
                   <a:outerShdw dist="35921" dir="2700000" algn="ctr" rotWithShape="0">
                     <a:schemeClr val="bg2"/>
@@ -4017,7 +3935,7 @@
             <a:fld id="{E477BC0E-3AE9-42A1-BC3F-DA76B085E71D}" type="slidenum">
               <a:rPr lang="en-GB" altLang="en-US"/>
               <a:pPr/>
-              <a:t>‹#›</a:t>
+              <a:t>‹nº›</a:t>
             </a:fld>
             <a:endParaRPr lang="en-GB" altLang="en-US"/>
           </a:p>
@@ -4693,7 +4611,7 @@
           <a:blip r:embed="rId2" cstate="print">
             <a:extLst>
               <a:ext uri="{28A0092B-C50C-407E-A947-70E740481C1C}">
-                <a14:useLocalDpi xmlns:a14="http://schemas.microsoft.com/office/drawing/2010/main" val="0"/>
+                <a14:useLocalDpi xmlns:a14="http://schemas.microsoft.com/office/drawing/2010/main" xmlns="" val="0"/>
               </a:ext>
             </a:extLst>
           </a:blip>
@@ -4716,14 +4634,14 @@
           </a:ln>
           <a:extLst>
             <a:ext uri="{909E8E84-426E-40DD-AFC4-6F175D3DCCD1}">
-              <a14:hiddenFill xmlns:a14="http://schemas.microsoft.com/office/drawing/2010/main">
+              <a14:hiddenFill xmlns:a14="http://schemas.microsoft.com/office/drawing/2010/main" xmlns="">
                 <a:solidFill>
                   <a:srgbClr val="FFFFFF"/>
                 </a:solidFill>
               </a14:hiddenFill>
             </a:ext>
             <a:ext uri="{91240B29-F687-4F45-9708-019B960494DF}">
-              <a14:hiddenLine xmlns:a14="http://schemas.microsoft.com/office/drawing/2010/main" w="9525">
+              <a14:hiddenLine xmlns:a14="http://schemas.microsoft.com/office/drawing/2010/main" xmlns="" w="9525">
                 <a:solidFill>
                   <a:srgbClr val="000000"/>
                 </a:solidFill>
@@ -4769,7 +4687,7 @@
       </p:grpSpPr>
       <p:sp>
         <p:nvSpPr>
-          <p:cNvPr id="20482" name="Rectangle 2"/>
+          <p:cNvPr id="19458" name="Rectangle 2"/>
           <p:cNvSpPr>
             <a:spLocks noGrp="1" noChangeArrowheads="1"/>
           </p:cNvSpPr>
@@ -4783,15 +4701,24 @@
           <a:lstStyle/>
           <a:p>
             <a:r>
-              <a:rPr lang="en-GB" altLang="en-US"/>
-              <a:t>Opportunities</a:t>
-            </a:r>
+              <a:rPr lang="en-GB" altLang="en-US" dirty="0" err="1" smtClean="0"/>
+              <a:t>Qualidade</a:t>
+            </a:r>
+            <a:r>
+              <a:rPr lang="en-GB" altLang="en-US" dirty="0" smtClean="0"/>
+              <a:t> de </a:t>
+            </a:r>
+            <a:r>
+              <a:rPr lang="en-GB" altLang="en-US" dirty="0" err="1" smtClean="0"/>
+              <a:t>Processo</a:t>
+            </a:r>
+            <a:endParaRPr lang="en-GB" altLang="en-US" dirty="0"/>
           </a:p>
         </p:txBody>
       </p:sp>
       <p:sp>
         <p:nvSpPr>
-          <p:cNvPr id="20483" name="Rectangle 3"/>
+          <p:cNvPr id="19459" name="Rectangle 3"/>
           <p:cNvSpPr>
             <a:spLocks noGrp="1" noChangeArrowheads="1"/>
           </p:cNvSpPr>
@@ -4799,22 +4726,128 @@
             <p:ph type="body" idx="1"/>
           </p:nvPr>
         </p:nvSpPr>
-        <p:spPr/>
+        <p:spPr>
+          <a:xfrm>
+            <a:off x="1905000" y="1447800"/>
+            <a:ext cx="7239000" cy="4648200"/>
+          </a:xfrm>
+        </p:spPr>
         <p:txBody>
           <a:bodyPr/>
           <a:lstStyle/>
           <a:p>
             <a:r>
-              <a:rPr lang="en-GB" altLang="en-US"/>
-              <a:t>Identify problems and opportunities.</a:t>
-            </a:r>
-          </a:p>
-          <a:p>
-            <a:pPr lvl="1"/>
-            <a:r>
-              <a:rPr lang="en-GB" altLang="en-US"/>
-              <a:t>State consumer problems, and define the nature of product/service opportunities that are created by those problems.</a:t>
-            </a:r>
+              <a:rPr lang="en-GB" altLang="en-US" dirty="0" err="1" smtClean="0"/>
+              <a:t>Processo</a:t>
+            </a:r>
+            <a:endParaRPr lang="en-GB" altLang="en-US" dirty="0" smtClean="0"/>
+          </a:p>
+          <a:p>
+            <a:endParaRPr lang="en-GB" altLang="en-US" dirty="0" smtClean="0"/>
+          </a:p>
+          <a:p>
+            <a:pPr lvl="1">
+              <a:buNone/>
+            </a:pPr>
+            <a:r>
+              <a:rPr lang="en-GB" altLang="en-US" sz="5400" dirty="0" smtClean="0">
+                <a:latin typeface="Arial Black" pitchFamily="34" charset="0"/>
+                <a:cs typeface="Arial" pitchFamily="34" charset="0"/>
+              </a:rPr>
+              <a:t>“ </a:t>
+            </a:r>
+            <a:r>
+              <a:rPr lang="en-GB" altLang="en-US" i="1" dirty="0" smtClean="0">
+                <a:latin typeface="Times New Roman" pitchFamily="18" charset="0"/>
+                <a:cs typeface="Times New Roman" pitchFamily="18" charset="0"/>
+              </a:rPr>
+              <a:t>...</a:t>
+            </a:r>
+            <a:r>
+              <a:rPr lang="pt-BR" i="1" dirty="0" smtClean="0">
+                <a:latin typeface="Times New Roman" pitchFamily="18" charset="0"/>
+                <a:cs typeface="Times New Roman" pitchFamily="18" charset="0"/>
+              </a:rPr>
+              <a:t>um </a:t>
+            </a:r>
+            <a:r>
+              <a:rPr lang="pt-BR" i="1" dirty="0" smtClean="0">
+                <a:latin typeface="Times New Roman" pitchFamily="18" charset="0"/>
+                <a:cs typeface="Times New Roman" pitchFamily="18" charset="0"/>
+              </a:rPr>
+              <a:t>conjunto de atividades inter-relacionadas ou interativas que transformam entradas em saídas </a:t>
+            </a:r>
+            <a:r>
+              <a:rPr lang="pt-BR" i="1" dirty="0" smtClean="0">
+                <a:latin typeface="Times New Roman" pitchFamily="18" charset="0"/>
+                <a:cs typeface="Times New Roman" pitchFamily="18" charset="0"/>
+              </a:rPr>
+              <a:t>– ISO 9000</a:t>
+            </a:r>
+            <a:endParaRPr lang="pt-BR" altLang="en-US" i="1" dirty="0" smtClean="0">
+              <a:latin typeface="Times New Roman" pitchFamily="18" charset="0"/>
+              <a:cs typeface="Times New Roman" pitchFamily="18" charset="0"/>
+            </a:endParaRPr>
+          </a:p>
+          <a:p>
+            <a:pPr lvl="1">
+              <a:buNone/>
+            </a:pPr>
+            <a:endParaRPr lang="pt-BR" altLang="en-US" i="1" dirty="0" smtClean="0">
+              <a:latin typeface="Times New Roman" pitchFamily="18" charset="0"/>
+              <a:cs typeface="Times New Roman" pitchFamily="18" charset="0"/>
+            </a:endParaRPr>
+          </a:p>
+          <a:p>
+            <a:pPr lvl="1">
+              <a:buNone/>
+            </a:pPr>
+            <a:r>
+              <a:rPr lang="en-GB" altLang="en-US" sz="5400" dirty="0" smtClean="0">
+                <a:latin typeface="Arial Black" pitchFamily="34" charset="0"/>
+                <a:cs typeface="Arial" pitchFamily="34" charset="0"/>
+              </a:rPr>
+              <a:t>“ </a:t>
+            </a:r>
+            <a:r>
+              <a:rPr lang="pt-BR" i="1" dirty="0" smtClean="0">
+                <a:latin typeface="Times New Roman" pitchFamily="18" charset="0"/>
+                <a:cs typeface="Times New Roman" pitchFamily="18" charset="0"/>
+              </a:rPr>
+              <a:t>O </a:t>
+            </a:r>
+            <a:r>
+              <a:rPr lang="pt-BR" i="1" dirty="0" smtClean="0">
+                <a:latin typeface="Times New Roman" pitchFamily="18" charset="0"/>
+                <a:cs typeface="Times New Roman" pitchFamily="18" charset="0"/>
+              </a:rPr>
+              <a:t>processo de software é representado por um conjunto sequencial de atividades, objetivos, transformações e eventos que integram estratégias para cumprimento da evolução de </a:t>
+            </a:r>
+            <a:r>
+              <a:rPr lang="pt-BR" i="1" dirty="0" smtClean="0">
+                <a:latin typeface="Times New Roman" pitchFamily="18" charset="0"/>
+                <a:cs typeface="Times New Roman" pitchFamily="18" charset="0"/>
+              </a:rPr>
+              <a:t>software - PRESSMAN</a:t>
+            </a:r>
+            <a:r>
+              <a:rPr lang="pt-BR" i="1" dirty="0" smtClean="0">
+                <a:latin typeface="Times New Roman" pitchFamily="18" charset="0"/>
+                <a:cs typeface="Times New Roman" pitchFamily="18" charset="0"/>
+              </a:rPr>
+              <a:t>, </a:t>
+            </a:r>
+            <a:r>
+              <a:rPr lang="pt-BR" i="1" dirty="0" smtClean="0">
+                <a:latin typeface="Times New Roman" pitchFamily="18" charset="0"/>
+                <a:cs typeface="Times New Roman" pitchFamily="18" charset="0"/>
+              </a:rPr>
+              <a:t>1995. </a:t>
+            </a:r>
+            <a:endParaRPr lang="en-GB" altLang="en-US" i="1" dirty="0" smtClean="0">
+              <a:latin typeface="Times New Roman" pitchFamily="18" charset="0"/>
+              <a:cs typeface="Times New Roman" pitchFamily="18" charset="0"/>
+            </a:endParaRPr>
           </a:p>
         </p:txBody>
       </p:sp>
@@ -4852,7 +4885,7 @@
       </p:grpSpPr>
       <p:sp>
         <p:nvSpPr>
-          <p:cNvPr id="21506" name="Rectangle 2"/>
+          <p:cNvPr id="19458" name="Rectangle 2"/>
           <p:cNvSpPr>
             <a:spLocks noGrp="1" noChangeArrowheads="1"/>
           </p:cNvSpPr>
@@ -4866,15 +4899,24 @@
           <a:lstStyle/>
           <a:p>
             <a:r>
-              <a:rPr lang="en-GB" altLang="en-US"/>
-              <a:t>Business Concept</a:t>
-            </a:r>
+              <a:rPr lang="en-GB" altLang="en-US" dirty="0" err="1" smtClean="0"/>
+              <a:t>Qualidade</a:t>
+            </a:r>
+            <a:r>
+              <a:rPr lang="en-GB" altLang="en-US" dirty="0" smtClean="0"/>
+              <a:t> de </a:t>
+            </a:r>
+            <a:r>
+              <a:rPr lang="en-GB" altLang="en-US" dirty="0" err="1" smtClean="0"/>
+              <a:t>Processo</a:t>
+            </a:r>
+            <a:endParaRPr lang="en-GB" altLang="en-US" dirty="0"/>
           </a:p>
         </p:txBody>
       </p:sp>
       <p:sp>
         <p:nvSpPr>
-          <p:cNvPr id="21507" name="Rectangle 3"/>
+          <p:cNvPr id="19459" name="Rectangle 3"/>
           <p:cNvSpPr>
             <a:spLocks noGrp="1" noChangeArrowheads="1"/>
           </p:cNvSpPr>
@@ -4888,9 +4930,144 @@
           <a:lstStyle/>
           <a:p>
             <a:r>
-              <a:rPr lang="en-GB" altLang="en-US"/>
-              <a:t>Summarize the key technology, concept, or strategy on which your business is based.</a:t>
-            </a:r>
+              <a:rPr lang="en-GB" altLang="en-US" dirty="0" err="1" smtClean="0"/>
+              <a:t>Modelos</a:t>
+            </a:r>
+            <a:r>
+              <a:rPr lang="en-GB" altLang="en-US" dirty="0" smtClean="0"/>
+              <a:t> </a:t>
+            </a:r>
+            <a:r>
+              <a:rPr lang="en-GB" altLang="en-US" dirty="0" err="1" smtClean="0"/>
+              <a:t>para</a:t>
+            </a:r>
+            <a:r>
+              <a:rPr lang="en-GB" altLang="en-US" dirty="0" smtClean="0"/>
+              <a:t> </a:t>
+            </a:r>
+            <a:r>
+              <a:rPr lang="en-GB" altLang="en-US" dirty="0" err="1" smtClean="0"/>
+              <a:t>Qualidade</a:t>
+            </a:r>
+            <a:r>
+              <a:rPr lang="en-GB" altLang="en-US" dirty="0" smtClean="0"/>
+              <a:t> de Process</a:t>
+            </a:r>
+          </a:p>
+          <a:p>
+            <a:pPr lvl="1"/>
+            <a:r>
+              <a:rPr lang="en-GB" altLang="en-US" dirty="0" smtClean="0"/>
+              <a:t>ISO/IEC 15504-4</a:t>
+            </a:r>
+          </a:p>
+          <a:p>
+            <a:pPr lvl="1"/>
+            <a:r>
+              <a:rPr lang="en-GB" altLang="en-US" dirty="0" smtClean="0"/>
+              <a:t>CMMI </a:t>
+            </a:r>
+            <a:r>
+              <a:rPr lang="pt-BR" altLang="en-US" i="1" dirty="0" smtClean="0">
+                <a:latin typeface="Times New Roman" pitchFamily="18" charset="0"/>
+                <a:cs typeface="Times New Roman" pitchFamily="18" charset="0"/>
+              </a:rPr>
+              <a:t>(</a:t>
+            </a:r>
+            <a:r>
+              <a:rPr lang="pt-BR" altLang="en-US" i="1" dirty="0" err="1" smtClean="0">
+                <a:latin typeface="Times New Roman" pitchFamily="18" charset="0"/>
+                <a:cs typeface="Times New Roman" pitchFamily="18" charset="0"/>
+              </a:rPr>
+              <a:t>Cabability</a:t>
+            </a:r>
+            <a:r>
+              <a:rPr lang="pt-BR" altLang="en-US" i="1" dirty="0" smtClean="0">
+                <a:latin typeface="Times New Roman" pitchFamily="18" charset="0"/>
+                <a:cs typeface="Times New Roman" pitchFamily="18" charset="0"/>
+              </a:rPr>
+              <a:t> </a:t>
+            </a:r>
+            <a:r>
+              <a:rPr lang="pt-BR" altLang="en-US" i="1" dirty="0" err="1" smtClean="0">
+                <a:latin typeface="Times New Roman" pitchFamily="18" charset="0"/>
+                <a:cs typeface="Times New Roman" pitchFamily="18" charset="0"/>
+              </a:rPr>
+              <a:t>Maturity</a:t>
+            </a:r>
+            <a:r>
+              <a:rPr lang="pt-BR" altLang="en-US" i="1" dirty="0" smtClean="0">
+                <a:latin typeface="Times New Roman" pitchFamily="18" charset="0"/>
+                <a:cs typeface="Times New Roman" pitchFamily="18" charset="0"/>
+              </a:rPr>
+              <a:t> </a:t>
+            </a:r>
+            <a:r>
+              <a:rPr lang="pt-BR" altLang="en-US" i="1" dirty="0" err="1" smtClean="0">
+                <a:latin typeface="Times New Roman" pitchFamily="18" charset="0"/>
+                <a:cs typeface="Times New Roman" pitchFamily="18" charset="0"/>
+              </a:rPr>
+              <a:t>Model</a:t>
+            </a:r>
+            <a:r>
+              <a:rPr lang="pt-BR" altLang="en-US" i="1" dirty="0" smtClean="0">
+                <a:latin typeface="Times New Roman" pitchFamily="18" charset="0"/>
+                <a:cs typeface="Times New Roman" pitchFamily="18" charset="0"/>
+              </a:rPr>
+              <a:t> </a:t>
+            </a:r>
+            <a:r>
+              <a:rPr lang="pt-BR" altLang="en-US" i="1" dirty="0" err="1" smtClean="0">
+                <a:latin typeface="Times New Roman" pitchFamily="18" charset="0"/>
+                <a:cs typeface="Times New Roman" pitchFamily="18" charset="0"/>
+              </a:rPr>
+              <a:t>Integration</a:t>
+            </a:r>
+            <a:r>
+              <a:rPr lang="pt-BR" altLang="en-US" i="1" dirty="0" smtClean="0">
+                <a:latin typeface="Times New Roman" pitchFamily="18" charset="0"/>
+                <a:cs typeface="Times New Roman" pitchFamily="18" charset="0"/>
+              </a:rPr>
+              <a:t>)</a:t>
+            </a:r>
+          </a:p>
+          <a:p>
+            <a:pPr lvl="1"/>
+            <a:r>
+              <a:rPr lang="pt-BR" altLang="en-US" i="1" dirty="0" smtClean="0">
+                <a:latin typeface="Times New Roman" pitchFamily="18" charset="0"/>
+                <a:cs typeface="Times New Roman" pitchFamily="18" charset="0"/>
+              </a:rPr>
+              <a:t> </a:t>
+            </a:r>
+            <a:r>
+              <a:rPr lang="en-GB" altLang="en-US" dirty="0" smtClean="0"/>
+              <a:t>MPS.BR – </a:t>
+            </a:r>
+            <a:r>
+              <a:rPr lang="en-GB" altLang="en-US" dirty="0" err="1" smtClean="0"/>
+              <a:t>Melhoria</a:t>
+            </a:r>
+            <a:r>
+              <a:rPr lang="en-GB" altLang="en-US" dirty="0" smtClean="0"/>
+              <a:t> de </a:t>
+            </a:r>
+            <a:r>
+              <a:rPr lang="en-GB" altLang="en-US" dirty="0" err="1" smtClean="0"/>
+              <a:t>Processo</a:t>
+            </a:r>
+            <a:r>
+              <a:rPr lang="en-GB" altLang="en-US" dirty="0" smtClean="0"/>
+              <a:t> do Software </a:t>
+            </a:r>
+            <a:r>
+              <a:rPr lang="en-GB" altLang="en-US" dirty="0" err="1" smtClean="0"/>
+              <a:t>Brasileiro</a:t>
+            </a:r>
+            <a:endParaRPr lang="en-GB" altLang="en-US" dirty="0" smtClean="0"/>
+          </a:p>
+          <a:p>
+            <a:endParaRPr lang="en-GB" altLang="en-US" dirty="0" smtClean="0"/>
           </a:p>
         </p:txBody>
       </p:sp>
@@ -4928,7 +5105,7 @@
       </p:grpSpPr>
       <p:sp>
         <p:nvSpPr>
-          <p:cNvPr id="22530" name="Rectangle 2"/>
+          <p:cNvPr id="19458" name="Rectangle 2"/>
           <p:cNvSpPr>
             <a:spLocks noGrp="1" noChangeArrowheads="1"/>
           </p:cNvSpPr>
@@ -4942,15 +5119,20 @@
           <a:lstStyle/>
           <a:p>
             <a:r>
-              <a:rPr lang="en-GB" altLang="en-US"/>
-              <a:t>Competition</a:t>
-            </a:r>
+              <a:rPr lang="en-GB" altLang="en-US" dirty="0" err="1" smtClean="0"/>
+              <a:t>Qualidade</a:t>
+            </a:r>
+            <a:r>
+              <a:rPr lang="en-GB" altLang="en-US" dirty="0" smtClean="0"/>
+              <a:t> - PMBOK</a:t>
+            </a:r>
+            <a:endParaRPr lang="en-GB" altLang="en-US" dirty="0"/>
           </a:p>
         </p:txBody>
       </p:sp>
       <p:sp>
         <p:nvSpPr>
-          <p:cNvPr id="22531" name="Rectangle 3"/>
+          <p:cNvPr id="19459" name="Rectangle 3"/>
           <p:cNvSpPr>
             <a:spLocks noGrp="1" noChangeArrowheads="1"/>
           </p:cNvSpPr>
@@ -4964,15 +5146,64 @@
           <a:lstStyle/>
           <a:p>
             <a:r>
-              <a:rPr lang="en-GB" altLang="en-US"/>
-              <a:t>Summarize the competition.</a:t>
-            </a:r>
-          </a:p>
-          <a:p>
-            <a:r>
-              <a:rPr lang="en-GB" altLang="en-US"/>
-              <a:t>Outline your company’s competitive advantage.</a:t>
-            </a:r>
+              <a:rPr lang="en-GB" altLang="en-US" dirty="0" err="1" smtClean="0"/>
+              <a:t>Pilares</a:t>
+            </a:r>
+            <a:r>
+              <a:rPr lang="en-GB" altLang="en-US" dirty="0" smtClean="0"/>
+              <a:t> </a:t>
+            </a:r>
+            <a:r>
+              <a:rPr lang="en-GB" altLang="en-US" dirty="0" err="1" smtClean="0"/>
+              <a:t>da</a:t>
+            </a:r>
+            <a:r>
+              <a:rPr lang="en-GB" altLang="en-US" dirty="0" smtClean="0"/>
+              <a:t> </a:t>
+            </a:r>
+            <a:r>
+              <a:rPr lang="en-GB" altLang="en-US" dirty="0" err="1" smtClean="0"/>
+              <a:t>Qualidade</a:t>
+            </a:r>
+            <a:r>
+              <a:rPr lang="en-GB" altLang="en-US" dirty="0" smtClean="0"/>
+              <a:t> de Software</a:t>
+            </a:r>
+          </a:p>
+          <a:p>
+            <a:pPr lvl="1"/>
+            <a:r>
+              <a:rPr lang="en-GB" altLang="en-US" dirty="0" smtClean="0"/>
+              <a:t>Plan</a:t>
+            </a:r>
+          </a:p>
+          <a:p>
+            <a:pPr lvl="1"/>
+            <a:r>
+              <a:rPr lang="pt-BR" altLang="en-US" dirty="0" smtClean="0"/>
+              <a:t>Control</a:t>
+            </a:r>
+            <a:endParaRPr lang="pt-BR" altLang="en-US" i="1" dirty="0" smtClean="0">
+              <a:latin typeface="Times New Roman" pitchFamily="18" charset="0"/>
+              <a:cs typeface="Times New Roman" pitchFamily="18" charset="0"/>
+            </a:endParaRPr>
+          </a:p>
+          <a:p>
+            <a:pPr lvl="1"/>
+            <a:r>
+              <a:rPr lang="pt-BR" altLang="en-US" i="1" dirty="0" smtClean="0">
+                <a:latin typeface="Times New Roman" pitchFamily="18" charset="0"/>
+                <a:cs typeface="Times New Roman" pitchFamily="18" charset="0"/>
+              </a:rPr>
+              <a:t> </a:t>
+            </a:r>
+            <a:r>
+              <a:rPr lang="en-GB" altLang="en-US" dirty="0" smtClean="0"/>
+              <a:t>Assurance</a:t>
+            </a:r>
+          </a:p>
+          <a:p>
+            <a:endParaRPr lang="en-GB" altLang="en-US" dirty="0" smtClean="0"/>
           </a:p>
         </p:txBody>
       </p:sp>
@@ -5010,7 +5241,7 @@
       </p:grpSpPr>
       <p:sp>
         <p:nvSpPr>
-          <p:cNvPr id="23554" name="Rectangle 2"/>
+          <p:cNvPr id="19458" name="Rectangle 2"/>
           <p:cNvSpPr>
             <a:spLocks noGrp="1" noChangeArrowheads="1"/>
           </p:cNvSpPr>
@@ -5024,15 +5255,32 @@
           <a:lstStyle/>
           <a:p>
             <a:r>
-              <a:rPr lang="en-GB" altLang="en-US"/>
-              <a:t>Goals and Objectives</a:t>
-            </a:r>
+              <a:rPr lang="en-GB" altLang="en-US" dirty="0" err="1" smtClean="0"/>
+              <a:t>Garantia</a:t>
+            </a:r>
+            <a:r>
+              <a:rPr lang="en-GB" altLang="en-US" dirty="0" smtClean="0"/>
+              <a:t> </a:t>
+            </a:r>
+            <a:r>
+              <a:rPr lang="en-GB" altLang="en-US" dirty="0" err="1" smtClean="0"/>
+              <a:t>da</a:t>
+            </a:r>
+            <a:r>
+              <a:rPr lang="en-GB" altLang="en-US" dirty="0" smtClean="0"/>
+              <a:t> </a:t>
+            </a:r>
+            <a:r>
+              <a:rPr lang="en-GB" altLang="en-US" dirty="0" err="1" smtClean="0"/>
+              <a:t>qualidade</a:t>
+            </a:r>
+            <a:endParaRPr lang="en-GB" altLang="en-US" dirty="0"/>
           </a:p>
         </p:txBody>
       </p:sp>
       <p:sp>
         <p:nvSpPr>
-          <p:cNvPr id="23555" name="Rectangle 3"/>
+          <p:cNvPr id="19459" name="Rectangle 3"/>
           <p:cNvSpPr>
             <a:spLocks noGrp="1" noChangeArrowheads="1"/>
           </p:cNvSpPr>
@@ -5046,29 +5294,168 @@
           <a:lstStyle/>
           <a:p>
             <a:r>
-              <a:rPr lang="en-GB" altLang="en-US"/>
-              <a:t>List five-year goals.</a:t>
-            </a:r>
-          </a:p>
-          <a:p>
-            <a:r>
-              <a:rPr lang="en-GB" altLang="en-US"/>
-              <a:t>State specific, measurable objectives for achieving your five-year goals.</a:t>
-            </a:r>
+              <a:rPr lang="en-GB" altLang="en-US" dirty="0" smtClean="0"/>
+              <a:t>O </a:t>
+            </a:r>
+            <a:r>
+              <a:rPr lang="en-GB" altLang="en-US" dirty="0" err="1" smtClean="0"/>
+              <a:t>quê</a:t>
+            </a:r>
+            <a:r>
+              <a:rPr lang="en-GB" altLang="en-US" dirty="0" smtClean="0"/>
+              <a:t> se </a:t>
+            </a:r>
+            <a:r>
+              <a:rPr lang="en-GB" altLang="en-US" dirty="0" err="1" smtClean="0"/>
+              <a:t>busca</a:t>
+            </a:r>
+            <a:r>
+              <a:rPr lang="en-GB" altLang="en-US" dirty="0" smtClean="0"/>
+              <a:t> </a:t>
+            </a:r>
+            <a:r>
+              <a:rPr lang="en-GB" altLang="en-US" dirty="0" smtClean="0"/>
+              <a:t>com a </a:t>
+            </a:r>
+            <a:r>
+              <a:rPr lang="en-GB" altLang="en-US" dirty="0" err="1" smtClean="0"/>
+              <a:t>garantia</a:t>
+            </a:r>
+            <a:r>
+              <a:rPr lang="en-GB" altLang="en-US" dirty="0" smtClean="0"/>
+              <a:t> </a:t>
+            </a:r>
+            <a:r>
+              <a:rPr lang="en-GB" altLang="en-US" dirty="0" err="1" smtClean="0"/>
+              <a:t>da</a:t>
+            </a:r>
+            <a:r>
+              <a:rPr lang="en-GB" altLang="en-US" dirty="0" smtClean="0"/>
+              <a:t> </a:t>
+            </a:r>
+            <a:r>
+              <a:rPr lang="en-GB" altLang="en-US" dirty="0" err="1" smtClean="0"/>
+              <a:t>qualidade</a:t>
+            </a:r>
+            <a:r>
+              <a:rPr lang="en-GB" altLang="en-US" dirty="0" smtClean="0"/>
+              <a:t>?</a:t>
+            </a:r>
+            <a:endParaRPr lang="en-GB" altLang="en-US" dirty="0"/>
           </a:p>
           <a:p>
             <a:pPr lvl="1"/>
             <a:r>
-              <a:rPr lang="en-GB" altLang="en-US"/>
-              <a:t>List market-share objectives.</a:t>
+              <a:rPr lang="en-GB" altLang="en-US" dirty="0" err="1" smtClean="0"/>
+              <a:t>Processos</a:t>
+            </a:r>
+            <a:r>
+              <a:rPr lang="en-GB" altLang="en-US" dirty="0" smtClean="0"/>
+              <a:t> de </a:t>
+            </a:r>
+            <a:r>
+              <a:rPr lang="en-GB" altLang="en-US" dirty="0" err="1" smtClean="0"/>
+              <a:t>qualidade</a:t>
+            </a:r>
+            <a:r>
+              <a:rPr lang="en-GB" altLang="en-US" dirty="0" smtClean="0"/>
+              <a:t> com o </a:t>
+            </a:r>
+            <a:r>
+              <a:rPr lang="en-GB" altLang="en-US" dirty="0" err="1" smtClean="0"/>
+              <a:t>intuito</a:t>
+            </a:r>
+            <a:r>
+              <a:rPr lang="en-GB" altLang="en-US" dirty="0" smtClean="0"/>
+              <a:t> de </a:t>
+            </a:r>
+            <a:r>
+              <a:rPr lang="en-GB" altLang="en-US" dirty="0" err="1" smtClean="0"/>
+              <a:t>obter</a:t>
+            </a:r>
+            <a:r>
+              <a:rPr lang="en-GB" altLang="en-US" dirty="0" smtClean="0"/>
+              <a:t> um </a:t>
+            </a:r>
+            <a:r>
+              <a:rPr lang="en-GB" altLang="en-US" dirty="0" err="1" smtClean="0"/>
+              <a:t>produto</a:t>
+            </a:r>
+            <a:r>
+              <a:rPr lang="en-GB" altLang="en-US" dirty="0" smtClean="0"/>
+              <a:t> de </a:t>
+            </a:r>
+            <a:r>
+              <a:rPr lang="en-GB" altLang="en-US" dirty="0" err="1" smtClean="0"/>
+              <a:t>trabalho</a:t>
+            </a:r>
+            <a:r>
+              <a:rPr lang="en-GB" altLang="en-US" dirty="0" smtClean="0"/>
+              <a:t> com </a:t>
+            </a:r>
+            <a:r>
+              <a:rPr lang="en-GB" altLang="en-US" dirty="0" err="1" smtClean="0"/>
+              <a:t>qualidade</a:t>
+            </a:r>
+            <a:r>
+              <a:rPr lang="en-GB" altLang="en-US" dirty="0" smtClean="0"/>
+              <a:t>.</a:t>
             </a:r>
           </a:p>
           <a:p>
             <a:pPr lvl="1"/>
             <a:r>
-              <a:rPr lang="en-GB" altLang="en-US"/>
-              <a:t>List revenue/profitability objectives.</a:t>
-            </a:r>
+              <a:rPr lang="en-GB" altLang="en-US" dirty="0" err="1" smtClean="0"/>
+              <a:t>Modelos</a:t>
+            </a:r>
+            <a:r>
+              <a:rPr lang="en-GB" altLang="en-US" dirty="0" smtClean="0"/>
+              <a:t> de </a:t>
+            </a:r>
+            <a:r>
+              <a:rPr lang="en-GB" altLang="en-US" dirty="0" err="1" smtClean="0"/>
+              <a:t>Qualidade</a:t>
+            </a:r>
+            <a:endParaRPr lang="en-GB" altLang="en-US" dirty="0" smtClean="0"/>
+          </a:p>
+          <a:p>
+            <a:pPr lvl="2"/>
+            <a:r>
+              <a:rPr lang="en-GB" altLang="en-US" dirty="0" err="1" smtClean="0"/>
+              <a:t>Produto</a:t>
+            </a:r>
+            <a:endParaRPr lang="en-GB" altLang="en-US" dirty="0" smtClean="0"/>
+          </a:p>
+          <a:p>
+            <a:pPr lvl="3"/>
+            <a:r>
+              <a:rPr lang="en-GB" altLang="en-US" dirty="0" smtClean="0"/>
+              <a:t>ISO/IEC 25010 (9126)</a:t>
+            </a:r>
+          </a:p>
+          <a:p>
+            <a:pPr lvl="2"/>
+            <a:r>
+              <a:rPr lang="en-GB" altLang="en-US" dirty="0" err="1" smtClean="0"/>
+              <a:t>Processo</a:t>
+            </a:r>
+            <a:endParaRPr lang="en-GB" altLang="en-US" dirty="0" smtClean="0"/>
+          </a:p>
+          <a:p>
+            <a:pPr lvl="3"/>
+            <a:r>
+              <a:rPr lang="en-GB" altLang="en-US" dirty="0" smtClean="0"/>
+              <a:t>CMMI, ISO/IEC 15504, MPS.BR entre </a:t>
+            </a:r>
+            <a:r>
+              <a:rPr lang="en-GB" altLang="en-US" dirty="0" err="1" smtClean="0"/>
+              <a:t>outros</a:t>
+            </a:r>
+            <a:r>
+              <a:rPr lang="en-GB" altLang="en-US" dirty="0" smtClean="0"/>
+              <a:t>.</a:t>
+            </a:r>
+            <a:endParaRPr lang="en-GB" altLang="en-US" dirty="0"/>
           </a:p>
         </p:txBody>
       </p:sp>
@@ -5106,7 +5493,7 @@
       </p:grpSpPr>
       <p:sp>
         <p:nvSpPr>
-          <p:cNvPr id="24578" name="Rectangle 2"/>
+          <p:cNvPr id="19458" name="Rectangle 2"/>
           <p:cNvSpPr>
             <a:spLocks noGrp="1" noChangeArrowheads="1"/>
           </p:cNvSpPr>
@@ -5120,15 +5507,16 @@
           <a:lstStyle/>
           <a:p>
             <a:r>
-              <a:rPr lang="en-GB" altLang="en-US"/>
-              <a:t>Financial Plan</a:t>
-            </a:r>
+              <a:rPr lang="en-GB" altLang="en-US" dirty="0" smtClean="0"/>
+              <a:t>CMMI</a:t>
+            </a:r>
+            <a:endParaRPr lang="en-GB" altLang="en-US" dirty="0"/>
           </a:p>
         </p:txBody>
       </p:sp>
       <p:sp>
         <p:nvSpPr>
-          <p:cNvPr id="24579" name="Rectangle 3"/>
+          <p:cNvPr id="19459" name="Rectangle 3"/>
           <p:cNvSpPr>
             <a:spLocks noGrp="1" noChangeArrowheads="1"/>
           </p:cNvSpPr>
@@ -5136,29 +5524,298 @@
             <p:ph type="body" idx="1"/>
           </p:nvPr>
         </p:nvSpPr>
-        <p:spPr/>
+        <p:spPr>
+          <a:xfrm>
+            <a:off x="1905000" y="1447800"/>
+            <a:ext cx="7239000" cy="5077544"/>
+          </a:xfrm>
+        </p:spPr>
         <p:txBody>
           <a:bodyPr/>
           <a:lstStyle/>
           <a:p>
             <a:r>
-              <a:rPr lang="en-GB" altLang="en-US"/>
-              <a:t>Outline a high-level financial plan that defines your financial model and pricing assumptions. </a:t>
+              <a:rPr lang="en-GB" altLang="en-US" dirty="0" smtClean="0"/>
+              <a:t>CMM </a:t>
+            </a:r>
+            <a:r>
+              <a:rPr lang="en-GB" altLang="en-US" i="1" dirty="0" smtClean="0">
+                <a:latin typeface="Times New Roman" pitchFamily="18" charset="0"/>
+                <a:cs typeface="Times New Roman" pitchFamily="18" charset="0"/>
+              </a:rPr>
+              <a:t>(Capability Maturity Model)</a:t>
             </a:r>
           </a:p>
           <a:p>
             <a:pPr lvl="1"/>
             <a:r>
-              <a:rPr lang="en-GB" altLang="en-US"/>
-              <a:t>This plan should include expected annual sales and profits for the next three years.</a:t>
-            </a:r>
+              <a:rPr lang="en-GB" altLang="en-US" dirty="0" err="1" smtClean="0">
+                <a:cs typeface="Arial" pitchFamily="34" charset="0"/>
+              </a:rPr>
+              <a:t>Desenvolvido</a:t>
+            </a:r>
+            <a:r>
+              <a:rPr lang="en-GB" altLang="en-US" dirty="0" smtClean="0">
+                <a:cs typeface="Arial" pitchFamily="34" charset="0"/>
+              </a:rPr>
+              <a:t> </a:t>
+            </a:r>
+            <a:r>
+              <a:rPr lang="en-GB" altLang="en-US" dirty="0" err="1" smtClean="0">
+                <a:cs typeface="Arial" pitchFamily="34" charset="0"/>
+              </a:rPr>
+              <a:t>pelo</a:t>
+            </a:r>
+            <a:r>
+              <a:rPr lang="en-GB" altLang="en-US" dirty="0" smtClean="0">
+                <a:cs typeface="Arial" pitchFamily="34" charset="0"/>
+              </a:rPr>
+              <a:t> SEI </a:t>
+            </a:r>
+            <a:r>
+              <a:rPr lang="en-GB" altLang="en-US" i="1" dirty="0" smtClean="0">
+                <a:latin typeface="Times New Roman" pitchFamily="18" charset="0"/>
+                <a:cs typeface="Times New Roman" pitchFamily="18" charset="0"/>
+              </a:rPr>
+              <a:t>(Software Engineering Institute)</a:t>
+            </a:r>
+          </a:p>
+          <a:p>
+            <a:pPr lvl="2"/>
+            <a:r>
+              <a:rPr lang="en-GB" altLang="en-US" dirty="0" err="1" smtClean="0">
+                <a:cs typeface="Arial" pitchFamily="34" charset="0"/>
+              </a:rPr>
+              <a:t>Universidade</a:t>
+            </a:r>
+            <a:r>
+              <a:rPr lang="en-GB" altLang="en-US" dirty="0" smtClean="0">
+                <a:cs typeface="Arial" pitchFamily="34" charset="0"/>
+              </a:rPr>
+              <a:t> Carnegie Mellon.</a:t>
+            </a:r>
+          </a:p>
+          <a:p>
+            <a:pPr lvl="2"/>
+            <a:r>
+              <a:rPr lang="en-GB" altLang="en-US" dirty="0" err="1" smtClean="0">
+                <a:cs typeface="Arial" pitchFamily="34" charset="0"/>
+              </a:rPr>
+              <a:t>Departamento</a:t>
+            </a:r>
+            <a:r>
+              <a:rPr lang="en-GB" altLang="en-US" dirty="0" smtClean="0">
+                <a:cs typeface="Arial" pitchFamily="34" charset="0"/>
+              </a:rPr>
+              <a:t> de </a:t>
+            </a:r>
+            <a:r>
+              <a:rPr lang="en-GB" altLang="en-US" dirty="0" err="1" smtClean="0">
+                <a:cs typeface="Arial" pitchFamily="34" charset="0"/>
+              </a:rPr>
+              <a:t>Defesa</a:t>
+            </a:r>
+            <a:r>
+              <a:rPr lang="en-GB" altLang="en-US" dirty="0" smtClean="0">
+                <a:cs typeface="Arial" pitchFamily="34" charset="0"/>
+              </a:rPr>
+              <a:t> dos EUA.</a:t>
+            </a:r>
+          </a:p>
+          <a:p>
+            <a:pPr lvl="2"/>
+            <a:r>
+              <a:rPr lang="en-GB" altLang="en-US" dirty="0" err="1" smtClean="0">
+                <a:cs typeface="Arial" pitchFamily="34" charset="0"/>
+              </a:rPr>
+              <a:t>Versão</a:t>
+            </a:r>
+            <a:r>
+              <a:rPr lang="en-GB" altLang="en-US" dirty="0" smtClean="0">
+                <a:cs typeface="Arial" pitchFamily="34" charset="0"/>
+              </a:rPr>
+              <a:t> 1.1 - 1993</a:t>
+            </a:r>
+          </a:p>
+          <a:p>
+            <a:r>
+              <a:rPr lang="en-GB" altLang="en-US" dirty="0" smtClean="0"/>
+              <a:t>CMMI </a:t>
+            </a:r>
+            <a:r>
+              <a:rPr lang="en-GB" altLang="en-US" i="1" dirty="0" smtClean="0">
+                <a:latin typeface="Times New Roman" pitchFamily="18" charset="0"/>
+                <a:cs typeface="Times New Roman" pitchFamily="18" charset="0"/>
+              </a:rPr>
+              <a:t>(Capability Maturity </a:t>
+            </a:r>
+            <a:r>
+              <a:rPr lang="en-GB" altLang="en-US" i="1" dirty="0" smtClean="0">
+                <a:latin typeface="Times New Roman" pitchFamily="18" charset="0"/>
+                <a:cs typeface="Times New Roman" pitchFamily="18" charset="0"/>
+              </a:rPr>
+              <a:t>Model Integration) </a:t>
+            </a:r>
+            <a:r>
+              <a:rPr lang="en-GB" altLang="en-US" dirty="0" smtClean="0">
+                <a:latin typeface="Arial" pitchFamily="34" charset="0"/>
+                <a:cs typeface="Arial" pitchFamily="34" charset="0"/>
+              </a:rPr>
+              <a:t>dos </a:t>
+            </a:r>
+            <a:r>
+              <a:rPr lang="en-GB" altLang="en-US" dirty="0" err="1" smtClean="0">
+                <a:latin typeface="Arial" pitchFamily="34" charset="0"/>
+                <a:cs typeface="Arial" pitchFamily="34" charset="0"/>
+              </a:rPr>
+              <a:t>modelos</a:t>
+            </a:r>
+            <a:r>
+              <a:rPr lang="en-GB" altLang="en-US" dirty="0" smtClean="0">
+                <a:latin typeface="Arial" pitchFamily="34" charset="0"/>
+                <a:cs typeface="Arial" pitchFamily="34" charset="0"/>
+              </a:rPr>
+              <a:t>:</a:t>
+            </a:r>
+            <a:endParaRPr lang="en-GB" altLang="en-US" i="1" dirty="0" smtClean="0">
+              <a:latin typeface="Times New Roman" pitchFamily="18" charset="0"/>
+              <a:cs typeface="Times New Roman" pitchFamily="18" charset="0"/>
+            </a:endParaRPr>
           </a:p>
           <a:p>
             <a:pPr lvl="1"/>
             <a:r>
-              <a:rPr lang="en-GB" altLang="en-US"/>
-              <a:t>Use several slides to cover this material appropriately.</a:t>
-            </a:r>
+              <a:rPr lang="en-US" sz="1600" dirty="0" smtClean="0"/>
+              <a:t>SW-CMM V2C - </a:t>
+            </a:r>
+            <a:r>
+              <a:rPr lang="en-US" sz="1600" i="1" dirty="0" smtClean="0">
+                <a:latin typeface="Times New Roman" pitchFamily="18" charset="0"/>
+                <a:cs typeface="Times New Roman" pitchFamily="18" charset="0"/>
+              </a:rPr>
+              <a:t>Capability Maturity Model for Software V2.0</a:t>
+            </a:r>
+          </a:p>
+          <a:p>
+            <a:pPr lvl="1"/>
+            <a:r>
+              <a:rPr lang="pt-BR" sz="1600" dirty="0" smtClean="0"/>
+              <a:t>SECM </a:t>
+            </a:r>
+            <a:r>
+              <a:rPr lang="pt-BR" sz="1600" dirty="0" smtClean="0"/>
+              <a:t>- </a:t>
+            </a:r>
+            <a:r>
+              <a:rPr lang="pt-BR" sz="1600" i="1" dirty="0" smtClean="0">
+                <a:latin typeface="Times New Roman" pitchFamily="18" charset="0"/>
+                <a:cs typeface="Times New Roman" pitchFamily="18" charset="0"/>
+              </a:rPr>
+              <a:t>EIA </a:t>
+            </a:r>
+            <a:r>
+              <a:rPr lang="pt-BR" sz="1600" i="1" dirty="0" err="1" smtClean="0">
+                <a:latin typeface="Times New Roman" pitchFamily="18" charset="0"/>
+                <a:cs typeface="Times New Roman" pitchFamily="18" charset="0"/>
+              </a:rPr>
+              <a:t>Interim</a:t>
+            </a:r>
+            <a:r>
+              <a:rPr lang="pt-BR" sz="1600" i="1" dirty="0" smtClean="0">
+                <a:latin typeface="Times New Roman" pitchFamily="18" charset="0"/>
+                <a:cs typeface="Times New Roman" pitchFamily="18" charset="0"/>
+              </a:rPr>
+              <a:t> Standard 731 – System </a:t>
+            </a:r>
+            <a:r>
+              <a:rPr lang="pt-BR" sz="1600" i="1" dirty="0" err="1" smtClean="0">
+                <a:latin typeface="Times New Roman" pitchFamily="18" charset="0"/>
+                <a:cs typeface="Times New Roman" pitchFamily="18" charset="0"/>
+              </a:rPr>
+              <a:t>Engineering</a:t>
+            </a:r>
+            <a:r>
+              <a:rPr lang="pt-BR" sz="1600" i="1" dirty="0" smtClean="0">
+                <a:latin typeface="Times New Roman" pitchFamily="18" charset="0"/>
+                <a:cs typeface="Times New Roman" pitchFamily="18" charset="0"/>
+              </a:rPr>
+              <a:t> </a:t>
+            </a:r>
+            <a:r>
+              <a:rPr lang="pt-BR" sz="1600" i="1" dirty="0" err="1" smtClean="0">
+                <a:latin typeface="Times New Roman" pitchFamily="18" charset="0"/>
+                <a:cs typeface="Times New Roman" pitchFamily="18" charset="0"/>
+              </a:rPr>
+              <a:t>Capability</a:t>
+            </a:r>
+            <a:r>
+              <a:rPr lang="pt-BR" sz="1600" i="1" dirty="0" smtClean="0">
+                <a:latin typeface="Times New Roman" pitchFamily="18" charset="0"/>
+                <a:cs typeface="Times New Roman" pitchFamily="18" charset="0"/>
+              </a:rPr>
+              <a:t> </a:t>
+            </a:r>
+            <a:r>
+              <a:rPr lang="pt-BR" sz="1600" i="1" dirty="0" err="1" smtClean="0">
+                <a:latin typeface="Times New Roman" pitchFamily="18" charset="0"/>
+                <a:cs typeface="Times New Roman" pitchFamily="18" charset="0"/>
+              </a:rPr>
+              <a:t>Model</a:t>
+            </a:r>
+            <a:r>
+              <a:rPr lang="pt-BR" sz="1600" i="1" dirty="0" smtClean="0">
+                <a:latin typeface="Times New Roman" pitchFamily="18" charset="0"/>
+                <a:cs typeface="Times New Roman" pitchFamily="18" charset="0"/>
+              </a:rPr>
+              <a:t>. </a:t>
+            </a:r>
+          </a:p>
+          <a:p>
+            <a:pPr lvl="1"/>
+            <a:r>
+              <a:rPr lang="en-US" sz="1600" dirty="0" smtClean="0"/>
+              <a:t>IPD-CMM </a:t>
+            </a:r>
+            <a:r>
+              <a:rPr lang="en-US" sz="1600" dirty="0" smtClean="0"/>
+              <a:t>- </a:t>
+            </a:r>
+            <a:r>
+              <a:rPr lang="en-US" sz="1600" i="1" dirty="0" smtClean="0">
+                <a:latin typeface="Times New Roman" pitchFamily="18" charset="0"/>
+                <a:cs typeface="Times New Roman" pitchFamily="18" charset="0"/>
+              </a:rPr>
+              <a:t>Integrated Product Development Capability Maturity </a:t>
+            </a:r>
+            <a:r>
+              <a:rPr lang="en-US" sz="1600" i="1" dirty="0" smtClean="0">
+                <a:latin typeface="Times New Roman" pitchFamily="18" charset="0"/>
+                <a:cs typeface="Times New Roman" pitchFamily="18" charset="0"/>
+              </a:rPr>
+              <a:t>Model</a:t>
+            </a:r>
+            <a:endParaRPr lang="en-US" sz="1600" b="1" dirty="0" smtClean="0">
+              <a:latin typeface="Arial" pitchFamily="34" charset="0"/>
+              <a:cs typeface="Arial" pitchFamily="34" charset="0"/>
+            </a:endParaRPr>
+          </a:p>
+          <a:p>
+            <a:pPr lvl="1"/>
+            <a:r>
+              <a:rPr lang="en-US" altLang="en-US" sz="1600" b="1" dirty="0" err="1" smtClean="0">
+                <a:cs typeface="Arial" pitchFamily="34" charset="0"/>
+              </a:rPr>
+              <a:t>Compatibilidade</a:t>
+            </a:r>
+            <a:r>
+              <a:rPr lang="en-US" altLang="en-US" sz="1600" b="1" dirty="0" smtClean="0">
+                <a:cs typeface="Arial" pitchFamily="34" charset="0"/>
+              </a:rPr>
+              <a:t> com ISO/IEC 15504</a:t>
+            </a:r>
+            <a:endParaRPr lang="en-GB" altLang="en-US" sz="1600" b="1" dirty="0" smtClean="0">
+              <a:cs typeface="Arial" pitchFamily="34" charset="0"/>
+            </a:endParaRPr>
           </a:p>
         </p:txBody>
       </p:sp>
@@ -5196,7 +5853,7 @@
       </p:grpSpPr>
       <p:sp>
         <p:nvSpPr>
-          <p:cNvPr id="25602" name="Rectangle 2"/>
+          <p:cNvPr id="19458" name="Rectangle 2"/>
           <p:cNvSpPr>
             <a:spLocks noGrp="1" noChangeArrowheads="1"/>
           </p:cNvSpPr>
@@ -5210,15 +5867,16 @@
           <a:lstStyle/>
           <a:p>
             <a:r>
-              <a:rPr lang="en-GB" altLang="en-US"/>
-              <a:t>Resource Requirements</a:t>
-            </a:r>
+              <a:rPr lang="en-GB" altLang="en-US" dirty="0" smtClean="0"/>
+              <a:t>CMMI</a:t>
+            </a:r>
+            <a:endParaRPr lang="en-GB" altLang="en-US" dirty="0"/>
           </a:p>
         </p:txBody>
       </p:sp>
       <p:sp>
         <p:nvSpPr>
-          <p:cNvPr id="25603" name="Rectangle 3"/>
+          <p:cNvPr id="19459" name="Rectangle 3"/>
           <p:cNvSpPr>
             <a:spLocks noGrp="1" noChangeArrowheads="1"/>
           </p:cNvSpPr>
@@ -5232,58 +5890,268 @@
           <a:lstStyle/>
           <a:p>
             <a:r>
-              <a:rPr lang="en-GB" altLang="en-US"/>
-              <a:t>List requirements for the following resources:</a:t>
-            </a:r>
+              <a:rPr lang="en-GB" altLang="en-US" dirty="0" smtClean="0"/>
+              <a:t>CMMI </a:t>
+            </a:r>
+            <a:r>
+              <a:rPr lang="en-GB" altLang="en-US" dirty="0" err="1" smtClean="0"/>
+              <a:t>versão</a:t>
+            </a:r>
+            <a:r>
+              <a:rPr lang="en-GB" altLang="en-US" dirty="0" smtClean="0"/>
+              <a:t> 1.3, </a:t>
+            </a:r>
+            <a:r>
+              <a:rPr lang="en-GB" altLang="en-US" dirty="0" err="1" smtClean="0"/>
+              <a:t>possui</a:t>
+            </a:r>
+            <a:r>
+              <a:rPr lang="en-GB" altLang="en-US" dirty="0" smtClean="0"/>
+              <a:t> 03 </a:t>
+            </a:r>
+            <a:r>
+              <a:rPr lang="en-GB" altLang="en-US" dirty="0" err="1" smtClean="0"/>
+              <a:t>áreas</a:t>
+            </a:r>
+            <a:r>
+              <a:rPr lang="en-GB" altLang="en-US" dirty="0" smtClean="0"/>
+              <a:t> de </a:t>
+            </a:r>
+            <a:r>
+              <a:rPr lang="en-GB" altLang="en-US" dirty="0" err="1" smtClean="0"/>
+              <a:t>interesse</a:t>
+            </a:r>
+            <a:endParaRPr lang="en-GB" altLang="en-US" dirty="0" smtClean="0"/>
           </a:p>
           <a:p>
             <a:pPr lvl="1"/>
             <a:r>
-              <a:rPr lang="en-GB" altLang="en-US"/>
-              <a:t>Personnel</a:t>
+              <a:rPr lang="en-GB" altLang="en-US" dirty="0" smtClean="0"/>
+              <a:t>CMMI-DEV </a:t>
+            </a:r>
+            <a:r>
+              <a:rPr lang="en-GB" altLang="en-US" i="1" dirty="0" smtClean="0">
+                <a:latin typeface="Times New Roman" pitchFamily="18" charset="0"/>
+                <a:cs typeface="Times New Roman" pitchFamily="18" charset="0"/>
+              </a:rPr>
+              <a:t>(Capability Maturity Model for Development)</a:t>
             </a:r>
           </a:p>
           <a:p>
             <a:pPr lvl="1"/>
             <a:r>
-              <a:rPr lang="en-GB" altLang="en-US"/>
-              <a:t>Technology</a:t>
-            </a:r>
+              <a:rPr lang="en-GB" altLang="en-US" dirty="0" smtClean="0"/>
+              <a:t>CMMI-SVC </a:t>
+            </a:r>
+            <a:r>
+              <a:rPr lang="en-GB" altLang="en-US" i="1" dirty="0" smtClean="0">
+                <a:latin typeface="Times New Roman" pitchFamily="18" charset="0"/>
+                <a:cs typeface="Times New Roman" pitchFamily="18" charset="0"/>
+              </a:rPr>
+              <a:t>(Capability Maturity Model for </a:t>
+            </a:r>
+            <a:r>
+              <a:rPr lang="en-GB" altLang="en-US" i="1" dirty="0" smtClean="0">
+                <a:latin typeface="Times New Roman" pitchFamily="18" charset="0"/>
+                <a:cs typeface="Times New Roman" pitchFamily="18" charset="0"/>
+              </a:rPr>
+              <a:t>Service)</a:t>
+            </a:r>
+            <a:endParaRPr lang="en-GB" altLang="en-US" i="1" dirty="0" smtClean="0">
+              <a:latin typeface="Times New Roman" pitchFamily="18" charset="0"/>
+              <a:cs typeface="Times New Roman" pitchFamily="18" charset="0"/>
+            </a:endParaRPr>
           </a:p>
           <a:p>
             <a:pPr lvl="1"/>
             <a:r>
-              <a:rPr lang="en-GB" altLang="en-US"/>
-              <a:t>Finances</a:t>
+              <a:rPr lang="en-GB" altLang="en-US" dirty="0" smtClean="0"/>
+              <a:t>CMMI-ACQ </a:t>
+            </a:r>
+            <a:r>
+              <a:rPr lang="en-GB" altLang="en-US" i="1" dirty="0" smtClean="0">
+                <a:latin typeface="Times New Roman" pitchFamily="18" charset="0"/>
+                <a:cs typeface="Times New Roman" pitchFamily="18" charset="0"/>
+              </a:rPr>
+              <a:t>(Capability Maturity Model for </a:t>
+            </a:r>
+            <a:r>
+              <a:rPr lang="en-GB" altLang="en-US" i="1" dirty="0" smtClean="0">
+                <a:latin typeface="Times New Roman" pitchFamily="18" charset="0"/>
+                <a:cs typeface="Times New Roman" pitchFamily="18" charset="0"/>
+              </a:rPr>
+              <a:t>Acquisition)</a:t>
+            </a:r>
+          </a:p>
+          <a:p>
+            <a:r>
+              <a:rPr lang="en-GB" altLang="en-US" dirty="0" smtClean="0"/>
+              <a:t>CMMI</a:t>
+            </a:r>
+            <a:r>
+              <a:rPr lang="en-GB" altLang="en-US" dirty="0" smtClean="0">
+                <a:ea typeface="+mn-ea"/>
+                <a:cs typeface="+mn-cs"/>
+              </a:rPr>
+              <a:t>-DEV</a:t>
             </a:r>
           </a:p>
           <a:p>
             <a:pPr lvl="1"/>
             <a:r>
-              <a:rPr lang="en-GB" altLang="en-US"/>
-              <a:t>Distribution</a:t>
-            </a:r>
+              <a:rPr lang="en-GB" altLang="en-US" b="1" i="1" u="sng" dirty="0" smtClean="0">
+                <a:latin typeface="Times New Roman" pitchFamily="18" charset="0"/>
+                <a:cs typeface="Times New Roman" pitchFamily="18" charset="0"/>
+              </a:rPr>
+              <a:t>Framework</a:t>
+            </a:r>
+            <a:r>
+              <a:rPr lang="en-GB" altLang="en-US" dirty="0" smtClean="0">
+                <a:latin typeface="Times New Roman" pitchFamily="18" charset="0"/>
+                <a:cs typeface="Times New Roman" pitchFamily="18" charset="0"/>
+              </a:rPr>
+              <a:t> </a:t>
+            </a:r>
+            <a:r>
+              <a:rPr lang="en-GB" altLang="en-US" dirty="0" smtClean="0">
+                <a:latin typeface="Arial" pitchFamily="34" charset="0"/>
+                <a:cs typeface="Arial" pitchFamily="34" charset="0"/>
+              </a:rPr>
+              <a:t>com 22 </a:t>
+            </a:r>
+            <a:r>
+              <a:rPr lang="en-GB" altLang="en-US" dirty="0" err="1" smtClean="0">
+                <a:latin typeface="Arial" pitchFamily="34" charset="0"/>
+                <a:cs typeface="Arial" pitchFamily="34" charset="0"/>
+              </a:rPr>
+              <a:t>áreas</a:t>
+            </a:r>
+            <a:r>
+              <a:rPr lang="en-GB" altLang="en-US" dirty="0" smtClean="0">
+                <a:latin typeface="Arial" pitchFamily="34" charset="0"/>
+                <a:cs typeface="Arial" pitchFamily="34" charset="0"/>
+              </a:rPr>
+              <a:t> de </a:t>
+            </a:r>
+            <a:r>
+              <a:rPr lang="en-GB" altLang="en-US" dirty="0" err="1" smtClean="0">
+                <a:latin typeface="Arial" pitchFamily="34" charset="0"/>
+                <a:cs typeface="Arial" pitchFamily="34" charset="0"/>
+              </a:rPr>
+              <a:t>processos</a:t>
+            </a:r>
+            <a:endParaRPr lang="en-GB" altLang="en-US" i="1" dirty="0" smtClean="0">
+              <a:latin typeface="Arial" pitchFamily="34" charset="0"/>
+              <a:cs typeface="Arial" pitchFamily="34" charset="0"/>
+            </a:endParaRPr>
           </a:p>
           <a:p>
             <a:pPr lvl="1"/>
             <a:r>
-              <a:rPr lang="en-GB" altLang="en-US"/>
-              <a:t>Promotion</a:t>
-            </a:r>
+              <a:rPr lang="en-GB" altLang="en-US" dirty="0" err="1" smtClean="0">
+                <a:cs typeface="Arial" pitchFamily="34" charset="0"/>
+              </a:rPr>
+              <a:t>Atende</a:t>
+            </a:r>
+            <a:r>
+              <a:rPr lang="en-GB" altLang="en-US" dirty="0" smtClean="0">
+                <a:cs typeface="Arial" pitchFamily="34" charset="0"/>
+              </a:rPr>
+              <a:t> </a:t>
+            </a:r>
+            <a:r>
+              <a:rPr lang="en-GB" altLang="en-US" dirty="0" err="1" smtClean="0">
+                <a:cs typeface="Arial" pitchFamily="34" charset="0"/>
+              </a:rPr>
+              <a:t>diversos</a:t>
+            </a:r>
+            <a:r>
+              <a:rPr lang="en-GB" altLang="en-US" dirty="0" smtClean="0">
+                <a:cs typeface="Arial" pitchFamily="34" charset="0"/>
+              </a:rPr>
+              <a:t> </a:t>
+            </a:r>
+            <a:r>
+              <a:rPr lang="en-GB" altLang="en-US" dirty="0" err="1" smtClean="0">
+                <a:cs typeface="Arial" pitchFamily="34" charset="0"/>
+              </a:rPr>
+              <a:t>setores</a:t>
+            </a:r>
+            <a:r>
+              <a:rPr lang="en-GB" altLang="en-US" dirty="0" smtClean="0">
+                <a:cs typeface="Arial" pitchFamily="34" charset="0"/>
+              </a:rPr>
+              <a:t>, </a:t>
+            </a:r>
+            <a:r>
+              <a:rPr lang="en-GB" altLang="en-US" dirty="0" err="1" smtClean="0">
+                <a:cs typeface="Arial" pitchFamily="34" charset="0"/>
+              </a:rPr>
+              <a:t>como</a:t>
+            </a:r>
+            <a:r>
+              <a:rPr lang="en-GB" altLang="en-US" dirty="0" smtClean="0">
+                <a:latin typeface="Arial" pitchFamily="34" charset="0"/>
+                <a:cs typeface="Arial" pitchFamily="34" charset="0"/>
+              </a:rPr>
+              <a:t>:</a:t>
+            </a:r>
+          </a:p>
+          <a:p>
+            <a:pPr lvl="2"/>
+            <a:r>
+              <a:rPr lang="en-GB" altLang="en-US" dirty="0" err="1" smtClean="0">
+                <a:cs typeface="Arial" pitchFamily="34" charset="0"/>
+              </a:rPr>
+              <a:t>Indústria</a:t>
+            </a:r>
+            <a:r>
+              <a:rPr lang="en-GB" altLang="en-US" dirty="0" smtClean="0">
+                <a:cs typeface="Arial" pitchFamily="34" charset="0"/>
+              </a:rPr>
+              <a:t>, </a:t>
+            </a:r>
+            <a:r>
+              <a:rPr lang="en-GB" altLang="en-US" dirty="0" err="1" smtClean="0">
+                <a:cs typeface="Arial" pitchFamily="34" charset="0"/>
+              </a:rPr>
+              <a:t>telecomunicação</a:t>
+            </a:r>
+            <a:r>
+              <a:rPr lang="en-GB" altLang="en-US" dirty="0" smtClean="0">
+                <a:cs typeface="Arial" pitchFamily="34" charset="0"/>
+              </a:rPr>
+              <a:t>, </a:t>
+            </a:r>
+            <a:r>
+              <a:rPr lang="en-GB" altLang="en-US" dirty="0" err="1" smtClean="0">
+                <a:cs typeface="Arial" pitchFamily="34" charset="0"/>
+              </a:rPr>
+              <a:t>bancário</a:t>
+            </a:r>
+            <a:r>
+              <a:rPr lang="en-GB" altLang="en-US" dirty="0" smtClean="0">
+                <a:cs typeface="Arial" pitchFamily="34" charset="0"/>
+              </a:rPr>
+              <a:t> e etc.</a:t>
+            </a:r>
+            <a:endParaRPr lang="en-GB" altLang="en-US" dirty="0" smtClean="0">
+              <a:cs typeface="Arial" pitchFamily="34" charset="0"/>
+            </a:endParaRPr>
           </a:p>
           <a:p>
             <a:pPr lvl="1"/>
-            <a:r>
-              <a:rPr lang="en-GB" altLang="en-US"/>
-              <a:t>Products</a:t>
-            </a:r>
+            <a:endParaRPr lang="en-GB" altLang="en-US" i="1" dirty="0" smtClean="0">
+              <a:latin typeface="Times New Roman" pitchFamily="18" charset="0"/>
+              <a:cs typeface="Times New Roman" pitchFamily="18" charset="0"/>
+            </a:endParaRPr>
           </a:p>
           <a:p>
             <a:pPr lvl="1"/>
-            <a:r>
-              <a:rPr lang="en-GB" altLang="en-US"/>
-              <a:t>Services</a:t>
-            </a:r>
+            <a:endParaRPr lang="en-GB" altLang="en-US" i="1" dirty="0" smtClean="0">
+              <a:latin typeface="Times New Roman" pitchFamily="18" charset="0"/>
+              <a:cs typeface="Times New Roman" pitchFamily="18" charset="0"/>
+            </a:endParaRPr>
           </a:p>
         </p:txBody>
       </p:sp>
@@ -5321,7 +6189,7 @@
       </p:grpSpPr>
       <p:sp>
         <p:nvSpPr>
-          <p:cNvPr id="26626" name="Rectangle 2"/>
+          <p:cNvPr id="19458" name="Rectangle 2"/>
           <p:cNvSpPr>
             <a:spLocks noGrp="1" noChangeArrowheads="1"/>
           </p:cNvSpPr>
@@ -5335,15 +6203,16 @@
           <a:lstStyle/>
           <a:p>
             <a:r>
-              <a:rPr lang="en-GB" altLang="en-US"/>
-              <a:t>Risks and Rewards</a:t>
-            </a:r>
+              <a:rPr lang="en-GB" altLang="en-US" dirty="0" smtClean="0"/>
+              <a:t>CMMI - PPQA</a:t>
+            </a:r>
+            <a:endParaRPr lang="en-GB" altLang="en-US" dirty="0"/>
           </a:p>
         </p:txBody>
       </p:sp>
       <p:sp>
         <p:nvSpPr>
-          <p:cNvPr id="26627" name="Rectangle 3"/>
+          <p:cNvPr id="19459" name="Rectangle 3"/>
           <p:cNvSpPr>
             <a:spLocks noGrp="1" noChangeArrowheads="1"/>
           </p:cNvSpPr>
@@ -5356,19 +6225,1559 @@
           <a:bodyPr/>
           <a:lstStyle/>
           <a:p>
-            <a:r>
-              <a:rPr lang="en-GB" altLang="en-US"/>
-              <a:t>Summarize the risks of the proposed project and how they will be addressed.</a:t>
-            </a:r>
-          </a:p>
-          <a:p>
-            <a:r>
-              <a:rPr lang="en-GB" altLang="en-US"/>
-              <a:t>Estimate expected rewards, particularly if you are seeking funding.</a:t>
-            </a:r>
+            <a:pPr lvl="1"/>
+            <a:r>
+              <a:rPr lang="en-GB" altLang="en-US" i="1" dirty="0" smtClean="0">
+                <a:latin typeface="Times New Roman" pitchFamily="18" charset="0"/>
+                <a:cs typeface="Times New Roman" pitchFamily="18" charset="0"/>
+              </a:rPr>
+              <a:t>Process and Product Quality Assurance</a:t>
+            </a:r>
+            <a:r>
+              <a:rPr lang="en-GB" altLang="en-US" dirty="0" smtClean="0">
+                <a:cs typeface="Times New Roman" pitchFamily="18" charset="0"/>
+              </a:rPr>
+              <a:t> – PPQA</a:t>
+            </a:r>
+          </a:p>
+          <a:p>
+            <a:pPr lvl="2"/>
+            <a:r>
+              <a:rPr lang="en-GB" altLang="en-US" dirty="0" smtClean="0">
+                <a:cs typeface="Times New Roman" pitchFamily="18" charset="0"/>
+              </a:rPr>
+              <a:t>02 </a:t>
+            </a:r>
+            <a:r>
+              <a:rPr lang="en-GB" altLang="en-US" dirty="0" err="1" smtClean="0">
+                <a:cs typeface="Times New Roman" pitchFamily="18" charset="0"/>
+              </a:rPr>
+              <a:t>Objetivos</a:t>
+            </a:r>
+            <a:r>
+              <a:rPr lang="en-GB" altLang="en-US" dirty="0" smtClean="0">
+                <a:cs typeface="Times New Roman" pitchFamily="18" charset="0"/>
+              </a:rPr>
+              <a:t> </a:t>
+            </a:r>
+            <a:r>
+              <a:rPr lang="en-GB" altLang="en-US" dirty="0" err="1" smtClean="0">
+                <a:cs typeface="Times New Roman" pitchFamily="18" charset="0"/>
+              </a:rPr>
+              <a:t>específicos</a:t>
+            </a:r>
+            <a:endParaRPr lang="en-GB" altLang="en-US" dirty="0" smtClean="0">
+              <a:cs typeface="Times New Roman" pitchFamily="18" charset="0"/>
+            </a:endParaRPr>
+          </a:p>
+          <a:p>
+            <a:pPr lvl="3"/>
+            <a:r>
+              <a:rPr lang="en-GB" altLang="en-US" dirty="0" err="1" smtClean="0">
+                <a:cs typeface="Times New Roman" pitchFamily="18" charset="0"/>
+              </a:rPr>
+              <a:t>Cada</a:t>
+            </a:r>
+            <a:r>
+              <a:rPr lang="en-GB" altLang="en-US" dirty="0" smtClean="0">
+                <a:cs typeface="Times New Roman" pitchFamily="18" charset="0"/>
+              </a:rPr>
+              <a:t> </a:t>
+            </a:r>
+            <a:r>
+              <a:rPr lang="en-GB" altLang="en-US" dirty="0" err="1" smtClean="0">
+                <a:cs typeface="Times New Roman" pitchFamily="18" charset="0"/>
+              </a:rPr>
+              <a:t>objetivo</a:t>
+            </a:r>
+            <a:r>
+              <a:rPr lang="en-GB" altLang="en-US" dirty="0" smtClean="0">
+                <a:cs typeface="Times New Roman" pitchFamily="18" charset="0"/>
+              </a:rPr>
+              <a:t> </a:t>
+            </a:r>
+            <a:r>
+              <a:rPr lang="en-GB" altLang="en-US" dirty="0" err="1" smtClean="0">
+                <a:cs typeface="Times New Roman" pitchFamily="18" charset="0"/>
+              </a:rPr>
+              <a:t>contém</a:t>
+            </a:r>
+            <a:r>
+              <a:rPr lang="en-GB" altLang="en-US" dirty="0" smtClean="0">
+                <a:cs typeface="Times New Roman" pitchFamily="18" charset="0"/>
+              </a:rPr>
+              <a:t> 02 </a:t>
+            </a:r>
+            <a:r>
+              <a:rPr lang="en-GB" altLang="en-US" dirty="0" err="1" smtClean="0">
+                <a:cs typeface="Times New Roman" pitchFamily="18" charset="0"/>
+              </a:rPr>
+              <a:t>práticas</a:t>
+            </a:r>
+            <a:r>
+              <a:rPr lang="en-GB" altLang="en-US" dirty="0" smtClean="0">
+                <a:cs typeface="Times New Roman" pitchFamily="18" charset="0"/>
+              </a:rPr>
+              <a:t> </a:t>
+            </a:r>
+            <a:r>
+              <a:rPr lang="en-GB" altLang="en-US" dirty="0" err="1" smtClean="0">
+                <a:cs typeface="Times New Roman" pitchFamily="18" charset="0"/>
+              </a:rPr>
+              <a:t>específicas</a:t>
+            </a:r>
+            <a:endParaRPr lang="en-GB" altLang="en-US" dirty="0" smtClean="0">
+              <a:cs typeface="Times New Roman" pitchFamily="18" charset="0"/>
+            </a:endParaRPr>
           </a:p>
         </p:txBody>
       </p:sp>
+      <p:grpSp>
+        <p:nvGrpSpPr>
+          <p:cNvPr id="26" name="Grupo 25"/>
+          <p:cNvGrpSpPr/>
+          <p:nvPr/>
+        </p:nvGrpSpPr>
+        <p:grpSpPr>
+          <a:xfrm>
+            <a:off x="2915816" y="3212976"/>
+            <a:ext cx="4333875" cy="3209925"/>
+            <a:chOff x="0" y="0"/>
+            <a:chExt cx="4333875" cy="3209925"/>
+          </a:xfrm>
+        </p:grpSpPr>
+        <p:sp>
+          <p:nvSpPr>
+            <p:cNvPr id="27" name="Oval 1"/>
+            <p:cNvSpPr/>
+            <p:nvPr/>
+          </p:nvSpPr>
+          <p:spPr>
+            <a:xfrm>
+              <a:off x="0" y="66675"/>
+              <a:ext cx="1685925" cy="3095625"/>
+            </a:xfrm>
+            <a:prstGeom prst="ellipse">
+              <a:avLst/>
+            </a:prstGeom>
+            <a:ln w="25400">
+              <a:solidFill>
+                <a:schemeClr val="tx1">
+                  <a:lumMod val="50000"/>
+                  <a:lumOff val="50000"/>
+                </a:schemeClr>
+              </a:solidFill>
+              <a:prstDash val="sysDot"/>
+              <a:tailEnd type="triangle"/>
+            </a:ln>
+          </p:spPr>
+          <p:style>
+            <a:lnRef idx="1">
+              <a:schemeClr val="accent1"/>
+            </a:lnRef>
+            <a:fillRef idx="0">
+              <a:schemeClr val="accent1"/>
+            </a:fillRef>
+            <a:effectRef idx="0">
+              <a:schemeClr val="accent1"/>
+            </a:effectRef>
+            <a:fontRef idx="minor">
+              <a:schemeClr val="tx1"/>
+            </a:fontRef>
+          </p:style>
+          <p:txBody>
+            <a:bodyPr rtlCol="0" anchor="ctr"/>
+            <a:lstStyle>
+              <a:lvl1pPr marL="0" indent="0">
+                <a:defRPr sz="1100">
+                  <a:solidFill>
+                    <a:schemeClr val="tx1"/>
+                  </a:solidFill>
+                  <a:latin typeface="+mn-lt"/>
+                  <a:ea typeface="+mn-ea"/>
+                  <a:cs typeface="+mn-cs"/>
+                </a:defRPr>
+              </a:lvl1pPr>
+              <a:lvl2pPr marL="457200" indent="0">
+                <a:defRPr sz="1100">
+                  <a:solidFill>
+                    <a:schemeClr val="tx1"/>
+                  </a:solidFill>
+                  <a:latin typeface="+mn-lt"/>
+                  <a:ea typeface="+mn-ea"/>
+                  <a:cs typeface="+mn-cs"/>
+                </a:defRPr>
+              </a:lvl2pPr>
+              <a:lvl3pPr marL="914400" indent="0">
+                <a:defRPr sz="1100">
+                  <a:solidFill>
+                    <a:schemeClr val="tx1"/>
+                  </a:solidFill>
+                  <a:latin typeface="+mn-lt"/>
+                  <a:ea typeface="+mn-ea"/>
+                  <a:cs typeface="+mn-cs"/>
+                </a:defRPr>
+              </a:lvl3pPr>
+              <a:lvl4pPr marL="1371600" indent="0">
+                <a:defRPr sz="1100">
+                  <a:solidFill>
+                    <a:schemeClr val="tx1"/>
+                  </a:solidFill>
+                  <a:latin typeface="+mn-lt"/>
+                  <a:ea typeface="+mn-ea"/>
+                  <a:cs typeface="+mn-cs"/>
+                </a:defRPr>
+              </a:lvl4pPr>
+              <a:lvl5pPr marL="1828800" indent="0">
+                <a:defRPr sz="1100">
+                  <a:solidFill>
+                    <a:schemeClr val="tx1"/>
+                  </a:solidFill>
+                  <a:latin typeface="+mn-lt"/>
+                  <a:ea typeface="+mn-ea"/>
+                  <a:cs typeface="+mn-cs"/>
+                </a:defRPr>
+              </a:lvl5pPr>
+              <a:lvl6pPr marL="2286000" indent="0">
+                <a:defRPr sz="1100">
+                  <a:solidFill>
+                    <a:schemeClr val="tx1"/>
+                  </a:solidFill>
+                  <a:latin typeface="+mn-lt"/>
+                  <a:ea typeface="+mn-ea"/>
+                  <a:cs typeface="+mn-cs"/>
+                </a:defRPr>
+              </a:lvl6pPr>
+              <a:lvl7pPr marL="2743200" indent="0">
+                <a:defRPr sz="1100">
+                  <a:solidFill>
+                    <a:schemeClr val="tx1"/>
+                  </a:solidFill>
+                  <a:latin typeface="+mn-lt"/>
+                  <a:ea typeface="+mn-ea"/>
+                  <a:cs typeface="+mn-cs"/>
+                </a:defRPr>
+              </a:lvl7pPr>
+              <a:lvl8pPr marL="3200400" indent="0">
+                <a:defRPr sz="1100">
+                  <a:solidFill>
+                    <a:schemeClr val="tx1"/>
+                  </a:solidFill>
+                  <a:latin typeface="+mn-lt"/>
+                  <a:ea typeface="+mn-ea"/>
+                  <a:cs typeface="+mn-cs"/>
+                </a:defRPr>
+              </a:lvl8pPr>
+              <a:lvl9pPr marL="3657600" indent="0">
+                <a:defRPr sz="1100">
+                  <a:solidFill>
+                    <a:schemeClr val="tx1"/>
+                  </a:solidFill>
+                  <a:latin typeface="+mn-lt"/>
+                  <a:ea typeface="+mn-ea"/>
+                  <a:cs typeface="+mn-cs"/>
+                </a:defRPr>
+              </a:lvl9pPr>
+            </a:lstStyle>
+            <a:p>
+              <a:pPr marL="0" indent="0" algn="ctr"/>
+              <a:r>
+                <a:rPr lang="en-GB" sz="1600" b="1">
+                  <a:solidFill>
+                    <a:schemeClr val="tx1">
+                      <a:lumMod val="75000"/>
+                      <a:lumOff val="25000"/>
+                    </a:schemeClr>
+                  </a:solidFill>
+                  <a:latin typeface="+mn-lt"/>
+                  <a:ea typeface="+mn-ea"/>
+                  <a:cs typeface="+mn-cs"/>
+                </a:rPr>
+                <a:t>Objetivos</a:t>
+              </a:r>
+            </a:p>
+          </p:txBody>
+        </p:sp>
+        <p:sp>
+          <p:nvSpPr>
+            <p:cNvPr id="28" name="Oval 2"/>
+            <p:cNvSpPr/>
+            <p:nvPr/>
+          </p:nvSpPr>
+          <p:spPr>
+            <a:xfrm>
+              <a:off x="209550" y="542926"/>
+              <a:ext cx="1285876" cy="781049"/>
+            </a:xfrm>
+            <a:prstGeom prst="ellipse">
+              <a:avLst/>
+            </a:prstGeom>
+            <a:solidFill>
+              <a:schemeClr val="lt1">
+                <a:alpha val="0"/>
+              </a:schemeClr>
+            </a:solidFill>
+            <a:ln>
+              <a:solidFill>
+                <a:schemeClr val="tx1">
+                  <a:lumMod val="75000"/>
+                  <a:lumOff val="25000"/>
+                </a:schemeClr>
+              </a:solidFill>
+            </a:ln>
+          </p:spPr>
+          <p:style>
+            <a:lnRef idx="2">
+              <a:schemeClr val="accent6"/>
+            </a:lnRef>
+            <a:fillRef idx="1">
+              <a:schemeClr val="lt1"/>
+            </a:fillRef>
+            <a:effectRef idx="0">
+              <a:schemeClr val="accent6"/>
+            </a:effectRef>
+            <a:fontRef idx="minor">
+              <a:schemeClr val="dk1"/>
+            </a:fontRef>
+          </p:style>
+          <p:txBody>
+            <a:bodyPr rtlCol="0" anchor="ctr"/>
+            <a:lstStyle>
+              <a:lvl1pPr marL="0" indent="0">
+                <a:defRPr sz="1100">
+                  <a:solidFill>
+                    <a:schemeClr val="dk1"/>
+                  </a:solidFill>
+                  <a:latin typeface="+mn-lt"/>
+                  <a:ea typeface="+mn-ea"/>
+                  <a:cs typeface="+mn-cs"/>
+                </a:defRPr>
+              </a:lvl1pPr>
+              <a:lvl2pPr marL="457200" indent="0">
+                <a:defRPr sz="1100">
+                  <a:solidFill>
+                    <a:schemeClr val="dk1"/>
+                  </a:solidFill>
+                  <a:latin typeface="+mn-lt"/>
+                  <a:ea typeface="+mn-ea"/>
+                  <a:cs typeface="+mn-cs"/>
+                </a:defRPr>
+              </a:lvl2pPr>
+              <a:lvl3pPr marL="914400" indent="0">
+                <a:defRPr sz="1100">
+                  <a:solidFill>
+                    <a:schemeClr val="dk1"/>
+                  </a:solidFill>
+                  <a:latin typeface="+mn-lt"/>
+                  <a:ea typeface="+mn-ea"/>
+                  <a:cs typeface="+mn-cs"/>
+                </a:defRPr>
+              </a:lvl3pPr>
+              <a:lvl4pPr marL="1371600" indent="0">
+                <a:defRPr sz="1100">
+                  <a:solidFill>
+                    <a:schemeClr val="dk1"/>
+                  </a:solidFill>
+                  <a:latin typeface="+mn-lt"/>
+                  <a:ea typeface="+mn-ea"/>
+                  <a:cs typeface="+mn-cs"/>
+                </a:defRPr>
+              </a:lvl4pPr>
+              <a:lvl5pPr marL="1828800" indent="0">
+                <a:defRPr sz="1100">
+                  <a:solidFill>
+                    <a:schemeClr val="dk1"/>
+                  </a:solidFill>
+                  <a:latin typeface="+mn-lt"/>
+                  <a:ea typeface="+mn-ea"/>
+                  <a:cs typeface="+mn-cs"/>
+                </a:defRPr>
+              </a:lvl5pPr>
+              <a:lvl6pPr marL="2286000" indent="0">
+                <a:defRPr sz="1100">
+                  <a:solidFill>
+                    <a:schemeClr val="dk1"/>
+                  </a:solidFill>
+                  <a:latin typeface="+mn-lt"/>
+                  <a:ea typeface="+mn-ea"/>
+                  <a:cs typeface="+mn-cs"/>
+                </a:defRPr>
+              </a:lvl6pPr>
+              <a:lvl7pPr marL="2743200" indent="0">
+                <a:defRPr sz="1100">
+                  <a:solidFill>
+                    <a:schemeClr val="dk1"/>
+                  </a:solidFill>
+                  <a:latin typeface="+mn-lt"/>
+                  <a:ea typeface="+mn-ea"/>
+                  <a:cs typeface="+mn-cs"/>
+                </a:defRPr>
+              </a:lvl7pPr>
+              <a:lvl8pPr marL="3200400" indent="0">
+                <a:defRPr sz="1100">
+                  <a:solidFill>
+                    <a:schemeClr val="dk1"/>
+                  </a:solidFill>
+                  <a:latin typeface="+mn-lt"/>
+                  <a:ea typeface="+mn-ea"/>
+                  <a:cs typeface="+mn-cs"/>
+                </a:defRPr>
+              </a:lvl8pPr>
+              <a:lvl9pPr marL="3657600" indent="0">
+                <a:defRPr sz="1100">
+                  <a:solidFill>
+                    <a:schemeClr val="dk1"/>
+                  </a:solidFill>
+                  <a:latin typeface="+mn-lt"/>
+                  <a:ea typeface="+mn-ea"/>
+                  <a:cs typeface="+mn-cs"/>
+                </a:defRPr>
+              </a:lvl9pPr>
+            </a:lstStyle>
+            <a:p>
+              <a:pPr marL="0" indent="0" algn="ctr"/>
+              <a:r>
+                <a:rPr lang="en-GB" sz="2400" b="1">
+                  <a:solidFill>
+                    <a:schemeClr val="tx1">
+                      <a:lumMod val="85000"/>
+                      <a:lumOff val="15000"/>
+                    </a:schemeClr>
+                  </a:solidFill>
+                  <a:latin typeface="Arial" panose="020B0604020202020204" pitchFamily="34" charset="0"/>
+                  <a:ea typeface="+mn-ea"/>
+                  <a:cs typeface="Arial" panose="020B0604020202020204" pitchFamily="34" charset="0"/>
+                </a:rPr>
+                <a:t>SG</a:t>
+              </a:r>
+              <a:r>
+                <a:rPr lang="en-GB" sz="2400" b="1" baseline="0">
+                  <a:solidFill>
+                    <a:schemeClr val="tx1">
+                      <a:lumMod val="85000"/>
+                      <a:lumOff val="15000"/>
+                    </a:schemeClr>
+                  </a:solidFill>
+                  <a:latin typeface="Arial" panose="020B0604020202020204" pitchFamily="34" charset="0"/>
+                  <a:ea typeface="+mn-ea"/>
+                  <a:cs typeface="Arial" panose="020B0604020202020204" pitchFamily="34" charset="0"/>
+                </a:rPr>
+                <a:t> 1</a:t>
+              </a:r>
+              <a:endParaRPr lang="en-GB" sz="2400" b="1">
+                <a:solidFill>
+                  <a:schemeClr val="tx1">
+                    <a:lumMod val="85000"/>
+                    <a:lumOff val="15000"/>
+                  </a:schemeClr>
+                </a:solidFill>
+                <a:latin typeface="Arial" panose="020B0604020202020204" pitchFamily="34" charset="0"/>
+                <a:ea typeface="+mn-ea"/>
+                <a:cs typeface="Arial" panose="020B0604020202020204" pitchFamily="34" charset="0"/>
+              </a:endParaRPr>
+            </a:p>
+          </p:txBody>
+        </p:sp>
+        <p:sp>
+          <p:nvSpPr>
+            <p:cNvPr id="29" name="Oval 3"/>
+            <p:cNvSpPr/>
+            <p:nvPr/>
+          </p:nvSpPr>
+          <p:spPr>
+            <a:xfrm>
+              <a:off x="190500" y="1981201"/>
+              <a:ext cx="1285876" cy="781049"/>
+            </a:xfrm>
+            <a:prstGeom prst="ellipse">
+              <a:avLst/>
+            </a:prstGeom>
+            <a:solidFill>
+              <a:schemeClr val="lt1">
+                <a:alpha val="0"/>
+              </a:schemeClr>
+            </a:solidFill>
+            <a:ln>
+              <a:solidFill>
+                <a:schemeClr val="tx1">
+                  <a:lumMod val="75000"/>
+                  <a:lumOff val="25000"/>
+                </a:schemeClr>
+              </a:solidFill>
+            </a:ln>
+          </p:spPr>
+          <p:style>
+            <a:lnRef idx="2">
+              <a:schemeClr val="accent6"/>
+            </a:lnRef>
+            <a:fillRef idx="1">
+              <a:schemeClr val="lt1"/>
+            </a:fillRef>
+            <a:effectRef idx="0">
+              <a:schemeClr val="accent6"/>
+            </a:effectRef>
+            <a:fontRef idx="minor">
+              <a:schemeClr val="dk1"/>
+            </a:fontRef>
+          </p:style>
+          <p:txBody>
+            <a:bodyPr rtlCol="0" anchor="ctr"/>
+            <a:lstStyle>
+              <a:lvl1pPr marL="0" indent="0">
+                <a:defRPr sz="1100">
+                  <a:solidFill>
+                    <a:schemeClr val="dk1"/>
+                  </a:solidFill>
+                  <a:latin typeface="+mn-lt"/>
+                  <a:ea typeface="+mn-ea"/>
+                  <a:cs typeface="+mn-cs"/>
+                </a:defRPr>
+              </a:lvl1pPr>
+              <a:lvl2pPr marL="457200" indent="0">
+                <a:defRPr sz="1100">
+                  <a:solidFill>
+                    <a:schemeClr val="dk1"/>
+                  </a:solidFill>
+                  <a:latin typeface="+mn-lt"/>
+                  <a:ea typeface="+mn-ea"/>
+                  <a:cs typeface="+mn-cs"/>
+                </a:defRPr>
+              </a:lvl2pPr>
+              <a:lvl3pPr marL="914400" indent="0">
+                <a:defRPr sz="1100">
+                  <a:solidFill>
+                    <a:schemeClr val="dk1"/>
+                  </a:solidFill>
+                  <a:latin typeface="+mn-lt"/>
+                  <a:ea typeface="+mn-ea"/>
+                  <a:cs typeface="+mn-cs"/>
+                </a:defRPr>
+              </a:lvl3pPr>
+              <a:lvl4pPr marL="1371600" indent="0">
+                <a:defRPr sz="1100">
+                  <a:solidFill>
+                    <a:schemeClr val="dk1"/>
+                  </a:solidFill>
+                  <a:latin typeface="+mn-lt"/>
+                  <a:ea typeface="+mn-ea"/>
+                  <a:cs typeface="+mn-cs"/>
+                </a:defRPr>
+              </a:lvl4pPr>
+              <a:lvl5pPr marL="1828800" indent="0">
+                <a:defRPr sz="1100">
+                  <a:solidFill>
+                    <a:schemeClr val="dk1"/>
+                  </a:solidFill>
+                  <a:latin typeface="+mn-lt"/>
+                  <a:ea typeface="+mn-ea"/>
+                  <a:cs typeface="+mn-cs"/>
+                </a:defRPr>
+              </a:lvl5pPr>
+              <a:lvl6pPr marL="2286000" indent="0">
+                <a:defRPr sz="1100">
+                  <a:solidFill>
+                    <a:schemeClr val="dk1"/>
+                  </a:solidFill>
+                  <a:latin typeface="+mn-lt"/>
+                  <a:ea typeface="+mn-ea"/>
+                  <a:cs typeface="+mn-cs"/>
+                </a:defRPr>
+              </a:lvl6pPr>
+              <a:lvl7pPr marL="2743200" indent="0">
+                <a:defRPr sz="1100">
+                  <a:solidFill>
+                    <a:schemeClr val="dk1"/>
+                  </a:solidFill>
+                  <a:latin typeface="+mn-lt"/>
+                  <a:ea typeface="+mn-ea"/>
+                  <a:cs typeface="+mn-cs"/>
+                </a:defRPr>
+              </a:lvl7pPr>
+              <a:lvl8pPr marL="3200400" indent="0">
+                <a:defRPr sz="1100">
+                  <a:solidFill>
+                    <a:schemeClr val="dk1"/>
+                  </a:solidFill>
+                  <a:latin typeface="+mn-lt"/>
+                  <a:ea typeface="+mn-ea"/>
+                  <a:cs typeface="+mn-cs"/>
+                </a:defRPr>
+              </a:lvl8pPr>
+              <a:lvl9pPr marL="3657600" indent="0">
+                <a:defRPr sz="1100">
+                  <a:solidFill>
+                    <a:schemeClr val="dk1"/>
+                  </a:solidFill>
+                  <a:latin typeface="+mn-lt"/>
+                  <a:ea typeface="+mn-ea"/>
+                  <a:cs typeface="+mn-cs"/>
+                </a:defRPr>
+              </a:lvl9pPr>
+            </a:lstStyle>
+            <a:p>
+              <a:pPr marL="0" indent="0" algn="ctr"/>
+              <a:r>
+                <a:rPr lang="en-GB" sz="2400" b="1">
+                  <a:solidFill>
+                    <a:schemeClr val="tx1">
+                      <a:lumMod val="85000"/>
+                      <a:lumOff val="15000"/>
+                    </a:schemeClr>
+                  </a:solidFill>
+                  <a:latin typeface="Arial" panose="020B0604020202020204" pitchFamily="34" charset="0"/>
+                  <a:ea typeface="+mn-ea"/>
+                  <a:cs typeface="Arial" panose="020B0604020202020204" pitchFamily="34" charset="0"/>
+                </a:rPr>
+                <a:t>SG 2</a:t>
+              </a:r>
+            </a:p>
+          </p:txBody>
+        </p:sp>
+        <p:sp>
+          <p:nvSpPr>
+            <p:cNvPr id="30" name="Oval 5"/>
+            <p:cNvSpPr/>
+            <p:nvPr/>
+          </p:nvSpPr>
+          <p:spPr>
+            <a:xfrm>
+              <a:off x="2657476" y="1219201"/>
+              <a:ext cx="1152523" cy="552449"/>
+            </a:xfrm>
+            <a:prstGeom prst="ellipse">
+              <a:avLst/>
+            </a:prstGeom>
+            <a:solidFill>
+              <a:schemeClr val="lt1">
+                <a:alpha val="0"/>
+              </a:schemeClr>
+            </a:solidFill>
+            <a:ln>
+              <a:solidFill>
+                <a:schemeClr val="tx1">
+                  <a:lumMod val="75000"/>
+                  <a:lumOff val="25000"/>
+                </a:schemeClr>
+              </a:solidFill>
+            </a:ln>
+          </p:spPr>
+          <p:style>
+            <a:lnRef idx="2">
+              <a:schemeClr val="accent6"/>
+            </a:lnRef>
+            <a:fillRef idx="1">
+              <a:schemeClr val="lt1"/>
+            </a:fillRef>
+            <a:effectRef idx="0">
+              <a:schemeClr val="accent6"/>
+            </a:effectRef>
+            <a:fontRef idx="minor">
+              <a:schemeClr val="dk1"/>
+            </a:fontRef>
+          </p:style>
+          <p:txBody>
+            <a:bodyPr rtlCol="0" anchor="ctr"/>
+            <a:lstStyle>
+              <a:lvl1pPr marL="0" indent="0">
+                <a:defRPr sz="1100">
+                  <a:solidFill>
+                    <a:schemeClr val="dk1"/>
+                  </a:solidFill>
+                  <a:latin typeface="+mn-lt"/>
+                  <a:ea typeface="+mn-ea"/>
+                  <a:cs typeface="+mn-cs"/>
+                </a:defRPr>
+              </a:lvl1pPr>
+              <a:lvl2pPr marL="457200" indent="0">
+                <a:defRPr sz="1100">
+                  <a:solidFill>
+                    <a:schemeClr val="dk1"/>
+                  </a:solidFill>
+                  <a:latin typeface="+mn-lt"/>
+                  <a:ea typeface="+mn-ea"/>
+                  <a:cs typeface="+mn-cs"/>
+                </a:defRPr>
+              </a:lvl2pPr>
+              <a:lvl3pPr marL="914400" indent="0">
+                <a:defRPr sz="1100">
+                  <a:solidFill>
+                    <a:schemeClr val="dk1"/>
+                  </a:solidFill>
+                  <a:latin typeface="+mn-lt"/>
+                  <a:ea typeface="+mn-ea"/>
+                  <a:cs typeface="+mn-cs"/>
+                </a:defRPr>
+              </a:lvl3pPr>
+              <a:lvl4pPr marL="1371600" indent="0">
+                <a:defRPr sz="1100">
+                  <a:solidFill>
+                    <a:schemeClr val="dk1"/>
+                  </a:solidFill>
+                  <a:latin typeface="+mn-lt"/>
+                  <a:ea typeface="+mn-ea"/>
+                  <a:cs typeface="+mn-cs"/>
+                </a:defRPr>
+              </a:lvl4pPr>
+              <a:lvl5pPr marL="1828800" indent="0">
+                <a:defRPr sz="1100">
+                  <a:solidFill>
+                    <a:schemeClr val="dk1"/>
+                  </a:solidFill>
+                  <a:latin typeface="+mn-lt"/>
+                  <a:ea typeface="+mn-ea"/>
+                  <a:cs typeface="+mn-cs"/>
+                </a:defRPr>
+              </a:lvl5pPr>
+              <a:lvl6pPr marL="2286000" indent="0">
+                <a:defRPr sz="1100">
+                  <a:solidFill>
+                    <a:schemeClr val="dk1"/>
+                  </a:solidFill>
+                  <a:latin typeface="+mn-lt"/>
+                  <a:ea typeface="+mn-ea"/>
+                  <a:cs typeface="+mn-cs"/>
+                </a:defRPr>
+              </a:lvl6pPr>
+              <a:lvl7pPr marL="2743200" indent="0">
+                <a:defRPr sz="1100">
+                  <a:solidFill>
+                    <a:schemeClr val="dk1"/>
+                  </a:solidFill>
+                  <a:latin typeface="+mn-lt"/>
+                  <a:ea typeface="+mn-ea"/>
+                  <a:cs typeface="+mn-cs"/>
+                </a:defRPr>
+              </a:lvl7pPr>
+              <a:lvl8pPr marL="3200400" indent="0">
+                <a:defRPr sz="1100">
+                  <a:solidFill>
+                    <a:schemeClr val="dk1"/>
+                  </a:solidFill>
+                  <a:latin typeface="+mn-lt"/>
+                  <a:ea typeface="+mn-ea"/>
+                  <a:cs typeface="+mn-cs"/>
+                </a:defRPr>
+              </a:lvl8pPr>
+              <a:lvl9pPr marL="3657600" indent="0">
+                <a:defRPr sz="1100">
+                  <a:solidFill>
+                    <a:schemeClr val="dk1"/>
+                  </a:solidFill>
+                  <a:latin typeface="+mn-lt"/>
+                  <a:ea typeface="+mn-ea"/>
+                  <a:cs typeface="+mn-cs"/>
+                </a:defRPr>
+              </a:lvl9pPr>
+            </a:lstStyle>
+            <a:p>
+              <a:pPr marL="0" indent="0" algn="ctr"/>
+              <a:r>
+                <a:rPr lang="en-GB" sz="1600" b="1">
+                  <a:solidFill>
+                    <a:schemeClr val="tx1">
+                      <a:lumMod val="85000"/>
+                      <a:lumOff val="15000"/>
+                    </a:schemeClr>
+                  </a:solidFill>
+                  <a:latin typeface="Arial" panose="020B0604020202020204" pitchFamily="34" charset="0"/>
+                  <a:ea typeface="+mn-ea"/>
+                  <a:cs typeface="Arial" panose="020B0604020202020204" pitchFamily="34" charset="0"/>
+                </a:rPr>
+                <a:t>SP 1.2</a:t>
+              </a:r>
+            </a:p>
+          </p:txBody>
+        </p:sp>
+        <p:sp>
+          <p:nvSpPr>
+            <p:cNvPr id="31" name="Oval 6"/>
+            <p:cNvSpPr/>
+            <p:nvPr/>
+          </p:nvSpPr>
+          <p:spPr>
+            <a:xfrm>
+              <a:off x="2647951" y="533401"/>
+              <a:ext cx="1152523" cy="552449"/>
+            </a:xfrm>
+            <a:prstGeom prst="ellipse">
+              <a:avLst/>
+            </a:prstGeom>
+            <a:solidFill>
+              <a:schemeClr val="lt1">
+                <a:alpha val="0"/>
+              </a:schemeClr>
+            </a:solidFill>
+            <a:ln>
+              <a:solidFill>
+                <a:schemeClr val="tx1">
+                  <a:lumMod val="75000"/>
+                  <a:lumOff val="25000"/>
+                </a:schemeClr>
+              </a:solidFill>
+            </a:ln>
+          </p:spPr>
+          <p:style>
+            <a:lnRef idx="2">
+              <a:schemeClr val="accent6"/>
+            </a:lnRef>
+            <a:fillRef idx="1">
+              <a:schemeClr val="lt1"/>
+            </a:fillRef>
+            <a:effectRef idx="0">
+              <a:schemeClr val="accent6"/>
+            </a:effectRef>
+            <a:fontRef idx="minor">
+              <a:schemeClr val="dk1"/>
+            </a:fontRef>
+          </p:style>
+          <p:txBody>
+            <a:bodyPr rtlCol="0" anchor="ctr"/>
+            <a:lstStyle>
+              <a:lvl1pPr marL="0" indent="0">
+                <a:defRPr sz="1100">
+                  <a:solidFill>
+                    <a:schemeClr val="dk1"/>
+                  </a:solidFill>
+                  <a:latin typeface="+mn-lt"/>
+                  <a:ea typeface="+mn-ea"/>
+                  <a:cs typeface="+mn-cs"/>
+                </a:defRPr>
+              </a:lvl1pPr>
+              <a:lvl2pPr marL="457200" indent="0">
+                <a:defRPr sz="1100">
+                  <a:solidFill>
+                    <a:schemeClr val="dk1"/>
+                  </a:solidFill>
+                  <a:latin typeface="+mn-lt"/>
+                  <a:ea typeface="+mn-ea"/>
+                  <a:cs typeface="+mn-cs"/>
+                </a:defRPr>
+              </a:lvl2pPr>
+              <a:lvl3pPr marL="914400" indent="0">
+                <a:defRPr sz="1100">
+                  <a:solidFill>
+                    <a:schemeClr val="dk1"/>
+                  </a:solidFill>
+                  <a:latin typeface="+mn-lt"/>
+                  <a:ea typeface="+mn-ea"/>
+                  <a:cs typeface="+mn-cs"/>
+                </a:defRPr>
+              </a:lvl3pPr>
+              <a:lvl4pPr marL="1371600" indent="0">
+                <a:defRPr sz="1100">
+                  <a:solidFill>
+                    <a:schemeClr val="dk1"/>
+                  </a:solidFill>
+                  <a:latin typeface="+mn-lt"/>
+                  <a:ea typeface="+mn-ea"/>
+                  <a:cs typeface="+mn-cs"/>
+                </a:defRPr>
+              </a:lvl4pPr>
+              <a:lvl5pPr marL="1828800" indent="0">
+                <a:defRPr sz="1100">
+                  <a:solidFill>
+                    <a:schemeClr val="dk1"/>
+                  </a:solidFill>
+                  <a:latin typeface="+mn-lt"/>
+                  <a:ea typeface="+mn-ea"/>
+                  <a:cs typeface="+mn-cs"/>
+                </a:defRPr>
+              </a:lvl5pPr>
+              <a:lvl6pPr marL="2286000" indent="0">
+                <a:defRPr sz="1100">
+                  <a:solidFill>
+                    <a:schemeClr val="dk1"/>
+                  </a:solidFill>
+                  <a:latin typeface="+mn-lt"/>
+                  <a:ea typeface="+mn-ea"/>
+                  <a:cs typeface="+mn-cs"/>
+                </a:defRPr>
+              </a:lvl6pPr>
+              <a:lvl7pPr marL="2743200" indent="0">
+                <a:defRPr sz="1100">
+                  <a:solidFill>
+                    <a:schemeClr val="dk1"/>
+                  </a:solidFill>
+                  <a:latin typeface="+mn-lt"/>
+                  <a:ea typeface="+mn-ea"/>
+                  <a:cs typeface="+mn-cs"/>
+                </a:defRPr>
+              </a:lvl7pPr>
+              <a:lvl8pPr marL="3200400" indent="0">
+                <a:defRPr sz="1100">
+                  <a:solidFill>
+                    <a:schemeClr val="dk1"/>
+                  </a:solidFill>
+                  <a:latin typeface="+mn-lt"/>
+                  <a:ea typeface="+mn-ea"/>
+                  <a:cs typeface="+mn-cs"/>
+                </a:defRPr>
+              </a:lvl8pPr>
+              <a:lvl9pPr marL="3657600" indent="0">
+                <a:defRPr sz="1100">
+                  <a:solidFill>
+                    <a:schemeClr val="dk1"/>
+                  </a:solidFill>
+                  <a:latin typeface="+mn-lt"/>
+                  <a:ea typeface="+mn-ea"/>
+                  <a:cs typeface="+mn-cs"/>
+                </a:defRPr>
+              </a:lvl9pPr>
+            </a:lstStyle>
+            <a:p>
+              <a:pPr marL="0" indent="0" algn="ctr"/>
+              <a:r>
+                <a:rPr lang="en-GB" sz="1600" b="1">
+                  <a:solidFill>
+                    <a:schemeClr val="tx1">
+                      <a:lumMod val="85000"/>
+                      <a:lumOff val="15000"/>
+                    </a:schemeClr>
+                  </a:solidFill>
+                  <a:latin typeface="Arial" panose="020B0604020202020204" pitchFamily="34" charset="0"/>
+                  <a:ea typeface="+mn-ea"/>
+                  <a:cs typeface="Arial" panose="020B0604020202020204" pitchFamily="34" charset="0"/>
+                </a:rPr>
+                <a:t>SP 1.1</a:t>
+              </a:r>
+            </a:p>
+          </p:txBody>
+        </p:sp>
+        <p:sp>
+          <p:nvSpPr>
+            <p:cNvPr id="32" name="Oval 7"/>
+            <p:cNvSpPr/>
+            <p:nvPr/>
+          </p:nvSpPr>
+          <p:spPr>
+            <a:xfrm>
+              <a:off x="2647951" y="2486026"/>
+              <a:ext cx="1152523" cy="552449"/>
+            </a:xfrm>
+            <a:prstGeom prst="ellipse">
+              <a:avLst/>
+            </a:prstGeom>
+            <a:solidFill>
+              <a:schemeClr val="lt1">
+                <a:alpha val="0"/>
+              </a:schemeClr>
+            </a:solidFill>
+            <a:ln>
+              <a:solidFill>
+                <a:schemeClr val="tx1">
+                  <a:lumMod val="75000"/>
+                  <a:lumOff val="25000"/>
+                </a:schemeClr>
+              </a:solidFill>
+            </a:ln>
+          </p:spPr>
+          <p:style>
+            <a:lnRef idx="2">
+              <a:schemeClr val="accent6"/>
+            </a:lnRef>
+            <a:fillRef idx="1">
+              <a:schemeClr val="lt1"/>
+            </a:fillRef>
+            <a:effectRef idx="0">
+              <a:schemeClr val="accent6"/>
+            </a:effectRef>
+            <a:fontRef idx="minor">
+              <a:schemeClr val="dk1"/>
+            </a:fontRef>
+          </p:style>
+          <p:txBody>
+            <a:bodyPr rtlCol="0" anchor="ctr"/>
+            <a:lstStyle>
+              <a:lvl1pPr marL="0" indent="0">
+                <a:defRPr sz="1100">
+                  <a:solidFill>
+                    <a:schemeClr val="dk1"/>
+                  </a:solidFill>
+                  <a:latin typeface="+mn-lt"/>
+                  <a:ea typeface="+mn-ea"/>
+                  <a:cs typeface="+mn-cs"/>
+                </a:defRPr>
+              </a:lvl1pPr>
+              <a:lvl2pPr marL="457200" indent="0">
+                <a:defRPr sz="1100">
+                  <a:solidFill>
+                    <a:schemeClr val="dk1"/>
+                  </a:solidFill>
+                  <a:latin typeface="+mn-lt"/>
+                  <a:ea typeface="+mn-ea"/>
+                  <a:cs typeface="+mn-cs"/>
+                </a:defRPr>
+              </a:lvl2pPr>
+              <a:lvl3pPr marL="914400" indent="0">
+                <a:defRPr sz="1100">
+                  <a:solidFill>
+                    <a:schemeClr val="dk1"/>
+                  </a:solidFill>
+                  <a:latin typeface="+mn-lt"/>
+                  <a:ea typeface="+mn-ea"/>
+                  <a:cs typeface="+mn-cs"/>
+                </a:defRPr>
+              </a:lvl3pPr>
+              <a:lvl4pPr marL="1371600" indent="0">
+                <a:defRPr sz="1100">
+                  <a:solidFill>
+                    <a:schemeClr val="dk1"/>
+                  </a:solidFill>
+                  <a:latin typeface="+mn-lt"/>
+                  <a:ea typeface="+mn-ea"/>
+                  <a:cs typeface="+mn-cs"/>
+                </a:defRPr>
+              </a:lvl4pPr>
+              <a:lvl5pPr marL="1828800" indent="0">
+                <a:defRPr sz="1100">
+                  <a:solidFill>
+                    <a:schemeClr val="dk1"/>
+                  </a:solidFill>
+                  <a:latin typeface="+mn-lt"/>
+                  <a:ea typeface="+mn-ea"/>
+                  <a:cs typeface="+mn-cs"/>
+                </a:defRPr>
+              </a:lvl5pPr>
+              <a:lvl6pPr marL="2286000" indent="0">
+                <a:defRPr sz="1100">
+                  <a:solidFill>
+                    <a:schemeClr val="dk1"/>
+                  </a:solidFill>
+                  <a:latin typeface="+mn-lt"/>
+                  <a:ea typeface="+mn-ea"/>
+                  <a:cs typeface="+mn-cs"/>
+                </a:defRPr>
+              </a:lvl6pPr>
+              <a:lvl7pPr marL="2743200" indent="0">
+                <a:defRPr sz="1100">
+                  <a:solidFill>
+                    <a:schemeClr val="dk1"/>
+                  </a:solidFill>
+                  <a:latin typeface="+mn-lt"/>
+                  <a:ea typeface="+mn-ea"/>
+                  <a:cs typeface="+mn-cs"/>
+                </a:defRPr>
+              </a:lvl7pPr>
+              <a:lvl8pPr marL="3200400" indent="0">
+                <a:defRPr sz="1100">
+                  <a:solidFill>
+                    <a:schemeClr val="dk1"/>
+                  </a:solidFill>
+                  <a:latin typeface="+mn-lt"/>
+                  <a:ea typeface="+mn-ea"/>
+                  <a:cs typeface="+mn-cs"/>
+                </a:defRPr>
+              </a:lvl8pPr>
+              <a:lvl9pPr marL="3657600" indent="0">
+                <a:defRPr sz="1100">
+                  <a:solidFill>
+                    <a:schemeClr val="dk1"/>
+                  </a:solidFill>
+                  <a:latin typeface="+mn-lt"/>
+                  <a:ea typeface="+mn-ea"/>
+                  <a:cs typeface="+mn-cs"/>
+                </a:defRPr>
+              </a:lvl9pPr>
+            </a:lstStyle>
+            <a:p>
+              <a:pPr marL="0" indent="0" algn="ctr"/>
+              <a:r>
+                <a:rPr lang="en-GB" sz="1600" b="1">
+                  <a:solidFill>
+                    <a:schemeClr val="tx1">
+                      <a:lumMod val="85000"/>
+                      <a:lumOff val="15000"/>
+                    </a:schemeClr>
+                  </a:solidFill>
+                  <a:latin typeface="Arial" panose="020B0604020202020204" pitchFamily="34" charset="0"/>
+                  <a:ea typeface="+mn-ea"/>
+                  <a:cs typeface="Arial" panose="020B0604020202020204" pitchFamily="34" charset="0"/>
+                </a:rPr>
+                <a:t>SP 2.2</a:t>
+              </a:r>
+            </a:p>
+          </p:txBody>
+        </p:sp>
+        <p:sp>
+          <p:nvSpPr>
+            <p:cNvPr id="33" name="Oval 8"/>
+            <p:cNvSpPr/>
+            <p:nvPr/>
+          </p:nvSpPr>
+          <p:spPr>
+            <a:xfrm>
+              <a:off x="2638426" y="1838326"/>
+              <a:ext cx="1152523" cy="552449"/>
+            </a:xfrm>
+            <a:prstGeom prst="ellipse">
+              <a:avLst/>
+            </a:prstGeom>
+            <a:solidFill>
+              <a:schemeClr val="lt1">
+                <a:alpha val="0"/>
+              </a:schemeClr>
+            </a:solidFill>
+            <a:ln>
+              <a:solidFill>
+                <a:schemeClr val="tx1">
+                  <a:lumMod val="75000"/>
+                  <a:lumOff val="25000"/>
+                </a:schemeClr>
+              </a:solidFill>
+            </a:ln>
+          </p:spPr>
+          <p:style>
+            <a:lnRef idx="2">
+              <a:schemeClr val="accent6"/>
+            </a:lnRef>
+            <a:fillRef idx="1">
+              <a:schemeClr val="lt1"/>
+            </a:fillRef>
+            <a:effectRef idx="0">
+              <a:schemeClr val="accent6"/>
+            </a:effectRef>
+            <a:fontRef idx="minor">
+              <a:schemeClr val="dk1"/>
+            </a:fontRef>
+          </p:style>
+          <p:txBody>
+            <a:bodyPr rtlCol="0" anchor="ctr"/>
+            <a:lstStyle>
+              <a:lvl1pPr marL="0" indent="0">
+                <a:defRPr sz="1100">
+                  <a:solidFill>
+                    <a:schemeClr val="dk1"/>
+                  </a:solidFill>
+                  <a:latin typeface="+mn-lt"/>
+                  <a:ea typeface="+mn-ea"/>
+                  <a:cs typeface="+mn-cs"/>
+                </a:defRPr>
+              </a:lvl1pPr>
+              <a:lvl2pPr marL="457200" indent="0">
+                <a:defRPr sz="1100">
+                  <a:solidFill>
+                    <a:schemeClr val="dk1"/>
+                  </a:solidFill>
+                  <a:latin typeface="+mn-lt"/>
+                  <a:ea typeface="+mn-ea"/>
+                  <a:cs typeface="+mn-cs"/>
+                </a:defRPr>
+              </a:lvl2pPr>
+              <a:lvl3pPr marL="914400" indent="0">
+                <a:defRPr sz="1100">
+                  <a:solidFill>
+                    <a:schemeClr val="dk1"/>
+                  </a:solidFill>
+                  <a:latin typeface="+mn-lt"/>
+                  <a:ea typeface="+mn-ea"/>
+                  <a:cs typeface="+mn-cs"/>
+                </a:defRPr>
+              </a:lvl3pPr>
+              <a:lvl4pPr marL="1371600" indent="0">
+                <a:defRPr sz="1100">
+                  <a:solidFill>
+                    <a:schemeClr val="dk1"/>
+                  </a:solidFill>
+                  <a:latin typeface="+mn-lt"/>
+                  <a:ea typeface="+mn-ea"/>
+                  <a:cs typeface="+mn-cs"/>
+                </a:defRPr>
+              </a:lvl4pPr>
+              <a:lvl5pPr marL="1828800" indent="0">
+                <a:defRPr sz="1100">
+                  <a:solidFill>
+                    <a:schemeClr val="dk1"/>
+                  </a:solidFill>
+                  <a:latin typeface="+mn-lt"/>
+                  <a:ea typeface="+mn-ea"/>
+                  <a:cs typeface="+mn-cs"/>
+                </a:defRPr>
+              </a:lvl5pPr>
+              <a:lvl6pPr marL="2286000" indent="0">
+                <a:defRPr sz="1100">
+                  <a:solidFill>
+                    <a:schemeClr val="dk1"/>
+                  </a:solidFill>
+                  <a:latin typeface="+mn-lt"/>
+                  <a:ea typeface="+mn-ea"/>
+                  <a:cs typeface="+mn-cs"/>
+                </a:defRPr>
+              </a:lvl6pPr>
+              <a:lvl7pPr marL="2743200" indent="0">
+                <a:defRPr sz="1100">
+                  <a:solidFill>
+                    <a:schemeClr val="dk1"/>
+                  </a:solidFill>
+                  <a:latin typeface="+mn-lt"/>
+                  <a:ea typeface="+mn-ea"/>
+                  <a:cs typeface="+mn-cs"/>
+                </a:defRPr>
+              </a:lvl7pPr>
+              <a:lvl8pPr marL="3200400" indent="0">
+                <a:defRPr sz="1100">
+                  <a:solidFill>
+                    <a:schemeClr val="dk1"/>
+                  </a:solidFill>
+                  <a:latin typeface="+mn-lt"/>
+                  <a:ea typeface="+mn-ea"/>
+                  <a:cs typeface="+mn-cs"/>
+                </a:defRPr>
+              </a:lvl8pPr>
+              <a:lvl9pPr marL="3657600" indent="0">
+                <a:defRPr sz="1100">
+                  <a:solidFill>
+                    <a:schemeClr val="dk1"/>
+                  </a:solidFill>
+                  <a:latin typeface="+mn-lt"/>
+                  <a:ea typeface="+mn-ea"/>
+                  <a:cs typeface="+mn-cs"/>
+                </a:defRPr>
+              </a:lvl9pPr>
+            </a:lstStyle>
+            <a:p>
+              <a:pPr marL="0" indent="0" algn="ctr"/>
+              <a:r>
+                <a:rPr lang="en-GB" sz="1600" b="1">
+                  <a:solidFill>
+                    <a:schemeClr val="tx1">
+                      <a:lumMod val="85000"/>
+                      <a:lumOff val="15000"/>
+                    </a:schemeClr>
+                  </a:solidFill>
+                  <a:latin typeface="Arial" panose="020B0604020202020204" pitchFamily="34" charset="0"/>
+                  <a:ea typeface="+mn-ea"/>
+                  <a:cs typeface="Arial" panose="020B0604020202020204" pitchFamily="34" charset="0"/>
+                </a:rPr>
+                <a:t>SP 2.1</a:t>
+              </a:r>
+            </a:p>
+          </p:txBody>
+        </p:sp>
+        <p:sp>
+          <p:nvSpPr>
+            <p:cNvPr id="34" name="Rectangle 26"/>
+            <p:cNvSpPr/>
+            <p:nvPr/>
+          </p:nvSpPr>
+          <p:spPr>
+            <a:xfrm>
+              <a:off x="2028825" y="0"/>
+              <a:ext cx="2305050" cy="3209925"/>
+            </a:xfrm>
+            <a:prstGeom prst="rect">
+              <a:avLst/>
+            </a:prstGeom>
+            <a:ln w="25400">
+              <a:solidFill>
+                <a:schemeClr val="tx1">
+                  <a:lumMod val="50000"/>
+                  <a:lumOff val="50000"/>
+                </a:schemeClr>
+              </a:solidFill>
+              <a:prstDash val="sysDot"/>
+              <a:tailEnd type="triangle"/>
+            </a:ln>
+          </p:spPr>
+          <p:style>
+            <a:lnRef idx="1">
+              <a:schemeClr val="accent1"/>
+            </a:lnRef>
+            <a:fillRef idx="0">
+              <a:schemeClr val="accent1"/>
+            </a:fillRef>
+            <a:effectRef idx="0">
+              <a:schemeClr val="accent1"/>
+            </a:effectRef>
+            <a:fontRef idx="minor">
+              <a:schemeClr val="tx1"/>
+            </a:fontRef>
+          </p:style>
+          <p:txBody>
+            <a:bodyPr rtlCol="0" anchor="t"/>
+            <a:lstStyle>
+              <a:lvl1pPr marL="0" indent="0">
+                <a:defRPr sz="1100">
+                  <a:solidFill>
+                    <a:schemeClr val="tx1"/>
+                  </a:solidFill>
+                  <a:latin typeface="+mn-lt"/>
+                  <a:ea typeface="+mn-ea"/>
+                  <a:cs typeface="+mn-cs"/>
+                </a:defRPr>
+              </a:lvl1pPr>
+              <a:lvl2pPr marL="457200" indent="0">
+                <a:defRPr sz="1100">
+                  <a:solidFill>
+                    <a:schemeClr val="tx1"/>
+                  </a:solidFill>
+                  <a:latin typeface="+mn-lt"/>
+                  <a:ea typeface="+mn-ea"/>
+                  <a:cs typeface="+mn-cs"/>
+                </a:defRPr>
+              </a:lvl2pPr>
+              <a:lvl3pPr marL="914400" indent="0">
+                <a:defRPr sz="1100">
+                  <a:solidFill>
+                    <a:schemeClr val="tx1"/>
+                  </a:solidFill>
+                  <a:latin typeface="+mn-lt"/>
+                  <a:ea typeface="+mn-ea"/>
+                  <a:cs typeface="+mn-cs"/>
+                </a:defRPr>
+              </a:lvl3pPr>
+              <a:lvl4pPr marL="1371600" indent="0">
+                <a:defRPr sz="1100">
+                  <a:solidFill>
+                    <a:schemeClr val="tx1"/>
+                  </a:solidFill>
+                  <a:latin typeface="+mn-lt"/>
+                  <a:ea typeface="+mn-ea"/>
+                  <a:cs typeface="+mn-cs"/>
+                </a:defRPr>
+              </a:lvl4pPr>
+              <a:lvl5pPr marL="1828800" indent="0">
+                <a:defRPr sz="1100">
+                  <a:solidFill>
+                    <a:schemeClr val="tx1"/>
+                  </a:solidFill>
+                  <a:latin typeface="+mn-lt"/>
+                  <a:ea typeface="+mn-ea"/>
+                  <a:cs typeface="+mn-cs"/>
+                </a:defRPr>
+              </a:lvl5pPr>
+              <a:lvl6pPr marL="2286000" indent="0">
+                <a:defRPr sz="1100">
+                  <a:solidFill>
+                    <a:schemeClr val="tx1"/>
+                  </a:solidFill>
+                  <a:latin typeface="+mn-lt"/>
+                  <a:ea typeface="+mn-ea"/>
+                  <a:cs typeface="+mn-cs"/>
+                </a:defRPr>
+              </a:lvl6pPr>
+              <a:lvl7pPr marL="2743200" indent="0">
+                <a:defRPr sz="1100">
+                  <a:solidFill>
+                    <a:schemeClr val="tx1"/>
+                  </a:solidFill>
+                  <a:latin typeface="+mn-lt"/>
+                  <a:ea typeface="+mn-ea"/>
+                  <a:cs typeface="+mn-cs"/>
+                </a:defRPr>
+              </a:lvl7pPr>
+              <a:lvl8pPr marL="3200400" indent="0">
+                <a:defRPr sz="1100">
+                  <a:solidFill>
+                    <a:schemeClr val="tx1"/>
+                  </a:solidFill>
+                  <a:latin typeface="+mn-lt"/>
+                  <a:ea typeface="+mn-ea"/>
+                  <a:cs typeface="+mn-cs"/>
+                </a:defRPr>
+              </a:lvl8pPr>
+              <a:lvl9pPr marL="3657600" indent="0">
+                <a:defRPr sz="1100">
+                  <a:solidFill>
+                    <a:schemeClr val="tx1"/>
+                  </a:solidFill>
+                  <a:latin typeface="+mn-lt"/>
+                  <a:ea typeface="+mn-ea"/>
+                  <a:cs typeface="+mn-cs"/>
+                </a:defRPr>
+              </a:lvl9pPr>
+            </a:lstStyle>
+            <a:p>
+              <a:pPr marL="0" indent="0" algn="ctr"/>
+              <a:r>
+                <a:rPr lang="en-GB" sz="1600" b="1">
+                  <a:solidFill>
+                    <a:schemeClr val="tx1">
+                      <a:lumMod val="75000"/>
+                      <a:lumOff val="25000"/>
+                    </a:schemeClr>
+                  </a:solidFill>
+                  <a:latin typeface="+mn-lt"/>
+                  <a:ea typeface="+mn-ea"/>
+                  <a:cs typeface="+mn-cs"/>
+                </a:rPr>
+                <a:t>Práticas</a:t>
+              </a:r>
+            </a:p>
+          </p:txBody>
+        </p:sp>
+        <p:cxnSp>
+          <p:nvCxnSpPr>
+            <p:cNvPr id="35" name="Straight Arrow Connector 38"/>
+            <p:cNvCxnSpPr>
+              <a:stCxn id="28" idx="6"/>
+              <a:endCxn id="31" idx="2"/>
+            </p:cNvCxnSpPr>
+            <p:nvPr/>
+          </p:nvCxnSpPr>
+          <p:spPr>
+            <a:xfrm flipV="1">
+              <a:off x="1495426" y="809626"/>
+              <a:ext cx="1152525" cy="123825"/>
+            </a:xfrm>
+            <a:prstGeom prst="straightConnector1">
+              <a:avLst/>
+            </a:prstGeom>
+            <a:ln w="44450">
+              <a:solidFill>
+                <a:schemeClr val="tx1">
+                  <a:lumMod val="50000"/>
+                  <a:lumOff val="50000"/>
+                </a:schemeClr>
+              </a:solidFill>
+              <a:prstDash val="sysDot"/>
+              <a:tailEnd type="triangle"/>
+            </a:ln>
+          </p:spPr>
+          <p:style>
+            <a:lnRef idx="1">
+              <a:schemeClr val="accent1"/>
+            </a:lnRef>
+            <a:fillRef idx="0">
+              <a:schemeClr val="accent1"/>
+            </a:fillRef>
+            <a:effectRef idx="0">
+              <a:schemeClr val="accent1"/>
+            </a:effectRef>
+            <a:fontRef idx="minor">
+              <a:schemeClr val="tx1"/>
+            </a:fontRef>
+          </p:style>
+        </p:cxnSp>
+        <p:cxnSp>
+          <p:nvCxnSpPr>
+            <p:cNvPr id="36" name="Straight Arrow Connector 40"/>
+            <p:cNvCxnSpPr>
+              <a:stCxn id="28" idx="6"/>
+              <a:endCxn id="30" idx="2"/>
+            </p:cNvCxnSpPr>
+            <p:nvPr/>
+          </p:nvCxnSpPr>
+          <p:spPr>
+            <a:xfrm>
+              <a:off x="1495426" y="933451"/>
+              <a:ext cx="1162050" cy="561975"/>
+            </a:xfrm>
+            <a:prstGeom prst="straightConnector1">
+              <a:avLst/>
+            </a:prstGeom>
+            <a:ln w="44450">
+              <a:solidFill>
+                <a:schemeClr val="tx1">
+                  <a:lumMod val="50000"/>
+                  <a:lumOff val="50000"/>
+                </a:schemeClr>
+              </a:solidFill>
+              <a:prstDash val="sysDot"/>
+              <a:tailEnd type="triangle"/>
+            </a:ln>
+          </p:spPr>
+          <p:style>
+            <a:lnRef idx="1">
+              <a:schemeClr val="accent1"/>
+            </a:lnRef>
+            <a:fillRef idx="0">
+              <a:schemeClr val="accent1"/>
+            </a:fillRef>
+            <a:effectRef idx="0">
+              <a:schemeClr val="accent1"/>
+            </a:effectRef>
+            <a:fontRef idx="minor">
+              <a:schemeClr val="tx1"/>
+            </a:fontRef>
+          </p:style>
+        </p:cxnSp>
+        <p:cxnSp>
+          <p:nvCxnSpPr>
+            <p:cNvPr id="37" name="Straight Arrow Connector 43"/>
+            <p:cNvCxnSpPr>
+              <a:stCxn id="29" idx="6"/>
+              <a:endCxn id="33" idx="2"/>
+            </p:cNvCxnSpPr>
+            <p:nvPr/>
+          </p:nvCxnSpPr>
+          <p:spPr>
+            <a:xfrm flipV="1">
+              <a:off x="1476376" y="2114551"/>
+              <a:ext cx="1162050" cy="257175"/>
+            </a:xfrm>
+            <a:prstGeom prst="straightConnector1">
+              <a:avLst/>
+            </a:prstGeom>
+            <a:ln w="44450">
+              <a:solidFill>
+                <a:schemeClr val="tx1">
+                  <a:lumMod val="50000"/>
+                  <a:lumOff val="50000"/>
+                </a:schemeClr>
+              </a:solidFill>
+              <a:prstDash val="sysDot"/>
+              <a:tailEnd type="triangle"/>
+            </a:ln>
+          </p:spPr>
+          <p:style>
+            <a:lnRef idx="1">
+              <a:schemeClr val="accent1"/>
+            </a:lnRef>
+            <a:fillRef idx="0">
+              <a:schemeClr val="accent1"/>
+            </a:fillRef>
+            <a:effectRef idx="0">
+              <a:schemeClr val="accent1"/>
+            </a:effectRef>
+            <a:fontRef idx="minor">
+              <a:schemeClr val="tx1"/>
+            </a:fontRef>
+          </p:style>
+        </p:cxnSp>
+        <p:cxnSp>
+          <p:nvCxnSpPr>
+            <p:cNvPr id="38" name="Straight Arrow Connector 46"/>
+            <p:cNvCxnSpPr>
+              <a:stCxn id="29" idx="6"/>
+              <a:endCxn id="32" idx="2"/>
+            </p:cNvCxnSpPr>
+            <p:nvPr/>
+          </p:nvCxnSpPr>
+          <p:spPr>
+            <a:xfrm>
+              <a:off x="1476376" y="2371726"/>
+              <a:ext cx="1171575" cy="390525"/>
+            </a:xfrm>
+            <a:prstGeom prst="straightConnector1">
+              <a:avLst/>
+            </a:prstGeom>
+            <a:ln w="44450">
+              <a:solidFill>
+                <a:schemeClr val="tx1">
+                  <a:lumMod val="50000"/>
+                  <a:lumOff val="50000"/>
+                </a:schemeClr>
+              </a:solidFill>
+              <a:prstDash val="sysDot"/>
+              <a:tailEnd type="triangle"/>
+            </a:ln>
+          </p:spPr>
+          <p:style>
+            <a:lnRef idx="1">
+              <a:schemeClr val="accent1"/>
+            </a:lnRef>
+            <a:fillRef idx="0">
+              <a:schemeClr val="accent1"/>
+            </a:fillRef>
+            <a:effectRef idx="0">
+              <a:schemeClr val="accent1"/>
+            </a:effectRef>
+            <a:fontRef idx="minor">
+              <a:schemeClr val="tx1"/>
+            </a:fontRef>
+          </p:style>
+        </p:cxnSp>
+      </p:grpSp>
     </p:spTree>
   </p:cSld>
   <p:clrMapOvr>
@@ -5403,7 +7812,7 @@
       </p:grpSpPr>
       <p:sp>
         <p:nvSpPr>
-          <p:cNvPr id="27650" name="Rectangle 2"/>
+          <p:cNvPr id="19458" name="Rectangle 2"/>
           <p:cNvSpPr>
             <a:spLocks noGrp="1" noChangeArrowheads="1"/>
           </p:cNvSpPr>
@@ -5417,15 +7826,16 @@
           <a:lstStyle/>
           <a:p>
             <a:r>
-              <a:rPr lang="en-GB" altLang="en-US"/>
-              <a:t>Key Issues</a:t>
-            </a:r>
+              <a:rPr lang="en-GB" altLang="en-US" dirty="0" smtClean="0"/>
+              <a:t>CMMI - PPQA</a:t>
+            </a:r>
+            <a:endParaRPr lang="en-GB" altLang="en-US" dirty="0"/>
           </a:p>
         </p:txBody>
       </p:sp>
       <p:sp>
         <p:nvSpPr>
-          <p:cNvPr id="27651" name="Rectangle 3"/>
+          <p:cNvPr id="19459" name="Rectangle 3"/>
           <p:cNvSpPr>
             <a:spLocks noGrp="1" noChangeArrowheads="1"/>
           </p:cNvSpPr>
@@ -5439,49 +7849,272 @@
           <a:lstStyle/>
           <a:p>
             <a:r>
-              <a:rPr lang="en-GB" altLang="en-US"/>
-              <a:t>Near term</a:t>
+              <a:rPr lang="pt-BR" sz="1600" b="1" dirty="0" smtClean="0"/>
+              <a:t>SG 1 - Aderência dos processos e produtos de trabalhos associados com as descrições do processo, padronizar e avaliar objetivamente o processo. </a:t>
             </a:r>
           </a:p>
           <a:p>
             <a:pPr lvl="1"/>
             <a:r>
-              <a:rPr lang="en-GB" altLang="en-US"/>
-              <a:t>Identify key decisions and issues that need immediate or near-term resolution.</a:t>
+              <a:rPr lang="pt-BR" sz="1400" dirty="0" smtClean="0"/>
+              <a:t>SP 1.1 Avaliar objetivamente processos realizados, selecionado contra descrições aplicáveis de processo, padrões e procedimentos. </a:t>
             </a:r>
           </a:p>
           <a:p>
             <a:pPr lvl="1"/>
             <a:r>
-              <a:rPr lang="en-GB" altLang="en-US"/>
-              <a:t>State consequences of decision postponement.</a:t>
-            </a:r>
-          </a:p>
-          <a:p>
-            <a:r>
-              <a:rPr lang="en-GB" altLang="en-US"/>
-              <a:t>Long term</a:t>
+              <a:rPr lang="pt-BR" sz="1400" dirty="0" smtClean="0"/>
+              <a:t>SP 1.2 Avaliar objetivamente produtos de trabalho selecionado contra as descrições aplicáveis de processo, padrões e procedimentos. </a:t>
+            </a:r>
+          </a:p>
+          <a:p>
+            <a:r>
+              <a:rPr lang="pt-BR" sz="1600" b="1" dirty="0" smtClean="0"/>
+              <a:t>SG 2 - Questões de não conformidades são objetivamente rastreadas e comunicados, e é assegurada a resolução. </a:t>
             </a:r>
           </a:p>
           <a:p>
             <a:pPr lvl="1"/>
             <a:r>
-              <a:rPr lang="en-GB" altLang="en-US"/>
-              <a:t>Identify issues needing long-term resolution.</a:t>
+              <a:rPr lang="pt-BR" sz="1400" dirty="0" smtClean="0"/>
+              <a:t>SP 2.1 Comunicar problemas de qualidade e garantir a resolução dos problemas de não conformidade com a equipe e gestores. </a:t>
             </a:r>
           </a:p>
           <a:p>
             <a:pPr lvl="1"/>
             <a:r>
-              <a:rPr lang="en-GB" altLang="en-US"/>
-              <a:t>State consequences of decision postponement.</a:t>
-            </a:r>
-          </a:p>
-          <a:p>
-            <a:r>
-              <a:rPr lang="en-GB" altLang="en-US"/>
-              <a:t>If you are seeking funding, be specific about any issues that require financial resources for resolution.</a:t>
-            </a:r>
+              <a:rPr lang="pt-BR" sz="1400" dirty="0" smtClean="0"/>
+              <a:t>SP 2.2 Estabelecer e manter registros das atividades de garantia de qualidade.</a:t>
+            </a:r>
+            <a:endParaRPr lang="en-GB" altLang="en-US" sz="1400" i="1" dirty="0" smtClean="0">
+              <a:latin typeface="Times New Roman" pitchFamily="18" charset="0"/>
+              <a:cs typeface="Times New Roman" pitchFamily="18" charset="0"/>
+            </a:endParaRPr>
+          </a:p>
+        </p:txBody>
+      </p:sp>
+    </p:spTree>
+  </p:cSld>
+  <p:clrMapOvr>
+    <a:masterClrMapping/>
+  </p:clrMapOvr>
+  <p:timing>
+    <p:tnLst>
+      <p:par>
+        <p:cTn id="1" dur="indefinite" restart="never" nodeType="tmRoot"/>
+      </p:par>
+    </p:tnLst>
+  </p:timing>
+</p:sld>
+</file>
+
+<file path=ppt/slides/slide18.xml><?xml version="1.0" encoding="utf-8"?>
+<p:sld xmlns:a="http://schemas.openxmlformats.org/drawingml/2006/main" xmlns:r="http://schemas.openxmlformats.org/officeDocument/2006/relationships" xmlns:p="http://schemas.openxmlformats.org/presentationml/2006/main">
+  <p:cSld>
+    <p:spTree>
+      <p:nvGrpSpPr>
+        <p:cNvPr id="1" name=""/>
+        <p:cNvGrpSpPr/>
+        <p:nvPr/>
+      </p:nvGrpSpPr>
+      <p:grpSpPr>
+        <a:xfrm>
+          <a:off x="0" y="0"/>
+          <a:ext cx="0" cy="0"/>
+          <a:chOff x="0" y="0"/>
+          <a:chExt cx="0" cy="0"/>
+        </a:xfrm>
+      </p:grpSpPr>
+      <p:sp>
+        <p:nvSpPr>
+          <p:cNvPr id="19458" name="Rectangle 2"/>
+          <p:cNvSpPr>
+            <a:spLocks noGrp="1" noChangeArrowheads="1"/>
+          </p:cNvSpPr>
+          <p:nvPr>
+            <p:ph type="title"/>
+          </p:nvPr>
+        </p:nvSpPr>
+        <p:spPr/>
+        <p:txBody>
+          <a:bodyPr/>
+          <a:lstStyle/>
+          <a:p>
+            <a:r>
+              <a:rPr lang="en-GB" altLang="en-US" dirty="0" smtClean="0"/>
+              <a:t>CMMI - PPQA</a:t>
+            </a:r>
+            <a:endParaRPr lang="en-GB" altLang="en-US" dirty="0"/>
+          </a:p>
+        </p:txBody>
+      </p:sp>
+      <p:sp>
+        <p:nvSpPr>
+          <p:cNvPr id="19459" name="Rectangle 3"/>
+          <p:cNvSpPr>
+            <a:spLocks noGrp="1" noChangeArrowheads="1"/>
+          </p:cNvSpPr>
+          <p:nvPr>
+            <p:ph type="body" idx="1"/>
+          </p:nvPr>
+        </p:nvSpPr>
+        <p:spPr/>
+        <p:txBody>
+          <a:bodyPr/>
+          <a:lstStyle/>
+          <a:p>
+            <a:r>
+              <a:rPr lang="pt-BR" b="1" dirty="0" smtClean="0"/>
+              <a:t>De forma geral</a:t>
+            </a:r>
+            <a:endParaRPr lang="pt-BR" dirty="0" smtClean="0"/>
+          </a:p>
+          <a:p>
+            <a:pPr lvl="1"/>
+            <a:r>
+              <a:rPr lang="pt-BR" sz="1800" dirty="0" smtClean="0"/>
+              <a:t>Avaliar a aderência dos produtos de trabalho e serviços com as descrições dos processos, padrões e procedimentos </a:t>
+            </a:r>
+            <a:r>
+              <a:rPr lang="pt-BR" sz="1800" dirty="0" smtClean="0"/>
+              <a:t>estabelecidos </a:t>
+            </a:r>
+          </a:p>
+          <a:p>
+            <a:pPr lvl="1"/>
+            <a:r>
+              <a:rPr lang="pt-BR" sz="1800" dirty="0" smtClean="0"/>
+              <a:t>Identificar e documentar problemas de não </a:t>
+            </a:r>
+            <a:r>
+              <a:rPr lang="pt-BR" sz="1800" dirty="0" smtClean="0"/>
+              <a:t>conformidade</a:t>
+            </a:r>
+            <a:endParaRPr lang="pt-BR" sz="1800" dirty="0" smtClean="0"/>
+          </a:p>
+          <a:p>
+            <a:pPr lvl="1"/>
+            <a:r>
+              <a:rPr lang="pt-BR" sz="1800" dirty="0" smtClean="0"/>
+              <a:t>Manter equipe e gestores informados dos resultados sobre as atividades da Garantia da Qualidade</a:t>
+            </a:r>
+            <a:r>
+              <a:rPr lang="pt-BR" sz="1800" dirty="0" smtClean="0"/>
+              <a:t>.</a:t>
+            </a:r>
+            <a:endParaRPr lang="pt-BR" sz="1800" dirty="0" smtClean="0"/>
+          </a:p>
+          <a:p>
+            <a:pPr lvl="1"/>
+            <a:r>
+              <a:rPr lang="pt-BR" sz="1800" dirty="0" smtClean="0"/>
+              <a:t>Certificar que problemas de não conformidade estão devidamente delegados (CMMI, 2010) e (</a:t>
+            </a:r>
+            <a:r>
+              <a:rPr lang="pt-BR" sz="1800" dirty="0" smtClean="0"/>
+              <a:t>MANUVANNAN, 2010) </a:t>
+            </a:r>
+          </a:p>
+          <a:p>
+            <a:pPr lvl="1">
+              <a:buNone/>
+            </a:pPr>
+            <a:endParaRPr lang="pt-BR" sz="1800" dirty="0" smtClean="0"/>
+          </a:p>
+        </p:txBody>
+      </p:sp>
+    </p:spTree>
+  </p:cSld>
+  <p:clrMapOvr>
+    <a:masterClrMapping/>
+  </p:clrMapOvr>
+  <p:timing>
+    <p:tnLst>
+      <p:par>
+        <p:cTn id="1" dur="indefinite" restart="never" nodeType="tmRoot"/>
+      </p:par>
+    </p:tnLst>
+  </p:timing>
+</p:sld>
+</file>
+
+<file path=ppt/slides/slide19.xml><?xml version="1.0" encoding="utf-8"?>
+<p:sld xmlns:a="http://schemas.openxmlformats.org/drawingml/2006/main" xmlns:r="http://schemas.openxmlformats.org/officeDocument/2006/relationships" xmlns:p="http://schemas.openxmlformats.org/presentationml/2006/main">
+  <p:cSld>
+    <p:spTree>
+      <p:nvGrpSpPr>
+        <p:cNvPr id="1" name=""/>
+        <p:cNvGrpSpPr/>
+        <p:nvPr/>
+      </p:nvGrpSpPr>
+      <p:grpSpPr>
+        <a:xfrm>
+          <a:off x="0" y="0"/>
+          <a:ext cx="0" cy="0"/>
+          <a:chOff x="0" y="0"/>
+          <a:chExt cx="0" cy="0"/>
+        </a:xfrm>
+      </p:grpSpPr>
+      <p:sp>
+        <p:nvSpPr>
+          <p:cNvPr id="19458" name="Rectangle 2"/>
+          <p:cNvSpPr>
+            <a:spLocks noGrp="1" noChangeArrowheads="1"/>
+          </p:cNvSpPr>
+          <p:nvPr>
+            <p:ph type="title"/>
+          </p:nvPr>
+        </p:nvSpPr>
+        <p:spPr/>
+        <p:txBody>
+          <a:bodyPr/>
+          <a:lstStyle/>
+          <a:p>
+            <a:r>
+              <a:rPr lang="en-GB" altLang="en-US" dirty="0" err="1" smtClean="0"/>
+              <a:t>Proposta</a:t>
+            </a:r>
+            <a:endParaRPr lang="en-GB" altLang="en-US" dirty="0"/>
+          </a:p>
+        </p:txBody>
+      </p:sp>
+      <p:sp>
+        <p:nvSpPr>
+          <p:cNvPr id="19459" name="Rectangle 3"/>
+          <p:cNvSpPr>
+            <a:spLocks noGrp="1" noChangeArrowheads="1"/>
+          </p:cNvSpPr>
+          <p:nvPr>
+            <p:ph type="body" idx="1"/>
+          </p:nvPr>
+        </p:nvSpPr>
+        <p:spPr/>
+        <p:txBody>
+          <a:bodyPr/>
+          <a:lstStyle/>
+          <a:p>
+            <a:pPr lvl="1"/>
+            <a:r>
+              <a:rPr lang="en-GB" altLang="en-US" dirty="0" err="1" smtClean="0">
+                <a:cs typeface="Times New Roman" pitchFamily="18" charset="0"/>
+              </a:rPr>
+              <a:t>Áreas</a:t>
+            </a:r>
+            <a:r>
+              <a:rPr lang="en-GB" altLang="en-US" dirty="0" smtClean="0">
+                <a:cs typeface="Times New Roman" pitchFamily="18" charset="0"/>
+              </a:rPr>
+              <a:t> de </a:t>
+            </a:r>
+            <a:r>
+              <a:rPr lang="en-GB" altLang="en-US" dirty="0" err="1" smtClean="0">
+                <a:cs typeface="Times New Roman" pitchFamily="18" charset="0"/>
+              </a:rPr>
+              <a:t>processo</a:t>
+            </a:r>
+            <a:endParaRPr lang="en-GB" altLang="en-US" dirty="0" smtClean="0">
+              <a:cs typeface="Times New Roman" pitchFamily="18" charset="0"/>
+            </a:endParaRPr>
           </a:p>
         </p:txBody>
       </p:sp>
@@ -6067,11 +8700,7 @@
             </a:r>
             <a:r>
               <a:rPr lang="en-GB" altLang="en-US" dirty="0" smtClean="0"/>
-              <a:t> </a:t>
-            </a:r>
-            <a:r>
-              <a:rPr lang="en-GB" altLang="en-US" dirty="0" smtClean="0"/>
-              <a:t>= </a:t>
+              <a:t> = </a:t>
             </a:r>
             <a:r>
               <a:rPr lang="en-GB" altLang="en-US" dirty="0" err="1" smtClean="0"/>
@@ -6169,7 +8798,7 @@
         <p:spPr>
           <a:xfrm>
             <a:off x="3995936" y="2348880"/>
-            <a:ext cx="2880320" cy="2880320"/>
+            <a:ext cx="2520280" cy="2520280"/>
           </a:xfrm>
           <a:prstGeom prst="rect">
             <a:avLst/>
@@ -7286,7 +9915,7 @@
     </p:spTree>
     <p:extLst>
       <p:ext uri="{BB962C8B-B14F-4D97-AF65-F5344CB8AC3E}">
-        <p14:creationId xmlns:p14="http://schemas.microsoft.com/office/powerpoint/2010/main" val="3781259700"/>
+        <p14:creationId xmlns:p14="http://schemas.microsoft.com/office/powerpoint/2010/main" xmlns="" val="3781259700"/>
       </p:ext>
     </p:extLst>
   </p:cSld>
@@ -7422,7 +10051,7 @@
     </p:spTree>
     <p:extLst>
       <p:ext uri="{BB962C8B-B14F-4D97-AF65-F5344CB8AC3E}">
-        <p14:creationId xmlns:p14="http://schemas.microsoft.com/office/powerpoint/2010/main" val="173649872"/>
+        <p14:creationId xmlns:p14="http://schemas.microsoft.com/office/powerpoint/2010/main" xmlns="" val="173649872"/>
       </p:ext>
     </p:extLst>
   </p:cSld>
@@ -7479,7 +10108,6 @@
               <a:rPr lang="en-GB" altLang="en-US" dirty="0"/>
               <a:t> de Software</a:t>
             </a:r>
-            <a:endParaRPr lang="en-GB" altLang="en-US" dirty="0"/>
           </a:p>
         </p:txBody>
       </p:sp>
@@ -9400,7 +12028,7 @@
     </p:spTree>
     <p:extLst>
       <p:ext uri="{BB962C8B-B14F-4D97-AF65-F5344CB8AC3E}">
-        <p14:creationId xmlns:p14="http://schemas.microsoft.com/office/powerpoint/2010/main" val="4150305661"/>
+        <p14:creationId xmlns:p14="http://schemas.microsoft.com/office/powerpoint/2010/main" xmlns="" val="4150305661"/>
       </p:ext>
     </p:extLst>
   </p:cSld>
@@ -9451,27 +12079,11 @@
           <a:p>
             <a:r>
               <a:rPr lang="en-GB" altLang="en-US" dirty="0" err="1" smtClean="0"/>
-              <a:t>Garantia</a:t>
+              <a:t>Qualidade</a:t>
             </a:r>
             <a:r>
               <a:rPr lang="en-GB" altLang="en-US" dirty="0" smtClean="0"/>
-              <a:t> </a:t>
-            </a:r>
-            <a:r>
-              <a:rPr lang="en-GB" altLang="en-US" dirty="0" err="1" smtClean="0"/>
-              <a:t>da</a:t>
-            </a:r>
-            <a:r>
-              <a:rPr lang="en-GB" altLang="en-US" dirty="0" smtClean="0"/>
-              <a:t> </a:t>
-            </a:r>
-            <a:r>
-              <a:rPr lang="en-GB" altLang="en-US" dirty="0" err="1" smtClean="0"/>
-              <a:t>qualidade</a:t>
-            </a:r>
-            <a:r>
-              <a:rPr lang="en-GB" altLang="en-US" dirty="0" smtClean="0"/>
-              <a:t>?</a:t>
+              <a:t> de Software</a:t>
             </a:r>
             <a:endParaRPr lang="en-GB" altLang="en-US" dirty="0"/>
           </a:p>
@@ -9493,110 +12105,198 @@
           <a:lstStyle/>
           <a:p>
             <a:r>
+              <a:rPr lang="en-GB" altLang="en-US" dirty="0" err="1" smtClean="0"/>
+              <a:t>Premissa</a:t>
+            </a:r>
+            <a:r>
               <a:rPr lang="en-GB" altLang="en-US" dirty="0" smtClean="0"/>
-              <a:t>O </a:t>
+              <a:t> – </a:t>
             </a:r>
             <a:r>
               <a:rPr lang="en-GB" altLang="en-US" dirty="0" err="1" smtClean="0"/>
-              <a:t>quê</a:t>
+              <a:t>Qualidade</a:t>
             </a:r>
             <a:r>
               <a:rPr lang="en-GB" altLang="en-US" dirty="0" smtClean="0"/>
-              <a:t> se </a:t>
+              <a:t> de Software é </a:t>
             </a:r>
             <a:r>
               <a:rPr lang="en-GB" altLang="en-US" dirty="0" err="1" smtClean="0"/>
-              <a:t>busca</a:t>
+              <a:t>fruto</a:t>
             </a:r>
             <a:r>
               <a:rPr lang="en-GB" altLang="en-US" dirty="0" smtClean="0"/>
-              <a:t> com </a:t>
+              <a:t> de </a:t>
             </a:r>
             <a:r>
               <a:rPr lang="en-GB" altLang="en-US" dirty="0" err="1" smtClean="0"/>
-              <a:t>garantia</a:t>
+              <a:t>processos</a:t>
             </a:r>
             <a:r>
               <a:rPr lang="en-GB" altLang="en-US" dirty="0" smtClean="0"/>
-              <a:t> </a:t>
-            </a:r>
-            <a:r>
-              <a:rPr lang="en-GB" altLang="en-US" dirty="0" err="1" smtClean="0"/>
-              <a:t>da</a:t>
-            </a:r>
-            <a:r>
-              <a:rPr lang="en-GB" altLang="en-US" dirty="0" smtClean="0"/>
-              <a:t> </a:t>
+              <a:t> de </a:t>
             </a:r>
             <a:r>
               <a:rPr lang="en-GB" altLang="en-US" dirty="0" err="1" smtClean="0"/>
               <a:t>qualidade</a:t>
             </a:r>
-            <a:r>
-              <a:rPr lang="en-GB" altLang="en-US" dirty="0" smtClean="0"/>
-              <a:t>?</a:t>
-            </a:r>
-            <a:endParaRPr lang="en-GB" altLang="en-US" dirty="0"/>
-          </a:p>
-          <a:p>
-            <a:pPr lvl="1"/>
-            <a:r>
-              <a:rPr lang="en-GB" altLang="en-US" dirty="0" err="1" smtClean="0"/>
-              <a:t>Processos</a:t>
-            </a:r>
-            <a:r>
-              <a:rPr lang="en-GB" altLang="en-US" dirty="0" smtClean="0"/>
-              <a:t> de </a:t>
-            </a:r>
-            <a:r>
-              <a:rPr lang="en-GB" altLang="en-US" dirty="0" err="1" smtClean="0"/>
-              <a:t>qualidade</a:t>
-            </a:r>
-            <a:r>
-              <a:rPr lang="en-GB" altLang="en-US" dirty="0" smtClean="0"/>
-              <a:t> com o </a:t>
-            </a:r>
-            <a:r>
-              <a:rPr lang="en-GB" altLang="en-US" dirty="0" err="1" smtClean="0"/>
-              <a:t>intuito</a:t>
-            </a:r>
-            <a:r>
-              <a:rPr lang="en-GB" altLang="en-US" dirty="0" smtClean="0"/>
-              <a:t> de </a:t>
-            </a:r>
-            <a:r>
-              <a:rPr lang="en-GB" altLang="en-US" dirty="0" err="1" smtClean="0"/>
-              <a:t>obter</a:t>
-            </a:r>
-            <a:r>
-              <a:rPr lang="en-GB" altLang="en-US" dirty="0" smtClean="0"/>
-              <a:t> um </a:t>
-            </a:r>
-            <a:r>
-              <a:rPr lang="en-GB" altLang="en-US" dirty="0" err="1" smtClean="0"/>
-              <a:t>produto</a:t>
-            </a:r>
-            <a:r>
-              <a:rPr lang="en-GB" altLang="en-US" dirty="0" smtClean="0"/>
-              <a:t> de </a:t>
-            </a:r>
-            <a:r>
-              <a:rPr lang="en-GB" altLang="en-US" dirty="0" err="1" smtClean="0"/>
-              <a:t>trabalho</a:t>
-            </a:r>
-            <a:r>
-              <a:rPr lang="en-GB" altLang="en-US" dirty="0" smtClean="0"/>
-              <a:t> com </a:t>
-            </a:r>
-            <a:r>
-              <a:rPr lang="en-GB" altLang="en-US" dirty="0" err="1" smtClean="0"/>
-              <a:t>qualidade</a:t>
-            </a:r>
-            <a:r>
-              <a:rPr lang="en-GB" altLang="en-US" dirty="0" smtClean="0"/>
-              <a:t>.</a:t>
-            </a:r>
-            <a:endParaRPr lang="en-GB" altLang="en-US" dirty="0"/>
+            <a:endParaRPr lang="en-GB" altLang="en-US" dirty="0" smtClean="0"/>
+          </a:p>
+          <a:p>
+            <a:endParaRPr lang="en-GB" altLang="en-US" dirty="0" smtClean="0"/>
+          </a:p>
+          <a:p>
+            <a:pPr lvl="1">
+              <a:buNone/>
+            </a:pPr>
+            <a:r>
+              <a:rPr lang="en-GB" altLang="en-US" sz="5400" dirty="0" smtClean="0">
+                <a:latin typeface="Arial Black" pitchFamily="34" charset="0"/>
+                <a:cs typeface="Arial" pitchFamily="34" charset="0"/>
+              </a:rPr>
+              <a:t>“ </a:t>
+            </a:r>
+            <a:r>
+              <a:rPr lang="en-GB" altLang="en-US" i="1" dirty="0" smtClean="0">
+                <a:latin typeface="Times New Roman" pitchFamily="18" charset="0"/>
+                <a:cs typeface="Times New Roman" pitchFamily="18" charset="0"/>
+              </a:rPr>
+              <a:t>...</a:t>
+            </a:r>
+            <a:r>
+              <a:rPr lang="pt-BR" altLang="en-US" i="1" dirty="0" smtClean="0">
+                <a:latin typeface="Times New Roman" pitchFamily="18" charset="0"/>
+                <a:cs typeface="Times New Roman" pitchFamily="18" charset="0"/>
+              </a:rPr>
+              <a:t>é</a:t>
+            </a:r>
+            <a:r>
+              <a:rPr lang="pt-BR" altLang="en-US" i="1" dirty="0" smtClean="0">
+                <a:latin typeface="Times New Roman" pitchFamily="18" charset="0"/>
+                <a:cs typeface="Times New Roman" pitchFamily="18" charset="0"/>
+              </a:rPr>
+              <a:t> </a:t>
+            </a:r>
+            <a:r>
+              <a:rPr lang="pt-BR" altLang="en-US" i="1" dirty="0" smtClean="0">
+                <a:latin typeface="Times New Roman" pitchFamily="18" charset="0"/>
+                <a:cs typeface="Times New Roman" pitchFamily="18" charset="0"/>
+              </a:rPr>
+              <a:t>impossível obter um software de qualidade com processos de desenvolvimento frágeis e deficientes</a:t>
+            </a:r>
+            <a:r>
+              <a:rPr lang="en-GB" altLang="en-US" i="1" dirty="0" smtClean="0">
+                <a:latin typeface="Times New Roman" pitchFamily="18" charset="0"/>
+                <a:cs typeface="Times New Roman" pitchFamily="18" charset="0"/>
+              </a:rPr>
+              <a:t> </a:t>
+            </a:r>
+            <a:r>
+              <a:rPr lang="en-GB" altLang="en-US" i="1" dirty="0" smtClean="0">
+                <a:latin typeface="Times New Roman" pitchFamily="18" charset="0"/>
+                <a:cs typeface="Times New Roman" pitchFamily="18" charset="0"/>
+              </a:rPr>
+              <a:t>– </a:t>
+            </a:r>
+            <a:r>
+              <a:rPr lang="en-GB" altLang="en-US" i="1" dirty="0" smtClean="0">
+                <a:latin typeface="Times New Roman" pitchFamily="18" charset="0"/>
+                <a:cs typeface="Times New Roman" pitchFamily="18" charset="0"/>
+              </a:rPr>
+              <a:t>BARTIÉ, 2002.</a:t>
+            </a:r>
+            <a:endParaRPr lang="en-GB" altLang="en-US" i="1" dirty="0" smtClean="0">
+              <a:latin typeface="Times New Roman" pitchFamily="18" charset="0"/>
+              <a:cs typeface="Times New Roman" pitchFamily="18" charset="0"/>
+            </a:endParaRPr>
+          </a:p>
+          <a:p>
+            <a:pPr lvl="1">
+              <a:buNone/>
+            </a:pPr>
+            <a:endParaRPr lang="en-GB" altLang="en-US" i="1" dirty="0" smtClean="0">
+              <a:latin typeface="Times New Roman" pitchFamily="18" charset="0"/>
+              <a:cs typeface="Times New Roman" pitchFamily="18" charset="0"/>
+            </a:endParaRPr>
+          </a:p>
+          <a:p>
+            <a:pPr lvl="1">
+              <a:buNone/>
+            </a:pPr>
+            <a:r>
+              <a:rPr lang="en-GB" altLang="en-US" sz="5400" dirty="0" smtClean="0">
+                <a:latin typeface="Arial Black" pitchFamily="34" charset="0"/>
+                <a:cs typeface="Times New Roman" pitchFamily="18" charset="0"/>
+              </a:rPr>
+              <a:t>“</a:t>
+            </a:r>
+            <a:r>
+              <a:rPr lang="en-GB" altLang="en-US" sz="5400" dirty="0" smtClean="0">
+                <a:latin typeface="Arial Black" pitchFamily="34" charset="0"/>
+                <a:cs typeface="Arial" pitchFamily="34" charset="0"/>
+              </a:rPr>
+              <a:t> </a:t>
+            </a:r>
+            <a:r>
+              <a:rPr lang="en-GB" altLang="en-US" i="1" dirty="0" smtClean="0">
+                <a:latin typeface="Times New Roman" pitchFamily="18" charset="0"/>
+                <a:cs typeface="Times New Roman" pitchFamily="18" charset="0"/>
+              </a:rPr>
+              <a:t>...</a:t>
+            </a:r>
+            <a:r>
+              <a:rPr lang="pt-BR" i="1" dirty="0" smtClean="0">
+                <a:latin typeface="Times New Roman" pitchFamily="18" charset="0"/>
+                <a:cs typeface="Times New Roman" pitchFamily="18" charset="0"/>
+              </a:rPr>
+              <a:t>a </a:t>
+            </a:r>
+            <a:r>
+              <a:rPr lang="pt-BR" i="1" dirty="0" smtClean="0">
+                <a:latin typeface="Times New Roman" pitchFamily="18" charset="0"/>
+                <a:cs typeface="Times New Roman" pitchFamily="18" charset="0"/>
+              </a:rPr>
+              <a:t>garantia da qualidade de software é uma “atividade de guarda-chuva” que é aplicada ao longo de todo o processo de engenharia de </a:t>
+            </a:r>
+            <a:r>
+              <a:rPr lang="pt-BR" i="1" dirty="0" smtClean="0">
+                <a:latin typeface="Times New Roman" pitchFamily="18" charset="0"/>
+                <a:cs typeface="Times New Roman" pitchFamily="18" charset="0"/>
+              </a:rPr>
+              <a:t>software</a:t>
+            </a:r>
+            <a:r>
+              <a:rPr lang="pt-BR" i="1" dirty="0" smtClean="0">
+                <a:latin typeface="Times New Roman" pitchFamily="18" charset="0"/>
+                <a:cs typeface="Times New Roman" pitchFamily="18" charset="0"/>
+              </a:rPr>
+              <a:t> </a:t>
+            </a:r>
+            <a:r>
+              <a:rPr lang="pt-BR" i="1" dirty="0" smtClean="0">
+                <a:latin typeface="Times New Roman" pitchFamily="18" charset="0"/>
+                <a:cs typeface="Times New Roman" pitchFamily="18" charset="0"/>
+              </a:rPr>
+              <a:t>– </a:t>
+            </a:r>
+            <a:r>
+              <a:rPr lang="pt-BR" i="1" dirty="0" smtClean="0">
+                <a:latin typeface="Times New Roman" pitchFamily="18" charset="0"/>
+                <a:cs typeface="Times New Roman" pitchFamily="18" charset="0"/>
+              </a:rPr>
+              <a:t>PRESSMAN</a:t>
+            </a:r>
+            <a:r>
+              <a:rPr lang="pt-BR" i="1" dirty="0" smtClean="0">
+                <a:latin typeface="Times New Roman" pitchFamily="18" charset="0"/>
+                <a:cs typeface="Times New Roman" pitchFamily="18" charset="0"/>
+              </a:rPr>
+              <a:t>, 1995.</a:t>
+            </a:r>
+            <a:endParaRPr lang="en-GB" altLang="en-US" i="1" dirty="0">
+              <a:latin typeface="Times New Roman" pitchFamily="18" charset="0"/>
+              <a:cs typeface="Times New Roman" pitchFamily="18" charset="0"/>
+            </a:endParaRPr>
           </a:p>
         </p:txBody>
       </p:sp>
@@ -9865,7 +12565,7 @@
         <a:effectLst/>
         <a:extLst>
           <a:ext uri="{AF507438-7753-43E0-B8FC-AC1667EBCBE1}">
-            <a14:hiddenEffects xmlns:a14="http://schemas.microsoft.com/office/drawing/2010/main">
+            <a14:hiddenEffects xmlns:a14="http://schemas.microsoft.com/office/drawing/2010/main" xmlns="">
               <a:effectLst>
                 <a:outerShdw dist="35921" dir="2700000" algn="ctr" rotWithShape="0">
                   <a:schemeClr val="bg2"/>
@@ -9938,7 +12638,7 @@
         <a:effectLst/>
         <a:extLst>
           <a:ext uri="{AF507438-7753-43E0-B8FC-AC1667EBCBE1}">
-            <a14:hiddenEffects xmlns:a14="http://schemas.microsoft.com/office/drawing/2010/main">
+            <a14:hiddenEffects xmlns:a14="http://schemas.microsoft.com/office/drawing/2010/main" xmlns="">
               <a:effectLst>
                 <a:outerShdw dist="35921" dir="2700000" algn="ctr" rotWithShape="0">
                   <a:schemeClr val="bg2"/>

</xml_diff>